<commit_message>
Izzy met with Gergana
</commit_message>
<xml_diff>
--- a/images/prediction_graphs.pptx
+++ b/images/prediction_graphs.pptx
@@ -4,10 +4,14 @@
   <p:sldMasterIdLst>
     <p:sldMasterId id="2147483648" r:id="rId1"/>
   </p:sldMasterIdLst>
+  <p:notesMasterIdLst>
+    <p:notesMasterId r:id="rId6"/>
+  </p:notesMasterIdLst>
   <p:sldIdLst>
     <p:sldId id="256" r:id="rId2"/>
     <p:sldId id="259" r:id="rId3"/>
     <p:sldId id="260" r:id="rId4"/>
+    <p:sldId id="261" r:id="rId5"/>
   </p:sldIdLst>
   <p:sldSz cx="12192000" cy="6858000"/>
   <p:notesSz cx="6858000" cy="9144000"/>
@@ -106,7 +110,448 @@
       </a:defRPr>
     </a:lvl9pPr>
   </p:defaultTextStyle>
+  <p:extLst>
+    <p:ext uri="{EFAFB233-063F-42B5-8137-9DF3F51BA10A}">
+      <p15:sldGuideLst xmlns:p15="http://schemas.microsoft.com/office/powerpoint/2012/main"/>
+    </p:ext>
+  </p:extLst>
 </p:presentation>
+</file>
+
+<file path=ppt/notesMasters/notesMaster1.xml><?xml version="1.0" encoding="utf-8"?>
+<p:notesMaster xmlns:a="http://schemas.openxmlformats.org/drawingml/2006/main" xmlns:r="http://schemas.openxmlformats.org/officeDocument/2006/relationships" xmlns:p="http://schemas.openxmlformats.org/presentationml/2006/main">
+  <p:cSld>
+    <p:bg>
+      <p:bgRef idx="1001">
+        <a:schemeClr val="bg1"/>
+      </p:bgRef>
+    </p:bg>
+    <p:spTree>
+      <p:nvGrpSpPr>
+        <p:cNvPr id="1" name=""/>
+        <p:cNvGrpSpPr/>
+        <p:nvPr/>
+      </p:nvGrpSpPr>
+      <p:grpSpPr>
+        <a:xfrm>
+          <a:off x="0" y="0"/>
+          <a:ext cx="0" cy="0"/>
+          <a:chOff x="0" y="0"/>
+          <a:chExt cx="0" cy="0"/>
+        </a:xfrm>
+      </p:grpSpPr>
+      <p:sp>
+        <p:nvSpPr>
+          <p:cNvPr id="2" name="Header Placeholder 1"/>
+          <p:cNvSpPr>
+            <a:spLocks noGrp="1"/>
+          </p:cNvSpPr>
+          <p:nvPr>
+            <p:ph type="hdr" sz="quarter"/>
+          </p:nvPr>
+        </p:nvSpPr>
+        <p:spPr>
+          <a:xfrm>
+            <a:off x="0" y="0"/>
+            <a:ext cx="2971800" cy="458788"/>
+          </a:xfrm>
+          <a:prstGeom prst="rect">
+            <a:avLst/>
+          </a:prstGeom>
+        </p:spPr>
+        <p:txBody>
+          <a:bodyPr vert="horz" lIns="91440" tIns="45720" rIns="91440" bIns="45720" rtlCol="0"/>
+          <a:lstStyle>
+            <a:lvl1pPr algn="l">
+              <a:defRPr sz="1200"/>
+            </a:lvl1pPr>
+          </a:lstStyle>
+          <a:p>
+            <a:endParaRPr lang="en-US"/>
+          </a:p>
+        </p:txBody>
+      </p:sp>
+      <p:sp>
+        <p:nvSpPr>
+          <p:cNvPr id="3" name="Date Placeholder 2"/>
+          <p:cNvSpPr>
+            <a:spLocks noGrp="1"/>
+          </p:cNvSpPr>
+          <p:nvPr>
+            <p:ph type="dt" idx="1"/>
+          </p:nvPr>
+        </p:nvSpPr>
+        <p:spPr>
+          <a:xfrm>
+            <a:off x="3884613" y="0"/>
+            <a:ext cx="2971800" cy="458788"/>
+          </a:xfrm>
+          <a:prstGeom prst="rect">
+            <a:avLst/>
+          </a:prstGeom>
+        </p:spPr>
+        <p:txBody>
+          <a:bodyPr vert="horz" lIns="91440" tIns="45720" rIns="91440" bIns="45720" rtlCol="0"/>
+          <a:lstStyle>
+            <a:lvl1pPr algn="r">
+              <a:defRPr sz="1200"/>
+            </a:lvl1pPr>
+          </a:lstStyle>
+          <a:p>
+            <a:fld id="{B3983048-CB06-4E44-9303-08BA1CBDE2ED}" type="datetimeFigureOut">
+              <a:rPr lang="en-US" smtClean="0"/>
+              <a:t>2/27/19</a:t>
+            </a:fld>
+            <a:endParaRPr lang="en-US"/>
+          </a:p>
+        </p:txBody>
+      </p:sp>
+      <p:sp>
+        <p:nvSpPr>
+          <p:cNvPr id="4" name="Slide Image Placeholder 3"/>
+          <p:cNvSpPr>
+            <a:spLocks noGrp="1" noRot="1" noChangeAspect="1"/>
+          </p:cNvSpPr>
+          <p:nvPr>
+            <p:ph type="sldImg" idx="2"/>
+          </p:nvPr>
+        </p:nvSpPr>
+        <p:spPr>
+          <a:xfrm>
+            <a:off x="685800" y="1143000"/>
+            <a:ext cx="5486400" cy="3086100"/>
+          </a:xfrm>
+          <a:prstGeom prst="rect">
+            <a:avLst/>
+          </a:prstGeom>
+          <a:noFill/>
+          <a:ln w="12700">
+            <a:solidFill>
+              <a:prstClr val="black"/>
+            </a:solidFill>
+          </a:ln>
+        </p:spPr>
+        <p:txBody>
+          <a:bodyPr vert="horz" lIns="91440" tIns="45720" rIns="91440" bIns="45720" rtlCol="0" anchor="ctr"/>
+          <a:lstStyle/>
+          <a:p>
+            <a:endParaRPr lang="en-US"/>
+          </a:p>
+        </p:txBody>
+      </p:sp>
+      <p:sp>
+        <p:nvSpPr>
+          <p:cNvPr id="5" name="Notes Placeholder 4"/>
+          <p:cNvSpPr>
+            <a:spLocks noGrp="1"/>
+          </p:cNvSpPr>
+          <p:nvPr>
+            <p:ph type="body" sz="quarter" idx="3"/>
+          </p:nvPr>
+        </p:nvSpPr>
+        <p:spPr>
+          <a:xfrm>
+            <a:off x="685800" y="4400550"/>
+            <a:ext cx="5486400" cy="3600450"/>
+          </a:xfrm>
+          <a:prstGeom prst="rect">
+            <a:avLst/>
+          </a:prstGeom>
+        </p:spPr>
+        <p:txBody>
+          <a:bodyPr vert="horz" lIns="91440" tIns="45720" rIns="91440" bIns="45720" rtlCol="0"/>
+          <a:lstStyle/>
+          <a:p>
+            <a:pPr lvl="0"/>
+            <a:r>
+              <a:rPr lang="en-US"/>
+              <a:t>Click to edit Master text styles</a:t>
+            </a:r>
+          </a:p>
+          <a:p>
+            <a:pPr lvl="1"/>
+            <a:r>
+              <a:rPr lang="en-US"/>
+              <a:t>Second level</a:t>
+            </a:r>
+          </a:p>
+          <a:p>
+            <a:pPr lvl="2"/>
+            <a:r>
+              <a:rPr lang="en-US"/>
+              <a:t>Third level</a:t>
+            </a:r>
+          </a:p>
+          <a:p>
+            <a:pPr lvl="3"/>
+            <a:r>
+              <a:rPr lang="en-US"/>
+              <a:t>Fourth level</a:t>
+            </a:r>
+          </a:p>
+          <a:p>
+            <a:pPr lvl="4"/>
+            <a:r>
+              <a:rPr lang="en-US"/>
+              <a:t>Fifth level</a:t>
+            </a:r>
+          </a:p>
+        </p:txBody>
+      </p:sp>
+      <p:sp>
+        <p:nvSpPr>
+          <p:cNvPr id="6" name="Footer Placeholder 5"/>
+          <p:cNvSpPr>
+            <a:spLocks noGrp="1"/>
+          </p:cNvSpPr>
+          <p:nvPr>
+            <p:ph type="ftr" sz="quarter" idx="4"/>
+          </p:nvPr>
+        </p:nvSpPr>
+        <p:spPr>
+          <a:xfrm>
+            <a:off x="0" y="8685213"/>
+            <a:ext cx="2971800" cy="458787"/>
+          </a:xfrm>
+          <a:prstGeom prst="rect">
+            <a:avLst/>
+          </a:prstGeom>
+        </p:spPr>
+        <p:txBody>
+          <a:bodyPr vert="horz" lIns="91440" tIns="45720" rIns="91440" bIns="45720" rtlCol="0" anchor="b"/>
+          <a:lstStyle>
+            <a:lvl1pPr algn="l">
+              <a:defRPr sz="1200"/>
+            </a:lvl1pPr>
+          </a:lstStyle>
+          <a:p>
+            <a:endParaRPr lang="en-US"/>
+          </a:p>
+        </p:txBody>
+      </p:sp>
+      <p:sp>
+        <p:nvSpPr>
+          <p:cNvPr id="7" name="Slide Number Placeholder 6"/>
+          <p:cNvSpPr>
+            <a:spLocks noGrp="1"/>
+          </p:cNvSpPr>
+          <p:nvPr>
+            <p:ph type="sldNum" sz="quarter" idx="5"/>
+          </p:nvPr>
+        </p:nvSpPr>
+        <p:spPr>
+          <a:xfrm>
+            <a:off x="3884613" y="8685213"/>
+            <a:ext cx="2971800" cy="458787"/>
+          </a:xfrm>
+          <a:prstGeom prst="rect">
+            <a:avLst/>
+          </a:prstGeom>
+        </p:spPr>
+        <p:txBody>
+          <a:bodyPr vert="horz" lIns="91440" tIns="45720" rIns="91440" bIns="45720" rtlCol="0" anchor="b"/>
+          <a:lstStyle>
+            <a:lvl1pPr algn="r">
+              <a:defRPr sz="1200"/>
+            </a:lvl1pPr>
+          </a:lstStyle>
+          <a:p>
+            <a:fld id="{9BCE8D36-C1BF-224E-B7E6-C084A11AC8D6}" type="slidenum">
+              <a:rPr lang="en-US" smtClean="0"/>
+              <a:t>‹#›</a:t>
+            </a:fld>
+            <a:endParaRPr lang="en-US"/>
+          </a:p>
+        </p:txBody>
+      </p:sp>
+    </p:spTree>
+    <p:extLst>
+      <p:ext uri="{BB962C8B-B14F-4D97-AF65-F5344CB8AC3E}">
+        <p14:creationId xmlns:p14="http://schemas.microsoft.com/office/powerpoint/2010/main" val="2207247840"/>
+      </p:ext>
+    </p:extLst>
+  </p:cSld>
+  <p:clrMap bg1="lt1" tx1="dk1" bg2="lt2" tx2="dk2" accent1="accent1" accent2="accent2" accent3="accent3" accent4="accent4" accent5="accent5" accent6="accent6" hlink="hlink" folHlink="folHlink"/>
+  <p:notesStyle>
+    <a:lvl1pPr marL="0" algn="l" defTabSz="914400" rtl="0" eaLnBrk="1" latinLnBrk="0" hangingPunct="1">
+      <a:defRPr sz="1200" kern="1200">
+        <a:solidFill>
+          <a:schemeClr val="tx1"/>
+        </a:solidFill>
+        <a:latin typeface="+mn-lt"/>
+        <a:ea typeface="+mn-ea"/>
+        <a:cs typeface="+mn-cs"/>
+      </a:defRPr>
+    </a:lvl1pPr>
+    <a:lvl2pPr marL="457200" algn="l" defTabSz="914400" rtl="0" eaLnBrk="1" latinLnBrk="0" hangingPunct="1">
+      <a:defRPr sz="1200" kern="1200">
+        <a:solidFill>
+          <a:schemeClr val="tx1"/>
+        </a:solidFill>
+        <a:latin typeface="+mn-lt"/>
+        <a:ea typeface="+mn-ea"/>
+        <a:cs typeface="+mn-cs"/>
+      </a:defRPr>
+    </a:lvl2pPr>
+    <a:lvl3pPr marL="914400" algn="l" defTabSz="914400" rtl="0" eaLnBrk="1" latinLnBrk="0" hangingPunct="1">
+      <a:defRPr sz="1200" kern="1200">
+        <a:solidFill>
+          <a:schemeClr val="tx1"/>
+        </a:solidFill>
+        <a:latin typeface="+mn-lt"/>
+        <a:ea typeface="+mn-ea"/>
+        <a:cs typeface="+mn-cs"/>
+      </a:defRPr>
+    </a:lvl3pPr>
+    <a:lvl4pPr marL="1371600" algn="l" defTabSz="914400" rtl="0" eaLnBrk="1" latinLnBrk="0" hangingPunct="1">
+      <a:defRPr sz="1200" kern="1200">
+        <a:solidFill>
+          <a:schemeClr val="tx1"/>
+        </a:solidFill>
+        <a:latin typeface="+mn-lt"/>
+        <a:ea typeface="+mn-ea"/>
+        <a:cs typeface="+mn-cs"/>
+      </a:defRPr>
+    </a:lvl4pPr>
+    <a:lvl5pPr marL="1828800" algn="l" defTabSz="914400" rtl="0" eaLnBrk="1" latinLnBrk="0" hangingPunct="1">
+      <a:defRPr sz="1200" kern="1200">
+        <a:solidFill>
+          <a:schemeClr val="tx1"/>
+        </a:solidFill>
+        <a:latin typeface="+mn-lt"/>
+        <a:ea typeface="+mn-ea"/>
+        <a:cs typeface="+mn-cs"/>
+      </a:defRPr>
+    </a:lvl5pPr>
+    <a:lvl6pPr marL="2286000" algn="l" defTabSz="914400" rtl="0" eaLnBrk="1" latinLnBrk="0" hangingPunct="1">
+      <a:defRPr sz="1200" kern="1200">
+        <a:solidFill>
+          <a:schemeClr val="tx1"/>
+        </a:solidFill>
+        <a:latin typeface="+mn-lt"/>
+        <a:ea typeface="+mn-ea"/>
+        <a:cs typeface="+mn-cs"/>
+      </a:defRPr>
+    </a:lvl6pPr>
+    <a:lvl7pPr marL="2743200" algn="l" defTabSz="914400" rtl="0" eaLnBrk="1" latinLnBrk="0" hangingPunct="1">
+      <a:defRPr sz="1200" kern="1200">
+        <a:solidFill>
+          <a:schemeClr val="tx1"/>
+        </a:solidFill>
+        <a:latin typeface="+mn-lt"/>
+        <a:ea typeface="+mn-ea"/>
+        <a:cs typeface="+mn-cs"/>
+      </a:defRPr>
+    </a:lvl7pPr>
+    <a:lvl8pPr marL="3200400" algn="l" defTabSz="914400" rtl="0" eaLnBrk="1" latinLnBrk="0" hangingPunct="1">
+      <a:defRPr sz="1200" kern="1200">
+        <a:solidFill>
+          <a:schemeClr val="tx1"/>
+        </a:solidFill>
+        <a:latin typeface="+mn-lt"/>
+        <a:ea typeface="+mn-ea"/>
+        <a:cs typeface="+mn-cs"/>
+      </a:defRPr>
+    </a:lvl8pPr>
+    <a:lvl9pPr marL="3657600" algn="l" defTabSz="914400" rtl="0" eaLnBrk="1" latinLnBrk="0" hangingPunct="1">
+      <a:defRPr sz="1200" kern="1200">
+        <a:solidFill>
+          <a:schemeClr val="tx1"/>
+        </a:solidFill>
+        <a:latin typeface="+mn-lt"/>
+        <a:ea typeface="+mn-ea"/>
+        <a:cs typeface="+mn-cs"/>
+      </a:defRPr>
+    </a:lvl9pPr>
+  </p:notesStyle>
+</p:notesMaster>
+</file>
+
+<file path=ppt/notesSlides/notesSlide1.xml><?xml version="1.0" encoding="utf-8"?>
+<p:notes xmlns:a="http://schemas.openxmlformats.org/drawingml/2006/main" xmlns:r="http://schemas.openxmlformats.org/officeDocument/2006/relationships" xmlns:p="http://schemas.openxmlformats.org/presentationml/2006/main">
+  <p:cSld>
+    <p:spTree>
+      <p:nvGrpSpPr>
+        <p:cNvPr id="1" name=""/>
+        <p:cNvGrpSpPr/>
+        <p:nvPr/>
+      </p:nvGrpSpPr>
+      <p:grpSpPr>
+        <a:xfrm>
+          <a:off x="0" y="0"/>
+          <a:ext cx="0" cy="0"/>
+          <a:chOff x="0" y="0"/>
+          <a:chExt cx="0" cy="0"/>
+        </a:xfrm>
+      </p:grpSpPr>
+      <p:sp>
+        <p:nvSpPr>
+          <p:cNvPr id="2" name="Slide Image Placeholder 1"/>
+          <p:cNvSpPr>
+            <a:spLocks noGrp="1" noRot="1" noChangeAspect="1"/>
+          </p:cNvSpPr>
+          <p:nvPr>
+            <p:ph type="sldImg"/>
+          </p:nvPr>
+        </p:nvSpPr>
+        <p:spPr/>
+      </p:sp>
+      <p:sp>
+        <p:nvSpPr>
+          <p:cNvPr id="3" name="Notes Placeholder 2"/>
+          <p:cNvSpPr>
+            <a:spLocks noGrp="1"/>
+          </p:cNvSpPr>
+          <p:nvPr>
+            <p:ph type="body" idx="1"/>
+          </p:nvPr>
+        </p:nvSpPr>
+        <p:spPr/>
+        <p:txBody>
+          <a:bodyPr/>
+          <a:lstStyle/>
+          <a:p>
+            <a:endParaRPr lang="en-US" dirty="0"/>
+          </a:p>
+          <a:p>
+            <a:endParaRPr lang="en-US" dirty="0"/>
+          </a:p>
+        </p:txBody>
+      </p:sp>
+      <p:sp>
+        <p:nvSpPr>
+          <p:cNvPr id="4" name="Slide Number Placeholder 3"/>
+          <p:cNvSpPr>
+            <a:spLocks noGrp="1"/>
+          </p:cNvSpPr>
+          <p:nvPr>
+            <p:ph type="sldNum" sz="quarter" idx="5"/>
+          </p:nvPr>
+        </p:nvSpPr>
+        <p:spPr/>
+        <p:txBody>
+          <a:bodyPr/>
+          <a:lstStyle/>
+          <a:p>
+            <a:fld id="{9BCE8D36-C1BF-224E-B7E6-C084A11AC8D6}" type="slidenum">
+              <a:rPr lang="en-US" smtClean="0"/>
+              <a:t>4</a:t>
+            </a:fld>
+            <a:endParaRPr lang="en-US"/>
+          </a:p>
+        </p:txBody>
+      </p:sp>
+    </p:spTree>
+    <p:extLst>
+      <p:ext uri="{BB962C8B-B14F-4D97-AF65-F5344CB8AC3E}">
+        <p14:creationId xmlns:p14="http://schemas.microsoft.com/office/powerpoint/2010/main" val="3180003472"/>
+      </p:ext>
+    </p:extLst>
+  </p:cSld>
+  <p:clrMapOvr>
+    <a:masterClrMapping/>
+  </p:clrMapOvr>
+</p:notes>
 </file>
 
 <file path=ppt/slideLayouts/slideLayout1.xml><?xml version="1.0" encoding="utf-8"?>
@@ -256,7 +701,7 @@
           <a:p>
             <a:fld id="{CF1B88E2-74B9-C74C-93C7-A1E2B177FB07}" type="datetimeFigureOut">
               <a:rPr lang="en-US" smtClean="0"/>
-              <a:t>2/26/19</a:t>
+              <a:t>2/27/19</a:t>
             </a:fld>
             <a:endParaRPr lang="en-US"/>
           </a:p>
@@ -454,7 +899,7 @@
           <a:p>
             <a:fld id="{CF1B88E2-74B9-C74C-93C7-A1E2B177FB07}" type="datetimeFigureOut">
               <a:rPr lang="en-US" smtClean="0"/>
-              <a:t>2/26/19</a:t>
+              <a:t>2/27/19</a:t>
             </a:fld>
             <a:endParaRPr lang="en-US"/>
           </a:p>
@@ -662,7 +1107,7 @@
           <a:p>
             <a:fld id="{CF1B88E2-74B9-C74C-93C7-A1E2B177FB07}" type="datetimeFigureOut">
               <a:rPr lang="en-US" smtClean="0"/>
-              <a:t>2/26/19</a:t>
+              <a:t>2/27/19</a:t>
             </a:fld>
             <a:endParaRPr lang="en-US"/>
           </a:p>
@@ -860,7 +1305,7 @@
           <a:p>
             <a:fld id="{CF1B88E2-74B9-C74C-93C7-A1E2B177FB07}" type="datetimeFigureOut">
               <a:rPr lang="en-US" smtClean="0"/>
-              <a:t>2/26/19</a:t>
+              <a:t>2/27/19</a:t>
             </a:fld>
             <a:endParaRPr lang="en-US"/>
           </a:p>
@@ -1135,7 +1580,7 @@
           <a:p>
             <a:fld id="{CF1B88E2-74B9-C74C-93C7-A1E2B177FB07}" type="datetimeFigureOut">
               <a:rPr lang="en-US" smtClean="0"/>
-              <a:t>2/26/19</a:t>
+              <a:t>2/27/19</a:t>
             </a:fld>
             <a:endParaRPr lang="en-US"/>
           </a:p>
@@ -1400,7 +1845,7 @@
           <a:p>
             <a:fld id="{CF1B88E2-74B9-C74C-93C7-A1E2B177FB07}" type="datetimeFigureOut">
               <a:rPr lang="en-US" smtClean="0"/>
-              <a:t>2/26/19</a:t>
+              <a:t>2/27/19</a:t>
             </a:fld>
             <a:endParaRPr lang="en-US"/>
           </a:p>
@@ -1812,7 +2257,7 @@
           <a:p>
             <a:fld id="{CF1B88E2-74B9-C74C-93C7-A1E2B177FB07}" type="datetimeFigureOut">
               <a:rPr lang="en-US" smtClean="0"/>
-              <a:t>2/26/19</a:t>
+              <a:t>2/27/19</a:t>
             </a:fld>
             <a:endParaRPr lang="en-US"/>
           </a:p>
@@ -1953,7 +2398,7 @@
           <a:p>
             <a:fld id="{CF1B88E2-74B9-C74C-93C7-A1E2B177FB07}" type="datetimeFigureOut">
               <a:rPr lang="en-US" smtClean="0"/>
-              <a:t>2/26/19</a:t>
+              <a:t>2/27/19</a:t>
             </a:fld>
             <a:endParaRPr lang="en-US"/>
           </a:p>
@@ -2066,7 +2511,7 @@
           <a:p>
             <a:fld id="{CF1B88E2-74B9-C74C-93C7-A1E2B177FB07}" type="datetimeFigureOut">
               <a:rPr lang="en-US" smtClean="0"/>
-              <a:t>2/26/19</a:t>
+              <a:t>2/27/19</a:t>
             </a:fld>
             <a:endParaRPr lang="en-US"/>
           </a:p>
@@ -2377,7 +2822,7 @@
           <a:p>
             <a:fld id="{CF1B88E2-74B9-C74C-93C7-A1E2B177FB07}" type="datetimeFigureOut">
               <a:rPr lang="en-US" smtClean="0"/>
-              <a:t>2/26/19</a:t>
+              <a:t>2/27/19</a:t>
             </a:fld>
             <a:endParaRPr lang="en-US"/>
           </a:p>
@@ -2665,7 +3110,7 @@
           <a:p>
             <a:fld id="{CF1B88E2-74B9-C74C-93C7-A1E2B177FB07}" type="datetimeFigureOut">
               <a:rPr lang="en-US" smtClean="0"/>
-              <a:t>2/26/19</a:t>
+              <a:t>2/27/19</a:t>
             </a:fld>
             <a:endParaRPr lang="en-US"/>
           </a:p>
@@ -2906,7 +3351,7 @@
           <a:p>
             <a:fld id="{CF1B88E2-74B9-C74C-93C7-A1E2B177FB07}" type="datetimeFigureOut">
               <a:rPr lang="en-US" smtClean="0"/>
-              <a:t>2/26/19</a:t>
+              <a:t>2/27/19</a:t>
             </a:fld>
             <a:endParaRPr lang="en-US"/>
           </a:p>
@@ -3652,8 +4097,8 @@
         </p:nvSpPr>
         <p:spPr>
           <a:xfrm rot="16200000">
-            <a:off x="1867300" y="3762660"/>
-            <a:ext cx="1473480" cy="338554"/>
+            <a:off x="1541891" y="3762660"/>
+            <a:ext cx="2124299" cy="338554"/>
           </a:xfrm>
           <a:prstGeom prst="rect">
             <a:avLst/>
@@ -3670,7 +4115,7 @@
               <a:rPr lang="en-US" sz="1600" dirty="0">
                 <a:latin typeface="Helvetica" pitchFamily="2" charset="0"/>
               </a:rPr>
-              <a:t>Land use type</a:t>
+              <a:t>Area of land use type</a:t>
             </a:r>
           </a:p>
         </p:txBody>
@@ -4235,7 +4680,7 @@
                 <a:effectLst/>
                 <a:latin typeface="Helvetica" pitchFamily="2" charset="0"/>
               </a:rPr>
-              <a:t>Is the strength and direction of land-use change different among extensive,</a:t>
+              <a:t>Are the strength and direction of land-use change different among extensive,</a:t>
             </a:r>
           </a:p>
           <a:p>
@@ -4531,8 +4976,8 @@
         </p:nvSpPr>
         <p:spPr>
           <a:xfrm rot="16200000">
-            <a:off x="539132" y="3634257"/>
-            <a:ext cx="1473480" cy="338554"/>
+            <a:off x="213723" y="3634257"/>
+            <a:ext cx="2124299" cy="338554"/>
           </a:xfrm>
           <a:prstGeom prst="rect">
             <a:avLst/>
@@ -4549,7 +4994,7 @@
               <a:rPr lang="en-US" sz="1600" dirty="0">
                 <a:latin typeface="Helvetica" pitchFamily="2" charset="0"/>
               </a:rPr>
-              <a:t>Land use type</a:t>
+              <a:t>Area of land use type</a:t>
             </a:r>
           </a:p>
         </p:txBody>
@@ -5733,19 +6178,8 @@
                 <a:effectLst/>
                 <a:latin typeface="Helvetica" pitchFamily="2" charset="0"/>
               </a:rPr>
-              <a:t>Is there a time lag between socio-economic events and the occurrence of </a:t>
-            </a:r>
-            <a:r>
-              <a:rPr lang="en-US" b="1" dirty="0" err="1">
-                <a:effectLst/>
-                <a:latin typeface="Helvetica" pitchFamily="2" charset="0"/>
-              </a:rPr>
-              <a:t>landuse</a:t>
-            </a:r>
-            <a:endParaRPr lang="en-US" b="1" dirty="0">
-              <a:effectLst/>
-              <a:latin typeface="Helvetica" pitchFamily="2" charset="0"/>
-            </a:endParaRPr>
+              <a:t>Is there a time lag between socio-economic events and the occurrence of land use</a:t>
+            </a:r>
           </a:p>
           <a:p>
             <a:pPr algn="ctr"/>
@@ -6047,8 +6481,8 @@
         </p:nvSpPr>
         <p:spPr>
           <a:xfrm rot="16200000">
-            <a:off x="539132" y="3634257"/>
-            <a:ext cx="1473480" cy="338554"/>
+            <a:off x="213724" y="3634257"/>
+            <a:ext cx="2124299" cy="338554"/>
           </a:xfrm>
           <a:prstGeom prst="rect">
             <a:avLst/>
@@ -6065,7 +6499,7 @@
               <a:rPr lang="en-US" sz="1600" dirty="0">
                 <a:latin typeface="Helvetica" pitchFamily="2" charset="0"/>
               </a:rPr>
-              <a:t>Land use type</a:t>
+              <a:t>Area of land use type</a:t>
             </a:r>
           </a:p>
         </p:txBody>
@@ -7247,6 +7681,145 @@
     <p:extLst>
       <p:ext uri="{BB962C8B-B14F-4D97-AF65-F5344CB8AC3E}">
         <p14:creationId xmlns:p14="http://schemas.microsoft.com/office/powerpoint/2010/main" val="2338005841"/>
+      </p:ext>
+    </p:extLst>
+  </p:cSld>
+  <p:clrMapOvr>
+    <a:masterClrMapping/>
+  </p:clrMapOvr>
+</p:sld>
+</file>
+
+<file path=ppt/slides/slide4.xml><?xml version="1.0" encoding="utf-8"?>
+<p:sld xmlns:a="http://schemas.openxmlformats.org/drawingml/2006/main" xmlns:r="http://schemas.openxmlformats.org/officeDocument/2006/relationships" xmlns:p="http://schemas.openxmlformats.org/presentationml/2006/main">
+  <p:cSld>
+    <p:spTree>
+      <p:nvGrpSpPr>
+        <p:cNvPr id="1" name=""/>
+        <p:cNvGrpSpPr/>
+        <p:nvPr/>
+      </p:nvGrpSpPr>
+      <p:grpSpPr>
+        <a:xfrm>
+          <a:off x="0" y="0"/>
+          <a:ext cx="0" cy="0"/>
+          <a:chOff x="0" y="0"/>
+          <a:chExt cx="0" cy="0"/>
+        </a:xfrm>
+      </p:grpSpPr>
+      <p:sp>
+        <p:nvSpPr>
+          <p:cNvPr id="2" name="Title 1">
+            <a:extLst>
+              <a:ext uri="{FF2B5EF4-FFF2-40B4-BE49-F238E27FC236}">
+                <a16:creationId xmlns:a16="http://schemas.microsoft.com/office/drawing/2014/main" id="{97680B40-0CF3-074E-8A6F-55F537940696}"/>
+              </a:ext>
+            </a:extLst>
+          </p:cNvPr>
+          <p:cNvSpPr>
+            <a:spLocks noGrp="1"/>
+          </p:cNvSpPr>
+          <p:nvPr>
+            <p:ph type="title"/>
+          </p:nvPr>
+        </p:nvSpPr>
+        <p:spPr/>
+        <p:txBody>
+          <a:bodyPr/>
+          <a:lstStyle/>
+          <a:p>
+            <a:r>
+              <a:rPr lang="en-US" dirty="0"/>
+              <a:t>Notes from Gergana</a:t>
+            </a:r>
+          </a:p>
+        </p:txBody>
+      </p:sp>
+      <p:sp>
+        <p:nvSpPr>
+          <p:cNvPr id="3" name="Content Placeholder 2">
+            <a:extLst>
+              <a:ext uri="{FF2B5EF4-FFF2-40B4-BE49-F238E27FC236}">
+                <a16:creationId xmlns:a16="http://schemas.microsoft.com/office/drawing/2014/main" id="{31F69497-915F-7246-956B-8974E5E8B3E5}"/>
+              </a:ext>
+            </a:extLst>
+          </p:cNvPr>
+          <p:cNvSpPr>
+            <a:spLocks noGrp="1"/>
+          </p:cNvSpPr>
+          <p:nvPr>
+            <p:ph idx="1"/>
+          </p:nvPr>
+        </p:nvSpPr>
+        <p:spPr/>
+        <p:txBody>
+          <a:bodyPr>
+            <a:normAutofit lnSpcReduction="10000"/>
+          </a:bodyPr>
+          <a:lstStyle/>
+          <a:p>
+            <a:r>
+              <a:rPr lang="en-US" dirty="0"/>
+              <a:t>Have it all on one same graph  but highlight different things on 3 duplicates e.g. the time lag</a:t>
+            </a:r>
+          </a:p>
+          <a:p>
+            <a:r>
+              <a:rPr lang="en-US" dirty="0"/>
+              <a:t>First one is not clear, make copies of others </a:t>
+            </a:r>
+          </a:p>
+          <a:p>
+            <a:r>
+              <a:rPr lang="en-US" dirty="0"/>
+              <a:t>Show lag after EU better – increase in intensive and extensive after a while </a:t>
+            </a:r>
+          </a:p>
+          <a:p>
+            <a:r>
+              <a:rPr lang="en-US" dirty="0"/>
+              <a:t>Revisit predictions – not all abandoned came from extensive after SUC</a:t>
+            </a:r>
+          </a:p>
+          <a:p>
+            <a:pPr lvl="1"/>
+            <a:r>
+              <a:rPr lang="en-US" dirty="0"/>
+              <a:t>Not much of an increase of intensive agriculture after SUC</a:t>
+            </a:r>
+          </a:p>
+          <a:p>
+            <a:pPr lvl="1"/>
+            <a:r>
+              <a:rPr lang="en-US" dirty="0"/>
+              <a:t>Co-ops disappearing </a:t>
+            </a:r>
+            <a:r>
+              <a:rPr lang="en-US" dirty="0">
+                <a:sym typeface="Wingdings" pitchFamily="2" charset="2"/>
+              </a:rPr>
+              <a:t> look into this</a:t>
+            </a:r>
+            <a:endParaRPr lang="en-US" dirty="0"/>
+          </a:p>
+          <a:p>
+            <a:r>
+              <a:rPr lang="en-US" dirty="0"/>
+              <a:t>Lag for intensive cause of changing ownership after SUC?</a:t>
+            </a:r>
+          </a:p>
+          <a:p>
+            <a:endParaRPr lang="en-US" dirty="0"/>
+          </a:p>
+          <a:p>
+            <a:endParaRPr lang="en-US" dirty="0"/>
+          </a:p>
+        </p:txBody>
+      </p:sp>
+    </p:spTree>
+    <p:extLst>
+      <p:ext uri="{BB962C8B-B14F-4D97-AF65-F5344CB8AC3E}">
+        <p14:creationId xmlns:p14="http://schemas.microsoft.com/office/powerpoint/2010/main" val="2064874983"/>
       </p:ext>
     </p:extLst>
   </p:cSld>
@@ -7549,4 +8122,299 @@
     </a:ext>
   </a:extLst>
 </a:theme>
+</file>
+
+<file path=ppt/theme/theme2.xml><?xml version="1.0" encoding="utf-8"?>
+<a:theme xmlns:a="http://schemas.openxmlformats.org/drawingml/2006/main" name="Office Theme">
+  <a:themeElements>
+    <a:clrScheme name="Office">
+      <a:dk1>
+        <a:sysClr val="windowText" lastClr="000000"/>
+      </a:dk1>
+      <a:lt1>
+        <a:sysClr val="window" lastClr="FFFFFF"/>
+      </a:lt1>
+      <a:dk2>
+        <a:srgbClr val="44546A"/>
+      </a:dk2>
+      <a:lt2>
+        <a:srgbClr val="E7E6E6"/>
+      </a:lt2>
+      <a:accent1>
+        <a:srgbClr val="4472C4"/>
+      </a:accent1>
+      <a:accent2>
+        <a:srgbClr val="ED7D31"/>
+      </a:accent2>
+      <a:accent3>
+        <a:srgbClr val="A5A5A5"/>
+      </a:accent3>
+      <a:accent4>
+        <a:srgbClr val="FFC000"/>
+      </a:accent4>
+      <a:accent5>
+        <a:srgbClr val="5B9BD5"/>
+      </a:accent5>
+      <a:accent6>
+        <a:srgbClr val="70AD47"/>
+      </a:accent6>
+      <a:hlink>
+        <a:srgbClr val="0563C1"/>
+      </a:hlink>
+      <a:folHlink>
+        <a:srgbClr val="954F72"/>
+      </a:folHlink>
+    </a:clrScheme>
+    <a:fontScheme name="Office">
+      <a:majorFont>
+        <a:latin typeface="Calibri Light" panose="020F0302020204030204"/>
+        <a:ea typeface=""/>
+        <a:cs typeface=""/>
+        <a:font script="Jpan" typeface="游ゴシック Light"/>
+        <a:font script="Hang" typeface="맑은 고딕"/>
+        <a:font script="Hans" typeface="等线 Light"/>
+        <a:font script="Hant" typeface="新細明體"/>
+        <a:font script="Arab" typeface="Times New Roman"/>
+        <a:font script="Hebr" typeface="Times New Roman"/>
+        <a:font script="Thai" typeface="Angsana New"/>
+        <a:font script="Ethi" typeface="Nyala"/>
+        <a:font script="Beng" typeface="Vrinda"/>
+        <a:font script="Gujr" typeface="Shruti"/>
+        <a:font script="Khmr" typeface="MoolBoran"/>
+        <a:font script="Knda" typeface="Tunga"/>
+        <a:font script="Guru" typeface="Raavi"/>
+        <a:font script="Cans" typeface="Euphemia"/>
+        <a:font script="Cher" typeface="Plantagenet Cherokee"/>
+        <a:font script="Yiii" typeface="Microsoft Yi Baiti"/>
+        <a:font script="Tibt" typeface="Microsoft Himalaya"/>
+        <a:font script="Thaa" typeface="MV Boli"/>
+        <a:font script="Deva" typeface="Mangal"/>
+        <a:font script="Telu" typeface="Gautami"/>
+        <a:font script="Taml" typeface="Latha"/>
+        <a:font script="Syrc" typeface="Estrangelo Edessa"/>
+        <a:font script="Orya" typeface="Kalinga"/>
+        <a:font script="Mlym" typeface="Kartika"/>
+        <a:font script="Laoo" typeface="DokChampa"/>
+        <a:font script="Sinh" typeface="Iskoola Pota"/>
+        <a:font script="Mong" typeface="Mongolian Baiti"/>
+        <a:font script="Viet" typeface="Times New Roman"/>
+        <a:font script="Uigh" typeface="Microsoft Uighur"/>
+        <a:font script="Geor" typeface="Sylfaen"/>
+        <a:font script="Armn" typeface="Arial"/>
+        <a:font script="Bugi" typeface="Leelawadee UI"/>
+        <a:font script="Bopo" typeface="Microsoft JhengHei"/>
+        <a:font script="Java" typeface="Javanese Text"/>
+        <a:font script="Lisu" typeface="Segoe UI"/>
+        <a:font script="Mymr" typeface="Myanmar Text"/>
+        <a:font script="Nkoo" typeface="Ebrima"/>
+        <a:font script="Olck" typeface="Nirmala UI"/>
+        <a:font script="Osma" typeface="Ebrima"/>
+        <a:font script="Phag" typeface="Phagspa"/>
+        <a:font script="Syrn" typeface="Estrangelo Edessa"/>
+        <a:font script="Syrj" typeface="Estrangelo Edessa"/>
+        <a:font script="Syre" typeface="Estrangelo Edessa"/>
+        <a:font script="Sora" typeface="Nirmala UI"/>
+        <a:font script="Tale" typeface="Microsoft Tai Le"/>
+        <a:font script="Talu" typeface="Microsoft New Tai Lue"/>
+        <a:font script="Tfng" typeface="Ebrima"/>
+      </a:majorFont>
+      <a:minorFont>
+        <a:latin typeface="Calibri" panose="020F0502020204030204"/>
+        <a:ea typeface=""/>
+        <a:cs typeface=""/>
+        <a:font script="Jpan" typeface="游ゴシック"/>
+        <a:font script="Hang" typeface="맑은 고딕"/>
+        <a:font script="Hans" typeface="等线"/>
+        <a:font script="Hant" typeface="新細明體"/>
+        <a:font script="Arab" typeface="Arial"/>
+        <a:font script="Hebr" typeface="Arial"/>
+        <a:font script="Thai" typeface="Cordia New"/>
+        <a:font script="Ethi" typeface="Nyala"/>
+        <a:font script="Beng" typeface="Vrinda"/>
+        <a:font script="Gujr" typeface="Shruti"/>
+        <a:font script="Khmr" typeface="DaunPenh"/>
+        <a:font script="Knda" typeface="Tunga"/>
+        <a:font script="Guru" typeface="Raavi"/>
+        <a:font script="Cans" typeface="Euphemia"/>
+        <a:font script="Cher" typeface="Plantagenet Cherokee"/>
+        <a:font script="Yiii" typeface="Microsoft Yi Baiti"/>
+        <a:font script="Tibt" typeface="Microsoft Himalaya"/>
+        <a:font script="Thaa" typeface="MV Boli"/>
+        <a:font script="Deva" typeface="Mangal"/>
+        <a:font script="Telu" typeface="Gautami"/>
+        <a:font script="Taml" typeface="Latha"/>
+        <a:font script="Syrc" typeface="Estrangelo Edessa"/>
+        <a:font script="Orya" typeface="Kalinga"/>
+        <a:font script="Mlym" typeface="Kartika"/>
+        <a:font script="Laoo" typeface="DokChampa"/>
+        <a:font script="Sinh" typeface="Iskoola Pota"/>
+        <a:font script="Mong" typeface="Mongolian Baiti"/>
+        <a:font script="Viet" typeface="Arial"/>
+        <a:font script="Uigh" typeface="Microsoft Uighur"/>
+        <a:font script="Geor" typeface="Sylfaen"/>
+        <a:font script="Armn" typeface="Arial"/>
+        <a:font script="Bugi" typeface="Leelawadee UI"/>
+        <a:font script="Bopo" typeface="Microsoft JhengHei"/>
+        <a:font script="Java" typeface="Javanese Text"/>
+        <a:font script="Lisu" typeface="Segoe UI"/>
+        <a:font script="Mymr" typeface="Myanmar Text"/>
+        <a:font script="Nkoo" typeface="Ebrima"/>
+        <a:font script="Olck" typeface="Nirmala UI"/>
+        <a:font script="Osma" typeface="Ebrima"/>
+        <a:font script="Phag" typeface="Phagspa"/>
+        <a:font script="Syrn" typeface="Estrangelo Edessa"/>
+        <a:font script="Syrj" typeface="Estrangelo Edessa"/>
+        <a:font script="Syre" typeface="Estrangelo Edessa"/>
+        <a:font script="Sora" typeface="Nirmala UI"/>
+        <a:font script="Tale" typeface="Microsoft Tai Le"/>
+        <a:font script="Talu" typeface="Microsoft New Tai Lue"/>
+        <a:font script="Tfng" typeface="Ebrima"/>
+      </a:minorFont>
+    </a:fontScheme>
+    <a:fmtScheme name="Office">
+      <a:fillStyleLst>
+        <a:solidFill>
+          <a:schemeClr val="phClr"/>
+        </a:solidFill>
+        <a:gradFill rotWithShape="1">
+          <a:gsLst>
+            <a:gs pos="0">
+              <a:schemeClr val="phClr">
+                <a:lumMod val="110000"/>
+                <a:satMod val="105000"/>
+                <a:tint val="67000"/>
+              </a:schemeClr>
+            </a:gs>
+            <a:gs pos="50000">
+              <a:schemeClr val="phClr">
+                <a:lumMod val="105000"/>
+                <a:satMod val="103000"/>
+                <a:tint val="73000"/>
+              </a:schemeClr>
+            </a:gs>
+            <a:gs pos="100000">
+              <a:schemeClr val="phClr">
+                <a:lumMod val="105000"/>
+                <a:satMod val="109000"/>
+                <a:tint val="81000"/>
+              </a:schemeClr>
+            </a:gs>
+          </a:gsLst>
+          <a:lin ang="5400000" scaled="0"/>
+        </a:gradFill>
+        <a:gradFill rotWithShape="1">
+          <a:gsLst>
+            <a:gs pos="0">
+              <a:schemeClr val="phClr">
+                <a:satMod val="103000"/>
+                <a:lumMod val="102000"/>
+                <a:tint val="94000"/>
+              </a:schemeClr>
+            </a:gs>
+            <a:gs pos="50000">
+              <a:schemeClr val="phClr">
+                <a:satMod val="110000"/>
+                <a:lumMod val="100000"/>
+                <a:shade val="100000"/>
+              </a:schemeClr>
+            </a:gs>
+            <a:gs pos="100000">
+              <a:schemeClr val="phClr">
+                <a:lumMod val="99000"/>
+                <a:satMod val="120000"/>
+                <a:shade val="78000"/>
+              </a:schemeClr>
+            </a:gs>
+          </a:gsLst>
+          <a:lin ang="5400000" scaled="0"/>
+        </a:gradFill>
+      </a:fillStyleLst>
+      <a:lnStyleLst>
+        <a:ln w="6350" cap="flat" cmpd="sng" algn="ctr">
+          <a:solidFill>
+            <a:schemeClr val="phClr"/>
+          </a:solidFill>
+          <a:prstDash val="solid"/>
+          <a:miter lim="800000"/>
+        </a:ln>
+        <a:ln w="12700" cap="flat" cmpd="sng" algn="ctr">
+          <a:solidFill>
+            <a:schemeClr val="phClr"/>
+          </a:solidFill>
+          <a:prstDash val="solid"/>
+          <a:miter lim="800000"/>
+        </a:ln>
+        <a:ln w="19050" cap="flat" cmpd="sng" algn="ctr">
+          <a:solidFill>
+            <a:schemeClr val="phClr"/>
+          </a:solidFill>
+          <a:prstDash val="solid"/>
+          <a:miter lim="800000"/>
+        </a:ln>
+      </a:lnStyleLst>
+      <a:effectStyleLst>
+        <a:effectStyle>
+          <a:effectLst/>
+        </a:effectStyle>
+        <a:effectStyle>
+          <a:effectLst/>
+        </a:effectStyle>
+        <a:effectStyle>
+          <a:effectLst>
+            <a:outerShdw blurRad="57150" dist="19050" dir="5400000" algn="ctr" rotWithShape="0">
+              <a:srgbClr val="000000">
+                <a:alpha val="63000"/>
+              </a:srgbClr>
+            </a:outerShdw>
+          </a:effectLst>
+        </a:effectStyle>
+      </a:effectStyleLst>
+      <a:bgFillStyleLst>
+        <a:solidFill>
+          <a:schemeClr val="phClr"/>
+        </a:solidFill>
+        <a:solidFill>
+          <a:schemeClr val="phClr">
+            <a:tint val="95000"/>
+            <a:satMod val="170000"/>
+          </a:schemeClr>
+        </a:solidFill>
+        <a:gradFill rotWithShape="1">
+          <a:gsLst>
+            <a:gs pos="0">
+              <a:schemeClr val="phClr">
+                <a:tint val="93000"/>
+                <a:satMod val="150000"/>
+                <a:shade val="98000"/>
+                <a:lumMod val="102000"/>
+              </a:schemeClr>
+            </a:gs>
+            <a:gs pos="50000">
+              <a:schemeClr val="phClr">
+                <a:tint val="98000"/>
+                <a:satMod val="130000"/>
+                <a:shade val="90000"/>
+                <a:lumMod val="103000"/>
+              </a:schemeClr>
+            </a:gs>
+            <a:gs pos="100000">
+              <a:schemeClr val="phClr">
+                <a:shade val="63000"/>
+                <a:satMod val="120000"/>
+              </a:schemeClr>
+            </a:gs>
+          </a:gsLst>
+          <a:lin ang="5400000" scaled="0"/>
+        </a:gradFill>
+      </a:bgFillStyleLst>
+    </a:fmtScheme>
+  </a:themeElements>
+  <a:objectDefaults/>
+  <a:extraClrSchemeLst/>
+  <a:extLst>
+    <a:ext uri="{05A4C25C-085E-4340-85A3-A5531E510DB2}">
+      <thm15:themeFamily xmlns:thm15="http://schemas.microsoft.com/office/thememl/2012/main" name="Office Theme" id="{62F939B6-93AF-4DB8-9C6B-D6C7DFDC589F}" vid="{4A3C46E8-61CC-4603-A589-7422A47A8E4A}"/>
+    </a:ext>
+  </a:extLst>
+</a:theme>
 </file>
</xml_diff>

<commit_message>
Izzy fixed prediction figures and pre-registered
</commit_message>
<xml_diff>
--- a/images/prediction_graphs.pptx
+++ b/images/prediction_graphs.pptx
@@ -5,13 +5,12 @@
     <p:sldMasterId id="2147483648" r:id="rId1"/>
   </p:sldMasterIdLst>
   <p:notesMasterIdLst>
-    <p:notesMasterId r:id="rId6"/>
+    <p:notesMasterId r:id="rId5"/>
   </p:notesMasterIdLst>
   <p:sldIdLst>
-    <p:sldId id="256" r:id="rId2"/>
-    <p:sldId id="259" r:id="rId3"/>
-    <p:sldId id="260" r:id="rId4"/>
-    <p:sldId id="261" r:id="rId5"/>
+    <p:sldId id="262" r:id="rId2"/>
+    <p:sldId id="264" r:id="rId3"/>
+    <p:sldId id="263" r:id="rId4"/>
   </p:sldIdLst>
   <p:sldSz cx="12192000" cy="6858000"/>
   <p:notesSz cx="6858000" cy="9144000"/>
@@ -200,7 +199,7 @@
           <a:p>
             <a:fld id="{B3983048-CB06-4E44-9303-08BA1CBDE2ED}" type="datetimeFigureOut">
               <a:rPr lang="en-US" smtClean="0"/>
-              <a:t>2/27/19</a:t>
+              <a:t>2/28/19</a:t>
             </a:fld>
             <a:endParaRPr lang="en-US"/>
           </a:p>
@@ -467,93 +466,6 @@
 </p:notesMaster>
 </file>
 
-<file path=ppt/notesSlides/notesSlide1.xml><?xml version="1.0" encoding="utf-8"?>
-<p:notes xmlns:a="http://schemas.openxmlformats.org/drawingml/2006/main" xmlns:r="http://schemas.openxmlformats.org/officeDocument/2006/relationships" xmlns:p="http://schemas.openxmlformats.org/presentationml/2006/main">
-  <p:cSld>
-    <p:spTree>
-      <p:nvGrpSpPr>
-        <p:cNvPr id="1" name=""/>
-        <p:cNvGrpSpPr/>
-        <p:nvPr/>
-      </p:nvGrpSpPr>
-      <p:grpSpPr>
-        <a:xfrm>
-          <a:off x="0" y="0"/>
-          <a:ext cx="0" cy="0"/>
-          <a:chOff x="0" y="0"/>
-          <a:chExt cx="0" cy="0"/>
-        </a:xfrm>
-      </p:grpSpPr>
-      <p:sp>
-        <p:nvSpPr>
-          <p:cNvPr id="2" name="Slide Image Placeholder 1"/>
-          <p:cNvSpPr>
-            <a:spLocks noGrp="1" noRot="1" noChangeAspect="1"/>
-          </p:cNvSpPr>
-          <p:nvPr>
-            <p:ph type="sldImg"/>
-          </p:nvPr>
-        </p:nvSpPr>
-        <p:spPr/>
-      </p:sp>
-      <p:sp>
-        <p:nvSpPr>
-          <p:cNvPr id="3" name="Notes Placeholder 2"/>
-          <p:cNvSpPr>
-            <a:spLocks noGrp="1"/>
-          </p:cNvSpPr>
-          <p:nvPr>
-            <p:ph type="body" idx="1"/>
-          </p:nvPr>
-        </p:nvSpPr>
-        <p:spPr/>
-        <p:txBody>
-          <a:bodyPr/>
-          <a:lstStyle/>
-          <a:p>
-            <a:endParaRPr lang="en-US" dirty="0"/>
-          </a:p>
-          <a:p>
-            <a:endParaRPr lang="en-US" dirty="0"/>
-          </a:p>
-        </p:txBody>
-      </p:sp>
-      <p:sp>
-        <p:nvSpPr>
-          <p:cNvPr id="4" name="Slide Number Placeholder 3"/>
-          <p:cNvSpPr>
-            <a:spLocks noGrp="1"/>
-          </p:cNvSpPr>
-          <p:nvPr>
-            <p:ph type="sldNum" sz="quarter" idx="5"/>
-          </p:nvPr>
-        </p:nvSpPr>
-        <p:spPr/>
-        <p:txBody>
-          <a:bodyPr/>
-          <a:lstStyle/>
-          <a:p>
-            <a:fld id="{9BCE8D36-C1BF-224E-B7E6-C084A11AC8D6}" type="slidenum">
-              <a:rPr lang="en-US" smtClean="0"/>
-              <a:t>4</a:t>
-            </a:fld>
-            <a:endParaRPr lang="en-US"/>
-          </a:p>
-        </p:txBody>
-      </p:sp>
-    </p:spTree>
-    <p:extLst>
-      <p:ext uri="{BB962C8B-B14F-4D97-AF65-F5344CB8AC3E}">
-        <p14:creationId xmlns:p14="http://schemas.microsoft.com/office/powerpoint/2010/main" val="3180003472"/>
-      </p:ext>
-    </p:extLst>
-  </p:cSld>
-  <p:clrMapOvr>
-    <a:masterClrMapping/>
-  </p:clrMapOvr>
-</p:notes>
-</file>
-
 <file path=ppt/slideLayouts/slideLayout1.xml><?xml version="1.0" encoding="utf-8"?>
 <p:sldLayout xmlns:a="http://schemas.openxmlformats.org/drawingml/2006/main" xmlns:r="http://schemas.openxmlformats.org/officeDocument/2006/relationships" xmlns:p="http://schemas.openxmlformats.org/presentationml/2006/main" type="title" preserve="1">
   <p:cSld name="Title Slide">
@@ -701,7 +613,7 @@
           <a:p>
             <a:fld id="{CF1B88E2-74B9-C74C-93C7-A1E2B177FB07}" type="datetimeFigureOut">
               <a:rPr lang="en-US" smtClean="0"/>
-              <a:t>2/27/19</a:t>
+              <a:t>2/28/19</a:t>
             </a:fld>
             <a:endParaRPr lang="en-US"/>
           </a:p>
@@ -899,7 +811,7 @@
           <a:p>
             <a:fld id="{CF1B88E2-74B9-C74C-93C7-A1E2B177FB07}" type="datetimeFigureOut">
               <a:rPr lang="en-US" smtClean="0"/>
-              <a:t>2/27/19</a:t>
+              <a:t>2/28/19</a:t>
             </a:fld>
             <a:endParaRPr lang="en-US"/>
           </a:p>
@@ -1107,7 +1019,7 @@
           <a:p>
             <a:fld id="{CF1B88E2-74B9-C74C-93C7-A1E2B177FB07}" type="datetimeFigureOut">
               <a:rPr lang="en-US" smtClean="0"/>
-              <a:t>2/27/19</a:t>
+              <a:t>2/28/19</a:t>
             </a:fld>
             <a:endParaRPr lang="en-US"/>
           </a:p>
@@ -1305,7 +1217,7 @@
           <a:p>
             <a:fld id="{CF1B88E2-74B9-C74C-93C7-A1E2B177FB07}" type="datetimeFigureOut">
               <a:rPr lang="en-US" smtClean="0"/>
-              <a:t>2/27/19</a:t>
+              <a:t>2/28/19</a:t>
             </a:fld>
             <a:endParaRPr lang="en-US"/>
           </a:p>
@@ -1580,7 +1492,7 @@
           <a:p>
             <a:fld id="{CF1B88E2-74B9-C74C-93C7-A1E2B177FB07}" type="datetimeFigureOut">
               <a:rPr lang="en-US" smtClean="0"/>
-              <a:t>2/27/19</a:t>
+              <a:t>2/28/19</a:t>
             </a:fld>
             <a:endParaRPr lang="en-US"/>
           </a:p>
@@ -1845,7 +1757,7 @@
           <a:p>
             <a:fld id="{CF1B88E2-74B9-C74C-93C7-A1E2B177FB07}" type="datetimeFigureOut">
               <a:rPr lang="en-US" smtClean="0"/>
-              <a:t>2/27/19</a:t>
+              <a:t>2/28/19</a:t>
             </a:fld>
             <a:endParaRPr lang="en-US"/>
           </a:p>
@@ -2257,7 +2169,7 @@
           <a:p>
             <a:fld id="{CF1B88E2-74B9-C74C-93C7-A1E2B177FB07}" type="datetimeFigureOut">
               <a:rPr lang="en-US" smtClean="0"/>
-              <a:t>2/27/19</a:t>
+              <a:t>2/28/19</a:t>
             </a:fld>
             <a:endParaRPr lang="en-US"/>
           </a:p>
@@ -2398,7 +2310,7 @@
           <a:p>
             <a:fld id="{CF1B88E2-74B9-C74C-93C7-A1E2B177FB07}" type="datetimeFigureOut">
               <a:rPr lang="en-US" smtClean="0"/>
-              <a:t>2/27/19</a:t>
+              <a:t>2/28/19</a:t>
             </a:fld>
             <a:endParaRPr lang="en-US"/>
           </a:p>
@@ -2511,7 +2423,7 @@
           <a:p>
             <a:fld id="{CF1B88E2-74B9-C74C-93C7-A1E2B177FB07}" type="datetimeFigureOut">
               <a:rPr lang="en-US" smtClean="0"/>
-              <a:t>2/27/19</a:t>
+              <a:t>2/28/19</a:t>
             </a:fld>
             <a:endParaRPr lang="en-US"/>
           </a:p>
@@ -2822,7 +2734,7 @@
           <a:p>
             <a:fld id="{CF1B88E2-74B9-C74C-93C7-A1E2B177FB07}" type="datetimeFigureOut">
               <a:rPr lang="en-US" smtClean="0"/>
-              <a:t>2/27/19</a:t>
+              <a:t>2/28/19</a:t>
             </a:fld>
             <a:endParaRPr lang="en-US"/>
           </a:p>
@@ -3110,7 +3022,7 @@
           <a:p>
             <a:fld id="{CF1B88E2-74B9-C74C-93C7-A1E2B177FB07}" type="datetimeFigureOut">
               <a:rPr lang="en-US" smtClean="0"/>
-              <a:t>2/27/19</a:t>
+              <a:t>2/28/19</a:t>
             </a:fld>
             <a:endParaRPr lang="en-US"/>
           </a:p>
@@ -3351,7 +3263,7 @@
           <a:p>
             <a:fld id="{CF1B88E2-74B9-C74C-93C7-A1E2B177FB07}" type="datetimeFigureOut">
               <a:rPr lang="en-US" smtClean="0"/>
-              <a:t>2/27/19</a:t>
+              <a:t>2/28/19</a:t>
             </a:fld>
             <a:endParaRPr lang="en-US"/>
           </a:p>
@@ -3782,7 +3694,7 @@
         </p:nvSpPr>
         <p:spPr>
           <a:xfrm>
-            <a:off x="1136073" y="570498"/>
+            <a:off x="1005606" y="395538"/>
             <a:ext cx="10224654" cy="646331"/>
           </a:xfrm>
           <a:prstGeom prst="rect">
@@ -3798,7 +3710,6 @@
             <a:pPr algn="ctr"/>
             <a:r>
               <a:rPr lang="en-US" b="1" dirty="0">
-                <a:effectLst/>
                 <a:latin typeface="Helvetica" pitchFamily="2" charset="0"/>
               </a:rPr>
               <a:t>Is there a clear link between key socio-economic events and land-use change in</a:t>
@@ -3808,7 +3719,6 @@
             <a:pPr algn="ctr"/>
             <a:r>
               <a:rPr lang="en-US" b="1" dirty="0">
-                <a:effectLst/>
                 <a:latin typeface="Helvetica" pitchFamily="2" charset="0"/>
               </a:rPr>
               <a:t>Latvia?</a:t>
@@ -3830,8 +3740,8 @@
         </p:nvGrpSpPr>
         <p:grpSpPr>
           <a:xfrm>
-            <a:off x="2925337" y="2042940"/>
-            <a:ext cx="6669236" cy="3785035"/>
+            <a:off x="7091364" y="1879027"/>
+            <a:ext cx="4138897" cy="3785035"/>
             <a:chOff x="1363851" y="2433234"/>
             <a:chExt cx="3813472" cy="3118600"/>
           </a:xfrm>
@@ -3937,7 +3847,7 @@
         </p:nvSpPr>
         <p:spPr>
           <a:xfrm>
-            <a:off x="6900452" y="6102836"/>
+            <a:off x="8077940" y="6020861"/>
             <a:ext cx="2087431" cy="338554"/>
           </a:xfrm>
           <a:prstGeom prst="rect">
@@ -3974,7 +3884,7 @@
         </p:nvSpPr>
         <p:spPr>
           <a:xfrm>
-            <a:off x="3395247" y="6102836"/>
+            <a:off x="1997138" y="6020861"/>
             <a:ext cx="2803973" cy="338554"/>
           </a:xfrm>
           <a:prstGeom prst="rect">
@@ -4013,7 +3923,7 @@
         </p:nvCxnSpPr>
         <p:spPr>
           <a:xfrm>
-            <a:off x="4627756" y="5820937"/>
+            <a:off x="3342295" y="5665673"/>
             <a:ext cx="0" cy="281899"/>
           </a:xfrm>
           <a:prstGeom prst="line">
@@ -4056,7 +3966,7 @@
         </p:nvCxnSpPr>
         <p:spPr>
           <a:xfrm>
-            <a:off x="8021296" y="5820936"/>
+            <a:off x="9121656" y="5665673"/>
             <a:ext cx="0" cy="281899"/>
           </a:xfrm>
           <a:prstGeom prst="line">
@@ -4097,7 +4007,7 @@
         </p:nvSpPr>
         <p:spPr>
           <a:xfrm rot="16200000">
-            <a:off x="1541891" y="3762660"/>
+            <a:off x="213723" y="3634257"/>
             <a:ext cx="2124299" cy="338554"/>
           </a:xfrm>
           <a:prstGeom prst="rect">
@@ -4120,48 +4030,6 @@
           </a:p>
         </p:txBody>
       </p:sp>
-      <p:cxnSp>
-        <p:nvCxnSpPr>
-          <p:cNvPr id="30" name="Straight Arrow Connector 29">
-            <a:extLst>
-              <a:ext uri="{FF2B5EF4-FFF2-40B4-BE49-F238E27FC236}">
-                <a16:creationId xmlns:a16="http://schemas.microsoft.com/office/drawing/2014/main" id="{108CA6BD-EF9E-6648-ADB6-DE761816EB30}"/>
-              </a:ext>
-            </a:extLst>
-          </p:cNvPr>
-          <p:cNvCxnSpPr/>
-          <p:nvPr/>
-        </p:nvCxnSpPr>
-        <p:spPr>
-          <a:xfrm flipV="1">
-            <a:off x="1854926" y="2429691"/>
-            <a:ext cx="0" cy="2220686"/>
-          </a:xfrm>
-          <a:prstGeom prst="straightConnector1">
-            <a:avLst/>
-          </a:prstGeom>
-          <a:ln w="38100">
-            <a:solidFill>
-              <a:schemeClr val="accent1"/>
-            </a:solidFill>
-            <a:tailEnd type="triangle"/>
-          </a:ln>
-        </p:spPr>
-        <p:style>
-          <a:lnRef idx="1">
-            <a:schemeClr val="accent1"/>
-          </a:lnRef>
-          <a:fillRef idx="0">
-            <a:schemeClr val="accent1"/>
-          </a:fillRef>
-          <a:effectRef idx="0">
-            <a:schemeClr val="accent1"/>
-          </a:effectRef>
-          <a:fontRef idx="minor">
-            <a:schemeClr val="tx1"/>
-          </a:fontRef>
-        </p:style>
-      </p:cxnSp>
       <p:sp>
         <p:nvSpPr>
           <p:cNvPr id="31" name="TextBox 30">
@@ -4175,8 +4043,8 @@
           <p:nvPr/>
         </p:nvSpPr>
         <p:spPr>
-          <a:xfrm rot="16200000">
-            <a:off x="1404321" y="1889051"/>
+          <a:xfrm>
+            <a:off x="1822402" y="2433607"/>
             <a:ext cx="901209" cy="307777"/>
           </a:xfrm>
           <a:prstGeom prst="rect">
@@ -4212,8 +4080,8 @@
           <p:nvPr/>
         </p:nvSpPr>
         <p:spPr>
-          <a:xfrm rot="16200000">
-            <a:off x="1373864" y="5111776"/>
+          <a:xfrm>
+            <a:off x="1459926" y="4070266"/>
             <a:ext cx="962123" cy="307777"/>
           </a:xfrm>
           <a:prstGeom prst="rect">
@@ -4252,8 +4120,8 @@
         </p:nvCxnSpPr>
         <p:spPr>
           <a:xfrm flipV="1">
-            <a:off x="2925337" y="3796495"/>
-            <a:ext cx="6669236" cy="1"/>
+            <a:off x="1466493" y="3875606"/>
+            <a:ext cx="4118052" cy="2"/>
           </a:xfrm>
           <a:prstGeom prst="line">
             <a:avLst/>
@@ -4264,45 +4132,6 @@
             </a:solidFill>
             <a:prstDash val="dash"/>
           </a:ln>
-        </p:spPr>
-        <p:style>
-          <a:lnRef idx="1">
-            <a:schemeClr val="accent1"/>
-          </a:lnRef>
-          <a:fillRef idx="0">
-            <a:schemeClr val="accent1"/>
-          </a:fillRef>
-          <a:effectRef idx="0">
-            <a:schemeClr val="accent1"/>
-          </a:effectRef>
-          <a:fontRef idx="minor">
-            <a:schemeClr val="tx1"/>
-          </a:fontRef>
-        </p:style>
-      </p:cxnSp>
-      <p:cxnSp>
-        <p:nvCxnSpPr>
-          <p:cNvPr id="41" name="Straight Connector 40">
-            <a:extLst>
-              <a:ext uri="{FF2B5EF4-FFF2-40B4-BE49-F238E27FC236}">
-                <a16:creationId xmlns:a16="http://schemas.microsoft.com/office/drawing/2014/main" id="{E2B5683C-953C-8645-A311-33436B3DE1CE}"/>
-              </a:ext>
-            </a:extLst>
-          </p:cNvPr>
-          <p:cNvCxnSpPr>
-            <a:cxnSpLocks/>
-          </p:cNvCxnSpPr>
-          <p:nvPr/>
-        </p:nvCxnSpPr>
-        <p:spPr>
-          <a:xfrm flipV="1">
-            <a:off x="5100638" y="1879027"/>
-            <a:ext cx="4088392" cy="3099946"/>
-          </a:xfrm>
-          <a:prstGeom prst="line">
-            <a:avLst/>
-          </a:prstGeom>
-          <a:ln w="19050"/>
         </p:spPr>
         <p:style>
           <a:lnRef idx="1">
@@ -4335,101 +4164,15 @@
         </p:nvCxnSpPr>
         <p:spPr>
           <a:xfrm flipV="1">
-            <a:off x="2925337" y="4978973"/>
-            <a:ext cx="2175301" cy="1"/>
-          </a:xfrm>
-          <a:prstGeom prst="line">
-            <a:avLst/>
-          </a:prstGeom>
-          <a:ln w="19050"/>
-        </p:spPr>
-        <p:style>
-          <a:lnRef idx="1">
-            <a:schemeClr val="accent1"/>
-          </a:lnRef>
-          <a:fillRef idx="0">
-            <a:schemeClr val="accent1"/>
-          </a:fillRef>
-          <a:effectRef idx="0">
-            <a:schemeClr val="accent1"/>
-          </a:effectRef>
-          <a:fontRef idx="minor">
-            <a:schemeClr val="tx1"/>
-          </a:fontRef>
-        </p:style>
-      </p:cxnSp>
-      <p:cxnSp>
-        <p:nvCxnSpPr>
-          <p:cNvPr id="48" name="Straight Connector 47">
-            <a:extLst>
-              <a:ext uri="{FF2B5EF4-FFF2-40B4-BE49-F238E27FC236}">
-                <a16:creationId xmlns:a16="http://schemas.microsoft.com/office/drawing/2014/main" id="{10B4EE26-CA92-CA49-A462-A1CB5212D05D}"/>
-              </a:ext>
-            </a:extLst>
-          </p:cNvPr>
-          <p:cNvCxnSpPr>
-            <a:cxnSpLocks/>
-          </p:cNvCxnSpPr>
-          <p:nvPr/>
-        </p:nvCxnSpPr>
-        <p:spPr>
-          <a:xfrm flipV="1">
-            <a:off x="4636314" y="2096477"/>
-            <a:ext cx="3764736" cy="1700018"/>
+            <a:off x="1454803" y="2678637"/>
+            <a:ext cx="1875802" cy="13027"/>
           </a:xfrm>
           <a:prstGeom prst="line">
             <a:avLst/>
           </a:prstGeom>
           <a:ln w="19050">
             <a:solidFill>
-              <a:schemeClr val="accent2">
-                <a:lumMod val="50000"/>
-              </a:schemeClr>
-            </a:solidFill>
-          </a:ln>
-        </p:spPr>
-        <p:style>
-          <a:lnRef idx="1">
-            <a:schemeClr val="accent1"/>
-          </a:lnRef>
-          <a:fillRef idx="0">
-            <a:schemeClr val="accent1"/>
-          </a:fillRef>
-          <a:effectRef idx="0">
-            <a:schemeClr val="accent1"/>
-          </a:effectRef>
-          <a:fontRef idx="minor">
-            <a:schemeClr val="tx1"/>
-          </a:fontRef>
-        </p:style>
-      </p:cxnSp>
-      <p:cxnSp>
-        <p:nvCxnSpPr>
-          <p:cNvPr id="51" name="Straight Connector 50">
-            <a:extLst>
-              <a:ext uri="{FF2B5EF4-FFF2-40B4-BE49-F238E27FC236}">
-                <a16:creationId xmlns:a16="http://schemas.microsoft.com/office/drawing/2014/main" id="{61188D2F-9CFF-B446-9CBF-B01110A6E83A}"/>
-              </a:ext>
-            </a:extLst>
-          </p:cNvPr>
-          <p:cNvCxnSpPr>
-            <a:cxnSpLocks/>
-          </p:cNvCxnSpPr>
-          <p:nvPr/>
-        </p:nvCxnSpPr>
-        <p:spPr>
-          <a:xfrm flipH="1" flipV="1">
-            <a:off x="8401050" y="2096477"/>
-            <a:ext cx="1193524" cy="156393"/>
-          </a:xfrm>
-          <a:prstGeom prst="line">
-            <a:avLst/>
-          </a:prstGeom>
-          <a:ln w="19050">
-            <a:solidFill>
-              <a:schemeClr val="accent2">
-                <a:lumMod val="50000"/>
-              </a:schemeClr>
+              <a:srgbClr val="7030A0"/>
             </a:solidFill>
           </a:ln>
         </p:spPr>
@@ -4464,8 +4207,8 @@
         </p:nvCxnSpPr>
         <p:spPr>
           <a:xfrm flipV="1">
-            <a:off x="2924336" y="3796495"/>
-            <a:ext cx="1711978" cy="7040"/>
+            <a:off x="1445149" y="3875606"/>
+            <a:ext cx="1842055" cy="3520"/>
           </a:xfrm>
           <a:prstGeom prst="line">
             <a:avLst/>
@@ -4506,720 +4249,8 @@
           <p:nvPr/>
         </p:nvSpPr>
         <p:spPr>
-          <a:xfrm rot="20051667">
-            <a:off x="5673563" y="2792598"/>
-            <a:ext cx="1149674" cy="307777"/>
-          </a:xfrm>
-          <a:prstGeom prst="rect">
-            <a:avLst/>
-          </a:prstGeom>
-          <a:noFill/>
-        </p:spPr>
-        <p:txBody>
-          <a:bodyPr wrap="none" rtlCol="0">
-            <a:spAutoFit/>
-          </a:bodyPr>
-          <a:lstStyle/>
-          <a:p>
-            <a:r>
-              <a:rPr lang="en-US" sz="1400" dirty="0">
-                <a:latin typeface="Helvetica" pitchFamily="2" charset="0"/>
-              </a:rPr>
-              <a:t>Abandoned </a:t>
-            </a:r>
-          </a:p>
-        </p:txBody>
-      </p:sp>
-      <p:sp>
-        <p:nvSpPr>
-          <p:cNvPr id="72" name="Rectangle 71">
-            <a:extLst>
-              <a:ext uri="{FF2B5EF4-FFF2-40B4-BE49-F238E27FC236}">
-                <a16:creationId xmlns:a16="http://schemas.microsoft.com/office/drawing/2014/main" id="{DF62C4A4-E373-8B4B-9D7B-EAEB47B89550}"/>
-              </a:ext>
-            </a:extLst>
-          </p:cNvPr>
-          <p:cNvSpPr/>
-          <p:nvPr/>
-        </p:nvSpPr>
-        <p:spPr>
-          <a:xfrm>
-            <a:off x="6518682" y="4238236"/>
-            <a:ext cx="3225857" cy="1200329"/>
-          </a:xfrm>
-          <a:prstGeom prst="rect">
-            <a:avLst/>
-          </a:prstGeom>
-        </p:spPr>
-        <p:txBody>
-          <a:bodyPr wrap="square">
-            <a:spAutoFit/>
-          </a:bodyPr>
-          <a:lstStyle/>
-          <a:p>
-            <a:pPr algn="ctr"/>
-            <a:r>
-              <a:rPr lang="en-US" sz="1200" dirty="0">
-                <a:effectLst/>
-                <a:latin typeface="Helvetica" pitchFamily="2" charset="0"/>
-              </a:rPr>
-              <a:t>There is an observable, uniform link between the Soviet Union collapse and land-use change in Latvia at a country-scale. There is no homogeneous link between land-use change and the addition of Latvia to the EU at a country-scale.</a:t>
-            </a:r>
-          </a:p>
-        </p:txBody>
-      </p:sp>
-      <p:sp>
-        <p:nvSpPr>
-          <p:cNvPr id="73" name="Rectangle 72">
-            <a:extLst>
-              <a:ext uri="{FF2B5EF4-FFF2-40B4-BE49-F238E27FC236}">
-                <a16:creationId xmlns:a16="http://schemas.microsoft.com/office/drawing/2014/main" id="{53014079-AF53-FC4F-B0BE-64A592FF3580}"/>
-              </a:ext>
-            </a:extLst>
-          </p:cNvPr>
-          <p:cNvSpPr/>
-          <p:nvPr/>
-        </p:nvSpPr>
-        <p:spPr>
-          <a:xfrm>
-            <a:off x="8724145" y="2604611"/>
-            <a:ext cx="3225857" cy="646331"/>
-          </a:xfrm>
-          <a:prstGeom prst="rect">
-            <a:avLst/>
-          </a:prstGeom>
-        </p:spPr>
-        <p:txBody>
-          <a:bodyPr wrap="square">
-            <a:spAutoFit/>
-          </a:bodyPr>
-          <a:lstStyle/>
-          <a:p>
-            <a:r>
-              <a:rPr lang="en-US" sz="1200" dirty="0">
-                <a:effectLst/>
-                <a:latin typeface="Helvetica" pitchFamily="2" charset="0"/>
-              </a:rPr>
-              <a:t>Other way to show this:</a:t>
-            </a:r>
-          </a:p>
-          <a:p>
-            <a:r>
-              <a:rPr lang="en-US" sz="1200" dirty="0">
-                <a:latin typeface="Helvetica" pitchFamily="2" charset="0"/>
-              </a:rPr>
-              <a:t>- Bar plot with more number of pixels in each category through time </a:t>
-            </a:r>
-            <a:endParaRPr lang="en-US" sz="1200" dirty="0">
-              <a:effectLst/>
-              <a:latin typeface="Helvetica" pitchFamily="2" charset="0"/>
-            </a:endParaRPr>
-          </a:p>
-        </p:txBody>
-      </p:sp>
-    </p:spTree>
-    <p:extLst>
-      <p:ext uri="{BB962C8B-B14F-4D97-AF65-F5344CB8AC3E}">
-        <p14:creationId xmlns:p14="http://schemas.microsoft.com/office/powerpoint/2010/main" val="1954309435"/>
-      </p:ext>
-    </p:extLst>
-  </p:cSld>
-  <p:clrMapOvr>
-    <a:masterClrMapping/>
-  </p:clrMapOvr>
-</p:sld>
-</file>
-
-<file path=ppt/slides/slide2.xml><?xml version="1.0" encoding="utf-8"?>
-<p:sld xmlns:a="http://schemas.openxmlformats.org/drawingml/2006/main" xmlns:r="http://schemas.openxmlformats.org/officeDocument/2006/relationships" xmlns:p="http://schemas.openxmlformats.org/presentationml/2006/main">
-  <p:cSld>
-    <p:spTree>
-      <p:nvGrpSpPr>
-        <p:cNvPr id="1" name=""/>
-        <p:cNvGrpSpPr/>
-        <p:nvPr/>
-      </p:nvGrpSpPr>
-      <p:grpSpPr>
-        <a:xfrm>
-          <a:off x="0" y="0"/>
-          <a:ext cx="0" cy="0"/>
-          <a:chOff x="0" y="0"/>
-          <a:chExt cx="0" cy="0"/>
-        </a:xfrm>
-      </p:grpSpPr>
-      <p:sp>
-        <p:nvSpPr>
-          <p:cNvPr id="4" name="Rectangle 3">
-            <a:extLst>
-              <a:ext uri="{FF2B5EF4-FFF2-40B4-BE49-F238E27FC236}">
-                <a16:creationId xmlns:a16="http://schemas.microsoft.com/office/drawing/2014/main" id="{5E09949D-B77A-5B4F-8180-BA6976375034}"/>
-              </a:ext>
-            </a:extLst>
-          </p:cNvPr>
-          <p:cNvSpPr/>
-          <p:nvPr/>
-        </p:nvSpPr>
-        <p:spPr>
-          <a:xfrm>
-            <a:off x="1005606" y="395538"/>
-            <a:ext cx="10224654" cy="646331"/>
-          </a:xfrm>
-          <a:prstGeom prst="rect">
-            <a:avLst/>
-          </a:prstGeom>
-        </p:spPr>
-        <p:txBody>
-          <a:bodyPr wrap="square">
-            <a:spAutoFit/>
-          </a:bodyPr>
-          <a:lstStyle/>
-          <a:p>
-            <a:pPr algn="ctr"/>
-            <a:r>
-              <a:rPr lang="en-US" b="1" dirty="0">
-                <a:effectLst/>
-                <a:latin typeface="Helvetica" pitchFamily="2" charset="0"/>
-              </a:rPr>
-              <a:t>Are the strength and direction of land-use change different among extensive,</a:t>
-            </a:r>
-          </a:p>
-          <a:p>
-            <a:pPr algn="ctr"/>
-            <a:r>
-              <a:rPr lang="en-US" b="1" dirty="0">
-                <a:effectLst/>
-                <a:latin typeface="Helvetica" pitchFamily="2" charset="0"/>
-              </a:rPr>
-              <a:t>intensive and abandoned land-use types?</a:t>
-            </a:r>
-          </a:p>
-        </p:txBody>
-      </p:sp>
-      <p:grpSp>
-        <p:nvGrpSpPr>
-          <p:cNvPr id="16" name="Group 15">
-            <a:extLst>
-              <a:ext uri="{FF2B5EF4-FFF2-40B4-BE49-F238E27FC236}">
-                <a16:creationId xmlns:a16="http://schemas.microsoft.com/office/drawing/2014/main" id="{40CF6A39-7D5B-AC4E-A157-644587D284D7}"/>
-              </a:ext>
-            </a:extLst>
-          </p:cNvPr>
-          <p:cNvGrpSpPr/>
-          <p:nvPr/>
-        </p:nvGrpSpPr>
-        <p:grpSpPr>
-          <a:xfrm>
-            <a:off x="7091364" y="1879027"/>
-            <a:ext cx="4138897" cy="3785035"/>
-            <a:chOff x="1363851" y="2433234"/>
-            <a:chExt cx="3813472" cy="3118600"/>
-          </a:xfrm>
-        </p:grpSpPr>
-        <p:cxnSp>
-          <p:nvCxnSpPr>
-            <p:cNvPr id="17" name="Straight Connector 16">
-              <a:extLst>
-                <a:ext uri="{FF2B5EF4-FFF2-40B4-BE49-F238E27FC236}">
-                  <a16:creationId xmlns:a16="http://schemas.microsoft.com/office/drawing/2014/main" id="{55A01319-81D3-A14A-AF8D-2DDCF24C6353}"/>
-                </a:ext>
-              </a:extLst>
-            </p:cNvPr>
-            <p:cNvCxnSpPr>
-              <a:cxnSpLocks/>
-            </p:cNvCxnSpPr>
-            <p:nvPr/>
-          </p:nvCxnSpPr>
-          <p:spPr>
-            <a:xfrm>
-              <a:off x="1363851" y="2433234"/>
-              <a:ext cx="0" cy="3112801"/>
-            </a:xfrm>
-            <a:prstGeom prst="line">
-              <a:avLst/>
-            </a:prstGeom>
-            <a:ln>
-              <a:solidFill>
-                <a:schemeClr val="tx1"/>
-              </a:solidFill>
-            </a:ln>
-          </p:spPr>
-          <p:style>
-            <a:lnRef idx="1">
-              <a:schemeClr val="accent1"/>
-            </a:lnRef>
-            <a:fillRef idx="0">
-              <a:schemeClr val="accent1"/>
-            </a:fillRef>
-            <a:effectRef idx="0">
-              <a:schemeClr val="accent1"/>
-            </a:effectRef>
-            <a:fontRef idx="minor">
-              <a:schemeClr val="tx1"/>
-            </a:fontRef>
-          </p:style>
-        </p:cxnSp>
-        <p:cxnSp>
-          <p:nvCxnSpPr>
-            <p:cNvPr id="18" name="Straight Connector 17">
-              <a:extLst>
-                <a:ext uri="{FF2B5EF4-FFF2-40B4-BE49-F238E27FC236}">
-                  <a16:creationId xmlns:a16="http://schemas.microsoft.com/office/drawing/2014/main" id="{7C9D843F-2EB4-A447-A947-C1DF89175DC2}"/>
-                </a:ext>
-              </a:extLst>
-            </p:cNvPr>
-            <p:cNvCxnSpPr>
-              <a:cxnSpLocks/>
-            </p:cNvCxnSpPr>
-            <p:nvPr/>
-          </p:nvCxnSpPr>
-          <p:spPr>
-            <a:xfrm flipH="1" flipV="1">
-              <a:off x="1363852" y="5546035"/>
-              <a:ext cx="3813471" cy="5799"/>
-            </a:xfrm>
-            <a:prstGeom prst="line">
-              <a:avLst/>
-            </a:prstGeom>
-            <a:ln>
-              <a:solidFill>
-                <a:schemeClr val="tx1"/>
-              </a:solidFill>
-            </a:ln>
-          </p:spPr>
-          <p:style>
-            <a:lnRef idx="1">
-              <a:schemeClr val="accent1"/>
-            </a:lnRef>
-            <a:fillRef idx="0">
-              <a:schemeClr val="accent1"/>
-            </a:fillRef>
-            <a:effectRef idx="0">
-              <a:schemeClr val="accent1"/>
-            </a:effectRef>
-            <a:fontRef idx="minor">
-              <a:schemeClr val="tx1"/>
-            </a:fontRef>
-          </p:style>
-        </p:cxnSp>
-      </p:grpSp>
-      <p:sp>
-        <p:nvSpPr>
-          <p:cNvPr id="20" name="TextBox 19">
-            <a:extLst>
-              <a:ext uri="{FF2B5EF4-FFF2-40B4-BE49-F238E27FC236}">
-                <a16:creationId xmlns:a16="http://schemas.microsoft.com/office/drawing/2014/main" id="{00160729-423F-4E48-B073-428D9F6DBFC7}"/>
-              </a:ext>
-            </a:extLst>
-          </p:cNvPr>
-          <p:cNvSpPr txBox="1"/>
-          <p:nvPr/>
-        </p:nvSpPr>
-        <p:spPr>
-          <a:xfrm>
-            <a:off x="8077940" y="6020861"/>
-            <a:ext cx="2087431" cy="338554"/>
-          </a:xfrm>
-          <a:prstGeom prst="rect">
-            <a:avLst/>
-          </a:prstGeom>
-          <a:noFill/>
-        </p:spPr>
-        <p:txBody>
-          <a:bodyPr wrap="none" rtlCol="0">
-            <a:spAutoFit/>
-          </a:bodyPr>
-          <a:lstStyle/>
-          <a:p>
-            <a:r>
-              <a:rPr lang="en-US" sz="1600" dirty="0">
-                <a:latin typeface="Helvetica" pitchFamily="2" charset="0"/>
-              </a:rPr>
-              <a:t>EU accession (2004)</a:t>
-            </a:r>
-          </a:p>
-        </p:txBody>
-      </p:sp>
-      <p:sp>
-        <p:nvSpPr>
-          <p:cNvPr id="21" name="TextBox 20">
-            <a:extLst>
-              <a:ext uri="{FF2B5EF4-FFF2-40B4-BE49-F238E27FC236}">
-                <a16:creationId xmlns:a16="http://schemas.microsoft.com/office/drawing/2014/main" id="{105D2B8C-774A-E648-BE33-6DF0F97B2C43}"/>
-              </a:ext>
-            </a:extLst>
-          </p:cNvPr>
-          <p:cNvSpPr txBox="1"/>
-          <p:nvPr/>
-        </p:nvSpPr>
-        <p:spPr>
-          <a:xfrm>
-            <a:off x="1997138" y="6020861"/>
-            <a:ext cx="2803973" cy="338554"/>
-          </a:xfrm>
-          <a:prstGeom prst="rect">
-            <a:avLst/>
-          </a:prstGeom>
-          <a:noFill/>
-        </p:spPr>
-        <p:txBody>
-          <a:bodyPr wrap="none" rtlCol="0">
-            <a:spAutoFit/>
-          </a:bodyPr>
-          <a:lstStyle/>
-          <a:p>
-            <a:r>
-              <a:rPr lang="en-US" sz="1600" dirty="0">
-                <a:latin typeface="Helvetica" pitchFamily="2" charset="0"/>
-              </a:rPr>
-              <a:t>Soviet Union collapse (1991)</a:t>
-            </a:r>
-          </a:p>
-        </p:txBody>
-      </p:sp>
-      <p:cxnSp>
-        <p:nvCxnSpPr>
-          <p:cNvPr id="23" name="Straight Connector 22">
-            <a:extLst>
-              <a:ext uri="{FF2B5EF4-FFF2-40B4-BE49-F238E27FC236}">
-                <a16:creationId xmlns:a16="http://schemas.microsoft.com/office/drawing/2014/main" id="{2026D995-5657-5C44-88EB-77D50166E654}"/>
-              </a:ext>
-            </a:extLst>
-          </p:cNvPr>
-          <p:cNvCxnSpPr>
-            <a:cxnSpLocks/>
-          </p:cNvCxnSpPr>
-          <p:nvPr/>
-        </p:nvCxnSpPr>
-        <p:spPr>
-          <a:xfrm>
-            <a:off x="3342295" y="5665673"/>
-            <a:ext cx="0" cy="281899"/>
-          </a:xfrm>
-          <a:prstGeom prst="line">
-            <a:avLst/>
-          </a:prstGeom>
-          <a:ln>
-            <a:solidFill>
-              <a:schemeClr val="tx1"/>
-            </a:solidFill>
-          </a:ln>
-        </p:spPr>
-        <p:style>
-          <a:lnRef idx="1">
-            <a:schemeClr val="accent1"/>
-          </a:lnRef>
-          <a:fillRef idx="0">
-            <a:schemeClr val="accent1"/>
-          </a:fillRef>
-          <a:effectRef idx="0">
-            <a:schemeClr val="accent1"/>
-          </a:effectRef>
-          <a:fontRef idx="minor">
-            <a:schemeClr val="tx1"/>
-          </a:fontRef>
-        </p:style>
-      </p:cxnSp>
-      <p:cxnSp>
-        <p:nvCxnSpPr>
-          <p:cNvPr id="27" name="Straight Connector 26">
-            <a:extLst>
-              <a:ext uri="{FF2B5EF4-FFF2-40B4-BE49-F238E27FC236}">
-                <a16:creationId xmlns:a16="http://schemas.microsoft.com/office/drawing/2014/main" id="{7A96B6D0-A70C-104D-A9B2-A7917EDE6891}"/>
-              </a:ext>
-            </a:extLst>
-          </p:cNvPr>
-          <p:cNvCxnSpPr>
-            <a:cxnSpLocks/>
-          </p:cNvCxnSpPr>
-          <p:nvPr/>
-        </p:nvCxnSpPr>
-        <p:spPr>
-          <a:xfrm>
-            <a:off x="9121656" y="5665673"/>
-            <a:ext cx="0" cy="281899"/>
-          </a:xfrm>
-          <a:prstGeom prst="line">
-            <a:avLst/>
-          </a:prstGeom>
-          <a:ln>
-            <a:solidFill>
-              <a:schemeClr val="tx1"/>
-            </a:solidFill>
-          </a:ln>
-        </p:spPr>
-        <p:style>
-          <a:lnRef idx="1">
-            <a:schemeClr val="accent1"/>
-          </a:lnRef>
-          <a:fillRef idx="0">
-            <a:schemeClr val="accent1"/>
-          </a:fillRef>
-          <a:effectRef idx="0">
-            <a:schemeClr val="accent1"/>
-          </a:effectRef>
-          <a:fontRef idx="minor">
-            <a:schemeClr val="tx1"/>
-          </a:fontRef>
-        </p:style>
-      </p:cxnSp>
-      <p:sp>
-        <p:nvSpPr>
-          <p:cNvPr id="28" name="TextBox 27">
-            <a:extLst>
-              <a:ext uri="{FF2B5EF4-FFF2-40B4-BE49-F238E27FC236}">
-                <a16:creationId xmlns:a16="http://schemas.microsoft.com/office/drawing/2014/main" id="{968DD3D5-A621-EF4B-8DA0-91B3F7195E41}"/>
-              </a:ext>
-            </a:extLst>
-          </p:cNvPr>
-          <p:cNvSpPr txBox="1"/>
-          <p:nvPr/>
-        </p:nvSpPr>
-        <p:spPr>
-          <a:xfrm rot="16200000">
-            <a:off x="213723" y="3634257"/>
-            <a:ext cx="2124299" cy="338554"/>
-          </a:xfrm>
-          <a:prstGeom prst="rect">
-            <a:avLst/>
-          </a:prstGeom>
-          <a:noFill/>
-        </p:spPr>
-        <p:txBody>
-          <a:bodyPr wrap="none" rtlCol="0">
-            <a:spAutoFit/>
-          </a:bodyPr>
-          <a:lstStyle/>
-          <a:p>
-            <a:r>
-              <a:rPr lang="en-US" sz="1600" dirty="0">
-                <a:latin typeface="Helvetica" pitchFamily="2" charset="0"/>
-              </a:rPr>
-              <a:t>Area of land use type</a:t>
-            </a:r>
-          </a:p>
-        </p:txBody>
-      </p:sp>
-      <p:sp>
-        <p:nvSpPr>
-          <p:cNvPr id="31" name="TextBox 30">
-            <a:extLst>
-              <a:ext uri="{FF2B5EF4-FFF2-40B4-BE49-F238E27FC236}">
-                <a16:creationId xmlns:a16="http://schemas.microsoft.com/office/drawing/2014/main" id="{1F27D4AA-1B1A-7340-9145-FD19A8102554}"/>
-              </a:ext>
-            </a:extLst>
-          </p:cNvPr>
-          <p:cNvSpPr txBox="1"/>
-          <p:nvPr/>
-        </p:nvSpPr>
-        <p:spPr>
-          <a:xfrm rot="21120474">
-            <a:off x="4728540" y="2768007"/>
-            <a:ext cx="901209" cy="307777"/>
-          </a:xfrm>
-          <a:prstGeom prst="rect">
-            <a:avLst/>
-          </a:prstGeom>
-          <a:noFill/>
-        </p:spPr>
-        <p:txBody>
-          <a:bodyPr wrap="none" rtlCol="0">
-            <a:spAutoFit/>
-          </a:bodyPr>
-          <a:lstStyle/>
-          <a:p>
-            <a:r>
-              <a:rPr lang="en-US" sz="1400" dirty="0">
-                <a:latin typeface="Helvetica" pitchFamily="2" charset="0"/>
-              </a:rPr>
-              <a:t>Intensive</a:t>
-            </a:r>
-          </a:p>
-        </p:txBody>
-      </p:sp>
-      <p:sp>
-        <p:nvSpPr>
-          <p:cNvPr id="32" name="TextBox 31">
-            <a:extLst>
-              <a:ext uri="{FF2B5EF4-FFF2-40B4-BE49-F238E27FC236}">
-                <a16:creationId xmlns:a16="http://schemas.microsoft.com/office/drawing/2014/main" id="{4D62BA1D-8006-4247-AE24-68AC42AA16AE}"/>
-              </a:ext>
-            </a:extLst>
-          </p:cNvPr>
-          <p:cNvSpPr txBox="1"/>
-          <p:nvPr/>
-        </p:nvSpPr>
-        <p:spPr>
-          <a:xfrm>
-            <a:off x="1898013" y="2458967"/>
-            <a:ext cx="962123" cy="307777"/>
-          </a:xfrm>
-          <a:prstGeom prst="rect">
-            <a:avLst/>
-          </a:prstGeom>
-          <a:noFill/>
-        </p:spPr>
-        <p:txBody>
-          <a:bodyPr wrap="none" rtlCol="0">
-            <a:spAutoFit/>
-          </a:bodyPr>
-          <a:lstStyle/>
-          <a:p>
-            <a:r>
-              <a:rPr lang="en-US" sz="1400" dirty="0">
-                <a:latin typeface="Helvetica" pitchFamily="2" charset="0"/>
-              </a:rPr>
-              <a:t>Extensive</a:t>
-            </a:r>
-          </a:p>
-        </p:txBody>
-      </p:sp>
-      <p:cxnSp>
-        <p:nvCxnSpPr>
-          <p:cNvPr id="34" name="Straight Connector 33">
-            <a:extLst>
-              <a:ext uri="{FF2B5EF4-FFF2-40B4-BE49-F238E27FC236}">
-                <a16:creationId xmlns:a16="http://schemas.microsoft.com/office/drawing/2014/main" id="{BC084CB1-DE31-2646-8F88-5CEAAE373E89}"/>
-              </a:ext>
-            </a:extLst>
-          </p:cNvPr>
-          <p:cNvCxnSpPr>
-            <a:cxnSpLocks/>
-          </p:cNvCxnSpPr>
-          <p:nvPr/>
-        </p:nvCxnSpPr>
-        <p:spPr>
-          <a:xfrm flipV="1">
-            <a:off x="1466493" y="3875606"/>
-            <a:ext cx="4118052" cy="2"/>
-          </a:xfrm>
-          <a:prstGeom prst="line">
-            <a:avLst/>
-          </a:prstGeom>
-          <a:ln w="19050">
-            <a:solidFill>
-              <a:schemeClr val="tx1"/>
-            </a:solidFill>
-            <a:prstDash val="dash"/>
-          </a:ln>
-        </p:spPr>
-        <p:style>
-          <a:lnRef idx="1">
-            <a:schemeClr val="accent1"/>
-          </a:lnRef>
-          <a:fillRef idx="0">
-            <a:schemeClr val="accent1"/>
-          </a:fillRef>
-          <a:effectRef idx="0">
-            <a:schemeClr val="accent1"/>
-          </a:effectRef>
-          <a:fontRef idx="minor">
-            <a:schemeClr val="tx1"/>
-          </a:fontRef>
-        </p:style>
-      </p:cxnSp>
-      <p:cxnSp>
-        <p:nvCxnSpPr>
-          <p:cNvPr id="43" name="Straight Connector 42">
-            <a:extLst>
-              <a:ext uri="{FF2B5EF4-FFF2-40B4-BE49-F238E27FC236}">
-                <a16:creationId xmlns:a16="http://schemas.microsoft.com/office/drawing/2014/main" id="{D6D6C158-14D2-BA4D-8BA7-3BA18D2DDFCE}"/>
-              </a:ext>
-            </a:extLst>
-          </p:cNvPr>
-          <p:cNvCxnSpPr>
-            <a:cxnSpLocks/>
-          </p:cNvCxnSpPr>
-          <p:nvPr/>
-        </p:nvCxnSpPr>
-        <p:spPr>
-          <a:xfrm flipV="1">
-            <a:off x="1466493" y="4007614"/>
-            <a:ext cx="1875802" cy="1"/>
-          </a:xfrm>
-          <a:prstGeom prst="line">
-            <a:avLst/>
-          </a:prstGeom>
-          <a:ln w="19050">
-            <a:solidFill>
-              <a:srgbClr val="7030A0"/>
-            </a:solidFill>
-          </a:ln>
-        </p:spPr>
-        <p:style>
-          <a:lnRef idx="1">
-            <a:schemeClr val="accent1"/>
-          </a:lnRef>
-          <a:fillRef idx="0">
-            <a:schemeClr val="accent1"/>
-          </a:fillRef>
-          <a:effectRef idx="0">
-            <a:schemeClr val="accent1"/>
-          </a:effectRef>
-          <a:fontRef idx="minor">
-            <a:schemeClr val="tx1"/>
-          </a:fontRef>
-        </p:style>
-      </p:cxnSp>
-      <p:cxnSp>
-        <p:nvCxnSpPr>
-          <p:cNvPr id="58" name="Straight Connector 57">
-            <a:extLst>
-              <a:ext uri="{FF2B5EF4-FFF2-40B4-BE49-F238E27FC236}">
-                <a16:creationId xmlns:a16="http://schemas.microsoft.com/office/drawing/2014/main" id="{9DBAC7A3-9CDD-524F-9D46-3D94E5016E6D}"/>
-              </a:ext>
-            </a:extLst>
-          </p:cNvPr>
-          <p:cNvCxnSpPr>
-            <a:cxnSpLocks/>
-          </p:cNvCxnSpPr>
-          <p:nvPr/>
-        </p:nvCxnSpPr>
-        <p:spPr>
-          <a:xfrm flipV="1">
-            <a:off x="1445149" y="3875606"/>
-            <a:ext cx="1842055" cy="3520"/>
-          </a:xfrm>
-          <a:prstGeom prst="line">
-            <a:avLst/>
-          </a:prstGeom>
-          <a:ln w="19050">
-            <a:solidFill>
-              <a:schemeClr val="accent2">
-                <a:lumMod val="50000"/>
-              </a:schemeClr>
-            </a:solidFill>
-          </a:ln>
-        </p:spPr>
-        <p:style>
-          <a:lnRef idx="1">
-            <a:schemeClr val="accent1"/>
-          </a:lnRef>
-          <a:fillRef idx="0">
-            <a:schemeClr val="accent1"/>
-          </a:fillRef>
-          <a:effectRef idx="0">
-            <a:schemeClr val="accent1"/>
-          </a:effectRef>
-          <a:fontRef idx="minor">
-            <a:schemeClr val="tx1"/>
-          </a:fontRef>
-        </p:style>
-      </p:cxnSp>
-      <p:sp>
-        <p:nvSpPr>
-          <p:cNvPr id="65" name="TextBox 64">
-            <a:extLst>
-              <a:ext uri="{FF2B5EF4-FFF2-40B4-BE49-F238E27FC236}">
-                <a16:creationId xmlns:a16="http://schemas.microsoft.com/office/drawing/2014/main" id="{009091B1-CC4C-9C41-87CF-03F623B78E93}"/>
-              </a:ext>
-            </a:extLst>
-          </p:cNvPr>
-          <p:cNvSpPr txBox="1"/>
-          <p:nvPr/>
-        </p:nvSpPr>
-        <p:spPr>
-          <a:xfrm rot="180386">
-            <a:off x="4540160" y="2209256"/>
+          <a:xfrm rot="19442147">
+            <a:off x="4380404" y="2426922"/>
             <a:ext cx="1120954" cy="307777"/>
           </a:xfrm>
           <a:prstGeom prst="rect">
@@ -5395,10 +4426,10 @@
       </p:cxnSp>
       <p:cxnSp>
         <p:nvCxnSpPr>
-          <p:cNvPr id="35" name="Straight Connector 34">
-            <a:extLst>
-              <a:ext uri="{FF2B5EF4-FFF2-40B4-BE49-F238E27FC236}">
-                <a16:creationId xmlns:a16="http://schemas.microsoft.com/office/drawing/2014/main" id="{FCB24951-D27C-3A4E-A7A8-6796DF7DC38B}"/>
+          <p:cNvPr id="37" name="Straight Connector 36">
+            <a:extLst>
+              <a:ext uri="{FF2B5EF4-FFF2-40B4-BE49-F238E27FC236}">
+                <a16:creationId xmlns:a16="http://schemas.microsoft.com/office/drawing/2014/main" id="{0295E786-9DF4-6648-8BA3-8662292B1CE2}"/>
               </a:ext>
             </a:extLst>
           </p:cNvPr>
@@ -5408,52 +4439,9 @@
           <p:nvPr/>
         </p:nvCxnSpPr>
         <p:spPr>
-          <a:xfrm flipV="1">
-            <a:off x="3330605" y="3114071"/>
-            <a:ext cx="1383635" cy="893544"/>
-          </a:xfrm>
-          <a:prstGeom prst="line">
-            <a:avLst/>
-          </a:prstGeom>
-          <a:ln w="19050">
-            <a:solidFill>
-              <a:srgbClr val="7030A0"/>
-            </a:solidFill>
-          </a:ln>
-        </p:spPr>
-        <p:style>
-          <a:lnRef idx="1">
-            <a:schemeClr val="accent1"/>
-          </a:lnRef>
-          <a:fillRef idx="0">
-            <a:schemeClr val="accent1"/>
-          </a:fillRef>
-          <a:effectRef idx="0">
-            <a:schemeClr val="accent1"/>
-          </a:effectRef>
-          <a:fontRef idx="minor">
-            <a:schemeClr val="tx1"/>
-          </a:fontRef>
-        </p:style>
-      </p:cxnSp>
-      <p:cxnSp>
-        <p:nvCxnSpPr>
-          <p:cNvPr id="37" name="Straight Connector 36">
-            <a:extLst>
-              <a:ext uri="{FF2B5EF4-FFF2-40B4-BE49-F238E27FC236}">
-                <a16:creationId xmlns:a16="http://schemas.microsoft.com/office/drawing/2014/main" id="{0295E786-9DF4-6648-8BA3-8662292B1CE2}"/>
-              </a:ext>
-            </a:extLst>
-          </p:cNvPr>
-          <p:cNvCxnSpPr>
-            <a:cxnSpLocks/>
-          </p:cNvCxnSpPr>
-          <p:nvPr/>
-        </p:nvCxnSpPr>
-        <p:spPr>
-          <a:xfrm flipV="1">
-            <a:off x="4711520" y="2954975"/>
-            <a:ext cx="1039040" cy="159096"/>
+          <a:xfrm>
+            <a:off x="3312300" y="2684491"/>
+            <a:ext cx="2164000" cy="395305"/>
           </a:xfrm>
           <a:prstGeom prst="line">
             <a:avLst/>
@@ -5495,8 +4483,8 @@
         </p:nvCxnSpPr>
         <p:spPr>
           <a:xfrm flipV="1">
-            <a:off x="1454803" y="2715282"/>
-            <a:ext cx="1875802" cy="1"/>
+            <a:off x="1459910" y="4364414"/>
+            <a:ext cx="2443718" cy="7992"/>
           </a:xfrm>
           <a:prstGeom prst="line">
             <a:avLst/>
@@ -5537,52 +4525,9 @@
           <p:nvPr/>
         </p:nvCxnSpPr>
         <p:spPr>
-          <a:xfrm>
-            <a:off x="3308548" y="2715282"/>
-            <a:ext cx="1309685" cy="1559114"/>
-          </a:xfrm>
-          <a:prstGeom prst="line">
-            <a:avLst/>
-          </a:prstGeom>
-          <a:ln w="19050">
-            <a:solidFill>
-              <a:srgbClr val="00B050"/>
-            </a:solidFill>
-          </a:ln>
-        </p:spPr>
-        <p:style>
-          <a:lnRef idx="1">
-            <a:schemeClr val="accent1"/>
-          </a:lnRef>
-          <a:fillRef idx="0">
-            <a:schemeClr val="accent1"/>
-          </a:fillRef>
-          <a:effectRef idx="0">
-            <a:schemeClr val="accent1"/>
-          </a:effectRef>
-          <a:fontRef idx="minor">
-            <a:schemeClr val="tx1"/>
-          </a:fontRef>
-        </p:style>
-      </p:cxnSp>
-      <p:cxnSp>
-        <p:nvCxnSpPr>
-          <p:cNvPr id="47" name="Straight Connector 46">
-            <a:extLst>
-              <a:ext uri="{FF2B5EF4-FFF2-40B4-BE49-F238E27FC236}">
-                <a16:creationId xmlns:a16="http://schemas.microsoft.com/office/drawing/2014/main" id="{591462D8-C0E8-EF47-88C6-3FA73D36DC90}"/>
-              </a:ext>
-            </a:extLst>
-          </p:cNvPr>
-          <p:cNvCxnSpPr>
-            <a:cxnSpLocks/>
-          </p:cNvCxnSpPr>
-          <p:nvPr/>
-        </p:nvCxnSpPr>
-        <p:spPr>
-          <a:xfrm>
-            <a:off x="4615797" y="4274396"/>
-            <a:ext cx="896729" cy="229997"/>
+          <a:xfrm flipV="1">
+            <a:off x="3863409" y="3158515"/>
+            <a:ext cx="1800919" cy="1218325"/>
           </a:xfrm>
           <a:prstGeom prst="line">
             <a:avLst/>
@@ -5624,8 +4569,8 @@
         </p:nvCxnSpPr>
         <p:spPr>
           <a:xfrm flipV="1">
-            <a:off x="3283730" y="2440842"/>
-            <a:ext cx="1239796" cy="1438284"/>
+            <a:off x="3283730" y="2292298"/>
+            <a:ext cx="2215174" cy="1586828"/>
           </a:xfrm>
           <a:prstGeom prst="line">
             <a:avLst/>
@@ -5653,67 +4598,22 @@
           </a:fontRef>
         </p:style>
       </p:cxnSp>
-      <p:cxnSp>
-        <p:nvCxnSpPr>
-          <p:cNvPr id="56" name="Straight Connector 55">
-            <a:extLst>
-              <a:ext uri="{FF2B5EF4-FFF2-40B4-BE49-F238E27FC236}">
-                <a16:creationId xmlns:a16="http://schemas.microsoft.com/office/drawing/2014/main" id="{AA261B83-0CA1-1949-AA64-1E74D75975FC}"/>
-              </a:ext>
-            </a:extLst>
-          </p:cNvPr>
-          <p:cNvCxnSpPr>
-            <a:cxnSpLocks/>
-          </p:cNvCxnSpPr>
-          <p:nvPr/>
-        </p:nvCxnSpPr>
+      <p:sp>
+        <p:nvSpPr>
+          <p:cNvPr id="76" name="Rectangle 75">
+            <a:extLst>
+              <a:ext uri="{FF2B5EF4-FFF2-40B4-BE49-F238E27FC236}">
+                <a16:creationId xmlns:a16="http://schemas.microsoft.com/office/drawing/2014/main" id="{8CDA27CE-4D92-6046-BFAF-FEB82188EAC4}"/>
+              </a:ext>
+            </a:extLst>
+          </p:cNvPr>
+          <p:cNvSpPr/>
+          <p:nvPr/>
+        </p:nvSpPr>
         <p:spPr>
           <a:xfrm>
-            <a:off x="4523526" y="2448501"/>
-            <a:ext cx="1061019" cy="36784"/>
-          </a:xfrm>
-          <a:prstGeom prst="line">
-            <a:avLst/>
-          </a:prstGeom>
-          <a:ln w="19050">
-            <a:solidFill>
-              <a:schemeClr val="accent2">
-                <a:lumMod val="50000"/>
-              </a:schemeClr>
-            </a:solidFill>
-          </a:ln>
-        </p:spPr>
-        <p:style>
-          <a:lnRef idx="1">
-            <a:schemeClr val="accent1"/>
-          </a:lnRef>
-          <a:fillRef idx="0">
-            <a:schemeClr val="accent1"/>
-          </a:fillRef>
-          <a:effectRef idx="0">
-            <a:schemeClr val="accent1"/>
-          </a:effectRef>
-          <a:fontRef idx="minor">
-            <a:schemeClr val="tx1"/>
-          </a:fontRef>
-        </p:style>
-      </p:cxnSp>
-      <p:sp>
-        <p:nvSpPr>
-          <p:cNvPr id="76" name="Rectangle 75">
-            <a:extLst>
-              <a:ext uri="{FF2B5EF4-FFF2-40B4-BE49-F238E27FC236}">
-                <a16:creationId xmlns:a16="http://schemas.microsoft.com/office/drawing/2014/main" id="{8CDA27CE-4D92-6046-BFAF-FEB82188EAC4}"/>
-              </a:ext>
-            </a:extLst>
-          </p:cNvPr>
-          <p:cNvSpPr/>
-          <p:nvPr/>
-        </p:nvSpPr>
-        <p:spPr>
-          <a:xfrm>
-            <a:off x="138023" y="707291"/>
-            <a:ext cx="3867609" cy="1384995"/>
+            <a:off x="3477725" y="1037656"/>
+            <a:ext cx="5701828" cy="461665"/>
           </a:xfrm>
           <a:prstGeom prst="rect">
             <a:avLst/>
@@ -5728,17 +4628,10 @@
             <a:pPr algn="ctr"/>
             <a:r>
               <a:rPr lang="en-US" sz="1200" dirty="0">
-                <a:effectLst/>
                 <a:latin typeface="Helvetica" pitchFamily="2" charset="0"/>
               </a:rPr>
-              <a:t>The strength and direction of land-use change is different for extensive, intensive and abandoned land types at pixel-scale, with the transition to abandoned land strongest after the Soviet Union collapse and the transition to intensive land strongest after EU accession.</a:t>
-            </a:r>
-          </a:p>
-          <a:p>
-            <a:endParaRPr lang="en-US" sz="1200" dirty="0">
-              <a:effectLst/>
-              <a:latin typeface="Helvetica" pitchFamily="2" charset="0"/>
-            </a:endParaRPr>
+              <a:t>There is an observable, uniform link between both the Soviet Union collapse and EU accession and land-use change in Latvia at a country-scale. </a:t>
+            </a:r>
           </a:p>
         </p:txBody>
       </p:sp>
@@ -5884,9 +4777,9 @@
           <p:nvPr/>
         </p:nvCxnSpPr>
         <p:spPr>
-          <a:xfrm flipV="1">
-            <a:off x="7091364" y="2521883"/>
-            <a:ext cx="2109085" cy="476359"/>
+          <a:xfrm>
+            <a:off x="7084569" y="2614720"/>
+            <a:ext cx="1890989" cy="208562"/>
           </a:xfrm>
           <a:prstGeom prst="line">
             <a:avLst/>
@@ -5928,8 +4821,8 @@
         </p:nvCxnSpPr>
         <p:spPr>
           <a:xfrm flipV="1">
-            <a:off x="9160812" y="1855632"/>
-            <a:ext cx="1768088" cy="677901"/>
+            <a:off x="8957316" y="1601842"/>
+            <a:ext cx="1899565" cy="1232657"/>
           </a:xfrm>
           <a:prstGeom prst="line">
             <a:avLst/>
@@ -5968,8 +4861,8 @@
           <p:nvPr/>
         </p:nvSpPr>
         <p:spPr>
-          <a:xfrm rot="20422602">
-            <a:off x="9491289" y="1950363"/>
+          <a:xfrm rot="19575163">
+            <a:off x="9452521" y="1910039"/>
             <a:ext cx="901209" cy="307777"/>
           </a:xfrm>
           <a:prstGeom prst="rect">
@@ -6007,9 +4900,9 @@
           <p:nvPr/>
         </p:nvCxnSpPr>
         <p:spPr>
-          <a:xfrm>
-            <a:off x="7109158" y="4421322"/>
-            <a:ext cx="1933242" cy="427769"/>
+          <a:xfrm flipV="1">
+            <a:off x="7084569" y="3034523"/>
+            <a:ext cx="1806768" cy="816752"/>
           </a:xfrm>
           <a:prstGeom prst="line">
             <a:avLst/>
@@ -6051,8 +4944,8 @@
         </p:nvCxnSpPr>
         <p:spPr>
           <a:xfrm>
-            <a:off x="9045164" y="4853559"/>
-            <a:ext cx="2185096" cy="217205"/>
+            <a:off x="8852064" y="3031298"/>
+            <a:ext cx="2292555" cy="284339"/>
           </a:xfrm>
           <a:prstGeom prst="line">
             <a:avLst/>
@@ -6092,7 +4985,7 @@
         </p:nvSpPr>
         <p:spPr>
           <a:xfrm rot="368567">
-            <a:off x="9955598" y="4708271"/>
+            <a:off x="9664553" y="2932867"/>
             <a:ext cx="962123" cy="307777"/>
           </a:xfrm>
           <a:prstGeom prst="rect">
@@ -6118,7 +5011,7 @@
     </p:spTree>
     <p:extLst>
       <p:ext uri="{BB962C8B-B14F-4D97-AF65-F5344CB8AC3E}">
-        <p14:creationId xmlns:p14="http://schemas.microsoft.com/office/powerpoint/2010/main" val="4044838385"/>
+        <p14:creationId xmlns:p14="http://schemas.microsoft.com/office/powerpoint/2010/main" val="1532874315"/>
       </p:ext>
     </p:extLst>
   </p:cSld>
@@ -6128,7 +5021,7 @@
 </p:sld>
 </file>
 
-<file path=ppt/slides/slide3.xml><?xml version="1.0" encoding="utf-8"?>
+<file path=ppt/slides/slide2.xml><?xml version="1.0" encoding="utf-8"?>
 <p:sld xmlns:a="http://schemas.openxmlformats.org/drawingml/2006/main" xmlns:r="http://schemas.openxmlformats.org/officeDocument/2006/relationships" xmlns:p="http://schemas.openxmlformats.org/presentationml/2006/main">
   <p:cSld>
     <p:spTree>
@@ -6160,7 +5053,7 @@
         <p:spPr>
           <a:xfrm>
             <a:off x="1005606" y="395538"/>
-            <a:ext cx="10224654" cy="923330"/>
+            <a:ext cx="10224654" cy="646331"/>
           </a:xfrm>
           <a:prstGeom prst="rect">
             <a:avLst/>
@@ -6178,7 +5071,7 @@
                 <a:effectLst/>
                 <a:latin typeface="Helvetica" pitchFamily="2" charset="0"/>
               </a:rPr>
-              <a:t>Is there a time lag between socio-economic events and the occurrence of land use</a:t>
+              <a:t>Are the strength and direction of land-use change different among extensive,</a:t>
             </a:r>
           </a:p>
           <a:p>
@@ -6188,15 +5081,8 @@
                 <a:effectLst/>
                 <a:latin typeface="Helvetica" pitchFamily="2" charset="0"/>
               </a:rPr>
-              <a:t>change? Does this differ between land-use type?</a:t>
-            </a:r>
-          </a:p>
-          <a:p>
-            <a:pPr algn="ctr"/>
-            <a:endParaRPr lang="en-US" b="1" dirty="0">
-              <a:effectLst/>
-              <a:latin typeface="Helvetica" pitchFamily="2" charset="0"/>
-            </a:endParaRPr>
+              <a:t>intensive and abandoned land-use types?</a:t>
+            </a:r>
           </a:p>
         </p:txBody>
       </p:sp>
@@ -6481,7 +5367,7 @@
         </p:nvSpPr>
         <p:spPr>
           <a:xfrm rot="16200000">
-            <a:off x="213724" y="3634257"/>
+            <a:off x="213723" y="3634257"/>
             <a:ext cx="2124299" cy="338554"/>
           </a:xfrm>
           <a:prstGeom prst="rect">
@@ -6517,8 +5403,8 @@
           <p:nvPr/>
         </p:nvSpPr>
         <p:spPr>
-          <a:xfrm rot="21120474">
-            <a:off x="4728540" y="2768007"/>
+          <a:xfrm>
+            <a:off x="1822402" y="2433607"/>
             <a:ext cx="901209" cy="307777"/>
           </a:xfrm>
           <a:prstGeom prst="rect">
@@ -6555,7 +5441,7 @@
         </p:nvSpPr>
         <p:spPr>
           <a:xfrm>
-            <a:off x="1898013" y="2458967"/>
+            <a:off x="1459926" y="4070266"/>
             <a:ext cx="962123" cy="307777"/>
           </a:xfrm>
           <a:prstGeom prst="rect">
@@ -6638,8 +5524,8 @@
         </p:nvCxnSpPr>
         <p:spPr>
           <a:xfrm flipV="1">
-            <a:off x="1466493" y="4007614"/>
-            <a:ext cx="1875802" cy="1"/>
+            <a:off x="1454803" y="2678637"/>
+            <a:ext cx="1875802" cy="13027"/>
           </a:xfrm>
           <a:prstGeom prst="line">
             <a:avLst/>
@@ -6723,8 +5609,8 @@
           <p:nvPr/>
         </p:nvSpPr>
         <p:spPr>
-          <a:xfrm rot="180386">
-            <a:off x="4540160" y="2209256"/>
+          <a:xfrm rot="19442147">
+            <a:off x="4380404" y="2426922"/>
             <a:ext cx="1120954" cy="307777"/>
           </a:xfrm>
           <a:prstGeom prst="rect">
@@ -6900,10 +5786,10 @@
       </p:cxnSp>
       <p:cxnSp>
         <p:nvCxnSpPr>
-          <p:cNvPr id="35" name="Straight Connector 34">
-            <a:extLst>
-              <a:ext uri="{FF2B5EF4-FFF2-40B4-BE49-F238E27FC236}">
-                <a16:creationId xmlns:a16="http://schemas.microsoft.com/office/drawing/2014/main" id="{FCB24951-D27C-3A4E-A7A8-6796DF7DC38B}"/>
+          <p:cNvPr id="37" name="Straight Connector 36">
+            <a:extLst>
+              <a:ext uri="{FF2B5EF4-FFF2-40B4-BE49-F238E27FC236}">
+                <a16:creationId xmlns:a16="http://schemas.microsoft.com/office/drawing/2014/main" id="{0295E786-9DF4-6648-8BA3-8662292B1CE2}"/>
               </a:ext>
             </a:extLst>
           </p:cNvPr>
@@ -6913,52 +5799,9 @@
           <p:nvPr/>
         </p:nvCxnSpPr>
         <p:spPr>
-          <a:xfrm flipV="1">
-            <a:off x="3330605" y="3114071"/>
-            <a:ext cx="1383635" cy="893544"/>
-          </a:xfrm>
-          <a:prstGeom prst="line">
-            <a:avLst/>
-          </a:prstGeom>
-          <a:ln w="19050">
-            <a:solidFill>
-              <a:srgbClr val="7030A0"/>
-            </a:solidFill>
-          </a:ln>
-        </p:spPr>
-        <p:style>
-          <a:lnRef idx="1">
-            <a:schemeClr val="accent1"/>
-          </a:lnRef>
-          <a:fillRef idx="0">
-            <a:schemeClr val="accent1"/>
-          </a:fillRef>
-          <a:effectRef idx="0">
-            <a:schemeClr val="accent1"/>
-          </a:effectRef>
-          <a:fontRef idx="minor">
-            <a:schemeClr val="tx1"/>
-          </a:fontRef>
-        </p:style>
-      </p:cxnSp>
-      <p:cxnSp>
-        <p:nvCxnSpPr>
-          <p:cNvPr id="37" name="Straight Connector 36">
-            <a:extLst>
-              <a:ext uri="{FF2B5EF4-FFF2-40B4-BE49-F238E27FC236}">
-                <a16:creationId xmlns:a16="http://schemas.microsoft.com/office/drawing/2014/main" id="{0295E786-9DF4-6648-8BA3-8662292B1CE2}"/>
-              </a:ext>
-            </a:extLst>
-          </p:cNvPr>
-          <p:cNvCxnSpPr>
-            <a:cxnSpLocks/>
-          </p:cNvCxnSpPr>
-          <p:nvPr/>
-        </p:nvCxnSpPr>
-        <p:spPr>
-          <a:xfrm flipV="1">
-            <a:off x="4711520" y="2954975"/>
-            <a:ext cx="1039040" cy="159096"/>
+          <a:xfrm>
+            <a:off x="3312300" y="2684491"/>
+            <a:ext cx="2164000" cy="395305"/>
           </a:xfrm>
           <a:prstGeom prst="line">
             <a:avLst/>
@@ -7000,8 +5843,8 @@
         </p:nvCxnSpPr>
         <p:spPr>
           <a:xfrm flipV="1">
-            <a:off x="1454803" y="2715282"/>
-            <a:ext cx="1875802" cy="1"/>
+            <a:off x="1459910" y="4364414"/>
+            <a:ext cx="2443718" cy="7992"/>
           </a:xfrm>
           <a:prstGeom prst="line">
             <a:avLst/>
@@ -7042,52 +5885,9 @@
           <p:nvPr/>
         </p:nvCxnSpPr>
         <p:spPr>
-          <a:xfrm>
-            <a:off x="3308548" y="2715282"/>
-            <a:ext cx="1309685" cy="1559114"/>
-          </a:xfrm>
-          <a:prstGeom prst="line">
-            <a:avLst/>
-          </a:prstGeom>
-          <a:ln w="19050">
-            <a:solidFill>
-              <a:srgbClr val="00B050"/>
-            </a:solidFill>
-          </a:ln>
-        </p:spPr>
-        <p:style>
-          <a:lnRef idx="1">
-            <a:schemeClr val="accent1"/>
-          </a:lnRef>
-          <a:fillRef idx="0">
-            <a:schemeClr val="accent1"/>
-          </a:fillRef>
-          <a:effectRef idx="0">
-            <a:schemeClr val="accent1"/>
-          </a:effectRef>
-          <a:fontRef idx="minor">
-            <a:schemeClr val="tx1"/>
-          </a:fontRef>
-        </p:style>
-      </p:cxnSp>
-      <p:cxnSp>
-        <p:nvCxnSpPr>
-          <p:cNvPr id="47" name="Straight Connector 46">
-            <a:extLst>
-              <a:ext uri="{FF2B5EF4-FFF2-40B4-BE49-F238E27FC236}">
-                <a16:creationId xmlns:a16="http://schemas.microsoft.com/office/drawing/2014/main" id="{591462D8-C0E8-EF47-88C6-3FA73D36DC90}"/>
-              </a:ext>
-            </a:extLst>
-          </p:cNvPr>
-          <p:cNvCxnSpPr>
-            <a:cxnSpLocks/>
-          </p:cNvCxnSpPr>
-          <p:nvPr/>
-        </p:nvCxnSpPr>
-        <p:spPr>
-          <a:xfrm>
-            <a:off x="4615797" y="4274396"/>
-            <a:ext cx="896729" cy="229997"/>
+          <a:xfrm flipV="1">
+            <a:off x="3863409" y="3158515"/>
+            <a:ext cx="1800919" cy="1218325"/>
           </a:xfrm>
           <a:prstGeom prst="line">
             <a:avLst/>
@@ -7129,8 +5929,8 @@
         </p:nvCxnSpPr>
         <p:spPr>
           <a:xfrm flipV="1">
-            <a:off x="3283730" y="2440842"/>
-            <a:ext cx="1239796" cy="1438284"/>
+            <a:off x="3283730" y="2292298"/>
+            <a:ext cx="2215174" cy="1586828"/>
           </a:xfrm>
           <a:prstGeom prst="line">
             <a:avLst/>
@@ -7158,67 +5958,22 @@
           </a:fontRef>
         </p:style>
       </p:cxnSp>
-      <p:cxnSp>
-        <p:nvCxnSpPr>
-          <p:cNvPr id="56" name="Straight Connector 55">
-            <a:extLst>
-              <a:ext uri="{FF2B5EF4-FFF2-40B4-BE49-F238E27FC236}">
-                <a16:creationId xmlns:a16="http://schemas.microsoft.com/office/drawing/2014/main" id="{AA261B83-0CA1-1949-AA64-1E74D75975FC}"/>
-              </a:ext>
-            </a:extLst>
-          </p:cNvPr>
-          <p:cNvCxnSpPr>
-            <a:cxnSpLocks/>
-          </p:cNvCxnSpPr>
-          <p:nvPr/>
-        </p:nvCxnSpPr>
+      <p:sp>
+        <p:nvSpPr>
+          <p:cNvPr id="76" name="Rectangle 75">
+            <a:extLst>
+              <a:ext uri="{FF2B5EF4-FFF2-40B4-BE49-F238E27FC236}">
+                <a16:creationId xmlns:a16="http://schemas.microsoft.com/office/drawing/2014/main" id="{8CDA27CE-4D92-6046-BFAF-FEB82188EAC4}"/>
+              </a:ext>
+            </a:extLst>
+          </p:cNvPr>
+          <p:cNvSpPr/>
+          <p:nvPr/>
+        </p:nvSpPr>
         <p:spPr>
           <a:xfrm>
-            <a:off x="4523526" y="2448501"/>
-            <a:ext cx="1061019" cy="36784"/>
-          </a:xfrm>
-          <a:prstGeom prst="line">
-            <a:avLst/>
-          </a:prstGeom>
-          <a:ln w="19050">
-            <a:solidFill>
-              <a:schemeClr val="accent2">
-                <a:lumMod val="50000"/>
-              </a:schemeClr>
-            </a:solidFill>
-          </a:ln>
-        </p:spPr>
-        <p:style>
-          <a:lnRef idx="1">
-            <a:schemeClr val="accent1"/>
-          </a:lnRef>
-          <a:fillRef idx="0">
-            <a:schemeClr val="accent1"/>
-          </a:fillRef>
-          <a:effectRef idx="0">
-            <a:schemeClr val="accent1"/>
-          </a:effectRef>
-          <a:fontRef idx="minor">
-            <a:schemeClr val="tx1"/>
-          </a:fontRef>
-        </p:style>
-      </p:cxnSp>
-      <p:sp>
-        <p:nvSpPr>
-          <p:cNvPr id="76" name="Rectangle 75">
-            <a:extLst>
-              <a:ext uri="{FF2B5EF4-FFF2-40B4-BE49-F238E27FC236}">
-                <a16:creationId xmlns:a16="http://schemas.microsoft.com/office/drawing/2014/main" id="{8CDA27CE-4D92-6046-BFAF-FEB82188EAC4}"/>
-              </a:ext>
-            </a:extLst>
-          </p:cNvPr>
-          <p:cNvSpPr/>
-          <p:nvPr/>
-        </p:nvSpPr>
-        <p:spPr>
-          <a:xfrm>
-            <a:off x="62602" y="690561"/>
-            <a:ext cx="3462917" cy="1384995"/>
+            <a:off x="2195159" y="964156"/>
+            <a:ext cx="7333941" cy="830997"/>
           </a:xfrm>
           <a:prstGeom prst="rect">
             <a:avLst/>
@@ -7236,10 +5991,26 @@
                 <a:effectLst/>
                 <a:latin typeface="Helvetica" pitchFamily="2" charset="0"/>
               </a:rPr>
-              <a:t>Land-use change is observed directly following the Soviet Union collapse at country-scale. There is a time lag on when land-use change is observed at country-scale following Latvia joining the EU. Time lags are different across land-use types at pixel-scale.</a:t>
-            </a:r>
-          </a:p>
-          <a:p>
+              <a:t>The strength and direction of land-use change are different for extensive, intensive and abandoned land types at pixel-scale, with a slight decrease in intensive land and a sharp increase in abandoned and extensive land following Soviet Union collapse. For the EU, </a:t>
+            </a:r>
+            <a:r>
+              <a:rPr lang="en-US" sz="1200" dirty="0">
+                <a:latin typeface="Helvetica" pitchFamily="2" charset="0"/>
+              </a:rPr>
+              <a:t>I </a:t>
+            </a:r>
+            <a:r>
+              <a:rPr lang="en-US" sz="1200" dirty="0" err="1">
+                <a:latin typeface="Helvetica" pitchFamily="2" charset="0"/>
+              </a:rPr>
+              <a:t>hypothesise</a:t>
+            </a:r>
+            <a:r>
+              <a:rPr lang="en-US" sz="1200" dirty="0">
+                <a:latin typeface="Helvetica" pitchFamily="2" charset="0"/>
+              </a:rPr>
+              <a:t> a slight decrease in abandoned and extensive land-use types, but a sharp increase in intensive land.</a:t>
+            </a:r>
             <a:endParaRPr lang="en-US" sz="1200" dirty="0">
               <a:effectLst/>
               <a:latin typeface="Helvetica" pitchFamily="2" charset="0"/>
@@ -7389,9 +6160,9 @@
           <p:nvPr/>
         </p:nvCxnSpPr>
         <p:spPr>
-          <a:xfrm flipV="1">
-            <a:off x="7091364" y="2521883"/>
-            <a:ext cx="2109085" cy="476359"/>
+          <a:xfrm>
+            <a:off x="7084569" y="2614720"/>
+            <a:ext cx="1890989" cy="208562"/>
           </a:xfrm>
           <a:prstGeom prst="line">
             <a:avLst/>
@@ -7433,8 +6204,8 @@
         </p:nvCxnSpPr>
         <p:spPr>
           <a:xfrm flipV="1">
-            <a:off x="9160812" y="1855632"/>
-            <a:ext cx="1768088" cy="677901"/>
+            <a:off x="8957316" y="1601842"/>
+            <a:ext cx="1899565" cy="1232657"/>
           </a:xfrm>
           <a:prstGeom prst="line">
             <a:avLst/>
@@ -7473,8 +6244,8 @@
           <p:nvPr/>
         </p:nvSpPr>
         <p:spPr>
-          <a:xfrm rot="20422602">
-            <a:off x="9491289" y="1950363"/>
+          <a:xfrm rot="19575163">
+            <a:off x="9452521" y="1910039"/>
             <a:ext cx="901209" cy="307777"/>
           </a:xfrm>
           <a:prstGeom prst="rect">
@@ -7512,9 +6283,9 @@
           <p:nvPr/>
         </p:nvCxnSpPr>
         <p:spPr>
-          <a:xfrm>
-            <a:off x="7109158" y="4421322"/>
-            <a:ext cx="1933242" cy="427769"/>
+          <a:xfrm flipV="1">
+            <a:off x="7084569" y="3034523"/>
+            <a:ext cx="1806768" cy="816752"/>
           </a:xfrm>
           <a:prstGeom prst="line">
             <a:avLst/>
@@ -7556,8 +6327,8 @@
         </p:nvCxnSpPr>
         <p:spPr>
           <a:xfrm>
-            <a:off x="9045164" y="4853559"/>
-            <a:ext cx="2185096" cy="217205"/>
+            <a:off x="8852064" y="3031298"/>
+            <a:ext cx="2292555" cy="284339"/>
           </a:xfrm>
           <a:prstGeom prst="line">
             <a:avLst/>
@@ -7597,7 +6368,7 @@
         </p:nvSpPr>
         <p:spPr>
           <a:xfrm rot="368567">
-            <a:off x="9955598" y="4708271"/>
+            <a:off x="9664553" y="2932867"/>
             <a:ext cx="962123" cy="307777"/>
           </a:xfrm>
           <a:prstGeom prst="rect">
@@ -7622,10 +6393,10 @@
       </p:sp>
       <p:sp>
         <p:nvSpPr>
-          <p:cNvPr id="39" name="Rectangle 38">
-            <a:extLst>
-              <a:ext uri="{FF2B5EF4-FFF2-40B4-BE49-F238E27FC236}">
-                <a16:creationId xmlns:a16="http://schemas.microsoft.com/office/drawing/2014/main" id="{6AA4AC9D-F3C6-8C41-89CC-C3199CF83101}"/>
+          <p:cNvPr id="50" name="Rectangle 49">
+            <a:extLst>
+              <a:ext uri="{FF2B5EF4-FFF2-40B4-BE49-F238E27FC236}">
+                <a16:creationId xmlns:a16="http://schemas.microsoft.com/office/drawing/2014/main" id="{2C005FAD-10FE-2248-95A5-0D44E64523FC}"/>
               </a:ext>
             </a:extLst>
           </p:cNvPr>
@@ -7634,8 +6405,8 @@
         </p:nvSpPr>
         <p:spPr>
           <a:xfrm>
-            <a:off x="3697185" y="1155002"/>
-            <a:ext cx="3462917" cy="1015663"/>
+            <a:off x="1478607" y="4421627"/>
+            <a:ext cx="3867609" cy="1384995"/>
           </a:xfrm>
           <a:prstGeom prst="rect">
             <a:avLst/>
@@ -7653,7 +6424,7 @@
                 <a:effectLst/>
                 <a:latin typeface="Helvetica" pitchFamily="2" charset="0"/>
               </a:rPr>
-              <a:t>Can use same graphs as before</a:t>
+              <a:t>Sharp increase in abandoned land (because of not farming on newly returned land)</a:t>
             </a:r>
           </a:p>
           <a:p>
@@ -7662,14 +6433,83 @@
               <a:rPr lang="en-US" sz="1200" dirty="0">
                 <a:latin typeface="Helvetica" pitchFamily="2" charset="0"/>
               </a:rPr>
-              <a:t>Potential for bar plots or density plots to show how many pixels of each type and how fast they are changing</a:t>
-            </a:r>
+              <a:t>Sharp increase in extensive land (transition from co-ops to privately owned small farms)</a:t>
+            </a:r>
+          </a:p>
+          <a:p>
+            <a:pPr algn="ctr"/>
+            <a:r>
+              <a:rPr lang="en-US" sz="1200" dirty="0">
+                <a:latin typeface="Helvetica" pitchFamily="2" charset="0"/>
+              </a:rPr>
+              <a:t>Slight decrease in intensive land (as move away from state owned farms with state support)</a:t>
+            </a:r>
+          </a:p>
+          <a:p>
+            <a:pPr algn="ctr"/>
             <a:endParaRPr lang="en-US" sz="1200" dirty="0">
               <a:effectLst/>
               <a:latin typeface="Helvetica" pitchFamily="2" charset="0"/>
             </a:endParaRPr>
           </a:p>
-          <a:p>
+        </p:txBody>
+      </p:sp>
+      <p:sp>
+        <p:nvSpPr>
+          <p:cNvPr id="67" name="Rectangle 66">
+            <a:extLst>
+              <a:ext uri="{FF2B5EF4-FFF2-40B4-BE49-F238E27FC236}">
+                <a16:creationId xmlns:a16="http://schemas.microsoft.com/office/drawing/2014/main" id="{2FF10DE3-21F4-8C40-B3B1-37EC86EE47C0}"/>
+              </a:ext>
+            </a:extLst>
+          </p:cNvPr>
+          <p:cNvSpPr/>
+          <p:nvPr/>
+        </p:nvSpPr>
+        <p:spPr>
+          <a:xfrm>
+            <a:off x="7098160" y="4538126"/>
+            <a:ext cx="4303591" cy="1200329"/>
+          </a:xfrm>
+          <a:prstGeom prst="rect">
+            <a:avLst/>
+          </a:prstGeom>
+        </p:spPr>
+        <p:txBody>
+          <a:bodyPr wrap="square">
+            <a:spAutoFit/>
+          </a:bodyPr>
+          <a:lstStyle/>
+          <a:p>
+            <a:pPr algn="ctr"/>
+            <a:r>
+              <a:rPr lang="en-US" sz="1200" dirty="0">
+                <a:effectLst/>
+                <a:latin typeface="Helvetica" pitchFamily="2" charset="0"/>
+              </a:rPr>
+              <a:t>Slight decrease in abandoned land (land use for large farms)</a:t>
+            </a:r>
+          </a:p>
+          <a:p>
+            <a:pPr algn="ctr"/>
+            <a:r>
+              <a:rPr lang="en-US" sz="1200" dirty="0">
+                <a:latin typeface="Helvetica" pitchFamily="2" charset="0"/>
+              </a:rPr>
+              <a:t>Slight decrease in extensive land (people move to cities or work for more profitable farm)</a:t>
+            </a:r>
+          </a:p>
+          <a:p>
+            <a:pPr algn="ctr"/>
+            <a:r>
+              <a:rPr lang="en-US" sz="1200" dirty="0">
+                <a:latin typeface="Helvetica" pitchFamily="2" charset="0"/>
+              </a:rPr>
+              <a:t>Sharp increase in intensive land (more money to be made from EU subsidies with CAP)</a:t>
+            </a:r>
+          </a:p>
+          <a:p>
+            <a:pPr algn="ctr"/>
             <a:endParaRPr lang="en-US" sz="1200" dirty="0">
               <a:effectLst/>
               <a:latin typeface="Helvetica" pitchFamily="2" charset="0"/>
@@ -7680,7 +6520,7 @@
     </p:spTree>
     <p:extLst>
       <p:ext uri="{BB962C8B-B14F-4D97-AF65-F5344CB8AC3E}">
-        <p14:creationId xmlns:p14="http://schemas.microsoft.com/office/powerpoint/2010/main" val="2338005841"/>
+        <p14:creationId xmlns:p14="http://schemas.microsoft.com/office/powerpoint/2010/main" val="699633447"/>
       </p:ext>
     </p:extLst>
   </p:cSld>
@@ -7690,7 +6530,7 @@
 </p:sld>
 </file>
 
-<file path=ppt/slides/slide4.xml><?xml version="1.0" encoding="utf-8"?>
+<file path=ppt/slides/slide3.xml><?xml version="1.0" encoding="utf-8"?>
 <p:sld xmlns:a="http://schemas.openxmlformats.org/drawingml/2006/main" xmlns:r="http://schemas.openxmlformats.org/officeDocument/2006/relationships" xmlns:p="http://schemas.openxmlformats.org/presentationml/2006/main">
   <p:cSld>
     <p:spTree>
@@ -7707,110 +6547,1610 @@
           <a:chExt cx="0" cy="0"/>
         </a:xfrm>
       </p:grpSpPr>
-      <p:sp>
-        <p:nvSpPr>
-          <p:cNvPr id="2" name="Title 1">
-            <a:extLst>
-              <a:ext uri="{FF2B5EF4-FFF2-40B4-BE49-F238E27FC236}">
-                <a16:creationId xmlns:a16="http://schemas.microsoft.com/office/drawing/2014/main" id="{97680B40-0CF3-074E-8A6F-55F537940696}"/>
-              </a:ext>
-            </a:extLst>
-          </p:cNvPr>
-          <p:cNvSpPr>
-            <a:spLocks noGrp="1"/>
-          </p:cNvSpPr>
-          <p:nvPr>
-            <p:ph type="title"/>
-          </p:nvPr>
-        </p:nvSpPr>
-        <p:spPr/>
-        <p:txBody>
-          <a:bodyPr/>
-          <a:lstStyle/>
-          <a:p>
-            <a:r>
-              <a:rPr lang="en-US" dirty="0"/>
-              <a:t>Notes from Gergana</a:t>
-            </a:r>
-          </a:p>
-        </p:txBody>
-      </p:sp>
-      <p:sp>
-        <p:nvSpPr>
-          <p:cNvPr id="3" name="Content Placeholder 2">
-            <a:extLst>
-              <a:ext uri="{FF2B5EF4-FFF2-40B4-BE49-F238E27FC236}">
-                <a16:creationId xmlns:a16="http://schemas.microsoft.com/office/drawing/2014/main" id="{31F69497-915F-7246-956B-8974E5E8B3E5}"/>
-              </a:ext>
-            </a:extLst>
-          </p:cNvPr>
-          <p:cNvSpPr>
-            <a:spLocks noGrp="1"/>
-          </p:cNvSpPr>
-          <p:nvPr>
-            <p:ph idx="1"/>
-          </p:nvPr>
-        </p:nvSpPr>
-        <p:spPr/>
-        <p:txBody>
-          <a:bodyPr>
-            <a:normAutofit lnSpcReduction="10000"/>
+      <p:grpSp>
+        <p:nvGrpSpPr>
+          <p:cNvPr id="16" name="Group 15">
+            <a:extLst>
+              <a:ext uri="{FF2B5EF4-FFF2-40B4-BE49-F238E27FC236}">
+                <a16:creationId xmlns:a16="http://schemas.microsoft.com/office/drawing/2014/main" id="{40CF6A39-7D5B-AC4E-A157-644587D284D7}"/>
+              </a:ext>
+            </a:extLst>
+          </p:cNvPr>
+          <p:cNvGrpSpPr/>
+          <p:nvPr/>
+        </p:nvGrpSpPr>
+        <p:grpSpPr>
+          <a:xfrm>
+            <a:off x="7091364" y="1879027"/>
+            <a:ext cx="4138897" cy="3785035"/>
+            <a:chOff x="1363851" y="2433234"/>
+            <a:chExt cx="3813472" cy="3118600"/>
+          </a:xfrm>
+        </p:grpSpPr>
+        <p:cxnSp>
+          <p:nvCxnSpPr>
+            <p:cNvPr id="17" name="Straight Connector 16">
+              <a:extLst>
+                <a:ext uri="{FF2B5EF4-FFF2-40B4-BE49-F238E27FC236}">
+                  <a16:creationId xmlns:a16="http://schemas.microsoft.com/office/drawing/2014/main" id="{55A01319-81D3-A14A-AF8D-2DDCF24C6353}"/>
+                </a:ext>
+              </a:extLst>
+            </p:cNvPr>
+            <p:cNvCxnSpPr>
+              <a:cxnSpLocks/>
+            </p:cNvCxnSpPr>
+            <p:nvPr/>
+          </p:nvCxnSpPr>
+          <p:spPr>
+            <a:xfrm>
+              <a:off x="1363851" y="2433234"/>
+              <a:ext cx="0" cy="3112801"/>
+            </a:xfrm>
+            <a:prstGeom prst="line">
+              <a:avLst/>
+            </a:prstGeom>
+            <a:ln>
+              <a:solidFill>
+                <a:schemeClr val="tx1"/>
+              </a:solidFill>
+            </a:ln>
+          </p:spPr>
+          <p:style>
+            <a:lnRef idx="1">
+              <a:schemeClr val="accent1"/>
+            </a:lnRef>
+            <a:fillRef idx="0">
+              <a:schemeClr val="accent1"/>
+            </a:fillRef>
+            <a:effectRef idx="0">
+              <a:schemeClr val="accent1"/>
+            </a:effectRef>
+            <a:fontRef idx="minor">
+              <a:schemeClr val="tx1"/>
+            </a:fontRef>
+          </p:style>
+        </p:cxnSp>
+        <p:cxnSp>
+          <p:nvCxnSpPr>
+            <p:cNvPr id="18" name="Straight Connector 17">
+              <a:extLst>
+                <a:ext uri="{FF2B5EF4-FFF2-40B4-BE49-F238E27FC236}">
+                  <a16:creationId xmlns:a16="http://schemas.microsoft.com/office/drawing/2014/main" id="{7C9D843F-2EB4-A447-A947-C1DF89175DC2}"/>
+                </a:ext>
+              </a:extLst>
+            </p:cNvPr>
+            <p:cNvCxnSpPr>
+              <a:cxnSpLocks/>
+            </p:cNvCxnSpPr>
+            <p:nvPr/>
+          </p:nvCxnSpPr>
+          <p:spPr>
+            <a:xfrm flipH="1" flipV="1">
+              <a:off x="1363852" y="5546035"/>
+              <a:ext cx="3813471" cy="5799"/>
+            </a:xfrm>
+            <a:prstGeom prst="line">
+              <a:avLst/>
+            </a:prstGeom>
+            <a:ln>
+              <a:solidFill>
+                <a:schemeClr val="tx1"/>
+              </a:solidFill>
+            </a:ln>
+          </p:spPr>
+          <p:style>
+            <a:lnRef idx="1">
+              <a:schemeClr val="accent1"/>
+            </a:lnRef>
+            <a:fillRef idx="0">
+              <a:schemeClr val="accent1"/>
+            </a:fillRef>
+            <a:effectRef idx="0">
+              <a:schemeClr val="accent1"/>
+            </a:effectRef>
+            <a:fontRef idx="minor">
+              <a:schemeClr val="tx1"/>
+            </a:fontRef>
+          </p:style>
+        </p:cxnSp>
+      </p:grpSp>
+      <p:sp>
+        <p:nvSpPr>
+          <p:cNvPr id="20" name="TextBox 19">
+            <a:extLst>
+              <a:ext uri="{FF2B5EF4-FFF2-40B4-BE49-F238E27FC236}">
+                <a16:creationId xmlns:a16="http://schemas.microsoft.com/office/drawing/2014/main" id="{00160729-423F-4E48-B073-428D9F6DBFC7}"/>
+              </a:ext>
+            </a:extLst>
+          </p:cNvPr>
+          <p:cNvSpPr txBox="1"/>
+          <p:nvPr/>
+        </p:nvSpPr>
+        <p:spPr>
+          <a:xfrm>
+            <a:off x="7987953" y="6020861"/>
+            <a:ext cx="2087431" cy="338554"/>
+          </a:xfrm>
+          <a:prstGeom prst="rect">
+            <a:avLst/>
+          </a:prstGeom>
+          <a:noFill/>
+        </p:spPr>
+        <p:txBody>
+          <a:bodyPr wrap="none" rtlCol="0">
+            <a:spAutoFit/>
           </a:bodyPr>
           <a:lstStyle/>
           <a:p>
             <a:r>
-              <a:rPr lang="en-US" dirty="0"/>
-              <a:t>Have it all on one same graph  but highlight different things on 3 duplicates e.g. the time lag</a:t>
-            </a:r>
-          </a:p>
-          <a:p>
-            <a:r>
-              <a:rPr lang="en-US" dirty="0"/>
-              <a:t>First one is not clear, make copies of others </a:t>
-            </a:r>
-          </a:p>
-          <a:p>
-            <a:r>
-              <a:rPr lang="en-US" dirty="0"/>
-              <a:t>Show lag after EU better – increase in intensive and extensive after a while </a:t>
-            </a:r>
-          </a:p>
-          <a:p>
-            <a:r>
-              <a:rPr lang="en-US" dirty="0"/>
-              <a:t>Revisit predictions – not all abandoned came from extensive after SUC</a:t>
-            </a:r>
-          </a:p>
-          <a:p>
-            <a:pPr lvl="1"/>
-            <a:r>
-              <a:rPr lang="en-US" dirty="0"/>
-              <a:t>Not much of an increase of intensive agriculture after SUC</a:t>
-            </a:r>
-          </a:p>
-          <a:p>
-            <a:pPr lvl="1"/>
-            <a:r>
-              <a:rPr lang="en-US" dirty="0"/>
-              <a:t>Co-ops disappearing </a:t>
-            </a:r>
-            <a:r>
-              <a:rPr lang="en-US" dirty="0">
-                <a:sym typeface="Wingdings" pitchFamily="2" charset="2"/>
+              <a:rPr lang="en-US" sz="1600" dirty="0">
+                <a:latin typeface="Helvetica" pitchFamily="2" charset="0"/>
               </a:rPr>
-              <a:t> look into this</a:t>
-            </a:r>
-            <a:endParaRPr lang="en-US" dirty="0"/>
-          </a:p>
-          <a:p>
-            <a:r>
-              <a:rPr lang="en-US" dirty="0"/>
-              <a:t>Lag for intensive cause of changing ownership after SUC?</a:t>
-            </a:r>
-          </a:p>
-          <a:p>
-            <a:endParaRPr lang="en-US" dirty="0"/>
-          </a:p>
+              <a:t>EU accession (2004)</a:t>
+            </a:r>
+          </a:p>
+        </p:txBody>
+      </p:sp>
+      <p:sp>
+        <p:nvSpPr>
+          <p:cNvPr id="21" name="TextBox 20">
+            <a:extLst>
+              <a:ext uri="{FF2B5EF4-FFF2-40B4-BE49-F238E27FC236}">
+                <a16:creationId xmlns:a16="http://schemas.microsoft.com/office/drawing/2014/main" id="{105D2B8C-774A-E648-BE33-6DF0F97B2C43}"/>
+              </a:ext>
+            </a:extLst>
+          </p:cNvPr>
+          <p:cNvSpPr txBox="1"/>
+          <p:nvPr/>
+        </p:nvSpPr>
+        <p:spPr>
+          <a:xfrm>
+            <a:off x="1997138" y="6020861"/>
+            <a:ext cx="2803973" cy="338554"/>
+          </a:xfrm>
+          <a:prstGeom prst="rect">
+            <a:avLst/>
+          </a:prstGeom>
+          <a:noFill/>
+        </p:spPr>
+        <p:txBody>
+          <a:bodyPr wrap="none" rtlCol="0">
+            <a:spAutoFit/>
+          </a:bodyPr>
+          <a:lstStyle/>
+          <a:p>
+            <a:r>
+              <a:rPr lang="en-US" sz="1600" dirty="0">
+                <a:latin typeface="Helvetica" pitchFamily="2" charset="0"/>
+              </a:rPr>
+              <a:t>Soviet Union collapse (1991)</a:t>
+            </a:r>
+          </a:p>
+        </p:txBody>
+      </p:sp>
+      <p:cxnSp>
+        <p:nvCxnSpPr>
+          <p:cNvPr id="23" name="Straight Connector 22">
+            <a:extLst>
+              <a:ext uri="{FF2B5EF4-FFF2-40B4-BE49-F238E27FC236}">
+                <a16:creationId xmlns:a16="http://schemas.microsoft.com/office/drawing/2014/main" id="{2026D995-5657-5C44-88EB-77D50166E654}"/>
+              </a:ext>
+            </a:extLst>
+          </p:cNvPr>
+          <p:cNvCxnSpPr>
+            <a:cxnSpLocks/>
+          </p:cNvCxnSpPr>
+          <p:nvPr/>
+        </p:nvCxnSpPr>
+        <p:spPr>
+          <a:xfrm>
+            <a:off x="3312300" y="5665673"/>
+            <a:ext cx="0" cy="281899"/>
+          </a:xfrm>
+          <a:prstGeom prst="line">
+            <a:avLst/>
+          </a:prstGeom>
+          <a:ln>
+            <a:solidFill>
+              <a:schemeClr val="tx1"/>
+            </a:solidFill>
+          </a:ln>
+        </p:spPr>
+        <p:style>
+          <a:lnRef idx="1">
+            <a:schemeClr val="accent1"/>
+          </a:lnRef>
+          <a:fillRef idx="0">
+            <a:schemeClr val="accent1"/>
+          </a:fillRef>
+          <a:effectRef idx="0">
+            <a:schemeClr val="accent1"/>
+          </a:effectRef>
+          <a:fontRef idx="minor">
+            <a:schemeClr val="tx1"/>
+          </a:fontRef>
+        </p:style>
+      </p:cxnSp>
+      <p:cxnSp>
+        <p:nvCxnSpPr>
+          <p:cNvPr id="27" name="Straight Connector 26">
+            <a:extLst>
+              <a:ext uri="{FF2B5EF4-FFF2-40B4-BE49-F238E27FC236}">
+                <a16:creationId xmlns:a16="http://schemas.microsoft.com/office/drawing/2014/main" id="{7A96B6D0-A70C-104D-A9B2-A7917EDE6891}"/>
+              </a:ext>
+            </a:extLst>
+          </p:cNvPr>
+          <p:cNvCxnSpPr>
+            <a:cxnSpLocks/>
+          </p:cNvCxnSpPr>
+          <p:nvPr/>
+        </p:nvCxnSpPr>
+        <p:spPr>
+          <a:xfrm>
+            <a:off x="8891337" y="5665673"/>
+            <a:ext cx="0" cy="281899"/>
+          </a:xfrm>
+          <a:prstGeom prst="line">
+            <a:avLst/>
+          </a:prstGeom>
+          <a:ln>
+            <a:solidFill>
+              <a:schemeClr val="tx1"/>
+            </a:solidFill>
+          </a:ln>
+        </p:spPr>
+        <p:style>
+          <a:lnRef idx="1">
+            <a:schemeClr val="accent1"/>
+          </a:lnRef>
+          <a:fillRef idx="0">
+            <a:schemeClr val="accent1"/>
+          </a:fillRef>
+          <a:effectRef idx="0">
+            <a:schemeClr val="accent1"/>
+          </a:effectRef>
+          <a:fontRef idx="minor">
+            <a:schemeClr val="tx1"/>
+          </a:fontRef>
+        </p:style>
+      </p:cxnSp>
+      <p:sp>
+        <p:nvSpPr>
+          <p:cNvPr id="28" name="TextBox 27">
+            <a:extLst>
+              <a:ext uri="{FF2B5EF4-FFF2-40B4-BE49-F238E27FC236}">
+                <a16:creationId xmlns:a16="http://schemas.microsoft.com/office/drawing/2014/main" id="{968DD3D5-A621-EF4B-8DA0-91B3F7195E41}"/>
+              </a:ext>
+            </a:extLst>
+          </p:cNvPr>
+          <p:cNvSpPr txBox="1"/>
+          <p:nvPr/>
+        </p:nvSpPr>
+        <p:spPr>
+          <a:xfrm rot="16200000">
+            <a:off x="213723" y="3634257"/>
+            <a:ext cx="2124299" cy="338554"/>
+          </a:xfrm>
+          <a:prstGeom prst="rect">
+            <a:avLst/>
+          </a:prstGeom>
+          <a:noFill/>
+        </p:spPr>
+        <p:txBody>
+          <a:bodyPr wrap="none" rtlCol="0">
+            <a:spAutoFit/>
+          </a:bodyPr>
+          <a:lstStyle/>
+          <a:p>
+            <a:r>
+              <a:rPr lang="en-US" sz="1600" dirty="0">
+                <a:latin typeface="Helvetica" pitchFamily="2" charset="0"/>
+              </a:rPr>
+              <a:t>Area of land use type</a:t>
+            </a:r>
+          </a:p>
+        </p:txBody>
+      </p:sp>
+      <p:sp>
+        <p:nvSpPr>
+          <p:cNvPr id="31" name="TextBox 30">
+            <a:extLst>
+              <a:ext uri="{FF2B5EF4-FFF2-40B4-BE49-F238E27FC236}">
+                <a16:creationId xmlns:a16="http://schemas.microsoft.com/office/drawing/2014/main" id="{1F27D4AA-1B1A-7340-9145-FD19A8102554}"/>
+              </a:ext>
+            </a:extLst>
+          </p:cNvPr>
+          <p:cNvSpPr txBox="1"/>
+          <p:nvPr/>
+        </p:nvSpPr>
+        <p:spPr>
+          <a:xfrm>
+            <a:off x="1822402" y="2433607"/>
+            <a:ext cx="901209" cy="307777"/>
+          </a:xfrm>
+          <a:prstGeom prst="rect">
+            <a:avLst/>
+          </a:prstGeom>
+          <a:noFill/>
+        </p:spPr>
+        <p:txBody>
+          <a:bodyPr wrap="none" rtlCol="0">
+            <a:spAutoFit/>
+          </a:bodyPr>
+          <a:lstStyle/>
+          <a:p>
+            <a:r>
+              <a:rPr lang="en-US" sz="1400" dirty="0">
+                <a:latin typeface="Helvetica" pitchFamily="2" charset="0"/>
+              </a:rPr>
+              <a:t>Intensive</a:t>
+            </a:r>
+          </a:p>
+        </p:txBody>
+      </p:sp>
+      <p:sp>
+        <p:nvSpPr>
+          <p:cNvPr id="32" name="TextBox 31">
+            <a:extLst>
+              <a:ext uri="{FF2B5EF4-FFF2-40B4-BE49-F238E27FC236}">
+                <a16:creationId xmlns:a16="http://schemas.microsoft.com/office/drawing/2014/main" id="{4D62BA1D-8006-4247-AE24-68AC42AA16AE}"/>
+              </a:ext>
+            </a:extLst>
+          </p:cNvPr>
+          <p:cNvSpPr txBox="1"/>
+          <p:nvPr/>
+        </p:nvSpPr>
+        <p:spPr>
+          <a:xfrm>
+            <a:off x="1459926" y="4070266"/>
+            <a:ext cx="962123" cy="307777"/>
+          </a:xfrm>
+          <a:prstGeom prst="rect">
+            <a:avLst/>
+          </a:prstGeom>
+          <a:noFill/>
+        </p:spPr>
+        <p:txBody>
+          <a:bodyPr wrap="none" rtlCol="0">
+            <a:spAutoFit/>
+          </a:bodyPr>
+          <a:lstStyle/>
+          <a:p>
+            <a:r>
+              <a:rPr lang="en-US" sz="1400" dirty="0">
+                <a:latin typeface="Helvetica" pitchFamily="2" charset="0"/>
+              </a:rPr>
+              <a:t>Extensive</a:t>
+            </a:r>
+          </a:p>
+        </p:txBody>
+      </p:sp>
+      <p:cxnSp>
+        <p:nvCxnSpPr>
+          <p:cNvPr id="34" name="Straight Connector 33">
+            <a:extLst>
+              <a:ext uri="{FF2B5EF4-FFF2-40B4-BE49-F238E27FC236}">
+                <a16:creationId xmlns:a16="http://schemas.microsoft.com/office/drawing/2014/main" id="{BC084CB1-DE31-2646-8F88-5CEAAE373E89}"/>
+              </a:ext>
+            </a:extLst>
+          </p:cNvPr>
+          <p:cNvCxnSpPr>
+            <a:cxnSpLocks/>
+          </p:cNvCxnSpPr>
+          <p:nvPr/>
+        </p:nvCxnSpPr>
+        <p:spPr>
+          <a:xfrm flipV="1">
+            <a:off x="1466493" y="3875606"/>
+            <a:ext cx="4118052" cy="2"/>
+          </a:xfrm>
+          <a:prstGeom prst="line">
+            <a:avLst/>
+          </a:prstGeom>
+          <a:ln w="19050">
+            <a:solidFill>
+              <a:schemeClr val="tx1"/>
+            </a:solidFill>
+            <a:prstDash val="dash"/>
+          </a:ln>
+        </p:spPr>
+        <p:style>
+          <a:lnRef idx="1">
+            <a:schemeClr val="accent1"/>
+          </a:lnRef>
+          <a:fillRef idx="0">
+            <a:schemeClr val="accent1"/>
+          </a:fillRef>
+          <a:effectRef idx="0">
+            <a:schemeClr val="accent1"/>
+          </a:effectRef>
+          <a:fontRef idx="minor">
+            <a:schemeClr val="tx1"/>
+          </a:fontRef>
+        </p:style>
+      </p:cxnSp>
+      <p:cxnSp>
+        <p:nvCxnSpPr>
+          <p:cNvPr id="43" name="Straight Connector 42">
+            <a:extLst>
+              <a:ext uri="{FF2B5EF4-FFF2-40B4-BE49-F238E27FC236}">
+                <a16:creationId xmlns:a16="http://schemas.microsoft.com/office/drawing/2014/main" id="{D6D6C158-14D2-BA4D-8BA7-3BA18D2DDFCE}"/>
+              </a:ext>
+            </a:extLst>
+          </p:cNvPr>
+          <p:cNvCxnSpPr>
+            <a:cxnSpLocks/>
+          </p:cNvCxnSpPr>
+          <p:nvPr/>
+        </p:nvCxnSpPr>
+        <p:spPr>
+          <a:xfrm flipV="1">
+            <a:off x="1454803" y="2678637"/>
+            <a:ext cx="1875802" cy="13027"/>
+          </a:xfrm>
+          <a:prstGeom prst="line">
+            <a:avLst/>
+          </a:prstGeom>
+          <a:ln w="19050">
+            <a:solidFill>
+              <a:srgbClr val="7030A0"/>
+            </a:solidFill>
+          </a:ln>
+        </p:spPr>
+        <p:style>
+          <a:lnRef idx="1">
+            <a:schemeClr val="accent1"/>
+          </a:lnRef>
+          <a:fillRef idx="0">
+            <a:schemeClr val="accent1"/>
+          </a:fillRef>
+          <a:effectRef idx="0">
+            <a:schemeClr val="accent1"/>
+          </a:effectRef>
+          <a:fontRef idx="minor">
+            <a:schemeClr val="tx1"/>
+          </a:fontRef>
+        </p:style>
+      </p:cxnSp>
+      <p:cxnSp>
+        <p:nvCxnSpPr>
+          <p:cNvPr id="58" name="Straight Connector 57">
+            <a:extLst>
+              <a:ext uri="{FF2B5EF4-FFF2-40B4-BE49-F238E27FC236}">
+                <a16:creationId xmlns:a16="http://schemas.microsoft.com/office/drawing/2014/main" id="{9DBAC7A3-9CDD-524F-9D46-3D94E5016E6D}"/>
+              </a:ext>
+            </a:extLst>
+          </p:cNvPr>
+          <p:cNvCxnSpPr>
+            <a:cxnSpLocks/>
+          </p:cNvCxnSpPr>
+          <p:nvPr/>
+        </p:nvCxnSpPr>
+        <p:spPr>
+          <a:xfrm flipV="1">
+            <a:off x="1445149" y="3875606"/>
+            <a:ext cx="1842055" cy="3520"/>
+          </a:xfrm>
+          <a:prstGeom prst="line">
+            <a:avLst/>
+          </a:prstGeom>
+          <a:ln w="19050">
+            <a:solidFill>
+              <a:schemeClr val="accent2">
+                <a:lumMod val="50000"/>
+              </a:schemeClr>
+            </a:solidFill>
+          </a:ln>
+        </p:spPr>
+        <p:style>
+          <a:lnRef idx="1">
+            <a:schemeClr val="accent1"/>
+          </a:lnRef>
+          <a:fillRef idx="0">
+            <a:schemeClr val="accent1"/>
+          </a:fillRef>
+          <a:effectRef idx="0">
+            <a:schemeClr val="accent1"/>
+          </a:effectRef>
+          <a:fontRef idx="minor">
+            <a:schemeClr val="tx1"/>
+          </a:fontRef>
+        </p:style>
+      </p:cxnSp>
+      <p:sp>
+        <p:nvSpPr>
+          <p:cNvPr id="65" name="TextBox 64">
+            <a:extLst>
+              <a:ext uri="{FF2B5EF4-FFF2-40B4-BE49-F238E27FC236}">
+                <a16:creationId xmlns:a16="http://schemas.microsoft.com/office/drawing/2014/main" id="{009091B1-CC4C-9C41-87CF-03F623B78E93}"/>
+              </a:ext>
+            </a:extLst>
+          </p:cNvPr>
+          <p:cNvSpPr txBox="1"/>
+          <p:nvPr/>
+        </p:nvSpPr>
+        <p:spPr>
+          <a:xfrm rot="19442147">
+            <a:off x="4380404" y="2426922"/>
+            <a:ext cx="1120954" cy="307777"/>
+          </a:xfrm>
+          <a:prstGeom prst="rect">
+            <a:avLst/>
+          </a:prstGeom>
+          <a:noFill/>
+        </p:spPr>
+        <p:txBody>
+          <a:bodyPr wrap="square" rtlCol="0">
+            <a:spAutoFit/>
+          </a:bodyPr>
+          <a:lstStyle/>
+          <a:p>
+            <a:r>
+              <a:rPr lang="en-US" sz="1400" dirty="0">
+                <a:latin typeface="Helvetica" pitchFamily="2" charset="0"/>
+              </a:rPr>
+              <a:t>Abandoned </a:t>
+            </a:r>
+          </a:p>
+        </p:txBody>
+      </p:sp>
+      <p:grpSp>
+        <p:nvGrpSpPr>
+          <p:cNvPr id="22" name="Group 21">
+            <a:extLst>
+              <a:ext uri="{FF2B5EF4-FFF2-40B4-BE49-F238E27FC236}">
+                <a16:creationId xmlns:a16="http://schemas.microsoft.com/office/drawing/2014/main" id="{27056D1E-C55F-554E-BC3C-388132D54D19}"/>
+              </a:ext>
+            </a:extLst>
+          </p:cNvPr>
+          <p:cNvGrpSpPr/>
+          <p:nvPr/>
+        </p:nvGrpSpPr>
+        <p:grpSpPr>
+          <a:xfrm>
+            <a:off x="1445648" y="1879027"/>
+            <a:ext cx="4138897" cy="3785035"/>
+            <a:chOff x="1363851" y="2433234"/>
+            <a:chExt cx="3813472" cy="3118600"/>
+          </a:xfrm>
+        </p:grpSpPr>
+        <p:cxnSp>
+          <p:nvCxnSpPr>
+            <p:cNvPr id="24" name="Straight Connector 23">
+              <a:extLst>
+                <a:ext uri="{FF2B5EF4-FFF2-40B4-BE49-F238E27FC236}">
+                  <a16:creationId xmlns:a16="http://schemas.microsoft.com/office/drawing/2014/main" id="{97CF92A5-D62C-DE4C-B7E3-9E193BA3A2F2}"/>
+                </a:ext>
+              </a:extLst>
+            </p:cNvPr>
+            <p:cNvCxnSpPr>
+              <a:cxnSpLocks/>
+            </p:cNvCxnSpPr>
+            <p:nvPr/>
+          </p:nvCxnSpPr>
+          <p:spPr>
+            <a:xfrm>
+              <a:off x="1363851" y="2433234"/>
+              <a:ext cx="0" cy="3112801"/>
+            </a:xfrm>
+            <a:prstGeom prst="line">
+              <a:avLst/>
+            </a:prstGeom>
+            <a:ln>
+              <a:solidFill>
+                <a:schemeClr val="tx1"/>
+              </a:solidFill>
+            </a:ln>
+          </p:spPr>
+          <p:style>
+            <a:lnRef idx="1">
+              <a:schemeClr val="accent1"/>
+            </a:lnRef>
+            <a:fillRef idx="0">
+              <a:schemeClr val="accent1"/>
+            </a:fillRef>
+            <a:effectRef idx="0">
+              <a:schemeClr val="accent1"/>
+            </a:effectRef>
+            <a:fontRef idx="minor">
+              <a:schemeClr val="tx1"/>
+            </a:fontRef>
+          </p:style>
+        </p:cxnSp>
+        <p:cxnSp>
+          <p:nvCxnSpPr>
+            <p:cNvPr id="25" name="Straight Connector 24">
+              <a:extLst>
+                <a:ext uri="{FF2B5EF4-FFF2-40B4-BE49-F238E27FC236}">
+                  <a16:creationId xmlns:a16="http://schemas.microsoft.com/office/drawing/2014/main" id="{50D5870D-EBC4-7241-9E15-3804F049AB40}"/>
+                </a:ext>
+              </a:extLst>
+            </p:cNvPr>
+            <p:cNvCxnSpPr>
+              <a:cxnSpLocks/>
+            </p:cNvCxnSpPr>
+            <p:nvPr/>
+          </p:nvCxnSpPr>
+          <p:spPr>
+            <a:xfrm flipH="1" flipV="1">
+              <a:off x="1363852" y="5546035"/>
+              <a:ext cx="3813471" cy="5799"/>
+            </a:xfrm>
+            <a:prstGeom prst="line">
+              <a:avLst/>
+            </a:prstGeom>
+            <a:ln>
+              <a:solidFill>
+                <a:schemeClr val="tx1"/>
+              </a:solidFill>
+            </a:ln>
+          </p:spPr>
+          <p:style>
+            <a:lnRef idx="1">
+              <a:schemeClr val="accent1"/>
+            </a:lnRef>
+            <a:fillRef idx="0">
+              <a:schemeClr val="accent1"/>
+            </a:fillRef>
+            <a:effectRef idx="0">
+              <a:schemeClr val="accent1"/>
+            </a:effectRef>
+            <a:fontRef idx="minor">
+              <a:schemeClr val="tx1"/>
+            </a:fontRef>
+          </p:style>
+        </p:cxnSp>
+      </p:grpSp>
+      <p:cxnSp>
+        <p:nvCxnSpPr>
+          <p:cNvPr id="26" name="Straight Connector 25">
+            <a:extLst>
+              <a:ext uri="{FF2B5EF4-FFF2-40B4-BE49-F238E27FC236}">
+                <a16:creationId xmlns:a16="http://schemas.microsoft.com/office/drawing/2014/main" id="{7FE0B7EA-9C05-FC4D-96E6-F6AA450588DC}"/>
+              </a:ext>
+            </a:extLst>
+          </p:cNvPr>
+          <p:cNvCxnSpPr>
+            <a:cxnSpLocks/>
+          </p:cNvCxnSpPr>
+          <p:nvPr/>
+        </p:nvCxnSpPr>
+        <p:spPr>
+          <a:xfrm>
+            <a:off x="7091364" y="3875610"/>
+            <a:ext cx="4138896" cy="0"/>
+          </a:xfrm>
+          <a:prstGeom prst="line">
+            <a:avLst/>
+          </a:prstGeom>
+          <a:ln w="19050">
+            <a:solidFill>
+              <a:schemeClr val="tx1"/>
+            </a:solidFill>
+            <a:prstDash val="dash"/>
+          </a:ln>
+        </p:spPr>
+        <p:style>
+          <a:lnRef idx="1">
+            <a:schemeClr val="accent1"/>
+          </a:lnRef>
+          <a:fillRef idx="0">
+            <a:schemeClr val="accent1"/>
+          </a:fillRef>
+          <a:effectRef idx="0">
+            <a:schemeClr val="accent1"/>
+          </a:effectRef>
+          <a:fontRef idx="minor">
+            <a:schemeClr val="tx1"/>
+          </a:fontRef>
+        </p:style>
+      </p:cxnSp>
+      <p:cxnSp>
+        <p:nvCxnSpPr>
+          <p:cNvPr id="37" name="Straight Connector 36">
+            <a:extLst>
+              <a:ext uri="{FF2B5EF4-FFF2-40B4-BE49-F238E27FC236}">
+                <a16:creationId xmlns:a16="http://schemas.microsoft.com/office/drawing/2014/main" id="{0295E786-9DF4-6648-8BA3-8662292B1CE2}"/>
+              </a:ext>
+            </a:extLst>
+          </p:cNvPr>
+          <p:cNvCxnSpPr>
+            <a:cxnSpLocks/>
+          </p:cNvCxnSpPr>
+          <p:nvPr/>
+        </p:nvCxnSpPr>
+        <p:spPr>
+          <a:xfrm>
+            <a:off x="3312300" y="2684491"/>
+            <a:ext cx="2164000" cy="395305"/>
+          </a:xfrm>
+          <a:prstGeom prst="line">
+            <a:avLst/>
+          </a:prstGeom>
+          <a:ln w="19050">
+            <a:solidFill>
+              <a:srgbClr val="7030A0"/>
+            </a:solidFill>
+          </a:ln>
+        </p:spPr>
+        <p:style>
+          <a:lnRef idx="1">
+            <a:schemeClr val="accent1"/>
+          </a:lnRef>
+          <a:fillRef idx="0">
+            <a:schemeClr val="accent1"/>
+          </a:fillRef>
+          <a:effectRef idx="0">
+            <a:schemeClr val="accent1"/>
+          </a:effectRef>
+          <a:fontRef idx="minor">
+            <a:schemeClr val="tx1"/>
+          </a:fontRef>
+        </p:style>
+      </p:cxnSp>
+      <p:cxnSp>
+        <p:nvCxnSpPr>
+          <p:cNvPr id="44" name="Straight Connector 43">
+            <a:extLst>
+              <a:ext uri="{FF2B5EF4-FFF2-40B4-BE49-F238E27FC236}">
+                <a16:creationId xmlns:a16="http://schemas.microsoft.com/office/drawing/2014/main" id="{99A1CDC1-4DAD-7040-9742-C2CE5305D0FD}"/>
+              </a:ext>
+            </a:extLst>
+          </p:cNvPr>
+          <p:cNvCxnSpPr>
+            <a:cxnSpLocks/>
+          </p:cNvCxnSpPr>
+          <p:nvPr/>
+        </p:nvCxnSpPr>
+        <p:spPr>
+          <a:xfrm flipV="1">
+            <a:off x="1459910" y="4364414"/>
+            <a:ext cx="2443718" cy="7992"/>
+          </a:xfrm>
+          <a:prstGeom prst="line">
+            <a:avLst/>
+          </a:prstGeom>
+          <a:ln w="19050">
+            <a:solidFill>
+              <a:srgbClr val="00B050"/>
+            </a:solidFill>
+          </a:ln>
+        </p:spPr>
+        <p:style>
+          <a:lnRef idx="1">
+            <a:schemeClr val="accent1"/>
+          </a:lnRef>
+          <a:fillRef idx="0">
+            <a:schemeClr val="accent1"/>
+          </a:fillRef>
+          <a:effectRef idx="0">
+            <a:schemeClr val="accent1"/>
+          </a:effectRef>
+          <a:fontRef idx="minor">
+            <a:schemeClr val="tx1"/>
+          </a:fontRef>
+        </p:style>
+      </p:cxnSp>
+      <p:cxnSp>
+        <p:nvCxnSpPr>
+          <p:cNvPr id="45" name="Straight Connector 44">
+            <a:extLst>
+              <a:ext uri="{FF2B5EF4-FFF2-40B4-BE49-F238E27FC236}">
+                <a16:creationId xmlns:a16="http://schemas.microsoft.com/office/drawing/2014/main" id="{8C449E13-956E-C148-B5FE-932BB1520AEF}"/>
+              </a:ext>
+            </a:extLst>
+          </p:cNvPr>
+          <p:cNvCxnSpPr>
+            <a:cxnSpLocks/>
+          </p:cNvCxnSpPr>
+          <p:nvPr/>
+        </p:nvCxnSpPr>
+        <p:spPr>
+          <a:xfrm flipV="1">
+            <a:off x="3863409" y="3158515"/>
+            <a:ext cx="1800919" cy="1218325"/>
+          </a:xfrm>
+          <a:prstGeom prst="line">
+            <a:avLst/>
+          </a:prstGeom>
+          <a:ln w="19050">
+            <a:solidFill>
+              <a:srgbClr val="00B050"/>
+            </a:solidFill>
+          </a:ln>
+        </p:spPr>
+        <p:style>
+          <a:lnRef idx="1">
+            <a:schemeClr val="accent1"/>
+          </a:lnRef>
+          <a:fillRef idx="0">
+            <a:schemeClr val="accent1"/>
+          </a:fillRef>
+          <a:effectRef idx="0">
+            <a:schemeClr val="accent1"/>
+          </a:effectRef>
+          <a:fontRef idx="minor">
+            <a:schemeClr val="tx1"/>
+          </a:fontRef>
+        </p:style>
+      </p:cxnSp>
+      <p:cxnSp>
+        <p:nvCxnSpPr>
+          <p:cNvPr id="52" name="Straight Connector 51">
+            <a:extLst>
+              <a:ext uri="{FF2B5EF4-FFF2-40B4-BE49-F238E27FC236}">
+                <a16:creationId xmlns:a16="http://schemas.microsoft.com/office/drawing/2014/main" id="{43AA7D80-4722-D14D-AAE6-2C4C6DA608DD}"/>
+              </a:ext>
+            </a:extLst>
+          </p:cNvPr>
+          <p:cNvCxnSpPr>
+            <a:cxnSpLocks/>
+          </p:cNvCxnSpPr>
+          <p:nvPr/>
+        </p:nvCxnSpPr>
+        <p:spPr>
+          <a:xfrm flipV="1">
+            <a:off x="3283730" y="2292298"/>
+            <a:ext cx="2215174" cy="1586828"/>
+          </a:xfrm>
+          <a:prstGeom prst="line">
+            <a:avLst/>
+          </a:prstGeom>
+          <a:ln w="19050">
+            <a:solidFill>
+              <a:schemeClr val="accent2">
+                <a:lumMod val="50000"/>
+              </a:schemeClr>
+            </a:solidFill>
+          </a:ln>
+        </p:spPr>
+        <p:style>
+          <a:lnRef idx="1">
+            <a:schemeClr val="accent1"/>
+          </a:lnRef>
+          <a:fillRef idx="0">
+            <a:schemeClr val="accent1"/>
+          </a:fillRef>
+          <a:effectRef idx="0">
+            <a:schemeClr val="accent1"/>
+          </a:effectRef>
+          <a:fontRef idx="minor">
+            <a:schemeClr val="tx1"/>
+          </a:fontRef>
+        </p:style>
+      </p:cxnSp>
+      <p:sp>
+        <p:nvSpPr>
+          <p:cNvPr id="76" name="Rectangle 75">
+            <a:extLst>
+              <a:ext uri="{FF2B5EF4-FFF2-40B4-BE49-F238E27FC236}">
+                <a16:creationId xmlns:a16="http://schemas.microsoft.com/office/drawing/2014/main" id="{8CDA27CE-4D92-6046-BFAF-FEB82188EAC4}"/>
+              </a:ext>
+            </a:extLst>
+          </p:cNvPr>
+          <p:cNvSpPr/>
+          <p:nvPr/>
+        </p:nvSpPr>
+        <p:spPr>
+          <a:xfrm>
+            <a:off x="2647389" y="926876"/>
+            <a:ext cx="6401934" cy="1015663"/>
+          </a:xfrm>
+          <a:prstGeom prst="rect">
+            <a:avLst/>
+          </a:prstGeom>
+        </p:spPr>
+        <p:txBody>
+          <a:bodyPr wrap="square">
+            <a:spAutoFit/>
+          </a:bodyPr>
+          <a:lstStyle/>
+          <a:p>
+            <a:pPr algn="ctr"/>
+            <a:r>
+              <a:rPr lang="en-US" sz="1200" dirty="0">
+                <a:latin typeface="Helvetica" pitchFamily="2" charset="0"/>
+              </a:rPr>
+              <a:t>Intensive and abandoned land-use change is observed directly following the Soviet Union collapse at country-scale. However, there is a time lag when observing shifts towards intensive land-use change following the Soviet Union collapse. There is a time lag on when land-use change is observed at country-scale following Latvia joining the EU for abandoned land, but not for shifts towards intensive and extensive land-use types. </a:t>
+            </a:r>
+          </a:p>
+        </p:txBody>
+      </p:sp>
+      <p:cxnSp>
+        <p:nvCxnSpPr>
+          <p:cNvPr id="78" name="Straight Connector 77">
+            <a:extLst>
+              <a:ext uri="{FF2B5EF4-FFF2-40B4-BE49-F238E27FC236}">
+                <a16:creationId xmlns:a16="http://schemas.microsoft.com/office/drawing/2014/main" id="{41F15B02-45F8-8C46-9C89-F50B86F3BEE3}"/>
+              </a:ext>
+            </a:extLst>
+          </p:cNvPr>
+          <p:cNvCxnSpPr>
+            <a:cxnSpLocks/>
+          </p:cNvCxnSpPr>
+          <p:nvPr/>
+        </p:nvCxnSpPr>
+        <p:spPr>
+          <a:xfrm>
+            <a:off x="7084569" y="2359964"/>
+            <a:ext cx="2265493" cy="186254"/>
+          </a:xfrm>
+          <a:prstGeom prst="line">
+            <a:avLst/>
+          </a:prstGeom>
+          <a:ln w="19050">
+            <a:solidFill>
+              <a:schemeClr val="accent2">
+                <a:lumMod val="50000"/>
+              </a:schemeClr>
+            </a:solidFill>
+          </a:ln>
+        </p:spPr>
+        <p:style>
+          <a:lnRef idx="1">
+            <a:schemeClr val="accent1"/>
+          </a:lnRef>
+          <a:fillRef idx="0">
+            <a:schemeClr val="accent1"/>
+          </a:fillRef>
+          <a:effectRef idx="0">
+            <a:schemeClr val="accent1"/>
+          </a:effectRef>
+          <a:fontRef idx="minor">
+            <a:schemeClr val="tx1"/>
+          </a:fontRef>
+        </p:style>
+      </p:cxnSp>
+      <p:cxnSp>
+        <p:nvCxnSpPr>
+          <p:cNvPr id="80" name="Straight Connector 79">
+            <a:extLst>
+              <a:ext uri="{FF2B5EF4-FFF2-40B4-BE49-F238E27FC236}">
+                <a16:creationId xmlns:a16="http://schemas.microsoft.com/office/drawing/2014/main" id="{7F9A588F-7538-4249-826E-1C89E29AB946}"/>
+              </a:ext>
+            </a:extLst>
+          </p:cNvPr>
+          <p:cNvCxnSpPr>
+            <a:cxnSpLocks/>
+          </p:cNvCxnSpPr>
+          <p:nvPr/>
+        </p:nvCxnSpPr>
+        <p:spPr>
+          <a:xfrm>
+            <a:off x="9350062" y="2546218"/>
+            <a:ext cx="1770222" cy="288280"/>
+          </a:xfrm>
+          <a:prstGeom prst="line">
+            <a:avLst/>
+          </a:prstGeom>
+          <a:ln w="19050">
+            <a:solidFill>
+              <a:schemeClr val="accent2">
+                <a:lumMod val="50000"/>
+              </a:schemeClr>
+            </a:solidFill>
+          </a:ln>
+        </p:spPr>
+        <p:style>
+          <a:lnRef idx="1">
+            <a:schemeClr val="accent1"/>
+          </a:lnRef>
+          <a:fillRef idx="0">
+            <a:schemeClr val="accent1"/>
+          </a:fillRef>
+          <a:effectRef idx="0">
+            <a:schemeClr val="accent1"/>
+          </a:effectRef>
+          <a:fontRef idx="minor">
+            <a:schemeClr val="tx1"/>
+          </a:fontRef>
+        </p:style>
+      </p:cxnSp>
+      <p:sp>
+        <p:nvSpPr>
+          <p:cNvPr id="84" name="TextBox 83">
+            <a:extLst>
+              <a:ext uri="{FF2B5EF4-FFF2-40B4-BE49-F238E27FC236}">
+                <a16:creationId xmlns:a16="http://schemas.microsoft.com/office/drawing/2014/main" id="{AEC61A2A-F7E0-5E41-B2DD-16BB8AEAC12C}"/>
+              </a:ext>
+            </a:extLst>
+          </p:cNvPr>
+          <p:cNvSpPr txBox="1"/>
+          <p:nvPr/>
+        </p:nvSpPr>
+        <p:spPr>
+          <a:xfrm rot="277389">
+            <a:off x="7170683" y="2169431"/>
+            <a:ext cx="1120954" cy="307777"/>
+          </a:xfrm>
+          <a:prstGeom prst="rect">
+            <a:avLst/>
+          </a:prstGeom>
+          <a:noFill/>
+        </p:spPr>
+        <p:txBody>
+          <a:bodyPr wrap="square" rtlCol="0">
+            <a:spAutoFit/>
+          </a:bodyPr>
+          <a:lstStyle/>
+          <a:p>
+            <a:r>
+              <a:rPr lang="en-US" sz="1400" dirty="0">
+                <a:latin typeface="Helvetica" pitchFamily="2" charset="0"/>
+              </a:rPr>
+              <a:t>Abandoned </a:t>
+            </a:r>
+          </a:p>
+        </p:txBody>
+      </p:sp>
+      <p:cxnSp>
+        <p:nvCxnSpPr>
+          <p:cNvPr id="86" name="Straight Connector 85">
+            <a:extLst>
+              <a:ext uri="{FF2B5EF4-FFF2-40B4-BE49-F238E27FC236}">
+                <a16:creationId xmlns:a16="http://schemas.microsoft.com/office/drawing/2014/main" id="{6F4D8C3E-52C6-374F-A139-9A52FDCBA3A9}"/>
+              </a:ext>
+            </a:extLst>
+          </p:cNvPr>
+          <p:cNvCxnSpPr>
+            <a:cxnSpLocks/>
+          </p:cNvCxnSpPr>
+          <p:nvPr/>
+        </p:nvCxnSpPr>
+        <p:spPr>
+          <a:xfrm>
+            <a:off x="7084569" y="2614720"/>
+            <a:ext cx="1806768" cy="237785"/>
+          </a:xfrm>
+          <a:prstGeom prst="line">
+            <a:avLst/>
+          </a:prstGeom>
+          <a:ln w="19050">
+            <a:solidFill>
+              <a:srgbClr val="7030A0"/>
+            </a:solidFill>
+          </a:ln>
+        </p:spPr>
+        <p:style>
+          <a:lnRef idx="1">
+            <a:schemeClr val="accent1"/>
+          </a:lnRef>
+          <a:fillRef idx="0">
+            <a:schemeClr val="accent1"/>
+          </a:fillRef>
+          <a:effectRef idx="0">
+            <a:schemeClr val="accent1"/>
+          </a:effectRef>
+          <a:fontRef idx="minor">
+            <a:schemeClr val="tx1"/>
+          </a:fontRef>
+        </p:style>
+      </p:cxnSp>
+      <p:cxnSp>
+        <p:nvCxnSpPr>
+          <p:cNvPr id="89" name="Straight Connector 88">
+            <a:extLst>
+              <a:ext uri="{FF2B5EF4-FFF2-40B4-BE49-F238E27FC236}">
+                <a16:creationId xmlns:a16="http://schemas.microsoft.com/office/drawing/2014/main" id="{88805E40-C8F5-2B4F-9CAC-2E10B7A66B52}"/>
+              </a:ext>
+            </a:extLst>
+          </p:cNvPr>
+          <p:cNvCxnSpPr>
+            <a:cxnSpLocks/>
+          </p:cNvCxnSpPr>
+          <p:nvPr/>
+        </p:nvCxnSpPr>
+        <p:spPr>
+          <a:xfrm flipV="1">
+            <a:off x="8891337" y="1601843"/>
+            <a:ext cx="1965544" cy="1250662"/>
+          </a:xfrm>
+          <a:prstGeom prst="line">
+            <a:avLst/>
+          </a:prstGeom>
+          <a:ln w="19050">
+            <a:solidFill>
+              <a:srgbClr val="7030A0"/>
+            </a:solidFill>
+          </a:ln>
+        </p:spPr>
+        <p:style>
+          <a:lnRef idx="1">
+            <a:schemeClr val="accent1"/>
+          </a:lnRef>
+          <a:fillRef idx="0">
+            <a:schemeClr val="accent1"/>
+          </a:fillRef>
+          <a:effectRef idx="0">
+            <a:schemeClr val="accent1"/>
+          </a:effectRef>
+          <a:fontRef idx="minor">
+            <a:schemeClr val="tx1"/>
+          </a:fontRef>
+        </p:style>
+      </p:cxnSp>
+      <p:sp>
+        <p:nvSpPr>
+          <p:cNvPr id="92" name="TextBox 91">
+            <a:extLst>
+              <a:ext uri="{FF2B5EF4-FFF2-40B4-BE49-F238E27FC236}">
+                <a16:creationId xmlns:a16="http://schemas.microsoft.com/office/drawing/2014/main" id="{B39C8B06-563A-AB44-B274-DBCC878E056B}"/>
+              </a:ext>
+            </a:extLst>
+          </p:cNvPr>
+          <p:cNvSpPr txBox="1"/>
+          <p:nvPr/>
+        </p:nvSpPr>
+        <p:spPr>
+          <a:xfrm rot="19575163">
+            <a:off x="9452521" y="1910039"/>
+            <a:ext cx="901209" cy="307777"/>
+          </a:xfrm>
+          <a:prstGeom prst="rect">
+            <a:avLst/>
+          </a:prstGeom>
+          <a:noFill/>
+        </p:spPr>
+        <p:txBody>
+          <a:bodyPr wrap="none" rtlCol="0">
+            <a:spAutoFit/>
+          </a:bodyPr>
+          <a:lstStyle/>
+          <a:p>
+            <a:r>
+              <a:rPr lang="en-US" sz="1400" dirty="0">
+                <a:latin typeface="Helvetica" pitchFamily="2" charset="0"/>
+              </a:rPr>
+              <a:t>Intensive</a:t>
+            </a:r>
+          </a:p>
+        </p:txBody>
+      </p:sp>
+      <p:cxnSp>
+        <p:nvCxnSpPr>
+          <p:cNvPr id="94" name="Straight Connector 93">
+            <a:extLst>
+              <a:ext uri="{FF2B5EF4-FFF2-40B4-BE49-F238E27FC236}">
+                <a16:creationId xmlns:a16="http://schemas.microsoft.com/office/drawing/2014/main" id="{4FE2DEA7-505F-1B45-A7AC-184DAE3F21DC}"/>
+              </a:ext>
+            </a:extLst>
+          </p:cNvPr>
+          <p:cNvCxnSpPr>
+            <a:cxnSpLocks/>
+          </p:cNvCxnSpPr>
+          <p:nvPr/>
+        </p:nvCxnSpPr>
+        <p:spPr>
+          <a:xfrm flipV="1">
+            <a:off x="7084569" y="3034523"/>
+            <a:ext cx="1806768" cy="816752"/>
+          </a:xfrm>
+          <a:prstGeom prst="line">
+            <a:avLst/>
+          </a:prstGeom>
+          <a:ln w="19050">
+            <a:solidFill>
+              <a:srgbClr val="00B050"/>
+            </a:solidFill>
+          </a:ln>
+        </p:spPr>
+        <p:style>
+          <a:lnRef idx="1">
+            <a:schemeClr val="accent1"/>
+          </a:lnRef>
+          <a:fillRef idx="0">
+            <a:schemeClr val="accent1"/>
+          </a:fillRef>
+          <a:effectRef idx="0">
+            <a:schemeClr val="accent1"/>
+          </a:effectRef>
+          <a:fontRef idx="minor">
+            <a:schemeClr val="tx1"/>
+          </a:fontRef>
+        </p:style>
+      </p:cxnSp>
+      <p:cxnSp>
+        <p:nvCxnSpPr>
+          <p:cNvPr id="95" name="Straight Connector 94">
+            <a:extLst>
+              <a:ext uri="{FF2B5EF4-FFF2-40B4-BE49-F238E27FC236}">
+                <a16:creationId xmlns:a16="http://schemas.microsoft.com/office/drawing/2014/main" id="{025FE773-9F09-1F48-9B97-0B33CB6E61D7}"/>
+              </a:ext>
+            </a:extLst>
+          </p:cNvPr>
+          <p:cNvCxnSpPr>
+            <a:cxnSpLocks/>
+          </p:cNvCxnSpPr>
+          <p:nvPr/>
+        </p:nvCxnSpPr>
+        <p:spPr>
+          <a:xfrm>
+            <a:off x="8852064" y="3031298"/>
+            <a:ext cx="2292555" cy="284339"/>
+          </a:xfrm>
+          <a:prstGeom prst="line">
+            <a:avLst/>
+          </a:prstGeom>
+          <a:ln w="19050">
+            <a:solidFill>
+              <a:srgbClr val="00B050"/>
+            </a:solidFill>
+          </a:ln>
+        </p:spPr>
+        <p:style>
+          <a:lnRef idx="1">
+            <a:schemeClr val="accent1"/>
+          </a:lnRef>
+          <a:fillRef idx="0">
+            <a:schemeClr val="accent1"/>
+          </a:fillRef>
+          <a:effectRef idx="0">
+            <a:schemeClr val="accent1"/>
+          </a:effectRef>
+          <a:fontRef idx="minor">
+            <a:schemeClr val="tx1"/>
+          </a:fontRef>
+        </p:style>
+      </p:cxnSp>
+      <p:sp>
+        <p:nvSpPr>
+          <p:cNvPr id="98" name="TextBox 97">
+            <a:extLst>
+              <a:ext uri="{FF2B5EF4-FFF2-40B4-BE49-F238E27FC236}">
+                <a16:creationId xmlns:a16="http://schemas.microsoft.com/office/drawing/2014/main" id="{B522F7F3-83AB-214A-B1FC-F62623D3E183}"/>
+              </a:ext>
+            </a:extLst>
+          </p:cNvPr>
+          <p:cNvSpPr txBox="1"/>
+          <p:nvPr/>
+        </p:nvSpPr>
+        <p:spPr>
+          <a:xfrm rot="368567">
+            <a:off x="9664553" y="2932867"/>
+            <a:ext cx="962123" cy="307777"/>
+          </a:xfrm>
+          <a:prstGeom prst="rect">
+            <a:avLst/>
+          </a:prstGeom>
+          <a:noFill/>
+        </p:spPr>
+        <p:txBody>
+          <a:bodyPr wrap="none" rtlCol="0">
+            <a:spAutoFit/>
+          </a:bodyPr>
+          <a:lstStyle/>
+          <a:p>
+            <a:r>
+              <a:rPr lang="en-US" sz="1400" dirty="0">
+                <a:latin typeface="Helvetica" pitchFamily="2" charset="0"/>
+              </a:rPr>
+              <a:t>Extensive</a:t>
+            </a:r>
+          </a:p>
+        </p:txBody>
+      </p:sp>
+      <p:sp>
+        <p:nvSpPr>
+          <p:cNvPr id="50" name="Rectangle 49">
+            <a:extLst>
+              <a:ext uri="{FF2B5EF4-FFF2-40B4-BE49-F238E27FC236}">
+                <a16:creationId xmlns:a16="http://schemas.microsoft.com/office/drawing/2014/main" id="{2C005FAD-10FE-2248-95A5-0D44E64523FC}"/>
+              </a:ext>
+            </a:extLst>
+          </p:cNvPr>
+          <p:cNvSpPr/>
+          <p:nvPr/>
+        </p:nvSpPr>
+        <p:spPr>
+          <a:xfrm>
+            <a:off x="1459910" y="4444162"/>
+            <a:ext cx="3867609" cy="1569660"/>
+          </a:xfrm>
+          <a:prstGeom prst="rect">
+            <a:avLst/>
+          </a:prstGeom>
+        </p:spPr>
+        <p:txBody>
+          <a:bodyPr wrap="square">
+            <a:spAutoFit/>
+          </a:bodyPr>
+          <a:lstStyle/>
+          <a:p>
+            <a:pPr algn="ctr"/>
+            <a:r>
+              <a:rPr lang="en-US" sz="1200" dirty="0">
+                <a:effectLst/>
+                <a:latin typeface="Helvetica" pitchFamily="2" charset="0"/>
+              </a:rPr>
+              <a:t>No lag in abandoned land-use change (as people fail to return to land) </a:t>
+            </a:r>
+          </a:p>
+          <a:p>
+            <a:pPr algn="ctr"/>
+            <a:r>
+              <a:rPr lang="en-US" sz="1200" dirty="0">
+                <a:latin typeface="Helvetica" pitchFamily="2" charset="0"/>
+              </a:rPr>
+              <a:t>Lag in extensive land-use change (as people returned to old practices)</a:t>
+            </a:r>
+          </a:p>
+          <a:p>
+            <a:pPr algn="ctr"/>
+            <a:r>
+              <a:rPr lang="en-US" sz="1200" dirty="0">
+                <a:effectLst/>
+                <a:latin typeface="Helvetica" pitchFamily="2" charset="0"/>
+              </a:rPr>
+              <a:t>No lag in </a:t>
+            </a:r>
+            <a:r>
+              <a:rPr lang="en-US" sz="1200" dirty="0">
+                <a:latin typeface="Helvetica" pitchFamily="2" charset="0"/>
+              </a:rPr>
+              <a:t>intensive land-use change (not dramatic change and loss of tools from government)</a:t>
+            </a:r>
+            <a:r>
+              <a:rPr lang="en-US" sz="1200" dirty="0">
+                <a:effectLst/>
+                <a:latin typeface="Helvetica" pitchFamily="2" charset="0"/>
+              </a:rPr>
+              <a:t> </a:t>
+            </a:r>
+          </a:p>
+          <a:p>
+            <a:pPr algn="ctr"/>
+            <a:endParaRPr lang="en-US" sz="1200" dirty="0">
+              <a:latin typeface="Helvetica" pitchFamily="2" charset="0"/>
+            </a:endParaRPr>
+          </a:p>
+          <a:p>
+            <a:pPr algn="ctr"/>
+            <a:endParaRPr lang="en-US" sz="1200" dirty="0">
+              <a:effectLst/>
+              <a:latin typeface="Helvetica" pitchFamily="2" charset="0"/>
+            </a:endParaRPr>
+          </a:p>
+        </p:txBody>
+      </p:sp>
+      <p:sp>
+        <p:nvSpPr>
+          <p:cNvPr id="67" name="Rectangle 66">
+            <a:extLst>
+              <a:ext uri="{FF2B5EF4-FFF2-40B4-BE49-F238E27FC236}">
+                <a16:creationId xmlns:a16="http://schemas.microsoft.com/office/drawing/2014/main" id="{2FF10DE3-21F4-8C40-B3B1-37EC86EE47C0}"/>
+              </a:ext>
+            </a:extLst>
+          </p:cNvPr>
+          <p:cNvSpPr/>
+          <p:nvPr/>
+        </p:nvSpPr>
+        <p:spPr>
+          <a:xfrm>
+            <a:off x="7098160" y="4538126"/>
+            <a:ext cx="4303591" cy="1384995"/>
+          </a:xfrm>
+          <a:prstGeom prst="rect">
+            <a:avLst/>
+          </a:prstGeom>
+        </p:spPr>
+        <p:txBody>
+          <a:bodyPr wrap="square">
+            <a:spAutoFit/>
+          </a:bodyPr>
+          <a:lstStyle/>
+          <a:p>
+            <a:pPr algn="ctr"/>
+            <a:r>
+              <a:rPr lang="en-US" sz="1200" dirty="0">
+                <a:effectLst/>
+                <a:latin typeface="Helvetica" pitchFamily="2" charset="0"/>
+              </a:rPr>
+              <a:t>Lag in abandone</a:t>
+            </a:r>
+            <a:r>
+              <a:rPr lang="en-US" sz="1200" dirty="0">
+                <a:latin typeface="Helvetica" pitchFamily="2" charset="0"/>
+              </a:rPr>
+              <a:t>d land-use change (little change, some uptake for intensive practices)</a:t>
+            </a:r>
+          </a:p>
+          <a:p>
+            <a:pPr algn="ctr"/>
+            <a:r>
+              <a:rPr lang="en-US" sz="1200" dirty="0">
+                <a:latin typeface="Helvetica" pitchFamily="2" charset="0"/>
+              </a:rPr>
+              <a:t>No lag for extensive land-use change (people shift to larger farms supported by EU)</a:t>
+            </a:r>
+          </a:p>
+          <a:p>
+            <a:pPr algn="ctr"/>
+            <a:r>
+              <a:rPr lang="en-US" sz="1200" dirty="0">
+                <a:latin typeface="Helvetica" pitchFamily="2" charset="0"/>
+              </a:rPr>
+              <a:t>No lag for intensive land-use change (larger, more intensive farms better supported by EU)</a:t>
+            </a:r>
+          </a:p>
+          <a:p>
+            <a:pPr algn="ctr"/>
+            <a:endParaRPr lang="en-US" sz="1200" dirty="0">
+              <a:effectLst/>
+              <a:latin typeface="Helvetica" pitchFamily="2" charset="0"/>
+            </a:endParaRPr>
+          </a:p>
+        </p:txBody>
+      </p:sp>
+      <p:sp>
+        <p:nvSpPr>
+          <p:cNvPr id="39" name="Rectangle 38">
+            <a:extLst>
+              <a:ext uri="{FF2B5EF4-FFF2-40B4-BE49-F238E27FC236}">
+                <a16:creationId xmlns:a16="http://schemas.microsoft.com/office/drawing/2014/main" id="{1684589A-6A7F-CE42-B6CF-FCD431E7FC04}"/>
+              </a:ext>
+            </a:extLst>
+          </p:cNvPr>
+          <p:cNvSpPr/>
+          <p:nvPr/>
+        </p:nvSpPr>
+        <p:spPr>
+          <a:xfrm>
+            <a:off x="1106595" y="368816"/>
+            <a:ext cx="10224654" cy="923330"/>
+          </a:xfrm>
+          <a:prstGeom prst="rect">
+            <a:avLst/>
+          </a:prstGeom>
+        </p:spPr>
+        <p:txBody>
+          <a:bodyPr wrap="square">
+            <a:spAutoFit/>
+          </a:bodyPr>
+          <a:lstStyle/>
+          <a:p>
+            <a:pPr algn="ctr"/>
+            <a:r>
+              <a:rPr lang="en-US" b="1" dirty="0">
+                <a:effectLst/>
+                <a:latin typeface="Helvetica" pitchFamily="2" charset="0"/>
+              </a:rPr>
+              <a:t>Is there a time lag between socio-economic events and the occurrence of land use</a:t>
+            </a:r>
+          </a:p>
+          <a:p>
+            <a:pPr algn="ctr"/>
+            <a:r>
+              <a:rPr lang="en-US" b="1" dirty="0">
+                <a:effectLst/>
+                <a:latin typeface="Helvetica" pitchFamily="2" charset="0"/>
+              </a:rPr>
+              <a:t>change? Does this differ between land-use type?</a:t>
+            </a:r>
+          </a:p>
+          <a:p>
+            <a:pPr algn="ctr"/>
+            <a:endParaRPr lang="en-US" b="1" dirty="0">
+              <a:effectLst/>
+              <a:latin typeface="Helvetica" pitchFamily="2" charset="0"/>
+            </a:endParaRPr>
+          </a:p>
+        </p:txBody>
+      </p:sp>
+      <p:cxnSp>
+        <p:nvCxnSpPr>
+          <p:cNvPr id="46" name="Straight Connector 45">
+            <a:extLst>
+              <a:ext uri="{FF2B5EF4-FFF2-40B4-BE49-F238E27FC236}">
+                <a16:creationId xmlns:a16="http://schemas.microsoft.com/office/drawing/2014/main" id="{9572DC41-6B74-644F-AEC7-0B6DD97E2AD4}"/>
+              </a:ext>
+            </a:extLst>
+          </p:cNvPr>
+          <p:cNvCxnSpPr>
+            <a:cxnSpLocks/>
+          </p:cNvCxnSpPr>
+          <p:nvPr/>
+        </p:nvCxnSpPr>
+        <p:spPr>
+          <a:xfrm>
+            <a:off x="8881435" y="1847861"/>
+            <a:ext cx="0" cy="3809163"/>
+          </a:xfrm>
+          <a:prstGeom prst="line">
+            <a:avLst/>
+          </a:prstGeom>
+          <a:ln w="19050">
+            <a:solidFill>
+              <a:schemeClr val="accent2"/>
+            </a:solidFill>
+            <a:prstDash val="dash"/>
+          </a:ln>
+        </p:spPr>
+        <p:style>
+          <a:lnRef idx="1">
+            <a:schemeClr val="accent1"/>
+          </a:lnRef>
+          <a:fillRef idx="0">
+            <a:schemeClr val="accent1"/>
+          </a:fillRef>
+          <a:effectRef idx="0">
+            <a:schemeClr val="accent1"/>
+          </a:effectRef>
+          <a:fontRef idx="minor">
+            <a:schemeClr val="tx1"/>
+          </a:fontRef>
+        </p:style>
+      </p:cxnSp>
+      <p:cxnSp>
+        <p:nvCxnSpPr>
+          <p:cNvPr id="49" name="Straight Connector 48">
+            <a:extLst>
+              <a:ext uri="{FF2B5EF4-FFF2-40B4-BE49-F238E27FC236}">
+                <a16:creationId xmlns:a16="http://schemas.microsoft.com/office/drawing/2014/main" id="{F78CDFF8-38E0-B94A-AEE3-278094C23C6B}"/>
+              </a:ext>
+            </a:extLst>
+          </p:cNvPr>
+          <p:cNvCxnSpPr>
+            <a:cxnSpLocks/>
+          </p:cNvCxnSpPr>
+          <p:nvPr/>
+        </p:nvCxnSpPr>
+        <p:spPr>
+          <a:xfrm>
+            <a:off x="3327291" y="1847860"/>
+            <a:ext cx="0" cy="3809163"/>
+          </a:xfrm>
+          <a:prstGeom prst="line">
+            <a:avLst/>
+          </a:prstGeom>
+          <a:ln w="19050">
+            <a:solidFill>
+              <a:schemeClr val="accent2"/>
+            </a:solidFill>
+            <a:prstDash val="dash"/>
+          </a:ln>
+        </p:spPr>
+        <p:style>
+          <a:lnRef idx="1">
+            <a:schemeClr val="accent1"/>
+          </a:lnRef>
+          <a:fillRef idx="0">
+            <a:schemeClr val="accent1"/>
+          </a:fillRef>
+          <a:effectRef idx="0">
+            <a:schemeClr val="accent1"/>
+          </a:effectRef>
+          <a:fontRef idx="minor">
+            <a:schemeClr val="tx1"/>
+          </a:fontRef>
+        </p:style>
+      </p:cxnSp>
+      <p:sp>
+        <p:nvSpPr>
+          <p:cNvPr id="9" name="TextBox 8">
+            <a:extLst>
+              <a:ext uri="{FF2B5EF4-FFF2-40B4-BE49-F238E27FC236}">
+                <a16:creationId xmlns:a16="http://schemas.microsoft.com/office/drawing/2014/main" id="{93AD9FE6-F03F-874E-BE1A-A9CAB338B348}"/>
+              </a:ext>
+            </a:extLst>
+          </p:cNvPr>
+          <p:cNvSpPr txBox="1"/>
+          <p:nvPr/>
+        </p:nvSpPr>
+        <p:spPr>
+          <a:xfrm>
+            <a:off x="6096000" y="4302034"/>
+            <a:ext cx="184731" cy="369332"/>
+          </a:xfrm>
+          <a:prstGeom prst="rect">
+            <a:avLst/>
+          </a:prstGeom>
+          <a:noFill/>
+        </p:spPr>
+        <p:txBody>
+          <a:bodyPr wrap="none" rtlCol="0">
+            <a:spAutoFit/>
+          </a:bodyPr>
+          <a:lstStyle/>
           <a:p>
             <a:endParaRPr lang="en-US" dirty="0"/>
           </a:p>
@@ -7819,7 +8159,7 @@
     </p:spTree>
     <p:extLst>
       <p:ext uri="{BB962C8B-B14F-4D97-AF65-F5344CB8AC3E}">
-        <p14:creationId xmlns:p14="http://schemas.microsoft.com/office/powerpoint/2010/main" val="2064874983"/>
+        <p14:creationId xmlns:p14="http://schemas.microsoft.com/office/powerpoint/2010/main" val="2873355140"/>
       </p:ext>
     </p:extLst>
   </p:cSld>

</xml_diff>

<commit_message>
Izzy met with Isla and took notes
</commit_message>
<xml_diff>
--- a/images/prediction_graphs.pptx
+++ b/images/prediction_graphs.pptx
@@ -5,12 +5,13 @@
     <p:sldMasterId id="2147483648" r:id="rId1"/>
   </p:sldMasterIdLst>
   <p:notesMasterIdLst>
-    <p:notesMasterId r:id="rId5"/>
+    <p:notesMasterId r:id="rId6"/>
   </p:notesMasterIdLst>
   <p:sldIdLst>
     <p:sldId id="262" r:id="rId2"/>
     <p:sldId id="264" r:id="rId3"/>
     <p:sldId id="263" r:id="rId4"/>
+    <p:sldId id="265" r:id="rId5"/>
   </p:sldIdLst>
   <p:sldSz cx="12192000" cy="6858000"/>
   <p:notesSz cx="6858000" cy="9144000"/>
@@ -199,7 +200,7 @@
           <a:p>
             <a:fld id="{B3983048-CB06-4E44-9303-08BA1CBDE2ED}" type="datetimeFigureOut">
               <a:rPr lang="en-US" smtClean="0"/>
-              <a:t>2/28/19</a:t>
+              <a:t>3/14/19</a:t>
             </a:fld>
             <a:endParaRPr lang="en-US"/>
           </a:p>
@@ -613,7 +614,7 @@
           <a:p>
             <a:fld id="{CF1B88E2-74B9-C74C-93C7-A1E2B177FB07}" type="datetimeFigureOut">
               <a:rPr lang="en-US" smtClean="0"/>
-              <a:t>2/28/19</a:t>
+              <a:t>3/14/19</a:t>
             </a:fld>
             <a:endParaRPr lang="en-US"/>
           </a:p>
@@ -811,7 +812,7 @@
           <a:p>
             <a:fld id="{CF1B88E2-74B9-C74C-93C7-A1E2B177FB07}" type="datetimeFigureOut">
               <a:rPr lang="en-US" smtClean="0"/>
-              <a:t>2/28/19</a:t>
+              <a:t>3/14/19</a:t>
             </a:fld>
             <a:endParaRPr lang="en-US"/>
           </a:p>
@@ -1019,7 +1020,7 @@
           <a:p>
             <a:fld id="{CF1B88E2-74B9-C74C-93C7-A1E2B177FB07}" type="datetimeFigureOut">
               <a:rPr lang="en-US" smtClean="0"/>
-              <a:t>2/28/19</a:t>
+              <a:t>3/14/19</a:t>
             </a:fld>
             <a:endParaRPr lang="en-US"/>
           </a:p>
@@ -1217,7 +1218,7 @@
           <a:p>
             <a:fld id="{CF1B88E2-74B9-C74C-93C7-A1E2B177FB07}" type="datetimeFigureOut">
               <a:rPr lang="en-US" smtClean="0"/>
-              <a:t>2/28/19</a:t>
+              <a:t>3/14/19</a:t>
             </a:fld>
             <a:endParaRPr lang="en-US"/>
           </a:p>
@@ -1492,7 +1493,7 @@
           <a:p>
             <a:fld id="{CF1B88E2-74B9-C74C-93C7-A1E2B177FB07}" type="datetimeFigureOut">
               <a:rPr lang="en-US" smtClean="0"/>
-              <a:t>2/28/19</a:t>
+              <a:t>3/14/19</a:t>
             </a:fld>
             <a:endParaRPr lang="en-US"/>
           </a:p>
@@ -1757,7 +1758,7 @@
           <a:p>
             <a:fld id="{CF1B88E2-74B9-C74C-93C7-A1E2B177FB07}" type="datetimeFigureOut">
               <a:rPr lang="en-US" smtClean="0"/>
-              <a:t>2/28/19</a:t>
+              <a:t>3/14/19</a:t>
             </a:fld>
             <a:endParaRPr lang="en-US"/>
           </a:p>
@@ -2169,7 +2170,7 @@
           <a:p>
             <a:fld id="{CF1B88E2-74B9-C74C-93C7-A1E2B177FB07}" type="datetimeFigureOut">
               <a:rPr lang="en-US" smtClean="0"/>
-              <a:t>2/28/19</a:t>
+              <a:t>3/14/19</a:t>
             </a:fld>
             <a:endParaRPr lang="en-US"/>
           </a:p>
@@ -2310,7 +2311,7 @@
           <a:p>
             <a:fld id="{CF1B88E2-74B9-C74C-93C7-A1E2B177FB07}" type="datetimeFigureOut">
               <a:rPr lang="en-US" smtClean="0"/>
-              <a:t>2/28/19</a:t>
+              <a:t>3/14/19</a:t>
             </a:fld>
             <a:endParaRPr lang="en-US"/>
           </a:p>
@@ -2423,7 +2424,7 @@
           <a:p>
             <a:fld id="{CF1B88E2-74B9-C74C-93C7-A1E2B177FB07}" type="datetimeFigureOut">
               <a:rPr lang="en-US" smtClean="0"/>
-              <a:t>2/28/19</a:t>
+              <a:t>3/14/19</a:t>
             </a:fld>
             <a:endParaRPr lang="en-US"/>
           </a:p>
@@ -2734,7 +2735,7 @@
           <a:p>
             <a:fld id="{CF1B88E2-74B9-C74C-93C7-A1E2B177FB07}" type="datetimeFigureOut">
               <a:rPr lang="en-US" smtClean="0"/>
-              <a:t>2/28/19</a:t>
+              <a:t>3/14/19</a:t>
             </a:fld>
             <a:endParaRPr lang="en-US"/>
           </a:p>
@@ -3022,7 +3023,7 @@
           <a:p>
             <a:fld id="{CF1B88E2-74B9-C74C-93C7-A1E2B177FB07}" type="datetimeFigureOut">
               <a:rPr lang="en-US" smtClean="0"/>
-              <a:t>2/28/19</a:t>
+              <a:t>3/14/19</a:t>
             </a:fld>
             <a:endParaRPr lang="en-US"/>
           </a:p>
@@ -3263,7 +3264,7 @@
           <a:p>
             <a:fld id="{CF1B88E2-74B9-C74C-93C7-A1E2B177FB07}" type="datetimeFigureOut">
               <a:rPr lang="en-US" smtClean="0"/>
-              <a:t>2/28/19</a:t>
+              <a:t>3/14/19</a:t>
             </a:fld>
             <a:endParaRPr lang="en-US"/>
           </a:p>
@@ -8160,6 +8161,86 @@
     <p:extLst>
       <p:ext uri="{BB962C8B-B14F-4D97-AF65-F5344CB8AC3E}">
         <p14:creationId xmlns:p14="http://schemas.microsoft.com/office/powerpoint/2010/main" val="2873355140"/>
+      </p:ext>
+    </p:extLst>
+  </p:cSld>
+  <p:clrMapOvr>
+    <a:masterClrMapping/>
+  </p:clrMapOvr>
+</p:sld>
+</file>
+
+<file path=ppt/slides/slide4.xml><?xml version="1.0" encoding="utf-8"?>
+<p:sld xmlns:a="http://schemas.openxmlformats.org/drawingml/2006/main" xmlns:r="http://schemas.openxmlformats.org/officeDocument/2006/relationships" xmlns:p="http://schemas.openxmlformats.org/presentationml/2006/main">
+  <p:cSld>
+    <p:spTree>
+      <p:nvGrpSpPr>
+        <p:cNvPr id="1" name=""/>
+        <p:cNvGrpSpPr/>
+        <p:nvPr/>
+      </p:nvGrpSpPr>
+      <p:grpSpPr>
+        <a:xfrm>
+          <a:off x="0" y="0"/>
+          <a:ext cx="0" cy="0"/>
+          <a:chOff x="0" y="0"/>
+          <a:chExt cx="0" cy="0"/>
+        </a:xfrm>
+      </p:grpSpPr>
+      <p:sp>
+        <p:nvSpPr>
+          <p:cNvPr id="3" name="Content Placeholder 2">
+            <a:extLst>
+              <a:ext uri="{FF2B5EF4-FFF2-40B4-BE49-F238E27FC236}">
+                <a16:creationId xmlns:a16="http://schemas.microsoft.com/office/drawing/2014/main" id="{38C21521-7A55-D74C-AF9C-38ECE194FECF}"/>
+              </a:ext>
+            </a:extLst>
+          </p:cNvPr>
+          <p:cNvSpPr>
+            <a:spLocks noGrp="1"/>
+          </p:cNvSpPr>
+          <p:nvPr>
+            <p:ph idx="1"/>
+          </p:nvPr>
+        </p:nvSpPr>
+        <p:spPr>
+          <a:xfrm>
+            <a:off x="902825" y="1562581"/>
+            <a:ext cx="10590835" cy="4614381"/>
+          </a:xfrm>
+        </p:spPr>
+        <p:txBody>
+          <a:bodyPr/>
+          <a:lstStyle/>
+          <a:p>
+            <a:r>
+              <a:rPr lang="en-US" dirty="0"/>
+              <a:t>Add null hypotheses, alternate hypotheses </a:t>
+            </a:r>
+            <a:r>
+              <a:rPr lang="en-US" dirty="0" err="1"/>
+              <a:t>etc</a:t>
+            </a:r>
+            <a:r>
+              <a:rPr lang="en-US" dirty="0"/>
+              <a:t> </a:t>
+            </a:r>
+          </a:p>
+          <a:p>
+            <a:r>
+              <a:rPr lang="en-US" dirty="0"/>
+              <a:t>For each question and sub question </a:t>
+            </a:r>
+          </a:p>
+          <a:p>
+            <a:endParaRPr lang="en-US" dirty="0"/>
+          </a:p>
+        </p:txBody>
+      </p:sp>
+    </p:spTree>
+    <p:extLst>
+      <p:ext uri="{BB962C8B-B14F-4D97-AF65-F5344CB8AC3E}">
+        <p14:creationId xmlns:p14="http://schemas.microsoft.com/office/powerpoint/2010/main" val="2766066670"/>
       </p:ext>
     </p:extLst>
   </p:cSld>

</xml_diff>

<commit_message>
Izzy did a lot of work without pushing again! :(
</commit_message>
<xml_diff>
--- a/images/prediction_graphs.pptx
+++ b/images/prediction_graphs.pptx
@@ -5,13 +5,14 @@
     <p:sldMasterId id="2147483648" r:id="rId1"/>
   </p:sldMasterIdLst>
   <p:notesMasterIdLst>
-    <p:notesMasterId r:id="rId6"/>
+    <p:notesMasterId r:id="rId7"/>
   </p:notesMasterIdLst>
   <p:sldIdLst>
     <p:sldId id="262" r:id="rId2"/>
-    <p:sldId id="264" r:id="rId3"/>
-    <p:sldId id="263" r:id="rId4"/>
-    <p:sldId id="265" r:id="rId5"/>
+    <p:sldId id="266" r:id="rId3"/>
+    <p:sldId id="264" r:id="rId4"/>
+    <p:sldId id="267" r:id="rId5"/>
+    <p:sldId id="263" r:id="rId6"/>
   </p:sldIdLst>
   <p:sldSz cx="12192000" cy="6858000"/>
   <p:notesSz cx="6858000" cy="9144000"/>
@@ -118,6 +119,18 @@
 </p:presentation>
 </file>
 
+<file path=ppt/commentAuthors.xml><?xml version="1.0" encoding="utf-8"?>
+<p:cmAuthorLst xmlns:a="http://schemas.openxmlformats.org/drawingml/2006/main" xmlns:r="http://schemas.openxmlformats.org/officeDocument/2006/relationships" xmlns:p="http://schemas.openxmlformats.org/presentationml/2006/main">
+  <p:cmAuthor id="1" name="RICH Izzy" initials="RI" lastIdx="1" clrIdx="0">
+    <p:extLst>
+      <p:ext uri="{19B8F6BF-5375-455C-9EA6-DF929625EA0E}">
+        <p15:presenceInfo xmlns:p15="http://schemas.microsoft.com/office/powerpoint/2012/main" userId="RICH Izzy" providerId="None"/>
+      </p:ext>
+    </p:extLst>
+  </p:cmAuthor>
+</p:cmAuthorLst>
+</file>
+
 <file path=ppt/notesMasters/notesMaster1.xml><?xml version="1.0" encoding="utf-8"?>
 <p:notesMaster xmlns:a="http://schemas.openxmlformats.org/drawingml/2006/main" xmlns:r="http://schemas.openxmlformats.org/officeDocument/2006/relationships" xmlns:p="http://schemas.openxmlformats.org/presentationml/2006/main">
   <p:cSld>
@@ -200,7 +213,7 @@
           <a:p>
             <a:fld id="{B3983048-CB06-4E44-9303-08BA1CBDE2ED}" type="datetimeFigureOut">
               <a:rPr lang="en-US" smtClean="0"/>
-              <a:t>3/14/19</a:t>
+              <a:t>3/22/19</a:t>
             </a:fld>
             <a:endParaRPr lang="en-US"/>
           </a:p>
@@ -467,6 +480,514 @@
 </p:notesMaster>
 </file>
 
+<file path=ppt/notesSlides/notesSlide1.xml><?xml version="1.0" encoding="utf-8"?>
+<p:notes xmlns:a="http://schemas.openxmlformats.org/drawingml/2006/main" xmlns:r="http://schemas.openxmlformats.org/officeDocument/2006/relationships" xmlns:p="http://schemas.openxmlformats.org/presentationml/2006/main">
+  <p:cSld>
+    <p:spTree>
+      <p:nvGrpSpPr>
+        <p:cNvPr id="1" name=""/>
+        <p:cNvGrpSpPr/>
+        <p:nvPr/>
+      </p:nvGrpSpPr>
+      <p:grpSpPr>
+        <a:xfrm>
+          <a:off x="0" y="0"/>
+          <a:ext cx="0" cy="0"/>
+          <a:chOff x="0" y="0"/>
+          <a:chExt cx="0" cy="0"/>
+        </a:xfrm>
+      </p:grpSpPr>
+      <p:sp>
+        <p:nvSpPr>
+          <p:cNvPr id="2" name="Slide Image Placeholder 1"/>
+          <p:cNvSpPr>
+            <a:spLocks noGrp="1" noRot="1" noChangeAspect="1"/>
+          </p:cNvSpPr>
+          <p:nvPr>
+            <p:ph type="sldImg"/>
+          </p:nvPr>
+        </p:nvSpPr>
+        <p:spPr/>
+      </p:sp>
+      <p:sp>
+        <p:nvSpPr>
+          <p:cNvPr id="3" name="Notes Placeholder 2"/>
+          <p:cNvSpPr>
+            <a:spLocks noGrp="1"/>
+          </p:cNvSpPr>
+          <p:nvPr>
+            <p:ph type="body" idx="1"/>
+          </p:nvPr>
+        </p:nvSpPr>
+        <p:spPr/>
+        <p:txBody>
+          <a:bodyPr/>
+          <a:lstStyle/>
+          <a:p>
+            <a:r>
+              <a:rPr lang="en-US" dirty="0"/>
+              <a:t>Null: no shift in land use following SPE events</a:t>
+            </a:r>
+          </a:p>
+          <a:p>
+            <a:r>
+              <a:rPr lang="en-US" dirty="0"/>
+              <a:t>Alternate: </a:t>
+            </a:r>
+          </a:p>
+          <a:p>
+            <a:r>
+              <a:rPr lang="en-US" dirty="0"/>
+              <a:t>SUC: </a:t>
+            </a:r>
+          </a:p>
+          <a:p>
+            <a:pPr marL="171450" indent="-171450">
+              <a:buFontTx/>
+              <a:buChar char="-"/>
+            </a:pPr>
+            <a:r>
+              <a:rPr lang="en-US" dirty="0"/>
+              <a:t>No increase in extensive land as people don’t return to their newly owned land </a:t>
+            </a:r>
+          </a:p>
+          <a:p>
+            <a:pPr marL="171450" indent="-171450">
+              <a:buFontTx/>
+              <a:buChar char="-"/>
+            </a:pPr>
+            <a:r>
+              <a:rPr lang="en-US" dirty="0"/>
+              <a:t>No decrease in intensive land as move towards a more market-based economy </a:t>
+            </a:r>
+          </a:p>
+          <a:p>
+            <a:pPr marL="171450" indent="-171450">
+              <a:buFontTx/>
+              <a:buChar char="-"/>
+            </a:pPr>
+            <a:endParaRPr lang="en-US" dirty="0"/>
+          </a:p>
+          <a:p>
+            <a:r>
+              <a:rPr lang="en-US" dirty="0"/>
+              <a:t>EU:</a:t>
+            </a:r>
+          </a:p>
+          <a:p>
+            <a:pPr marL="171450" indent="-171450">
+              <a:buFontTx/>
+              <a:buChar char="-"/>
+            </a:pPr>
+            <a:r>
+              <a:rPr lang="en-US" dirty="0"/>
+              <a:t>No decrease in abandoned land as extensive land gets abandoned because people are moving towards larger, more intensive farms</a:t>
+            </a:r>
+          </a:p>
+          <a:p>
+            <a:pPr marL="171450" indent="-171450">
+              <a:buFontTx/>
+              <a:buChar char="-"/>
+            </a:pPr>
+            <a:r>
+              <a:rPr lang="en-US" dirty="0"/>
+              <a:t>No change in extensive land because people stick to traditional farming practices </a:t>
+            </a:r>
+          </a:p>
+          <a:p>
+            <a:pPr marL="171450" indent="-171450">
+              <a:buFontTx/>
+              <a:buChar char="-"/>
+            </a:pPr>
+            <a:r>
+              <a:rPr lang="en-US" dirty="0"/>
+              <a:t>No increase in intensive land as most transition after the SUC, intensive farms already largely established </a:t>
+            </a:r>
+          </a:p>
+        </p:txBody>
+      </p:sp>
+      <p:sp>
+        <p:nvSpPr>
+          <p:cNvPr id="4" name="Slide Number Placeholder 3"/>
+          <p:cNvSpPr>
+            <a:spLocks noGrp="1"/>
+          </p:cNvSpPr>
+          <p:nvPr>
+            <p:ph type="sldNum" sz="quarter" idx="5"/>
+          </p:nvPr>
+        </p:nvSpPr>
+        <p:spPr/>
+        <p:txBody>
+          <a:bodyPr/>
+          <a:lstStyle/>
+          <a:p>
+            <a:fld id="{9BCE8D36-C1BF-224E-B7E6-C084A11AC8D6}" type="slidenum">
+              <a:rPr lang="en-US" smtClean="0"/>
+              <a:t>3</a:t>
+            </a:fld>
+            <a:endParaRPr lang="en-US"/>
+          </a:p>
+        </p:txBody>
+      </p:sp>
+    </p:spTree>
+    <p:extLst>
+      <p:ext uri="{BB962C8B-B14F-4D97-AF65-F5344CB8AC3E}">
+        <p14:creationId xmlns:p14="http://schemas.microsoft.com/office/powerpoint/2010/main" val="1865644637"/>
+      </p:ext>
+    </p:extLst>
+  </p:cSld>
+  <p:clrMapOvr>
+    <a:masterClrMapping/>
+  </p:clrMapOvr>
+</p:notes>
+</file>
+
+<file path=ppt/notesSlides/notesSlide2.xml><?xml version="1.0" encoding="utf-8"?>
+<p:notes xmlns:a="http://schemas.openxmlformats.org/drawingml/2006/main" xmlns:r="http://schemas.openxmlformats.org/officeDocument/2006/relationships" xmlns:p="http://schemas.openxmlformats.org/presentationml/2006/main">
+  <p:cSld>
+    <p:spTree>
+      <p:nvGrpSpPr>
+        <p:cNvPr id="1" name=""/>
+        <p:cNvGrpSpPr/>
+        <p:nvPr/>
+      </p:nvGrpSpPr>
+      <p:grpSpPr>
+        <a:xfrm>
+          <a:off x="0" y="0"/>
+          <a:ext cx="0" cy="0"/>
+          <a:chOff x="0" y="0"/>
+          <a:chExt cx="0" cy="0"/>
+        </a:xfrm>
+      </p:grpSpPr>
+      <p:sp>
+        <p:nvSpPr>
+          <p:cNvPr id="2" name="Slide Image Placeholder 1"/>
+          <p:cNvSpPr>
+            <a:spLocks noGrp="1" noRot="1" noChangeAspect="1"/>
+          </p:cNvSpPr>
+          <p:nvPr>
+            <p:ph type="sldImg"/>
+          </p:nvPr>
+        </p:nvSpPr>
+        <p:spPr/>
+      </p:sp>
+      <p:sp>
+        <p:nvSpPr>
+          <p:cNvPr id="3" name="Notes Placeholder 2"/>
+          <p:cNvSpPr>
+            <a:spLocks noGrp="1"/>
+          </p:cNvSpPr>
+          <p:nvPr>
+            <p:ph type="body" idx="1"/>
+          </p:nvPr>
+        </p:nvSpPr>
+        <p:spPr/>
+        <p:txBody>
+          <a:bodyPr/>
+          <a:lstStyle/>
+          <a:p>
+            <a:r>
+              <a:rPr lang="en-US" dirty="0"/>
+              <a:t>Null: no shift in land-use following SPE events</a:t>
+            </a:r>
+          </a:p>
+          <a:p>
+            <a:r>
+              <a:rPr lang="en-US" dirty="0"/>
+              <a:t>Alternate: </a:t>
+            </a:r>
+          </a:p>
+          <a:p>
+            <a:r>
+              <a:rPr lang="en-US" dirty="0"/>
+              <a:t>SUC:</a:t>
+            </a:r>
+          </a:p>
+          <a:p>
+            <a:pPr marL="171450" indent="-171450">
+              <a:buFontTx/>
+              <a:buChar char="-"/>
+            </a:pPr>
+            <a:r>
+              <a:rPr lang="en-US" dirty="0"/>
+              <a:t>More abandoned land from extensive as people don’t return to their farms that are given back from the government </a:t>
+            </a:r>
+          </a:p>
+          <a:p>
+            <a:pPr marL="171450" indent="-171450">
+              <a:buFontTx/>
+              <a:buChar char="-"/>
+            </a:pPr>
+            <a:r>
+              <a:rPr lang="en-US" dirty="0"/>
+              <a:t>More intensive land from extensive as switch to market-based economy and people don’t return from farms</a:t>
+            </a:r>
+          </a:p>
+          <a:p>
+            <a:pPr marL="171450" indent="-171450">
+              <a:buFontTx/>
+              <a:buChar char="-"/>
+            </a:pPr>
+            <a:endParaRPr lang="en-US" dirty="0"/>
+          </a:p>
+          <a:p>
+            <a:pPr marL="171450" indent="-171450">
+              <a:buFontTx/>
+              <a:buChar char="-"/>
+            </a:pPr>
+            <a:r>
+              <a:rPr lang="en-US" dirty="0"/>
+              <a:t>EU:</a:t>
+            </a:r>
+          </a:p>
+          <a:p>
+            <a:pPr marL="171450" indent="-171450">
+              <a:buFontTx/>
+              <a:buChar char="-"/>
+            </a:pPr>
+            <a:r>
+              <a:rPr lang="en-US" dirty="0"/>
+              <a:t>No additional intensive land as already switched to market based economy</a:t>
+            </a:r>
+          </a:p>
+          <a:p>
+            <a:pPr marL="171450" indent="-171450">
+              <a:buFontTx/>
+              <a:buChar char="-"/>
+            </a:pPr>
+            <a:r>
+              <a:rPr lang="en-US" dirty="0"/>
+              <a:t>Increase in extensive from intensive and abandoned as subsidies available for small farms</a:t>
+            </a:r>
+          </a:p>
+          <a:p>
+            <a:pPr marL="171450" indent="-171450">
+              <a:buFontTx/>
+              <a:buChar char="-"/>
+            </a:pPr>
+            <a:r>
+              <a:rPr lang="en-US" dirty="0"/>
+              <a:t>Decrease in abandoned from extensive because of more uptake of traditional activities due to transition to nationalist ideals and subsidies for small farms </a:t>
+            </a:r>
+          </a:p>
+          <a:p>
+            <a:pPr marL="171450" indent="-171450">
+              <a:buFontTx/>
+              <a:buChar char="-"/>
+            </a:pPr>
+            <a:endParaRPr lang="en-US" dirty="0"/>
+          </a:p>
+        </p:txBody>
+      </p:sp>
+      <p:sp>
+        <p:nvSpPr>
+          <p:cNvPr id="4" name="Slide Number Placeholder 3"/>
+          <p:cNvSpPr>
+            <a:spLocks noGrp="1"/>
+          </p:cNvSpPr>
+          <p:nvPr>
+            <p:ph type="sldNum" sz="quarter" idx="5"/>
+          </p:nvPr>
+        </p:nvSpPr>
+        <p:spPr/>
+        <p:txBody>
+          <a:bodyPr/>
+          <a:lstStyle/>
+          <a:p>
+            <a:fld id="{9BCE8D36-C1BF-224E-B7E6-C084A11AC8D6}" type="slidenum">
+              <a:rPr lang="en-US" smtClean="0"/>
+              <a:t>4</a:t>
+            </a:fld>
+            <a:endParaRPr lang="en-US"/>
+          </a:p>
+        </p:txBody>
+      </p:sp>
+    </p:spTree>
+    <p:extLst>
+      <p:ext uri="{BB962C8B-B14F-4D97-AF65-F5344CB8AC3E}">
+        <p14:creationId xmlns:p14="http://schemas.microsoft.com/office/powerpoint/2010/main" val="1656892062"/>
+      </p:ext>
+    </p:extLst>
+  </p:cSld>
+  <p:clrMapOvr>
+    <a:masterClrMapping/>
+  </p:clrMapOvr>
+</p:notes>
+</file>
+
+<file path=ppt/notesSlides/notesSlide3.xml><?xml version="1.0" encoding="utf-8"?>
+<p:notes xmlns:a="http://schemas.openxmlformats.org/drawingml/2006/main" xmlns:r="http://schemas.openxmlformats.org/officeDocument/2006/relationships" xmlns:p="http://schemas.openxmlformats.org/presentationml/2006/main">
+  <p:cSld>
+    <p:spTree>
+      <p:nvGrpSpPr>
+        <p:cNvPr id="1" name=""/>
+        <p:cNvGrpSpPr/>
+        <p:nvPr/>
+      </p:nvGrpSpPr>
+      <p:grpSpPr>
+        <a:xfrm>
+          <a:off x="0" y="0"/>
+          <a:ext cx="0" cy="0"/>
+          <a:chOff x="0" y="0"/>
+          <a:chExt cx="0" cy="0"/>
+        </a:xfrm>
+      </p:grpSpPr>
+      <p:sp>
+        <p:nvSpPr>
+          <p:cNvPr id="2" name="Slide Image Placeholder 1"/>
+          <p:cNvSpPr>
+            <a:spLocks noGrp="1" noRot="1" noChangeAspect="1"/>
+          </p:cNvSpPr>
+          <p:nvPr>
+            <p:ph type="sldImg"/>
+          </p:nvPr>
+        </p:nvSpPr>
+        <p:spPr/>
+      </p:sp>
+      <p:sp>
+        <p:nvSpPr>
+          <p:cNvPr id="3" name="Notes Placeholder 2"/>
+          <p:cNvSpPr>
+            <a:spLocks noGrp="1"/>
+          </p:cNvSpPr>
+          <p:nvPr>
+            <p:ph type="body" idx="1"/>
+          </p:nvPr>
+        </p:nvSpPr>
+        <p:spPr/>
+        <p:txBody>
+          <a:bodyPr/>
+          <a:lstStyle/>
+          <a:p>
+            <a:r>
+              <a:rPr lang="en-US" dirty="0"/>
+              <a:t>Null: no land-use following SPE events when taking into account time lag</a:t>
+            </a:r>
+          </a:p>
+          <a:p>
+            <a:r>
+              <a:rPr lang="en-US" dirty="0"/>
+              <a:t>Alternate:</a:t>
+            </a:r>
+          </a:p>
+          <a:p>
+            <a:r>
+              <a:rPr lang="en-US" dirty="0"/>
+              <a:t>SUC:</a:t>
+            </a:r>
+          </a:p>
+          <a:p>
+            <a:pPr marL="171450" indent="-171450">
+              <a:buFontTx/>
+              <a:buChar char="-"/>
+            </a:pPr>
+            <a:r>
+              <a:rPr lang="en-US" dirty="0"/>
+              <a:t>Lag in abandoned land from intensive because still try carry on co-ops directly following SUC </a:t>
+            </a:r>
+          </a:p>
+          <a:p>
+            <a:pPr marL="171450" indent="-171450">
+              <a:buFontTx/>
+              <a:buChar char="-"/>
+            </a:pPr>
+            <a:r>
+              <a:rPr lang="en-US" dirty="0"/>
+              <a:t>No lag in transition to extensive land because people need new income so return to old farming ways</a:t>
+            </a:r>
+          </a:p>
+          <a:p>
+            <a:pPr marL="171450" indent="-171450">
+              <a:buFontTx/>
+              <a:buChar char="-"/>
+            </a:pPr>
+            <a:r>
+              <a:rPr lang="en-US" dirty="0"/>
+              <a:t>Lag in intensive to abandoned and extensive land because still carry on co-ops directly following SUC</a:t>
+            </a:r>
+          </a:p>
+          <a:p>
+            <a:endParaRPr lang="en-US" dirty="0"/>
+          </a:p>
+          <a:p>
+            <a:r>
+              <a:rPr lang="en-US" dirty="0"/>
+              <a:t>EU:</a:t>
+            </a:r>
+          </a:p>
+          <a:p>
+            <a:pPr marL="171450" indent="-171450">
+              <a:buFontTx/>
+              <a:buChar char="-"/>
+            </a:pPr>
+            <a:r>
+              <a:rPr lang="en-US" dirty="0"/>
+              <a:t>No lag in abandoned land-use change because no real change </a:t>
+            </a:r>
+          </a:p>
+          <a:p>
+            <a:pPr marL="171450" indent="-171450">
+              <a:buFontTx/>
+              <a:buChar char="-"/>
+            </a:pPr>
+            <a:r>
+              <a:rPr lang="en-US" dirty="0"/>
+              <a:t>Lag for extensive land-use change as people who were farming extensively have trouble transitioning to larger farms</a:t>
+            </a:r>
+          </a:p>
+          <a:p>
+            <a:pPr marL="171450" indent="-171450">
+              <a:buFontTx/>
+              <a:buChar char="-"/>
+            </a:pPr>
+            <a:r>
+              <a:rPr lang="en-US" dirty="0"/>
+              <a:t>Lag for intensive land-use change as hesitant to work on big farms and abandon extensive </a:t>
+            </a:r>
+            <a:r>
+              <a:rPr lang="en-US"/>
+              <a:t>agricultural ways</a:t>
+            </a:r>
+            <a:endParaRPr lang="en-US" dirty="0"/>
+          </a:p>
+        </p:txBody>
+      </p:sp>
+      <p:sp>
+        <p:nvSpPr>
+          <p:cNvPr id="4" name="Slide Number Placeholder 3"/>
+          <p:cNvSpPr>
+            <a:spLocks noGrp="1"/>
+          </p:cNvSpPr>
+          <p:nvPr>
+            <p:ph type="sldNum" sz="quarter" idx="5"/>
+          </p:nvPr>
+        </p:nvSpPr>
+        <p:spPr/>
+        <p:txBody>
+          <a:bodyPr/>
+          <a:lstStyle/>
+          <a:p>
+            <a:fld id="{9BCE8D36-C1BF-224E-B7E6-C084A11AC8D6}" type="slidenum">
+              <a:rPr lang="en-US" smtClean="0"/>
+              <a:t>5</a:t>
+            </a:fld>
+            <a:endParaRPr lang="en-US"/>
+          </a:p>
+        </p:txBody>
+      </p:sp>
+    </p:spTree>
+    <p:extLst>
+      <p:ext uri="{BB962C8B-B14F-4D97-AF65-F5344CB8AC3E}">
+        <p14:creationId xmlns:p14="http://schemas.microsoft.com/office/powerpoint/2010/main" val="452164524"/>
+      </p:ext>
+    </p:extLst>
+  </p:cSld>
+  <p:clrMapOvr>
+    <a:masterClrMapping/>
+  </p:clrMapOvr>
+</p:notes>
+</file>
+
 <file path=ppt/slideLayouts/slideLayout1.xml><?xml version="1.0" encoding="utf-8"?>
 <p:sldLayout xmlns:a="http://schemas.openxmlformats.org/drawingml/2006/main" xmlns:r="http://schemas.openxmlformats.org/officeDocument/2006/relationships" xmlns:p="http://schemas.openxmlformats.org/presentationml/2006/main" type="title" preserve="1">
   <p:cSld name="Title Slide">
@@ -614,7 +1135,7 @@
           <a:p>
             <a:fld id="{CF1B88E2-74B9-C74C-93C7-A1E2B177FB07}" type="datetimeFigureOut">
               <a:rPr lang="en-US" smtClean="0"/>
-              <a:t>3/14/19</a:t>
+              <a:t>3/22/19</a:t>
             </a:fld>
             <a:endParaRPr lang="en-US"/>
           </a:p>
@@ -812,7 +1333,7 @@
           <a:p>
             <a:fld id="{CF1B88E2-74B9-C74C-93C7-A1E2B177FB07}" type="datetimeFigureOut">
               <a:rPr lang="en-US" smtClean="0"/>
-              <a:t>3/14/19</a:t>
+              <a:t>3/22/19</a:t>
             </a:fld>
             <a:endParaRPr lang="en-US"/>
           </a:p>
@@ -1020,7 +1541,7 @@
           <a:p>
             <a:fld id="{CF1B88E2-74B9-C74C-93C7-A1E2B177FB07}" type="datetimeFigureOut">
               <a:rPr lang="en-US" smtClean="0"/>
-              <a:t>3/14/19</a:t>
+              <a:t>3/22/19</a:t>
             </a:fld>
             <a:endParaRPr lang="en-US"/>
           </a:p>
@@ -1218,7 +1739,7 @@
           <a:p>
             <a:fld id="{CF1B88E2-74B9-C74C-93C7-A1E2B177FB07}" type="datetimeFigureOut">
               <a:rPr lang="en-US" smtClean="0"/>
-              <a:t>3/14/19</a:t>
+              <a:t>3/22/19</a:t>
             </a:fld>
             <a:endParaRPr lang="en-US"/>
           </a:p>
@@ -1493,7 +2014,7 @@
           <a:p>
             <a:fld id="{CF1B88E2-74B9-C74C-93C7-A1E2B177FB07}" type="datetimeFigureOut">
               <a:rPr lang="en-US" smtClean="0"/>
-              <a:t>3/14/19</a:t>
+              <a:t>3/22/19</a:t>
             </a:fld>
             <a:endParaRPr lang="en-US"/>
           </a:p>
@@ -1758,7 +2279,7 @@
           <a:p>
             <a:fld id="{CF1B88E2-74B9-C74C-93C7-A1E2B177FB07}" type="datetimeFigureOut">
               <a:rPr lang="en-US" smtClean="0"/>
-              <a:t>3/14/19</a:t>
+              <a:t>3/22/19</a:t>
             </a:fld>
             <a:endParaRPr lang="en-US"/>
           </a:p>
@@ -2170,7 +2691,7 @@
           <a:p>
             <a:fld id="{CF1B88E2-74B9-C74C-93C7-A1E2B177FB07}" type="datetimeFigureOut">
               <a:rPr lang="en-US" smtClean="0"/>
-              <a:t>3/14/19</a:t>
+              <a:t>3/22/19</a:t>
             </a:fld>
             <a:endParaRPr lang="en-US"/>
           </a:p>
@@ -2311,7 +2832,7 @@
           <a:p>
             <a:fld id="{CF1B88E2-74B9-C74C-93C7-A1E2B177FB07}" type="datetimeFigureOut">
               <a:rPr lang="en-US" smtClean="0"/>
-              <a:t>3/14/19</a:t>
+              <a:t>3/22/19</a:t>
             </a:fld>
             <a:endParaRPr lang="en-US"/>
           </a:p>
@@ -2424,7 +2945,7 @@
           <a:p>
             <a:fld id="{CF1B88E2-74B9-C74C-93C7-A1E2B177FB07}" type="datetimeFigureOut">
               <a:rPr lang="en-US" smtClean="0"/>
-              <a:t>3/14/19</a:t>
+              <a:t>3/22/19</a:t>
             </a:fld>
             <a:endParaRPr lang="en-US"/>
           </a:p>
@@ -2735,7 +3256,7 @@
           <a:p>
             <a:fld id="{CF1B88E2-74B9-C74C-93C7-A1E2B177FB07}" type="datetimeFigureOut">
               <a:rPr lang="en-US" smtClean="0"/>
-              <a:t>3/14/19</a:t>
+              <a:t>3/22/19</a:t>
             </a:fld>
             <a:endParaRPr lang="en-US"/>
           </a:p>
@@ -3023,7 +3544,7 @@
           <a:p>
             <a:fld id="{CF1B88E2-74B9-C74C-93C7-A1E2B177FB07}" type="datetimeFigureOut">
               <a:rPr lang="en-US" smtClean="0"/>
-              <a:t>3/14/19</a:t>
+              <a:t>3/22/19</a:t>
             </a:fld>
             <a:endParaRPr lang="en-US"/>
           </a:p>
@@ -3264,7 +3785,7 @@
           <a:p>
             <a:fld id="{CF1B88E2-74B9-C74C-93C7-A1E2B177FB07}" type="datetimeFigureOut">
               <a:rPr lang="en-US" smtClean="0"/>
-              <a:t>3/14/19</a:t>
+              <a:t>3/22/19</a:t>
             </a:fld>
             <a:endParaRPr lang="en-US"/>
           </a:p>
@@ -5041,10 +5562,244 @@
       </p:grpSpPr>
       <p:sp>
         <p:nvSpPr>
-          <p:cNvPr id="4" name="Rectangle 3">
-            <a:extLst>
-              <a:ext uri="{FF2B5EF4-FFF2-40B4-BE49-F238E27FC236}">
-                <a16:creationId xmlns:a16="http://schemas.microsoft.com/office/drawing/2014/main" id="{5E09949D-B77A-5B4F-8180-BA6976375034}"/>
+          <p:cNvPr id="4" name="TextBox 3">
+            <a:extLst>
+              <a:ext uri="{FF2B5EF4-FFF2-40B4-BE49-F238E27FC236}">
+                <a16:creationId xmlns:a16="http://schemas.microsoft.com/office/drawing/2014/main" id="{58C51978-444F-8244-898F-8DD928F85903}"/>
+              </a:ext>
+            </a:extLst>
+          </p:cNvPr>
+          <p:cNvSpPr txBox="1"/>
+          <p:nvPr/>
+        </p:nvSpPr>
+        <p:spPr>
+          <a:xfrm>
+            <a:off x="568604" y="5808243"/>
+            <a:ext cx="2803973" cy="584775"/>
+          </a:xfrm>
+          <a:prstGeom prst="rect">
+            <a:avLst/>
+          </a:prstGeom>
+          <a:noFill/>
+        </p:spPr>
+        <p:txBody>
+          <a:bodyPr wrap="none" rtlCol="0">
+            <a:spAutoFit/>
+          </a:bodyPr>
+          <a:lstStyle/>
+          <a:p>
+            <a:pPr algn="ctr"/>
+            <a:r>
+              <a:rPr lang="en-US" sz="1600" dirty="0">
+                <a:latin typeface="Helvetica" pitchFamily="2" charset="0"/>
+              </a:rPr>
+              <a:t>BEFORE</a:t>
+            </a:r>
+          </a:p>
+          <a:p>
+            <a:pPr algn="ctr"/>
+            <a:r>
+              <a:rPr lang="en-US" sz="1600" dirty="0">
+                <a:latin typeface="Helvetica" pitchFamily="2" charset="0"/>
+              </a:rPr>
+              <a:t>Soviet Union collapse (1991)</a:t>
+            </a:r>
+          </a:p>
+        </p:txBody>
+      </p:sp>
+      <p:cxnSp>
+        <p:nvCxnSpPr>
+          <p:cNvPr id="5" name="Straight Connector 4">
+            <a:extLst>
+              <a:ext uri="{FF2B5EF4-FFF2-40B4-BE49-F238E27FC236}">
+                <a16:creationId xmlns:a16="http://schemas.microsoft.com/office/drawing/2014/main" id="{5C7FA6FC-9928-F240-8525-ACF447D8EE2F}"/>
+              </a:ext>
+            </a:extLst>
+          </p:cNvPr>
+          <p:cNvCxnSpPr>
+            <a:cxnSpLocks/>
+          </p:cNvCxnSpPr>
+          <p:nvPr/>
+        </p:nvCxnSpPr>
+        <p:spPr>
+          <a:xfrm>
+            <a:off x="3301352" y="5611082"/>
+            <a:ext cx="0" cy="281899"/>
+          </a:xfrm>
+          <a:prstGeom prst="line">
+            <a:avLst/>
+          </a:prstGeom>
+          <a:ln>
+            <a:solidFill>
+              <a:schemeClr val="tx1"/>
+            </a:solidFill>
+          </a:ln>
+        </p:spPr>
+        <p:style>
+          <a:lnRef idx="1">
+            <a:schemeClr val="accent1"/>
+          </a:lnRef>
+          <a:fillRef idx="0">
+            <a:schemeClr val="accent1"/>
+          </a:fillRef>
+          <a:effectRef idx="0">
+            <a:schemeClr val="accent1"/>
+          </a:effectRef>
+          <a:fontRef idx="minor">
+            <a:schemeClr val="tx1"/>
+          </a:fontRef>
+        </p:style>
+      </p:cxnSp>
+      <p:sp>
+        <p:nvSpPr>
+          <p:cNvPr id="6" name="TextBox 5">
+            <a:extLst>
+              <a:ext uri="{FF2B5EF4-FFF2-40B4-BE49-F238E27FC236}">
+                <a16:creationId xmlns:a16="http://schemas.microsoft.com/office/drawing/2014/main" id="{E8B33F6F-F0A8-8E44-84F8-61DF9B09FAB2}"/>
+              </a:ext>
+            </a:extLst>
+          </p:cNvPr>
+          <p:cNvSpPr txBox="1"/>
+          <p:nvPr/>
+        </p:nvSpPr>
+        <p:spPr>
+          <a:xfrm rot="16200000">
+            <a:off x="167173" y="3579666"/>
+            <a:ext cx="2135521" cy="338554"/>
+          </a:xfrm>
+          <a:prstGeom prst="rect">
+            <a:avLst/>
+          </a:prstGeom>
+          <a:noFill/>
+        </p:spPr>
+        <p:txBody>
+          <a:bodyPr wrap="none" rtlCol="0">
+            <a:spAutoFit/>
+          </a:bodyPr>
+          <a:lstStyle/>
+          <a:p>
+            <a:r>
+              <a:rPr lang="en-US" sz="1600" dirty="0">
+                <a:latin typeface="Helvetica" pitchFamily="2" charset="0"/>
+              </a:rPr>
+              <a:t>Area of land-use type</a:t>
+            </a:r>
+          </a:p>
+        </p:txBody>
+      </p:sp>
+      <p:grpSp>
+        <p:nvGrpSpPr>
+          <p:cNvPr id="13" name="Group 12">
+            <a:extLst>
+              <a:ext uri="{FF2B5EF4-FFF2-40B4-BE49-F238E27FC236}">
+                <a16:creationId xmlns:a16="http://schemas.microsoft.com/office/drawing/2014/main" id="{7969767D-E4FA-9D4F-B8AA-663BAFEDBCDD}"/>
+              </a:ext>
+            </a:extLst>
+          </p:cNvPr>
+          <p:cNvGrpSpPr/>
+          <p:nvPr/>
+        </p:nvGrpSpPr>
+        <p:grpSpPr>
+          <a:xfrm>
+            <a:off x="1404705" y="1824436"/>
+            <a:ext cx="4138897" cy="3785035"/>
+            <a:chOff x="1363851" y="2433234"/>
+            <a:chExt cx="3813472" cy="3118600"/>
+          </a:xfrm>
+        </p:grpSpPr>
+        <p:cxnSp>
+          <p:nvCxnSpPr>
+            <p:cNvPr id="14" name="Straight Connector 13">
+              <a:extLst>
+                <a:ext uri="{FF2B5EF4-FFF2-40B4-BE49-F238E27FC236}">
+                  <a16:creationId xmlns:a16="http://schemas.microsoft.com/office/drawing/2014/main" id="{6B0F6A4A-EDB9-3C42-A41F-CAE3264F6D38}"/>
+                </a:ext>
+              </a:extLst>
+            </p:cNvPr>
+            <p:cNvCxnSpPr>
+              <a:cxnSpLocks/>
+            </p:cNvCxnSpPr>
+            <p:nvPr/>
+          </p:nvCxnSpPr>
+          <p:spPr>
+            <a:xfrm>
+              <a:off x="1363851" y="2433234"/>
+              <a:ext cx="0" cy="3112801"/>
+            </a:xfrm>
+            <a:prstGeom prst="line">
+              <a:avLst/>
+            </a:prstGeom>
+            <a:ln>
+              <a:solidFill>
+                <a:schemeClr val="tx1"/>
+              </a:solidFill>
+            </a:ln>
+          </p:spPr>
+          <p:style>
+            <a:lnRef idx="1">
+              <a:schemeClr val="accent1"/>
+            </a:lnRef>
+            <a:fillRef idx="0">
+              <a:schemeClr val="accent1"/>
+            </a:fillRef>
+            <a:effectRef idx="0">
+              <a:schemeClr val="accent1"/>
+            </a:effectRef>
+            <a:fontRef idx="minor">
+              <a:schemeClr val="tx1"/>
+            </a:fontRef>
+          </p:style>
+        </p:cxnSp>
+        <p:cxnSp>
+          <p:nvCxnSpPr>
+            <p:cNvPr id="15" name="Straight Connector 14">
+              <a:extLst>
+                <a:ext uri="{FF2B5EF4-FFF2-40B4-BE49-F238E27FC236}">
+                  <a16:creationId xmlns:a16="http://schemas.microsoft.com/office/drawing/2014/main" id="{647B20B8-296E-AE41-87BE-884A25711236}"/>
+                </a:ext>
+              </a:extLst>
+            </p:cNvPr>
+            <p:cNvCxnSpPr>
+              <a:cxnSpLocks/>
+            </p:cNvCxnSpPr>
+            <p:nvPr/>
+          </p:nvCxnSpPr>
+          <p:spPr>
+            <a:xfrm flipH="1" flipV="1">
+              <a:off x="1363852" y="5546035"/>
+              <a:ext cx="3813471" cy="5799"/>
+            </a:xfrm>
+            <a:prstGeom prst="line">
+              <a:avLst/>
+            </a:prstGeom>
+            <a:ln>
+              <a:solidFill>
+                <a:schemeClr val="tx1"/>
+              </a:solidFill>
+            </a:ln>
+          </p:spPr>
+          <p:style>
+            <a:lnRef idx="1">
+              <a:schemeClr val="accent1"/>
+            </a:lnRef>
+            <a:fillRef idx="0">
+              <a:schemeClr val="accent1"/>
+            </a:fillRef>
+            <a:effectRef idx="0">
+              <a:schemeClr val="accent1"/>
+            </a:effectRef>
+            <a:fontRef idx="minor">
+              <a:schemeClr val="tx1"/>
+            </a:fontRef>
+          </p:style>
+        </p:cxnSp>
+      </p:grpSp>
+      <p:sp>
+        <p:nvSpPr>
+          <p:cNvPr id="20" name="Rectangle 19">
+            <a:extLst>
+              <a:ext uri="{FF2B5EF4-FFF2-40B4-BE49-F238E27FC236}">
+                <a16:creationId xmlns:a16="http://schemas.microsoft.com/office/drawing/2014/main" id="{68F5ACA9-D23F-EE4F-8B11-EEAD74A912EB}"/>
               </a:ext>
             </a:extLst>
           </p:cNvPr>
@@ -5053,8 +5808,61 @@
         </p:nvSpPr>
         <p:spPr>
           <a:xfrm>
-            <a:off x="1005606" y="395538"/>
-            <a:ext cx="10224654" cy="646331"/>
+            <a:off x="1404209" y="2880130"/>
+            <a:ext cx="602002" cy="2722303"/>
+          </a:xfrm>
+          <a:prstGeom prst="rect">
+            <a:avLst/>
+          </a:prstGeom>
+          <a:solidFill>
+            <a:srgbClr val="7030A0"/>
+          </a:solidFill>
+        </p:spPr>
+        <p:style>
+          <a:lnRef idx="2">
+            <a:schemeClr val="accent1">
+              <a:shade val="50000"/>
+            </a:schemeClr>
+          </a:lnRef>
+          <a:fillRef idx="1">
+            <a:schemeClr val="accent1"/>
+          </a:fillRef>
+          <a:effectRef idx="0">
+            <a:schemeClr val="accent1"/>
+          </a:effectRef>
+          <a:fontRef idx="minor">
+            <a:schemeClr val="lt1"/>
+          </a:fontRef>
+        </p:style>
+        <p:txBody>
+          <a:bodyPr rtlCol="0" anchor="ctr"/>
+          <a:lstStyle/>
+          <a:p>
+            <a:pPr algn="ctr"/>
+            <a:endParaRPr lang="en-US" dirty="0">
+              <a:solidFill>
+                <a:srgbClr val="7030A0"/>
+              </a:solidFill>
+            </a:endParaRPr>
+          </a:p>
+        </p:txBody>
+      </p:sp>
+      <p:sp>
+        <p:nvSpPr>
+          <p:cNvPr id="21" name="Rectangle 20">
+            <a:extLst>
+              <a:ext uri="{FF2B5EF4-FFF2-40B4-BE49-F238E27FC236}">
+                <a16:creationId xmlns:a16="http://schemas.microsoft.com/office/drawing/2014/main" id="{4E73B93F-AB46-034D-B8FF-854E83130AF6}"/>
+              </a:ext>
+            </a:extLst>
+          </p:cNvPr>
+          <p:cNvSpPr/>
+          <p:nvPr/>
+        </p:nvSpPr>
+        <p:spPr>
+          <a:xfrm>
+            <a:off x="2999651" y="5808243"/>
+            <a:ext cx="3366448" cy="584775"/>
           </a:xfrm>
           <a:prstGeom prst="rect">
             <a:avLst/>
@@ -5068,11 +5876,1550 @@
           <a:p>
             <a:pPr algn="ctr"/>
             <a:r>
+              <a:rPr lang="en-US" sz="1600" dirty="0">
+                <a:latin typeface="Helvetica" pitchFamily="2" charset="0"/>
+              </a:rPr>
+              <a:t>AFTER</a:t>
+            </a:r>
+          </a:p>
+          <a:p>
+            <a:pPr algn="ctr"/>
+            <a:r>
+              <a:rPr lang="en-US" sz="1600" dirty="0">
+                <a:latin typeface="Helvetica" pitchFamily="2" charset="0"/>
+              </a:rPr>
+              <a:t>Soviet Union collapse (1991)</a:t>
+            </a:r>
+          </a:p>
+        </p:txBody>
+      </p:sp>
+      <p:sp>
+        <p:nvSpPr>
+          <p:cNvPr id="22" name="Rectangle 21">
+            <a:extLst>
+              <a:ext uri="{FF2B5EF4-FFF2-40B4-BE49-F238E27FC236}">
+                <a16:creationId xmlns:a16="http://schemas.microsoft.com/office/drawing/2014/main" id="{028998F9-0BFB-DC4D-BD0F-6C7951F79A17}"/>
+              </a:ext>
+            </a:extLst>
+          </p:cNvPr>
+          <p:cNvSpPr/>
+          <p:nvPr/>
+        </p:nvSpPr>
+        <p:spPr>
+          <a:xfrm>
+            <a:off x="3372577" y="3930554"/>
+            <a:ext cx="602001" cy="1670267"/>
+          </a:xfrm>
+          <a:prstGeom prst="rect">
+            <a:avLst/>
+          </a:prstGeom>
+          <a:solidFill>
+            <a:srgbClr val="7030A0"/>
+          </a:solidFill>
+        </p:spPr>
+        <p:style>
+          <a:lnRef idx="2">
+            <a:schemeClr val="accent1">
+              <a:shade val="50000"/>
+            </a:schemeClr>
+          </a:lnRef>
+          <a:fillRef idx="1">
+            <a:schemeClr val="accent1"/>
+          </a:fillRef>
+          <a:effectRef idx="0">
+            <a:schemeClr val="accent1"/>
+          </a:effectRef>
+          <a:fontRef idx="minor">
+            <a:schemeClr val="lt1"/>
+          </a:fontRef>
+        </p:style>
+        <p:txBody>
+          <a:bodyPr rtlCol="0" anchor="ctr"/>
+          <a:lstStyle/>
+          <a:p>
+            <a:pPr algn="ctr"/>
+            <a:endParaRPr lang="en-US" dirty="0">
+              <a:solidFill>
+                <a:srgbClr val="7030A0"/>
+              </a:solidFill>
+            </a:endParaRPr>
+          </a:p>
+        </p:txBody>
+      </p:sp>
+      <p:sp>
+        <p:nvSpPr>
+          <p:cNvPr id="23" name="Rectangle 22">
+            <a:extLst>
+              <a:ext uri="{FF2B5EF4-FFF2-40B4-BE49-F238E27FC236}">
+                <a16:creationId xmlns:a16="http://schemas.microsoft.com/office/drawing/2014/main" id="{4161CB22-5899-AD40-8817-CE07BBD48312}"/>
+              </a:ext>
+            </a:extLst>
+          </p:cNvPr>
+          <p:cNvSpPr/>
+          <p:nvPr/>
+        </p:nvSpPr>
+        <p:spPr>
+          <a:xfrm>
+            <a:off x="2043765" y="5268464"/>
+            <a:ext cx="602002" cy="341007"/>
+          </a:xfrm>
+          <a:prstGeom prst="rect">
+            <a:avLst/>
+          </a:prstGeom>
+          <a:solidFill>
+            <a:schemeClr val="accent2">
+              <a:lumMod val="50000"/>
+            </a:schemeClr>
+          </a:solidFill>
+        </p:spPr>
+        <p:style>
+          <a:lnRef idx="2">
+            <a:schemeClr val="accent1">
+              <a:shade val="50000"/>
+            </a:schemeClr>
+          </a:lnRef>
+          <a:fillRef idx="1">
+            <a:schemeClr val="accent1"/>
+          </a:fillRef>
+          <a:effectRef idx="0">
+            <a:schemeClr val="accent1"/>
+          </a:effectRef>
+          <a:fontRef idx="minor">
+            <a:schemeClr val="lt1"/>
+          </a:fontRef>
+        </p:style>
+        <p:txBody>
+          <a:bodyPr rtlCol="0" anchor="ctr"/>
+          <a:lstStyle/>
+          <a:p>
+            <a:pPr algn="ctr"/>
+            <a:endParaRPr lang="en-US" dirty="0">
+              <a:solidFill>
+                <a:srgbClr val="7030A0"/>
+              </a:solidFill>
+            </a:endParaRPr>
+          </a:p>
+        </p:txBody>
+      </p:sp>
+      <p:sp>
+        <p:nvSpPr>
+          <p:cNvPr id="24" name="Rectangle 23">
+            <a:extLst>
+              <a:ext uri="{FF2B5EF4-FFF2-40B4-BE49-F238E27FC236}">
+                <a16:creationId xmlns:a16="http://schemas.microsoft.com/office/drawing/2014/main" id="{E33E0D34-D7EA-6F46-BF9E-5CE2AF7AE76E}"/>
+              </a:ext>
+            </a:extLst>
+          </p:cNvPr>
+          <p:cNvSpPr/>
+          <p:nvPr/>
+        </p:nvSpPr>
+        <p:spPr>
+          <a:xfrm>
+            <a:off x="4012133" y="2368101"/>
+            <a:ext cx="602002" cy="3232721"/>
+          </a:xfrm>
+          <a:prstGeom prst="rect">
+            <a:avLst/>
+          </a:prstGeom>
+          <a:solidFill>
+            <a:schemeClr val="accent2">
+              <a:lumMod val="50000"/>
+            </a:schemeClr>
+          </a:solidFill>
+        </p:spPr>
+        <p:style>
+          <a:lnRef idx="2">
+            <a:schemeClr val="accent1">
+              <a:shade val="50000"/>
+            </a:schemeClr>
+          </a:lnRef>
+          <a:fillRef idx="1">
+            <a:schemeClr val="accent1"/>
+          </a:fillRef>
+          <a:effectRef idx="0">
+            <a:schemeClr val="accent1"/>
+          </a:effectRef>
+          <a:fontRef idx="minor">
+            <a:schemeClr val="lt1"/>
+          </a:fontRef>
+        </p:style>
+        <p:txBody>
+          <a:bodyPr rtlCol="0" anchor="ctr"/>
+          <a:lstStyle/>
+          <a:p>
+            <a:pPr algn="ctr"/>
+            <a:endParaRPr lang="en-US" dirty="0">
+              <a:solidFill>
+                <a:srgbClr val="7030A0"/>
+              </a:solidFill>
+            </a:endParaRPr>
+          </a:p>
+        </p:txBody>
+      </p:sp>
+      <p:sp>
+        <p:nvSpPr>
+          <p:cNvPr id="25" name="Rectangle 24">
+            <a:extLst>
+              <a:ext uri="{FF2B5EF4-FFF2-40B4-BE49-F238E27FC236}">
+                <a16:creationId xmlns:a16="http://schemas.microsoft.com/office/drawing/2014/main" id="{A499008D-9816-8841-80D0-0C499BD0C36F}"/>
+              </a:ext>
+            </a:extLst>
+          </p:cNvPr>
+          <p:cNvSpPr/>
+          <p:nvPr/>
+        </p:nvSpPr>
+        <p:spPr>
+          <a:xfrm>
+            <a:off x="2672558" y="4135272"/>
+            <a:ext cx="602001" cy="1474199"/>
+          </a:xfrm>
+          <a:prstGeom prst="rect">
+            <a:avLst/>
+          </a:prstGeom>
+          <a:solidFill>
+            <a:schemeClr val="accent6">
+              <a:lumMod val="50000"/>
+            </a:schemeClr>
+          </a:solidFill>
+        </p:spPr>
+        <p:style>
+          <a:lnRef idx="2">
+            <a:schemeClr val="accent1">
+              <a:shade val="50000"/>
+            </a:schemeClr>
+          </a:lnRef>
+          <a:fillRef idx="1">
+            <a:schemeClr val="accent1"/>
+          </a:fillRef>
+          <a:effectRef idx="0">
+            <a:schemeClr val="accent1"/>
+          </a:effectRef>
+          <a:fontRef idx="minor">
+            <a:schemeClr val="lt1"/>
+          </a:fontRef>
+        </p:style>
+        <p:txBody>
+          <a:bodyPr rtlCol="0" anchor="ctr"/>
+          <a:lstStyle/>
+          <a:p>
+            <a:pPr algn="ctr"/>
+            <a:endParaRPr lang="en-US" dirty="0">
+              <a:solidFill>
+                <a:srgbClr val="7030A0"/>
+              </a:solidFill>
+            </a:endParaRPr>
+          </a:p>
+        </p:txBody>
+      </p:sp>
+      <p:sp>
+        <p:nvSpPr>
+          <p:cNvPr id="26" name="Rectangle 25">
+            <a:extLst>
+              <a:ext uri="{FF2B5EF4-FFF2-40B4-BE49-F238E27FC236}">
+                <a16:creationId xmlns:a16="http://schemas.microsoft.com/office/drawing/2014/main" id="{89A149FB-79AA-9846-B98D-7671D0D03197}"/>
+              </a:ext>
+            </a:extLst>
+          </p:cNvPr>
+          <p:cNvSpPr/>
+          <p:nvPr/>
+        </p:nvSpPr>
+        <p:spPr>
+          <a:xfrm>
+            <a:off x="4678480" y="3118728"/>
+            <a:ext cx="602001" cy="2482093"/>
+          </a:xfrm>
+          <a:prstGeom prst="rect">
+            <a:avLst/>
+          </a:prstGeom>
+          <a:solidFill>
+            <a:schemeClr val="accent6">
+              <a:lumMod val="50000"/>
+            </a:schemeClr>
+          </a:solidFill>
+        </p:spPr>
+        <p:style>
+          <a:lnRef idx="2">
+            <a:schemeClr val="accent1">
+              <a:shade val="50000"/>
+            </a:schemeClr>
+          </a:lnRef>
+          <a:fillRef idx="1">
+            <a:schemeClr val="accent1"/>
+          </a:fillRef>
+          <a:effectRef idx="0">
+            <a:schemeClr val="accent1"/>
+          </a:effectRef>
+          <a:fontRef idx="minor">
+            <a:schemeClr val="lt1"/>
+          </a:fontRef>
+        </p:style>
+        <p:txBody>
+          <a:bodyPr rtlCol="0" anchor="ctr"/>
+          <a:lstStyle/>
+          <a:p>
+            <a:pPr algn="ctr"/>
+            <a:endParaRPr lang="en-US" dirty="0">
+              <a:solidFill>
+                <a:srgbClr val="7030A0"/>
+              </a:solidFill>
+            </a:endParaRPr>
+          </a:p>
+        </p:txBody>
+      </p:sp>
+      <p:sp>
+        <p:nvSpPr>
+          <p:cNvPr id="40" name="TextBox 39">
+            <a:extLst>
+              <a:ext uri="{FF2B5EF4-FFF2-40B4-BE49-F238E27FC236}">
+                <a16:creationId xmlns:a16="http://schemas.microsoft.com/office/drawing/2014/main" id="{DB434A30-498A-1348-80D3-8A615F577679}"/>
+              </a:ext>
+            </a:extLst>
+          </p:cNvPr>
+          <p:cNvSpPr txBox="1"/>
+          <p:nvPr/>
+        </p:nvSpPr>
+        <p:spPr>
+          <a:xfrm>
+            <a:off x="6878184" y="5828921"/>
+            <a:ext cx="2098651" cy="584775"/>
+          </a:xfrm>
+          <a:prstGeom prst="rect">
+            <a:avLst/>
+          </a:prstGeom>
+          <a:noFill/>
+        </p:spPr>
+        <p:txBody>
+          <a:bodyPr wrap="none" rtlCol="0">
+            <a:spAutoFit/>
+          </a:bodyPr>
+          <a:lstStyle/>
+          <a:p>
+            <a:pPr algn="ctr"/>
+            <a:r>
+              <a:rPr lang="en-US" sz="1600" dirty="0">
+                <a:latin typeface="Helvetica" pitchFamily="2" charset="0"/>
+              </a:rPr>
+              <a:t>BEFORE</a:t>
+            </a:r>
+          </a:p>
+          <a:p>
+            <a:pPr algn="ctr"/>
+            <a:r>
+              <a:rPr lang="en-US" sz="1600" dirty="0">
+                <a:latin typeface="Helvetica" pitchFamily="2" charset="0"/>
+              </a:rPr>
+              <a:t>EU Accession (2004)</a:t>
+            </a:r>
+          </a:p>
+        </p:txBody>
+      </p:sp>
+      <p:cxnSp>
+        <p:nvCxnSpPr>
+          <p:cNvPr id="41" name="Straight Connector 40">
+            <a:extLst>
+              <a:ext uri="{FF2B5EF4-FFF2-40B4-BE49-F238E27FC236}">
+                <a16:creationId xmlns:a16="http://schemas.microsoft.com/office/drawing/2014/main" id="{CE0DC5CE-E8FE-4F4F-B653-08B37AB79EFB}"/>
+              </a:ext>
+            </a:extLst>
+          </p:cNvPr>
+          <p:cNvCxnSpPr>
+            <a:cxnSpLocks/>
+          </p:cNvCxnSpPr>
+          <p:nvPr/>
+        </p:nvCxnSpPr>
+        <p:spPr>
+          <a:xfrm>
+            <a:off x="8884096" y="5611082"/>
+            <a:ext cx="0" cy="281899"/>
+          </a:xfrm>
+          <a:prstGeom prst="line">
+            <a:avLst/>
+          </a:prstGeom>
+          <a:ln>
+            <a:solidFill>
+              <a:schemeClr val="tx1"/>
+            </a:solidFill>
+          </a:ln>
+        </p:spPr>
+        <p:style>
+          <a:lnRef idx="1">
+            <a:schemeClr val="accent1"/>
+          </a:lnRef>
+          <a:fillRef idx="0">
+            <a:schemeClr val="accent1"/>
+          </a:fillRef>
+          <a:effectRef idx="0">
+            <a:schemeClr val="accent1"/>
+          </a:effectRef>
+          <a:fontRef idx="minor">
+            <a:schemeClr val="tx1"/>
+          </a:fontRef>
+        </p:style>
+      </p:cxnSp>
+      <p:grpSp>
+        <p:nvGrpSpPr>
+          <p:cNvPr id="43" name="Group 42">
+            <a:extLst>
+              <a:ext uri="{FF2B5EF4-FFF2-40B4-BE49-F238E27FC236}">
+                <a16:creationId xmlns:a16="http://schemas.microsoft.com/office/drawing/2014/main" id="{EEBC6953-61B5-9D4C-BEF7-82CEC45B824E}"/>
+              </a:ext>
+            </a:extLst>
+          </p:cNvPr>
+          <p:cNvGrpSpPr/>
+          <p:nvPr/>
+        </p:nvGrpSpPr>
+        <p:grpSpPr>
+          <a:xfrm>
+            <a:off x="6987449" y="1824436"/>
+            <a:ext cx="4138897" cy="3785035"/>
+            <a:chOff x="1363851" y="2433234"/>
+            <a:chExt cx="3813472" cy="3118600"/>
+          </a:xfrm>
+        </p:grpSpPr>
+        <p:cxnSp>
+          <p:nvCxnSpPr>
+            <p:cNvPr id="44" name="Straight Connector 43">
+              <a:extLst>
+                <a:ext uri="{FF2B5EF4-FFF2-40B4-BE49-F238E27FC236}">
+                  <a16:creationId xmlns:a16="http://schemas.microsoft.com/office/drawing/2014/main" id="{5984DB2F-C724-3F4E-A208-12EAE20CCEB2}"/>
+                </a:ext>
+              </a:extLst>
+            </p:cNvPr>
+            <p:cNvCxnSpPr>
+              <a:cxnSpLocks/>
+            </p:cNvCxnSpPr>
+            <p:nvPr/>
+          </p:nvCxnSpPr>
+          <p:spPr>
+            <a:xfrm>
+              <a:off x="1363851" y="2433234"/>
+              <a:ext cx="0" cy="3112801"/>
+            </a:xfrm>
+            <a:prstGeom prst="line">
+              <a:avLst/>
+            </a:prstGeom>
+            <a:ln>
+              <a:solidFill>
+                <a:schemeClr val="tx1"/>
+              </a:solidFill>
+            </a:ln>
+          </p:spPr>
+          <p:style>
+            <a:lnRef idx="1">
+              <a:schemeClr val="accent1"/>
+            </a:lnRef>
+            <a:fillRef idx="0">
+              <a:schemeClr val="accent1"/>
+            </a:fillRef>
+            <a:effectRef idx="0">
+              <a:schemeClr val="accent1"/>
+            </a:effectRef>
+            <a:fontRef idx="minor">
+              <a:schemeClr val="tx1"/>
+            </a:fontRef>
+          </p:style>
+        </p:cxnSp>
+        <p:cxnSp>
+          <p:nvCxnSpPr>
+            <p:cNvPr id="45" name="Straight Connector 44">
+              <a:extLst>
+                <a:ext uri="{FF2B5EF4-FFF2-40B4-BE49-F238E27FC236}">
+                  <a16:creationId xmlns:a16="http://schemas.microsoft.com/office/drawing/2014/main" id="{C693A726-253C-2B4A-92F6-D4635A5E6943}"/>
+                </a:ext>
+              </a:extLst>
+            </p:cNvPr>
+            <p:cNvCxnSpPr>
+              <a:cxnSpLocks/>
+            </p:cNvCxnSpPr>
+            <p:nvPr/>
+          </p:nvCxnSpPr>
+          <p:spPr>
+            <a:xfrm flipH="1" flipV="1">
+              <a:off x="1363852" y="5546035"/>
+              <a:ext cx="3813471" cy="5799"/>
+            </a:xfrm>
+            <a:prstGeom prst="line">
+              <a:avLst/>
+            </a:prstGeom>
+            <a:ln>
+              <a:solidFill>
+                <a:schemeClr val="tx1"/>
+              </a:solidFill>
+            </a:ln>
+          </p:spPr>
+          <p:style>
+            <a:lnRef idx="1">
+              <a:schemeClr val="accent1"/>
+            </a:lnRef>
+            <a:fillRef idx="0">
+              <a:schemeClr val="accent1"/>
+            </a:fillRef>
+            <a:effectRef idx="0">
+              <a:schemeClr val="accent1"/>
+            </a:effectRef>
+            <a:fontRef idx="minor">
+              <a:schemeClr val="tx1"/>
+            </a:fontRef>
+          </p:style>
+        </p:cxnSp>
+      </p:grpSp>
+      <p:sp>
+        <p:nvSpPr>
+          <p:cNvPr id="46" name="Rectangle 45">
+            <a:extLst>
+              <a:ext uri="{FF2B5EF4-FFF2-40B4-BE49-F238E27FC236}">
+                <a16:creationId xmlns:a16="http://schemas.microsoft.com/office/drawing/2014/main" id="{900B4074-5DE4-EC4B-A8FA-EFDB99FB157B}"/>
+              </a:ext>
+            </a:extLst>
+          </p:cNvPr>
+          <p:cNvSpPr/>
+          <p:nvPr/>
+        </p:nvSpPr>
+        <p:spPr>
+          <a:xfrm>
+            <a:off x="6986953" y="3930554"/>
+            <a:ext cx="602002" cy="1671879"/>
+          </a:xfrm>
+          <a:prstGeom prst="rect">
+            <a:avLst/>
+          </a:prstGeom>
+          <a:solidFill>
+            <a:srgbClr val="7030A0"/>
+          </a:solidFill>
+        </p:spPr>
+        <p:style>
+          <a:lnRef idx="2">
+            <a:schemeClr val="accent1">
+              <a:shade val="50000"/>
+            </a:schemeClr>
+          </a:lnRef>
+          <a:fillRef idx="1">
+            <a:schemeClr val="accent1"/>
+          </a:fillRef>
+          <a:effectRef idx="0">
+            <a:schemeClr val="accent1"/>
+          </a:effectRef>
+          <a:fontRef idx="minor">
+            <a:schemeClr val="lt1"/>
+          </a:fontRef>
+        </p:style>
+        <p:txBody>
+          <a:bodyPr rtlCol="0" anchor="ctr"/>
+          <a:lstStyle/>
+          <a:p>
+            <a:pPr algn="ctr"/>
+            <a:endParaRPr lang="en-US" dirty="0">
+              <a:solidFill>
+                <a:srgbClr val="7030A0"/>
+              </a:solidFill>
+            </a:endParaRPr>
+          </a:p>
+        </p:txBody>
+      </p:sp>
+      <p:sp>
+        <p:nvSpPr>
+          <p:cNvPr id="47" name="Rectangle 46">
+            <a:extLst>
+              <a:ext uri="{FF2B5EF4-FFF2-40B4-BE49-F238E27FC236}">
+                <a16:creationId xmlns:a16="http://schemas.microsoft.com/office/drawing/2014/main" id="{2291736C-8978-0346-BE71-C60EB9296B24}"/>
+              </a:ext>
+            </a:extLst>
+          </p:cNvPr>
+          <p:cNvSpPr/>
+          <p:nvPr/>
+        </p:nvSpPr>
+        <p:spPr>
+          <a:xfrm>
+            <a:off x="8578000" y="5824984"/>
+            <a:ext cx="3366448" cy="584775"/>
+          </a:xfrm>
+          <a:prstGeom prst="rect">
+            <a:avLst/>
+          </a:prstGeom>
+        </p:spPr>
+        <p:txBody>
+          <a:bodyPr wrap="square">
+            <a:spAutoFit/>
+          </a:bodyPr>
+          <a:lstStyle/>
+          <a:p>
+            <a:pPr algn="ctr"/>
+            <a:r>
+              <a:rPr lang="en-US" sz="1600" dirty="0">
+                <a:latin typeface="Helvetica" pitchFamily="2" charset="0"/>
+              </a:rPr>
+              <a:t>AFTER</a:t>
+            </a:r>
+          </a:p>
+          <a:p>
+            <a:pPr algn="ctr"/>
+            <a:r>
+              <a:rPr lang="en-US" sz="1600" dirty="0">
+                <a:latin typeface="Helvetica" pitchFamily="2" charset="0"/>
+              </a:rPr>
+              <a:t>EU accession (2004)</a:t>
+            </a:r>
+          </a:p>
+        </p:txBody>
+      </p:sp>
+      <p:sp>
+        <p:nvSpPr>
+          <p:cNvPr id="48" name="Rectangle 47">
+            <a:extLst>
+              <a:ext uri="{FF2B5EF4-FFF2-40B4-BE49-F238E27FC236}">
+                <a16:creationId xmlns:a16="http://schemas.microsoft.com/office/drawing/2014/main" id="{B095B75F-4137-0542-8B55-BFFD361A9327}"/>
+              </a:ext>
+            </a:extLst>
+          </p:cNvPr>
+          <p:cNvSpPr/>
+          <p:nvPr/>
+        </p:nvSpPr>
+        <p:spPr>
+          <a:xfrm>
+            <a:off x="8955321" y="2375138"/>
+            <a:ext cx="602001" cy="3225683"/>
+          </a:xfrm>
+          <a:prstGeom prst="rect">
+            <a:avLst/>
+          </a:prstGeom>
+          <a:solidFill>
+            <a:srgbClr val="7030A0"/>
+          </a:solidFill>
+        </p:spPr>
+        <p:style>
+          <a:lnRef idx="2">
+            <a:schemeClr val="accent1">
+              <a:shade val="50000"/>
+            </a:schemeClr>
+          </a:lnRef>
+          <a:fillRef idx="1">
+            <a:schemeClr val="accent1"/>
+          </a:fillRef>
+          <a:effectRef idx="0">
+            <a:schemeClr val="accent1"/>
+          </a:effectRef>
+          <a:fontRef idx="minor">
+            <a:schemeClr val="lt1"/>
+          </a:fontRef>
+        </p:style>
+        <p:txBody>
+          <a:bodyPr rtlCol="0" anchor="ctr"/>
+          <a:lstStyle/>
+          <a:p>
+            <a:pPr algn="ctr"/>
+            <a:endParaRPr lang="en-US" dirty="0">
+              <a:solidFill>
+                <a:srgbClr val="7030A0"/>
+              </a:solidFill>
+            </a:endParaRPr>
+          </a:p>
+        </p:txBody>
+      </p:sp>
+      <p:sp>
+        <p:nvSpPr>
+          <p:cNvPr id="49" name="Rectangle 48">
+            <a:extLst>
+              <a:ext uri="{FF2B5EF4-FFF2-40B4-BE49-F238E27FC236}">
+                <a16:creationId xmlns:a16="http://schemas.microsoft.com/office/drawing/2014/main" id="{A752C8CC-95A9-564C-8FEC-0C1CD8A41FA5}"/>
+              </a:ext>
+            </a:extLst>
+          </p:cNvPr>
+          <p:cNvSpPr/>
+          <p:nvPr/>
+        </p:nvSpPr>
+        <p:spPr>
+          <a:xfrm>
+            <a:off x="7626509" y="2368102"/>
+            <a:ext cx="602002" cy="3241370"/>
+          </a:xfrm>
+          <a:prstGeom prst="rect">
+            <a:avLst/>
+          </a:prstGeom>
+          <a:solidFill>
+            <a:schemeClr val="accent2">
+              <a:lumMod val="50000"/>
+            </a:schemeClr>
+          </a:solidFill>
+        </p:spPr>
+        <p:style>
+          <a:lnRef idx="2">
+            <a:schemeClr val="accent1">
+              <a:shade val="50000"/>
+            </a:schemeClr>
+          </a:lnRef>
+          <a:fillRef idx="1">
+            <a:schemeClr val="accent1"/>
+          </a:fillRef>
+          <a:effectRef idx="0">
+            <a:schemeClr val="accent1"/>
+          </a:effectRef>
+          <a:fontRef idx="minor">
+            <a:schemeClr val="lt1"/>
+          </a:fontRef>
+        </p:style>
+        <p:txBody>
+          <a:bodyPr rtlCol="0" anchor="ctr"/>
+          <a:lstStyle/>
+          <a:p>
+            <a:pPr algn="ctr"/>
+            <a:endParaRPr lang="en-US" dirty="0">
+              <a:solidFill>
+                <a:srgbClr val="7030A0"/>
+              </a:solidFill>
+            </a:endParaRPr>
+          </a:p>
+        </p:txBody>
+      </p:sp>
+      <p:sp>
+        <p:nvSpPr>
+          <p:cNvPr id="50" name="Rectangle 49">
+            <a:extLst>
+              <a:ext uri="{FF2B5EF4-FFF2-40B4-BE49-F238E27FC236}">
+                <a16:creationId xmlns:a16="http://schemas.microsoft.com/office/drawing/2014/main" id="{5CD19C2B-EA8D-AD47-B038-8027F2BA6F3E}"/>
+              </a:ext>
+            </a:extLst>
+          </p:cNvPr>
+          <p:cNvSpPr/>
+          <p:nvPr/>
+        </p:nvSpPr>
+        <p:spPr>
+          <a:xfrm>
+            <a:off x="9594877" y="3429000"/>
+            <a:ext cx="602002" cy="2171822"/>
+          </a:xfrm>
+          <a:prstGeom prst="rect">
+            <a:avLst/>
+          </a:prstGeom>
+          <a:solidFill>
+            <a:schemeClr val="accent2">
+              <a:lumMod val="50000"/>
+            </a:schemeClr>
+          </a:solidFill>
+        </p:spPr>
+        <p:style>
+          <a:lnRef idx="2">
+            <a:schemeClr val="accent1">
+              <a:shade val="50000"/>
+            </a:schemeClr>
+          </a:lnRef>
+          <a:fillRef idx="1">
+            <a:schemeClr val="accent1"/>
+          </a:fillRef>
+          <a:effectRef idx="0">
+            <a:schemeClr val="accent1"/>
+          </a:effectRef>
+          <a:fontRef idx="minor">
+            <a:schemeClr val="lt1"/>
+          </a:fontRef>
+        </p:style>
+        <p:txBody>
+          <a:bodyPr rtlCol="0" anchor="ctr"/>
+          <a:lstStyle/>
+          <a:p>
+            <a:pPr algn="ctr"/>
+            <a:endParaRPr lang="en-US" dirty="0">
+              <a:solidFill>
+                <a:srgbClr val="7030A0"/>
+              </a:solidFill>
+            </a:endParaRPr>
+          </a:p>
+        </p:txBody>
+      </p:sp>
+      <p:sp>
+        <p:nvSpPr>
+          <p:cNvPr id="51" name="Rectangle 50">
+            <a:extLst>
+              <a:ext uri="{FF2B5EF4-FFF2-40B4-BE49-F238E27FC236}">
+                <a16:creationId xmlns:a16="http://schemas.microsoft.com/office/drawing/2014/main" id="{19B0429D-F626-C443-BA74-0C2B1C393625}"/>
+              </a:ext>
+            </a:extLst>
+          </p:cNvPr>
+          <p:cNvSpPr/>
+          <p:nvPr/>
+        </p:nvSpPr>
+        <p:spPr>
+          <a:xfrm>
+            <a:off x="8255302" y="3118728"/>
+            <a:ext cx="602001" cy="2490743"/>
+          </a:xfrm>
+          <a:prstGeom prst="rect">
+            <a:avLst/>
+          </a:prstGeom>
+          <a:solidFill>
+            <a:schemeClr val="accent6">
+              <a:lumMod val="50000"/>
+            </a:schemeClr>
+          </a:solidFill>
+        </p:spPr>
+        <p:style>
+          <a:lnRef idx="2">
+            <a:schemeClr val="accent1">
+              <a:shade val="50000"/>
+            </a:schemeClr>
+          </a:lnRef>
+          <a:fillRef idx="1">
+            <a:schemeClr val="accent1"/>
+          </a:fillRef>
+          <a:effectRef idx="0">
+            <a:schemeClr val="accent1"/>
+          </a:effectRef>
+          <a:fontRef idx="minor">
+            <a:schemeClr val="lt1"/>
+          </a:fontRef>
+        </p:style>
+        <p:txBody>
+          <a:bodyPr rtlCol="0" anchor="ctr"/>
+          <a:lstStyle/>
+          <a:p>
+            <a:pPr algn="ctr"/>
+            <a:endParaRPr lang="en-US" dirty="0">
+              <a:solidFill>
+                <a:srgbClr val="7030A0"/>
+              </a:solidFill>
+            </a:endParaRPr>
+          </a:p>
+        </p:txBody>
+      </p:sp>
+      <p:sp>
+        <p:nvSpPr>
+          <p:cNvPr id="52" name="Rectangle 51">
+            <a:extLst>
+              <a:ext uri="{FF2B5EF4-FFF2-40B4-BE49-F238E27FC236}">
+                <a16:creationId xmlns:a16="http://schemas.microsoft.com/office/drawing/2014/main" id="{D8E95EA9-B035-7047-A7DB-5A286CF78774}"/>
+              </a:ext>
+            </a:extLst>
+          </p:cNvPr>
+          <p:cNvSpPr/>
+          <p:nvPr/>
+        </p:nvSpPr>
+        <p:spPr>
+          <a:xfrm>
+            <a:off x="10261224" y="4135272"/>
+            <a:ext cx="602001" cy="1465549"/>
+          </a:xfrm>
+          <a:prstGeom prst="rect">
+            <a:avLst/>
+          </a:prstGeom>
+          <a:solidFill>
+            <a:schemeClr val="accent6">
+              <a:lumMod val="50000"/>
+            </a:schemeClr>
+          </a:solidFill>
+        </p:spPr>
+        <p:style>
+          <a:lnRef idx="2">
+            <a:schemeClr val="accent1">
+              <a:shade val="50000"/>
+            </a:schemeClr>
+          </a:lnRef>
+          <a:fillRef idx="1">
+            <a:schemeClr val="accent1"/>
+          </a:fillRef>
+          <a:effectRef idx="0">
+            <a:schemeClr val="accent1"/>
+          </a:effectRef>
+          <a:fontRef idx="minor">
+            <a:schemeClr val="lt1"/>
+          </a:fontRef>
+        </p:style>
+        <p:txBody>
+          <a:bodyPr rtlCol="0" anchor="ctr"/>
+          <a:lstStyle/>
+          <a:p>
+            <a:pPr algn="ctr"/>
+            <a:endParaRPr lang="en-US" dirty="0">
+              <a:solidFill>
+                <a:srgbClr val="7030A0"/>
+              </a:solidFill>
+            </a:endParaRPr>
+          </a:p>
+        </p:txBody>
+      </p:sp>
+      <p:sp>
+        <p:nvSpPr>
+          <p:cNvPr id="53" name="TextBox 52">
+            <a:extLst>
+              <a:ext uri="{FF2B5EF4-FFF2-40B4-BE49-F238E27FC236}">
+                <a16:creationId xmlns:a16="http://schemas.microsoft.com/office/drawing/2014/main" id="{92B8C57A-B9E6-B64B-A971-10C14F15C0BE}"/>
+              </a:ext>
+            </a:extLst>
+          </p:cNvPr>
+          <p:cNvSpPr txBox="1"/>
+          <p:nvPr/>
+        </p:nvSpPr>
+        <p:spPr>
+          <a:xfrm>
+            <a:off x="1484709" y="77459"/>
+            <a:ext cx="9378509" cy="2292935"/>
+          </a:xfrm>
+          <a:prstGeom prst="rect">
+            <a:avLst/>
+          </a:prstGeom>
+          <a:noFill/>
+        </p:spPr>
+        <p:txBody>
+          <a:bodyPr wrap="square" rtlCol="0">
+            <a:spAutoFit/>
+          </a:bodyPr>
+          <a:lstStyle/>
+          <a:p>
+            <a:r>
+              <a:rPr lang="en-US" sz="1100" b="1" dirty="0">
+                <a:latin typeface="Arial" panose="020B0604020202020204" pitchFamily="34" charset="0"/>
+                <a:cs typeface="Arial" panose="020B0604020202020204" pitchFamily="34" charset="0"/>
+              </a:rPr>
+              <a:t>Q1: Is there a quantifiable, country-scale shift in land-use following SPE events in Latvia? </a:t>
+            </a:r>
+          </a:p>
+          <a:p>
+            <a:endParaRPr lang="en-US" sz="1100" dirty="0">
+              <a:latin typeface="Arial" panose="020B0604020202020204" pitchFamily="34" charset="0"/>
+              <a:cs typeface="Arial" panose="020B0604020202020204" pitchFamily="34" charset="0"/>
+            </a:endParaRPr>
+          </a:p>
+          <a:p>
+            <a:r>
+              <a:rPr lang="en-US" sz="1100" dirty="0">
+                <a:latin typeface="Arial" panose="020B0604020202020204" pitchFamily="34" charset="0"/>
+                <a:cs typeface="Arial" panose="020B0604020202020204" pitchFamily="34" charset="0"/>
+              </a:rPr>
+              <a:t>H</a:t>
+            </a:r>
+            <a:r>
+              <a:rPr lang="en-US" sz="1100" baseline="-25000" dirty="0">
+                <a:latin typeface="Arial" panose="020B0604020202020204" pitchFamily="34" charset="0"/>
+                <a:cs typeface="Arial" panose="020B0604020202020204" pitchFamily="34" charset="0"/>
+              </a:rPr>
+              <a:t>1</a:t>
+            </a:r>
+            <a:r>
+              <a:rPr lang="en-US" sz="1100" dirty="0">
+                <a:latin typeface="Arial" panose="020B0604020202020204" pitchFamily="34" charset="0"/>
+                <a:cs typeface="Arial" panose="020B0604020202020204" pitchFamily="34" charset="0"/>
+              </a:rPr>
+              <a:t>: There is a quantifiable, country-scale shift in land-use following each SPE event studied, with the largest shift being seen after the SUC. **prediction that over 50% of pixels will experience land-use change within the 5 years following SUC but 25% of pixels will following EU accession ** or how else to quantify?</a:t>
+            </a:r>
+          </a:p>
+          <a:p>
+            <a:endParaRPr lang="en-US" sz="1100" dirty="0">
+              <a:latin typeface="Arial" panose="020B0604020202020204" pitchFamily="34" charset="0"/>
+              <a:cs typeface="Arial" panose="020B0604020202020204" pitchFamily="34" charset="0"/>
+            </a:endParaRPr>
+          </a:p>
+          <a:p>
+            <a:r>
+              <a:rPr lang="en-US" sz="1100" dirty="0">
+                <a:latin typeface="Arial" panose="020B0604020202020204" pitchFamily="34" charset="0"/>
+                <a:cs typeface="Arial" panose="020B0604020202020204" pitchFamily="34" charset="0"/>
+              </a:rPr>
+              <a:t>**There is a strong relationship between land-use change and SPE events at country-scale, with a stronger relationship observed after the SUC, with a greater quantity of area changing land-use type. ** because co-ops being abandoned and lack of return to subsistence farming</a:t>
+            </a:r>
+          </a:p>
+          <a:p>
+            <a:endParaRPr lang="en-US" sz="1100" dirty="0">
+              <a:latin typeface="Arial" panose="020B0604020202020204" pitchFamily="34" charset="0"/>
+              <a:cs typeface="Arial" panose="020B0604020202020204" pitchFamily="34" charset="0"/>
+            </a:endParaRPr>
+          </a:p>
+          <a:p>
+            <a:r>
+              <a:rPr lang="en-US" sz="1100" dirty="0">
+                <a:latin typeface="Arial" panose="020B0604020202020204" pitchFamily="34" charset="0"/>
+                <a:cs typeface="Arial" panose="020B0604020202020204" pitchFamily="34" charset="0"/>
+              </a:rPr>
+              <a:t>H</a:t>
+            </a:r>
+            <a:r>
+              <a:rPr lang="en-US" sz="1100" baseline="-25000" dirty="0">
+                <a:latin typeface="Arial" panose="020B0604020202020204" pitchFamily="34" charset="0"/>
+                <a:cs typeface="Arial" panose="020B0604020202020204" pitchFamily="34" charset="0"/>
+              </a:rPr>
+              <a:t>a</a:t>
+            </a:r>
+            <a:r>
+              <a:rPr lang="en-US" sz="1100" dirty="0">
+                <a:latin typeface="Arial" panose="020B0604020202020204" pitchFamily="34" charset="0"/>
+                <a:cs typeface="Arial" panose="020B0604020202020204" pitchFamily="34" charset="0"/>
+              </a:rPr>
+              <a:t>: There is a strong relationship between land-use change and SPE events at country-scale, with a stronger relationship observed after the EU accession, with a greater quantity of area changing land-use type. ** because stronger regulation and intensification </a:t>
+            </a:r>
+          </a:p>
+          <a:p>
+            <a:endParaRPr lang="en-US" sz="1100" dirty="0">
+              <a:latin typeface="Arial" panose="020B0604020202020204" pitchFamily="34" charset="0"/>
+              <a:cs typeface="Arial" panose="020B0604020202020204" pitchFamily="34" charset="0"/>
+            </a:endParaRPr>
+          </a:p>
+          <a:p>
+            <a:r>
+              <a:rPr lang="en-US" sz="1100" dirty="0">
+                <a:latin typeface="Arial" panose="020B0604020202020204" pitchFamily="34" charset="0"/>
+                <a:cs typeface="Arial" panose="020B0604020202020204" pitchFamily="34" charset="0"/>
+              </a:rPr>
+              <a:t>H</a:t>
+            </a:r>
+            <a:r>
+              <a:rPr lang="en-US" sz="1100" baseline="-25000" dirty="0">
+                <a:latin typeface="Arial" panose="020B0604020202020204" pitchFamily="34" charset="0"/>
+                <a:cs typeface="Arial" panose="020B0604020202020204" pitchFamily="34" charset="0"/>
+              </a:rPr>
+              <a:t>0</a:t>
+            </a:r>
+            <a:r>
+              <a:rPr lang="en-US" sz="1100" dirty="0">
+                <a:latin typeface="Arial" panose="020B0604020202020204" pitchFamily="34" charset="0"/>
+                <a:cs typeface="Arial" panose="020B0604020202020204" pitchFamily="34" charset="0"/>
+              </a:rPr>
+              <a:t>: There is no quantifiable, country-scale shift in land-use following each SPE event studied. </a:t>
+            </a:r>
+          </a:p>
+        </p:txBody>
+      </p:sp>
+      <p:sp>
+        <p:nvSpPr>
+          <p:cNvPr id="54" name="TextBox 53">
+            <a:extLst>
+              <a:ext uri="{FF2B5EF4-FFF2-40B4-BE49-F238E27FC236}">
+                <a16:creationId xmlns:a16="http://schemas.microsoft.com/office/drawing/2014/main" id="{BBBFA6B9-15E0-2147-906B-1D1848BCD4C2}"/>
+              </a:ext>
+            </a:extLst>
+          </p:cNvPr>
+          <p:cNvSpPr txBox="1"/>
+          <p:nvPr/>
+        </p:nvSpPr>
+        <p:spPr>
+          <a:xfrm rot="16200000">
+            <a:off x="5798559" y="3585583"/>
+            <a:ext cx="2135521" cy="338554"/>
+          </a:xfrm>
+          <a:prstGeom prst="rect">
+            <a:avLst/>
+          </a:prstGeom>
+          <a:noFill/>
+        </p:spPr>
+        <p:txBody>
+          <a:bodyPr wrap="none" rtlCol="0">
+            <a:spAutoFit/>
+          </a:bodyPr>
+          <a:lstStyle/>
+          <a:p>
+            <a:r>
+              <a:rPr lang="en-US" sz="1600" dirty="0">
+                <a:latin typeface="Helvetica" pitchFamily="2" charset="0"/>
+              </a:rPr>
+              <a:t>Area of land-use type</a:t>
+            </a:r>
+          </a:p>
+        </p:txBody>
+      </p:sp>
+      <p:sp>
+        <p:nvSpPr>
+          <p:cNvPr id="55" name="TextBox 54">
+            <a:extLst>
+              <a:ext uri="{FF2B5EF4-FFF2-40B4-BE49-F238E27FC236}">
+                <a16:creationId xmlns:a16="http://schemas.microsoft.com/office/drawing/2014/main" id="{B6990B17-AAAB-7944-BA75-FE4CD512417D}"/>
+              </a:ext>
+            </a:extLst>
+          </p:cNvPr>
+          <p:cNvSpPr txBox="1"/>
+          <p:nvPr/>
+        </p:nvSpPr>
+        <p:spPr>
+          <a:xfrm>
+            <a:off x="1589434" y="5310368"/>
+            <a:ext cx="269602" cy="338554"/>
+          </a:xfrm>
+          <a:prstGeom prst="rect">
+            <a:avLst/>
+          </a:prstGeom>
+          <a:noFill/>
+        </p:spPr>
+        <p:txBody>
+          <a:bodyPr wrap="square" rtlCol="0">
+            <a:spAutoFit/>
+          </a:bodyPr>
+          <a:lstStyle/>
+          <a:p>
+            <a:r>
+              <a:rPr lang="en-US" sz="1600" b="1" dirty="0">
+                <a:latin typeface="Helvetica" pitchFamily="2" charset="0"/>
+              </a:rPr>
+              <a:t>I</a:t>
+            </a:r>
+          </a:p>
+        </p:txBody>
+      </p:sp>
+      <p:sp>
+        <p:nvSpPr>
+          <p:cNvPr id="56" name="TextBox 55">
+            <a:extLst>
+              <a:ext uri="{FF2B5EF4-FFF2-40B4-BE49-F238E27FC236}">
+                <a16:creationId xmlns:a16="http://schemas.microsoft.com/office/drawing/2014/main" id="{F3822F90-0C3C-5C43-9C6D-43A0134D3BAE}"/>
+              </a:ext>
+            </a:extLst>
+          </p:cNvPr>
+          <p:cNvSpPr txBox="1"/>
+          <p:nvPr/>
+        </p:nvSpPr>
+        <p:spPr>
+          <a:xfrm>
+            <a:off x="2186712" y="5281781"/>
+            <a:ext cx="269602" cy="338554"/>
+          </a:xfrm>
+          <a:prstGeom prst="rect">
+            <a:avLst/>
+          </a:prstGeom>
+          <a:noFill/>
+        </p:spPr>
+        <p:txBody>
+          <a:bodyPr wrap="square" rtlCol="0">
+            <a:spAutoFit/>
+          </a:bodyPr>
+          <a:lstStyle/>
+          <a:p>
+            <a:r>
+              <a:rPr lang="en-US" sz="1600" b="1" dirty="0">
+                <a:latin typeface="Helvetica" pitchFamily="2" charset="0"/>
+              </a:rPr>
+              <a:t>A</a:t>
+            </a:r>
+          </a:p>
+        </p:txBody>
+      </p:sp>
+      <p:sp>
+        <p:nvSpPr>
+          <p:cNvPr id="58" name="TextBox 57">
+            <a:extLst>
+              <a:ext uri="{FF2B5EF4-FFF2-40B4-BE49-F238E27FC236}">
+                <a16:creationId xmlns:a16="http://schemas.microsoft.com/office/drawing/2014/main" id="{145D93FB-1D29-B147-B4D5-E4B732A108B7}"/>
+              </a:ext>
+            </a:extLst>
+          </p:cNvPr>
+          <p:cNvSpPr txBox="1"/>
+          <p:nvPr/>
+        </p:nvSpPr>
+        <p:spPr>
+          <a:xfrm>
+            <a:off x="2842468" y="5281781"/>
+            <a:ext cx="322644" cy="338554"/>
+          </a:xfrm>
+          <a:prstGeom prst="rect">
+            <a:avLst/>
+          </a:prstGeom>
+          <a:noFill/>
+        </p:spPr>
+        <p:txBody>
+          <a:bodyPr wrap="square" rtlCol="0">
+            <a:spAutoFit/>
+          </a:bodyPr>
+          <a:lstStyle/>
+          <a:p>
+            <a:r>
+              <a:rPr lang="en-US" sz="1600" b="1" dirty="0">
+                <a:latin typeface="Helvetica" pitchFamily="2" charset="0"/>
+              </a:rPr>
+              <a:t>E</a:t>
+            </a:r>
+          </a:p>
+        </p:txBody>
+      </p:sp>
+      <p:sp>
+        <p:nvSpPr>
+          <p:cNvPr id="59" name="TextBox 58">
+            <a:extLst>
+              <a:ext uri="{FF2B5EF4-FFF2-40B4-BE49-F238E27FC236}">
+                <a16:creationId xmlns:a16="http://schemas.microsoft.com/office/drawing/2014/main" id="{CC8E3A98-12C1-734B-AA47-9B5FEB05BB17}"/>
+              </a:ext>
+            </a:extLst>
+          </p:cNvPr>
+          <p:cNvSpPr txBox="1"/>
+          <p:nvPr/>
+        </p:nvSpPr>
+        <p:spPr>
+          <a:xfrm>
+            <a:off x="3557803" y="5270917"/>
+            <a:ext cx="269602" cy="338554"/>
+          </a:xfrm>
+          <a:prstGeom prst="rect">
+            <a:avLst/>
+          </a:prstGeom>
+          <a:noFill/>
+        </p:spPr>
+        <p:txBody>
+          <a:bodyPr wrap="square" rtlCol="0">
+            <a:spAutoFit/>
+          </a:bodyPr>
+          <a:lstStyle/>
+          <a:p>
+            <a:r>
+              <a:rPr lang="en-US" sz="1600" b="1" dirty="0">
+                <a:latin typeface="Helvetica" pitchFamily="2" charset="0"/>
+              </a:rPr>
+              <a:t>I</a:t>
+            </a:r>
+          </a:p>
+        </p:txBody>
+      </p:sp>
+      <p:sp>
+        <p:nvSpPr>
+          <p:cNvPr id="60" name="TextBox 59">
+            <a:extLst>
+              <a:ext uri="{FF2B5EF4-FFF2-40B4-BE49-F238E27FC236}">
+                <a16:creationId xmlns:a16="http://schemas.microsoft.com/office/drawing/2014/main" id="{8F310E12-AD79-9F46-8257-815B45E9992F}"/>
+              </a:ext>
+            </a:extLst>
+          </p:cNvPr>
+          <p:cNvSpPr txBox="1"/>
+          <p:nvPr/>
+        </p:nvSpPr>
+        <p:spPr>
+          <a:xfrm>
+            <a:off x="4167963" y="5281950"/>
+            <a:ext cx="269602" cy="338554"/>
+          </a:xfrm>
+          <a:prstGeom prst="rect">
+            <a:avLst/>
+          </a:prstGeom>
+          <a:noFill/>
+        </p:spPr>
+        <p:txBody>
+          <a:bodyPr wrap="square" rtlCol="0">
+            <a:spAutoFit/>
+          </a:bodyPr>
+          <a:lstStyle/>
+          <a:p>
+            <a:r>
+              <a:rPr lang="en-US" sz="1600" b="1" dirty="0">
+                <a:latin typeface="Helvetica" pitchFamily="2" charset="0"/>
+              </a:rPr>
+              <a:t>A</a:t>
+            </a:r>
+          </a:p>
+        </p:txBody>
+      </p:sp>
+      <p:sp>
+        <p:nvSpPr>
+          <p:cNvPr id="61" name="TextBox 60">
+            <a:extLst>
+              <a:ext uri="{FF2B5EF4-FFF2-40B4-BE49-F238E27FC236}">
+                <a16:creationId xmlns:a16="http://schemas.microsoft.com/office/drawing/2014/main" id="{0C151820-D749-D745-A35F-CD2C6C51793E}"/>
+              </a:ext>
+            </a:extLst>
+          </p:cNvPr>
+          <p:cNvSpPr txBox="1"/>
+          <p:nvPr/>
+        </p:nvSpPr>
+        <p:spPr>
+          <a:xfrm>
+            <a:off x="4851711" y="5310368"/>
+            <a:ext cx="322644" cy="338554"/>
+          </a:xfrm>
+          <a:prstGeom prst="rect">
+            <a:avLst/>
+          </a:prstGeom>
+          <a:noFill/>
+        </p:spPr>
+        <p:txBody>
+          <a:bodyPr wrap="square" rtlCol="0">
+            <a:spAutoFit/>
+          </a:bodyPr>
+          <a:lstStyle/>
+          <a:p>
+            <a:r>
+              <a:rPr lang="en-US" sz="1600" b="1" dirty="0">
+                <a:latin typeface="Helvetica" pitchFamily="2" charset="0"/>
+              </a:rPr>
+              <a:t>E</a:t>
+            </a:r>
+          </a:p>
+        </p:txBody>
+      </p:sp>
+      <p:sp>
+        <p:nvSpPr>
+          <p:cNvPr id="62" name="TextBox 61">
+            <a:extLst>
+              <a:ext uri="{FF2B5EF4-FFF2-40B4-BE49-F238E27FC236}">
+                <a16:creationId xmlns:a16="http://schemas.microsoft.com/office/drawing/2014/main" id="{A27634BD-FEC2-7D4D-B8C8-C87A656349C3}"/>
+              </a:ext>
+            </a:extLst>
+          </p:cNvPr>
+          <p:cNvSpPr txBox="1"/>
+          <p:nvPr/>
+        </p:nvSpPr>
+        <p:spPr>
+          <a:xfrm>
+            <a:off x="7186048" y="5319122"/>
+            <a:ext cx="269602" cy="338554"/>
+          </a:xfrm>
+          <a:prstGeom prst="rect">
+            <a:avLst/>
+          </a:prstGeom>
+          <a:noFill/>
+        </p:spPr>
+        <p:txBody>
+          <a:bodyPr wrap="square" rtlCol="0">
+            <a:spAutoFit/>
+          </a:bodyPr>
+          <a:lstStyle/>
+          <a:p>
+            <a:r>
+              <a:rPr lang="en-US" sz="1600" b="1" dirty="0">
+                <a:latin typeface="Helvetica" pitchFamily="2" charset="0"/>
+              </a:rPr>
+              <a:t>I</a:t>
+            </a:r>
+          </a:p>
+        </p:txBody>
+      </p:sp>
+      <p:sp>
+        <p:nvSpPr>
+          <p:cNvPr id="63" name="TextBox 62">
+            <a:extLst>
+              <a:ext uri="{FF2B5EF4-FFF2-40B4-BE49-F238E27FC236}">
+                <a16:creationId xmlns:a16="http://schemas.microsoft.com/office/drawing/2014/main" id="{9E66A3B7-2AFA-F14A-9A29-7D503C221532}"/>
+              </a:ext>
+            </a:extLst>
+          </p:cNvPr>
+          <p:cNvSpPr txBox="1"/>
+          <p:nvPr/>
+        </p:nvSpPr>
+        <p:spPr>
+          <a:xfrm>
+            <a:off x="7801890" y="5330311"/>
+            <a:ext cx="269602" cy="338554"/>
+          </a:xfrm>
+          <a:prstGeom prst="rect">
+            <a:avLst/>
+          </a:prstGeom>
+          <a:noFill/>
+        </p:spPr>
+        <p:txBody>
+          <a:bodyPr wrap="square" rtlCol="0">
+            <a:spAutoFit/>
+          </a:bodyPr>
+          <a:lstStyle/>
+          <a:p>
+            <a:r>
+              <a:rPr lang="en-US" sz="1600" b="1" dirty="0">
+                <a:latin typeface="Helvetica" pitchFamily="2" charset="0"/>
+              </a:rPr>
+              <a:t>A</a:t>
+            </a:r>
+          </a:p>
+        </p:txBody>
+      </p:sp>
+      <p:sp>
+        <p:nvSpPr>
+          <p:cNvPr id="64" name="TextBox 63">
+            <a:extLst>
+              <a:ext uri="{FF2B5EF4-FFF2-40B4-BE49-F238E27FC236}">
+                <a16:creationId xmlns:a16="http://schemas.microsoft.com/office/drawing/2014/main" id="{38433828-2AC9-7341-94E8-6DCF7EE9461F}"/>
+              </a:ext>
+            </a:extLst>
+          </p:cNvPr>
+          <p:cNvSpPr txBox="1"/>
+          <p:nvPr/>
+        </p:nvSpPr>
+        <p:spPr>
+          <a:xfrm>
+            <a:off x="8439183" y="5330408"/>
+            <a:ext cx="322644" cy="338554"/>
+          </a:xfrm>
+          <a:prstGeom prst="rect">
+            <a:avLst/>
+          </a:prstGeom>
+          <a:noFill/>
+        </p:spPr>
+        <p:txBody>
+          <a:bodyPr wrap="square" rtlCol="0">
+            <a:spAutoFit/>
+          </a:bodyPr>
+          <a:lstStyle/>
+          <a:p>
+            <a:r>
+              <a:rPr lang="en-US" sz="1600" b="1" dirty="0">
+                <a:latin typeface="Helvetica" pitchFamily="2" charset="0"/>
+              </a:rPr>
+              <a:t>E</a:t>
+            </a:r>
+          </a:p>
+        </p:txBody>
+      </p:sp>
+      <p:sp>
+        <p:nvSpPr>
+          <p:cNvPr id="65" name="TextBox 64">
+            <a:extLst>
+              <a:ext uri="{FF2B5EF4-FFF2-40B4-BE49-F238E27FC236}">
+                <a16:creationId xmlns:a16="http://schemas.microsoft.com/office/drawing/2014/main" id="{54887C08-8E75-EF43-8D89-98BDFD18D734}"/>
+              </a:ext>
+            </a:extLst>
+          </p:cNvPr>
+          <p:cNvSpPr txBox="1"/>
+          <p:nvPr/>
+        </p:nvSpPr>
+        <p:spPr>
+          <a:xfrm>
+            <a:off x="9171697" y="5330311"/>
+            <a:ext cx="269602" cy="338554"/>
+          </a:xfrm>
+          <a:prstGeom prst="rect">
+            <a:avLst/>
+          </a:prstGeom>
+          <a:noFill/>
+        </p:spPr>
+        <p:txBody>
+          <a:bodyPr wrap="square" rtlCol="0">
+            <a:spAutoFit/>
+          </a:bodyPr>
+          <a:lstStyle/>
+          <a:p>
+            <a:r>
+              <a:rPr lang="en-US" sz="1600" b="1" dirty="0">
+                <a:latin typeface="Helvetica" pitchFamily="2" charset="0"/>
+              </a:rPr>
+              <a:t>I</a:t>
+            </a:r>
+          </a:p>
+        </p:txBody>
+      </p:sp>
+      <p:sp>
+        <p:nvSpPr>
+          <p:cNvPr id="66" name="TextBox 65">
+            <a:extLst>
+              <a:ext uri="{FF2B5EF4-FFF2-40B4-BE49-F238E27FC236}">
+                <a16:creationId xmlns:a16="http://schemas.microsoft.com/office/drawing/2014/main" id="{6205082B-002B-0F40-8432-167E01BCAA32}"/>
+              </a:ext>
+            </a:extLst>
+          </p:cNvPr>
+          <p:cNvSpPr txBox="1"/>
+          <p:nvPr/>
+        </p:nvSpPr>
+        <p:spPr>
+          <a:xfrm>
+            <a:off x="9761077" y="5310910"/>
+            <a:ext cx="269602" cy="338554"/>
+          </a:xfrm>
+          <a:prstGeom prst="rect">
+            <a:avLst/>
+          </a:prstGeom>
+          <a:noFill/>
+        </p:spPr>
+        <p:txBody>
+          <a:bodyPr wrap="square" rtlCol="0">
+            <a:spAutoFit/>
+          </a:bodyPr>
+          <a:lstStyle/>
+          <a:p>
+            <a:r>
+              <a:rPr lang="en-US" sz="1600" b="1" dirty="0">
+                <a:latin typeface="Helvetica" pitchFamily="2" charset="0"/>
+              </a:rPr>
+              <a:t>A</a:t>
+            </a:r>
+          </a:p>
+        </p:txBody>
+      </p:sp>
+      <p:sp>
+        <p:nvSpPr>
+          <p:cNvPr id="67" name="TextBox 66">
+            <a:extLst>
+              <a:ext uri="{FF2B5EF4-FFF2-40B4-BE49-F238E27FC236}">
+                <a16:creationId xmlns:a16="http://schemas.microsoft.com/office/drawing/2014/main" id="{8039AC70-A200-F547-923C-265A946A7985}"/>
+              </a:ext>
+            </a:extLst>
+          </p:cNvPr>
+          <p:cNvSpPr txBox="1"/>
+          <p:nvPr/>
+        </p:nvSpPr>
+        <p:spPr>
+          <a:xfrm>
+            <a:off x="10434454" y="5320511"/>
+            <a:ext cx="322644" cy="338554"/>
+          </a:xfrm>
+          <a:prstGeom prst="rect">
+            <a:avLst/>
+          </a:prstGeom>
+          <a:noFill/>
+        </p:spPr>
+        <p:txBody>
+          <a:bodyPr wrap="square" rtlCol="0">
+            <a:spAutoFit/>
+          </a:bodyPr>
+          <a:lstStyle/>
+          <a:p>
+            <a:r>
+              <a:rPr lang="en-US" sz="1600" b="1" dirty="0">
+                <a:latin typeface="Helvetica" pitchFamily="2" charset="0"/>
+              </a:rPr>
+              <a:t>E</a:t>
+            </a:r>
+          </a:p>
+        </p:txBody>
+      </p:sp>
+    </p:spTree>
+    <p:extLst>
+      <p:ext uri="{BB962C8B-B14F-4D97-AF65-F5344CB8AC3E}">
+        <p14:creationId xmlns:p14="http://schemas.microsoft.com/office/powerpoint/2010/main" val="3152759698"/>
+      </p:ext>
+    </p:extLst>
+  </p:cSld>
+  <p:clrMapOvr>
+    <a:masterClrMapping/>
+  </p:clrMapOvr>
+</p:sld>
+</file>
+
+<file path=ppt/slides/slide3.xml><?xml version="1.0" encoding="utf-8"?>
+<p:sld xmlns:a="http://schemas.openxmlformats.org/drawingml/2006/main" xmlns:r="http://schemas.openxmlformats.org/officeDocument/2006/relationships" xmlns:p="http://schemas.openxmlformats.org/presentationml/2006/main">
+  <p:cSld>
+    <p:spTree>
+      <p:nvGrpSpPr>
+        <p:cNvPr id="1" name=""/>
+        <p:cNvGrpSpPr/>
+        <p:nvPr/>
+      </p:nvGrpSpPr>
+      <p:grpSpPr>
+        <a:xfrm>
+          <a:off x="0" y="0"/>
+          <a:ext cx="0" cy="0"/>
+          <a:chOff x="0" y="0"/>
+          <a:chExt cx="0" cy="0"/>
+        </a:xfrm>
+      </p:grpSpPr>
+      <p:sp>
+        <p:nvSpPr>
+          <p:cNvPr id="4" name="Rectangle 3">
+            <a:extLst>
+              <a:ext uri="{FF2B5EF4-FFF2-40B4-BE49-F238E27FC236}">
+                <a16:creationId xmlns:a16="http://schemas.microsoft.com/office/drawing/2014/main" id="{5E09949D-B77A-5B4F-8180-BA6976375034}"/>
+              </a:ext>
+            </a:extLst>
+          </p:cNvPr>
+          <p:cNvSpPr/>
+          <p:nvPr/>
+        </p:nvSpPr>
+        <p:spPr>
+          <a:xfrm>
+            <a:off x="1005606" y="395538"/>
+            <a:ext cx="10224654" cy="646331"/>
+          </a:xfrm>
+          <a:prstGeom prst="rect">
+            <a:avLst/>
+          </a:prstGeom>
+        </p:spPr>
+        <p:txBody>
+          <a:bodyPr wrap="square">
+            <a:spAutoFit/>
+          </a:bodyPr>
+          <a:lstStyle/>
+          <a:p>
+            <a:pPr algn="ctr"/>
+            <a:r>
               <a:rPr lang="en-US" b="1" dirty="0">
                 <a:effectLst/>
                 <a:latin typeface="Helvetica" pitchFamily="2" charset="0"/>
               </a:rPr>
-              <a:t>Are the strength and direction of land-use change different among extensive,</a:t>
+              <a:t>Q2: Are the strength and direction of land-use change different among extensive,</a:t>
             </a:r>
           </a:p>
           <a:p>
@@ -5467,50 +7814,6 @@
       </p:sp>
       <p:cxnSp>
         <p:nvCxnSpPr>
-          <p:cNvPr id="34" name="Straight Connector 33">
-            <a:extLst>
-              <a:ext uri="{FF2B5EF4-FFF2-40B4-BE49-F238E27FC236}">
-                <a16:creationId xmlns:a16="http://schemas.microsoft.com/office/drawing/2014/main" id="{BC084CB1-DE31-2646-8F88-5CEAAE373E89}"/>
-              </a:ext>
-            </a:extLst>
-          </p:cNvPr>
-          <p:cNvCxnSpPr>
-            <a:cxnSpLocks/>
-          </p:cNvCxnSpPr>
-          <p:nvPr/>
-        </p:nvCxnSpPr>
-        <p:spPr>
-          <a:xfrm flipV="1">
-            <a:off x="1466493" y="3875606"/>
-            <a:ext cx="4118052" cy="2"/>
-          </a:xfrm>
-          <a:prstGeom prst="line">
-            <a:avLst/>
-          </a:prstGeom>
-          <a:ln w="19050">
-            <a:solidFill>
-              <a:schemeClr val="tx1"/>
-            </a:solidFill>
-            <a:prstDash val="dash"/>
-          </a:ln>
-        </p:spPr>
-        <p:style>
-          <a:lnRef idx="1">
-            <a:schemeClr val="accent1"/>
-          </a:lnRef>
-          <a:fillRef idx="0">
-            <a:schemeClr val="accent1"/>
-          </a:fillRef>
-          <a:effectRef idx="0">
-            <a:schemeClr val="accent1"/>
-          </a:effectRef>
-          <a:fontRef idx="minor">
-            <a:schemeClr val="tx1"/>
-          </a:fontRef>
-        </p:style>
-      </p:cxnSp>
-      <p:cxnSp>
-        <p:nvCxnSpPr>
           <p:cNvPr id="43" name="Straight Connector 42">
             <a:extLst>
               <a:ext uri="{FF2B5EF4-FFF2-40B4-BE49-F238E27FC236}">
@@ -5568,8 +7871,8 @@
         </p:nvCxnSpPr>
         <p:spPr>
           <a:xfrm flipV="1">
-            <a:off x="1445149" y="3875606"/>
-            <a:ext cx="1842055" cy="3520"/>
+            <a:off x="1445150" y="5048655"/>
+            <a:ext cx="1897145" cy="359925"/>
           </a:xfrm>
           <a:prstGeom prst="line">
             <a:avLst/>
@@ -5610,8 +7913,8 @@
           <p:nvPr/>
         </p:nvSpPr>
         <p:spPr>
-          <a:xfrm rot="19442147">
-            <a:off x="4380404" y="2426922"/>
+          <a:xfrm rot="18730457">
+            <a:off x="4516819" y="2446575"/>
             <a:ext cx="1120954" cy="307777"/>
           </a:xfrm>
           <a:prstGeom prst="rect">
@@ -5743,10 +8046,10 @@
       </p:grpSp>
       <p:cxnSp>
         <p:nvCxnSpPr>
-          <p:cNvPr id="26" name="Straight Connector 25">
-            <a:extLst>
-              <a:ext uri="{FF2B5EF4-FFF2-40B4-BE49-F238E27FC236}">
-                <a16:creationId xmlns:a16="http://schemas.microsoft.com/office/drawing/2014/main" id="{7FE0B7EA-9C05-FC4D-96E6-F6AA450588DC}"/>
+          <p:cNvPr id="37" name="Straight Connector 36">
+            <a:extLst>
+              <a:ext uri="{FF2B5EF4-FFF2-40B4-BE49-F238E27FC236}">
+                <a16:creationId xmlns:a16="http://schemas.microsoft.com/office/drawing/2014/main" id="{0295E786-9DF4-6648-8BA3-8662292B1CE2}"/>
               </a:ext>
             </a:extLst>
           </p:cNvPr>
@@ -5757,52 +8060,8 @@
         </p:nvCxnSpPr>
         <p:spPr>
           <a:xfrm>
-            <a:off x="7091364" y="3875610"/>
-            <a:ext cx="4138896" cy="0"/>
-          </a:xfrm>
-          <a:prstGeom prst="line">
-            <a:avLst/>
-          </a:prstGeom>
-          <a:ln w="19050">
-            <a:solidFill>
-              <a:schemeClr val="tx1"/>
-            </a:solidFill>
-            <a:prstDash val="dash"/>
-          </a:ln>
-        </p:spPr>
-        <p:style>
-          <a:lnRef idx="1">
-            <a:schemeClr val="accent1"/>
-          </a:lnRef>
-          <a:fillRef idx="0">
-            <a:schemeClr val="accent1"/>
-          </a:fillRef>
-          <a:effectRef idx="0">
-            <a:schemeClr val="accent1"/>
-          </a:effectRef>
-          <a:fontRef idx="minor">
-            <a:schemeClr val="tx1"/>
-          </a:fontRef>
-        </p:style>
-      </p:cxnSp>
-      <p:cxnSp>
-        <p:nvCxnSpPr>
-          <p:cNvPr id="37" name="Straight Connector 36">
-            <a:extLst>
-              <a:ext uri="{FF2B5EF4-FFF2-40B4-BE49-F238E27FC236}">
-                <a16:creationId xmlns:a16="http://schemas.microsoft.com/office/drawing/2014/main" id="{0295E786-9DF4-6648-8BA3-8662292B1CE2}"/>
-              </a:ext>
-            </a:extLst>
-          </p:cNvPr>
-          <p:cNvCxnSpPr>
-            <a:cxnSpLocks/>
-          </p:cNvCxnSpPr>
-          <p:nvPr/>
-        </p:nvCxnSpPr>
-        <p:spPr>
-          <a:xfrm>
             <a:off x="3312300" y="2684491"/>
-            <a:ext cx="2164000" cy="395305"/>
+            <a:ext cx="2033916" cy="905015"/>
           </a:xfrm>
           <a:prstGeom prst="line">
             <a:avLst/>
@@ -5930,8 +8189,8 @@
         </p:nvCxnSpPr>
         <p:spPr>
           <a:xfrm flipV="1">
-            <a:off x="3283730" y="2292298"/>
-            <a:ext cx="2215174" cy="1586828"/>
+            <a:off x="3312300" y="2292298"/>
+            <a:ext cx="2186604" cy="2756357"/>
           </a:xfrm>
           <a:prstGeom prst="line">
             <a:avLst/>
@@ -5992,7 +8251,7 @@
                 <a:effectLst/>
                 <a:latin typeface="Helvetica" pitchFamily="2" charset="0"/>
               </a:rPr>
-              <a:t>The strength and direction of land-use change are different for extensive, intensive and abandoned land types at pixel-scale, with a slight decrease in intensive land and a sharp increase in abandoned and extensive land following Soviet Union collapse. For the EU, </a:t>
+              <a:t>The strength and direction of land-use change are different for extensive, intensive and abandoned land types at pixel-scale, with a slight decrease in intensive land and a sharp increase in abandoned and extensive land following SUC. Following EU accession, </a:t>
             </a:r>
             <a:r>
               <a:rPr lang="en-US" sz="1200" dirty="0">
@@ -6443,7 +8702,7 @@
               <a:rPr lang="en-US" sz="1200" dirty="0">
                 <a:latin typeface="Helvetica" pitchFamily="2" charset="0"/>
               </a:rPr>
-              <a:t>Slight decrease in intensive land (as move away from state owned farms with state support)</a:t>
+              <a:t>Decrease in intensive land (as move away from state owned farms with state support)</a:t>
             </a:r>
           </a:p>
           <a:p>
@@ -6531,7 +8790,1830 @@
 </p:sld>
 </file>
 
-<file path=ppt/slides/slide3.xml><?xml version="1.0" encoding="utf-8"?>
+<file path=ppt/slides/slide4.xml><?xml version="1.0" encoding="utf-8"?>
+<p:sld xmlns:a="http://schemas.openxmlformats.org/drawingml/2006/main" xmlns:r="http://schemas.openxmlformats.org/officeDocument/2006/relationships" xmlns:p="http://schemas.openxmlformats.org/presentationml/2006/main">
+  <p:cSld>
+    <p:spTree>
+      <p:nvGrpSpPr>
+        <p:cNvPr id="1" name=""/>
+        <p:cNvGrpSpPr/>
+        <p:nvPr/>
+      </p:nvGrpSpPr>
+      <p:grpSpPr>
+        <a:xfrm>
+          <a:off x="0" y="0"/>
+          <a:ext cx="0" cy="0"/>
+          <a:chOff x="0" y="0"/>
+          <a:chExt cx="0" cy="0"/>
+        </a:xfrm>
+      </p:grpSpPr>
+      <p:sp>
+        <p:nvSpPr>
+          <p:cNvPr id="34" name="TextBox 33">
+            <a:extLst>
+              <a:ext uri="{FF2B5EF4-FFF2-40B4-BE49-F238E27FC236}">
+                <a16:creationId xmlns:a16="http://schemas.microsoft.com/office/drawing/2014/main" id="{4D81AA34-B032-DE48-A1DD-FE518318462F}"/>
+              </a:ext>
+            </a:extLst>
+          </p:cNvPr>
+          <p:cNvSpPr txBox="1"/>
+          <p:nvPr/>
+        </p:nvSpPr>
+        <p:spPr>
+          <a:xfrm>
+            <a:off x="1476135" y="5760533"/>
+            <a:ext cx="3826690" cy="338554"/>
+          </a:xfrm>
+          <a:prstGeom prst="rect">
+            <a:avLst/>
+          </a:prstGeom>
+          <a:noFill/>
+        </p:spPr>
+        <p:txBody>
+          <a:bodyPr wrap="none" rtlCol="0">
+            <a:spAutoFit/>
+          </a:bodyPr>
+          <a:lstStyle/>
+          <a:p>
+            <a:pPr algn="ctr"/>
+            <a:r>
+              <a:rPr lang="en-US" sz="1600" dirty="0">
+                <a:latin typeface="Helvetica" pitchFamily="2" charset="0"/>
+              </a:rPr>
+              <a:t>Following Soviet Union collapse (1991)</a:t>
+            </a:r>
+          </a:p>
+        </p:txBody>
+      </p:sp>
+      <p:sp>
+        <p:nvSpPr>
+          <p:cNvPr id="36" name="TextBox 35">
+            <a:extLst>
+              <a:ext uri="{FF2B5EF4-FFF2-40B4-BE49-F238E27FC236}">
+                <a16:creationId xmlns:a16="http://schemas.microsoft.com/office/drawing/2014/main" id="{B076EDB9-E8BE-AB41-9D02-47AE9746B479}"/>
+              </a:ext>
+            </a:extLst>
+          </p:cNvPr>
+          <p:cNvSpPr txBox="1"/>
+          <p:nvPr/>
+        </p:nvSpPr>
+        <p:spPr>
+          <a:xfrm rot="16200000">
+            <a:off x="-218345" y="3579666"/>
+            <a:ext cx="2906565" cy="338554"/>
+          </a:xfrm>
+          <a:prstGeom prst="rect">
+            <a:avLst/>
+          </a:prstGeom>
+          <a:noFill/>
+        </p:spPr>
+        <p:txBody>
+          <a:bodyPr wrap="none" rtlCol="0">
+            <a:spAutoFit/>
+          </a:bodyPr>
+          <a:lstStyle/>
+          <a:p>
+            <a:r>
+              <a:rPr lang="en-US" sz="1600" dirty="0">
+                <a:latin typeface="Helvetica" pitchFamily="2" charset="0"/>
+              </a:rPr>
+              <a:t>Pixels changing land-use type</a:t>
+            </a:r>
+          </a:p>
+        </p:txBody>
+      </p:sp>
+      <p:grpSp>
+        <p:nvGrpSpPr>
+          <p:cNvPr id="37" name="Group 36">
+            <a:extLst>
+              <a:ext uri="{FF2B5EF4-FFF2-40B4-BE49-F238E27FC236}">
+                <a16:creationId xmlns:a16="http://schemas.microsoft.com/office/drawing/2014/main" id="{0F85885E-3F54-E74A-9FA9-42D8E52F0407}"/>
+              </a:ext>
+            </a:extLst>
+          </p:cNvPr>
+          <p:cNvGrpSpPr/>
+          <p:nvPr/>
+        </p:nvGrpSpPr>
+        <p:grpSpPr>
+          <a:xfrm>
+            <a:off x="1404705" y="1824436"/>
+            <a:ext cx="4138897" cy="3785035"/>
+            <a:chOff x="1363851" y="2433234"/>
+            <a:chExt cx="3813472" cy="3118600"/>
+          </a:xfrm>
+        </p:grpSpPr>
+        <p:cxnSp>
+          <p:nvCxnSpPr>
+            <p:cNvPr id="38" name="Straight Connector 37">
+              <a:extLst>
+                <a:ext uri="{FF2B5EF4-FFF2-40B4-BE49-F238E27FC236}">
+                  <a16:creationId xmlns:a16="http://schemas.microsoft.com/office/drawing/2014/main" id="{37871D27-4288-694D-B60A-B63FB1FCC8B2}"/>
+                </a:ext>
+              </a:extLst>
+            </p:cNvPr>
+            <p:cNvCxnSpPr>
+              <a:cxnSpLocks/>
+            </p:cNvCxnSpPr>
+            <p:nvPr/>
+          </p:nvCxnSpPr>
+          <p:spPr>
+            <a:xfrm>
+              <a:off x="1363851" y="2433234"/>
+              <a:ext cx="0" cy="3112801"/>
+            </a:xfrm>
+            <a:prstGeom prst="line">
+              <a:avLst/>
+            </a:prstGeom>
+            <a:ln>
+              <a:solidFill>
+                <a:schemeClr val="tx1"/>
+              </a:solidFill>
+            </a:ln>
+          </p:spPr>
+          <p:style>
+            <a:lnRef idx="1">
+              <a:schemeClr val="accent1"/>
+            </a:lnRef>
+            <a:fillRef idx="0">
+              <a:schemeClr val="accent1"/>
+            </a:fillRef>
+            <a:effectRef idx="0">
+              <a:schemeClr val="accent1"/>
+            </a:effectRef>
+            <a:fontRef idx="minor">
+              <a:schemeClr val="tx1"/>
+            </a:fontRef>
+          </p:style>
+        </p:cxnSp>
+        <p:cxnSp>
+          <p:nvCxnSpPr>
+            <p:cNvPr id="39" name="Straight Connector 38">
+              <a:extLst>
+                <a:ext uri="{FF2B5EF4-FFF2-40B4-BE49-F238E27FC236}">
+                  <a16:creationId xmlns:a16="http://schemas.microsoft.com/office/drawing/2014/main" id="{021546B5-505D-4843-95F6-B55509A0BBA5}"/>
+                </a:ext>
+              </a:extLst>
+            </p:cNvPr>
+            <p:cNvCxnSpPr>
+              <a:cxnSpLocks/>
+            </p:cNvCxnSpPr>
+            <p:nvPr/>
+          </p:nvCxnSpPr>
+          <p:spPr>
+            <a:xfrm flipH="1" flipV="1">
+              <a:off x="1363852" y="5546035"/>
+              <a:ext cx="3813471" cy="5799"/>
+            </a:xfrm>
+            <a:prstGeom prst="line">
+              <a:avLst/>
+            </a:prstGeom>
+            <a:ln>
+              <a:solidFill>
+                <a:schemeClr val="tx1"/>
+              </a:solidFill>
+            </a:ln>
+          </p:spPr>
+          <p:style>
+            <a:lnRef idx="1">
+              <a:schemeClr val="accent1"/>
+            </a:lnRef>
+            <a:fillRef idx="0">
+              <a:schemeClr val="accent1"/>
+            </a:fillRef>
+            <a:effectRef idx="0">
+              <a:schemeClr val="accent1"/>
+            </a:effectRef>
+            <a:fontRef idx="minor">
+              <a:schemeClr val="tx1"/>
+            </a:fontRef>
+          </p:style>
+        </p:cxnSp>
+      </p:grpSp>
+      <p:sp>
+        <p:nvSpPr>
+          <p:cNvPr id="40" name="Rectangle 39">
+            <a:extLst>
+              <a:ext uri="{FF2B5EF4-FFF2-40B4-BE49-F238E27FC236}">
+                <a16:creationId xmlns:a16="http://schemas.microsoft.com/office/drawing/2014/main" id="{F688FDB4-A320-7647-9D58-19861660A09D}"/>
+              </a:ext>
+            </a:extLst>
+          </p:cNvPr>
+          <p:cNvSpPr/>
+          <p:nvPr/>
+        </p:nvSpPr>
+        <p:spPr>
+          <a:xfrm>
+            <a:off x="1404209" y="5349697"/>
+            <a:ext cx="602002" cy="252736"/>
+          </a:xfrm>
+          <a:prstGeom prst="rect">
+            <a:avLst/>
+          </a:prstGeom>
+          <a:solidFill>
+            <a:srgbClr val="7030A0"/>
+          </a:solidFill>
+        </p:spPr>
+        <p:style>
+          <a:lnRef idx="2">
+            <a:schemeClr val="accent1">
+              <a:shade val="50000"/>
+            </a:schemeClr>
+          </a:lnRef>
+          <a:fillRef idx="1">
+            <a:schemeClr val="accent1"/>
+          </a:fillRef>
+          <a:effectRef idx="0">
+            <a:schemeClr val="accent1"/>
+          </a:effectRef>
+          <a:fontRef idx="minor">
+            <a:schemeClr val="lt1"/>
+          </a:fontRef>
+        </p:style>
+        <p:txBody>
+          <a:bodyPr rtlCol="0" anchor="ctr"/>
+          <a:lstStyle/>
+          <a:p>
+            <a:pPr algn="ctr"/>
+            <a:endParaRPr lang="en-US" dirty="0">
+              <a:solidFill>
+                <a:srgbClr val="7030A0"/>
+              </a:solidFill>
+            </a:endParaRPr>
+          </a:p>
+        </p:txBody>
+      </p:sp>
+      <p:sp>
+        <p:nvSpPr>
+          <p:cNvPr id="41" name="Rectangle 40">
+            <a:extLst>
+              <a:ext uri="{FF2B5EF4-FFF2-40B4-BE49-F238E27FC236}">
+                <a16:creationId xmlns:a16="http://schemas.microsoft.com/office/drawing/2014/main" id="{3737F623-EF28-B146-8ACA-DDC2D4030D9A}"/>
+              </a:ext>
+            </a:extLst>
+          </p:cNvPr>
+          <p:cNvSpPr/>
+          <p:nvPr/>
+        </p:nvSpPr>
+        <p:spPr>
+          <a:xfrm>
+            <a:off x="2078130" y="5349696"/>
+            <a:ext cx="602001" cy="251125"/>
+          </a:xfrm>
+          <a:prstGeom prst="rect">
+            <a:avLst/>
+          </a:prstGeom>
+          <a:solidFill>
+            <a:srgbClr val="7030A0"/>
+          </a:solidFill>
+        </p:spPr>
+        <p:style>
+          <a:lnRef idx="2">
+            <a:schemeClr val="accent1">
+              <a:shade val="50000"/>
+            </a:schemeClr>
+          </a:lnRef>
+          <a:fillRef idx="1">
+            <a:schemeClr val="accent1"/>
+          </a:fillRef>
+          <a:effectRef idx="0">
+            <a:schemeClr val="accent1"/>
+          </a:effectRef>
+          <a:fontRef idx="minor">
+            <a:schemeClr val="lt1"/>
+          </a:fontRef>
+        </p:style>
+        <p:txBody>
+          <a:bodyPr rtlCol="0" anchor="ctr"/>
+          <a:lstStyle/>
+          <a:p>
+            <a:pPr algn="ctr"/>
+            <a:endParaRPr lang="en-US" dirty="0">
+              <a:solidFill>
+                <a:srgbClr val="7030A0"/>
+              </a:solidFill>
+            </a:endParaRPr>
+          </a:p>
+        </p:txBody>
+      </p:sp>
+      <p:sp>
+        <p:nvSpPr>
+          <p:cNvPr id="42" name="Rectangle 41">
+            <a:extLst>
+              <a:ext uri="{FF2B5EF4-FFF2-40B4-BE49-F238E27FC236}">
+                <a16:creationId xmlns:a16="http://schemas.microsoft.com/office/drawing/2014/main" id="{16CF32D0-3D44-E04E-8695-340D3D8A93CB}"/>
+              </a:ext>
+            </a:extLst>
+          </p:cNvPr>
+          <p:cNvSpPr/>
+          <p:nvPr/>
+        </p:nvSpPr>
+        <p:spPr>
+          <a:xfrm>
+            <a:off x="2734745" y="2577830"/>
+            <a:ext cx="602002" cy="3031641"/>
+          </a:xfrm>
+          <a:prstGeom prst="rect">
+            <a:avLst/>
+          </a:prstGeom>
+          <a:solidFill>
+            <a:schemeClr val="accent2">
+              <a:lumMod val="50000"/>
+            </a:schemeClr>
+          </a:solidFill>
+        </p:spPr>
+        <p:style>
+          <a:lnRef idx="2">
+            <a:schemeClr val="accent1">
+              <a:shade val="50000"/>
+            </a:schemeClr>
+          </a:lnRef>
+          <a:fillRef idx="1">
+            <a:schemeClr val="accent1"/>
+          </a:fillRef>
+          <a:effectRef idx="0">
+            <a:schemeClr val="accent1"/>
+          </a:effectRef>
+          <a:fontRef idx="minor">
+            <a:schemeClr val="lt1"/>
+          </a:fontRef>
+        </p:style>
+        <p:txBody>
+          <a:bodyPr rtlCol="0" anchor="ctr"/>
+          <a:lstStyle/>
+          <a:p>
+            <a:pPr algn="ctr"/>
+            <a:endParaRPr lang="en-US" dirty="0">
+              <a:solidFill>
+                <a:srgbClr val="7030A0"/>
+              </a:solidFill>
+            </a:endParaRPr>
+          </a:p>
+        </p:txBody>
+      </p:sp>
+      <p:sp>
+        <p:nvSpPr>
+          <p:cNvPr id="43" name="Rectangle 42">
+            <a:extLst>
+              <a:ext uri="{FF2B5EF4-FFF2-40B4-BE49-F238E27FC236}">
+                <a16:creationId xmlns:a16="http://schemas.microsoft.com/office/drawing/2014/main" id="{E7B3312B-D1ED-7142-808A-5F59210192EA}"/>
+              </a:ext>
+            </a:extLst>
+          </p:cNvPr>
+          <p:cNvSpPr/>
+          <p:nvPr/>
+        </p:nvSpPr>
+        <p:spPr>
+          <a:xfrm>
+            <a:off x="3379245" y="5313239"/>
+            <a:ext cx="602002" cy="287116"/>
+          </a:xfrm>
+          <a:prstGeom prst="rect">
+            <a:avLst/>
+          </a:prstGeom>
+          <a:solidFill>
+            <a:schemeClr val="accent2">
+              <a:lumMod val="50000"/>
+            </a:schemeClr>
+          </a:solidFill>
+        </p:spPr>
+        <p:style>
+          <a:lnRef idx="2">
+            <a:schemeClr val="accent1">
+              <a:shade val="50000"/>
+            </a:schemeClr>
+          </a:lnRef>
+          <a:fillRef idx="1">
+            <a:schemeClr val="accent1"/>
+          </a:fillRef>
+          <a:effectRef idx="0">
+            <a:schemeClr val="accent1"/>
+          </a:effectRef>
+          <a:fontRef idx="minor">
+            <a:schemeClr val="lt1"/>
+          </a:fontRef>
+        </p:style>
+        <p:txBody>
+          <a:bodyPr rtlCol="0" anchor="ctr"/>
+          <a:lstStyle/>
+          <a:p>
+            <a:pPr algn="ctr"/>
+            <a:endParaRPr lang="en-US" dirty="0">
+              <a:solidFill>
+                <a:srgbClr val="7030A0"/>
+              </a:solidFill>
+            </a:endParaRPr>
+          </a:p>
+        </p:txBody>
+      </p:sp>
+      <p:sp>
+        <p:nvSpPr>
+          <p:cNvPr id="44" name="Rectangle 43">
+            <a:extLst>
+              <a:ext uri="{FF2B5EF4-FFF2-40B4-BE49-F238E27FC236}">
+                <a16:creationId xmlns:a16="http://schemas.microsoft.com/office/drawing/2014/main" id="{20092C45-03E4-324A-9B76-768CCD52199C}"/>
+              </a:ext>
+            </a:extLst>
+          </p:cNvPr>
+          <p:cNvSpPr/>
+          <p:nvPr/>
+        </p:nvSpPr>
+        <p:spPr>
+          <a:xfrm>
+            <a:off x="4741252" y="3012482"/>
+            <a:ext cx="602001" cy="2594917"/>
+          </a:xfrm>
+          <a:prstGeom prst="rect">
+            <a:avLst/>
+          </a:prstGeom>
+          <a:solidFill>
+            <a:schemeClr val="accent6">
+              <a:lumMod val="50000"/>
+            </a:schemeClr>
+          </a:solidFill>
+        </p:spPr>
+        <p:style>
+          <a:lnRef idx="2">
+            <a:schemeClr val="accent1">
+              <a:shade val="50000"/>
+            </a:schemeClr>
+          </a:lnRef>
+          <a:fillRef idx="1">
+            <a:schemeClr val="accent1"/>
+          </a:fillRef>
+          <a:effectRef idx="0">
+            <a:schemeClr val="accent1"/>
+          </a:effectRef>
+          <a:fontRef idx="minor">
+            <a:schemeClr val="lt1"/>
+          </a:fontRef>
+        </p:style>
+        <p:txBody>
+          <a:bodyPr rtlCol="0" anchor="ctr"/>
+          <a:lstStyle/>
+          <a:p>
+            <a:pPr algn="ctr"/>
+            <a:endParaRPr lang="en-US" dirty="0">
+              <a:solidFill>
+                <a:srgbClr val="7030A0"/>
+              </a:solidFill>
+            </a:endParaRPr>
+          </a:p>
+        </p:txBody>
+      </p:sp>
+      <p:sp>
+        <p:nvSpPr>
+          <p:cNvPr id="45" name="Rectangle 44">
+            <a:extLst>
+              <a:ext uri="{FF2B5EF4-FFF2-40B4-BE49-F238E27FC236}">
+                <a16:creationId xmlns:a16="http://schemas.microsoft.com/office/drawing/2014/main" id="{FD9C9C0C-8266-9240-84BE-3DEC04D7B398}"/>
+              </a:ext>
+            </a:extLst>
+          </p:cNvPr>
+          <p:cNvSpPr/>
+          <p:nvPr/>
+        </p:nvSpPr>
+        <p:spPr>
+          <a:xfrm>
+            <a:off x="4058392" y="5363772"/>
+            <a:ext cx="602001" cy="237049"/>
+          </a:xfrm>
+          <a:prstGeom prst="rect">
+            <a:avLst/>
+          </a:prstGeom>
+          <a:solidFill>
+            <a:schemeClr val="accent6">
+              <a:lumMod val="50000"/>
+            </a:schemeClr>
+          </a:solidFill>
+        </p:spPr>
+        <p:style>
+          <a:lnRef idx="2">
+            <a:schemeClr val="accent1">
+              <a:shade val="50000"/>
+            </a:schemeClr>
+          </a:lnRef>
+          <a:fillRef idx="1">
+            <a:schemeClr val="accent1"/>
+          </a:fillRef>
+          <a:effectRef idx="0">
+            <a:schemeClr val="accent1"/>
+          </a:effectRef>
+          <a:fontRef idx="minor">
+            <a:schemeClr val="lt1"/>
+          </a:fontRef>
+        </p:style>
+        <p:txBody>
+          <a:bodyPr rtlCol="0" anchor="ctr"/>
+          <a:lstStyle/>
+          <a:p>
+            <a:pPr algn="ctr"/>
+            <a:endParaRPr lang="en-US" dirty="0">
+              <a:solidFill>
+                <a:srgbClr val="7030A0"/>
+              </a:solidFill>
+            </a:endParaRPr>
+          </a:p>
+        </p:txBody>
+      </p:sp>
+      <p:sp>
+        <p:nvSpPr>
+          <p:cNvPr id="46" name="TextBox 45">
+            <a:extLst>
+              <a:ext uri="{FF2B5EF4-FFF2-40B4-BE49-F238E27FC236}">
+                <a16:creationId xmlns:a16="http://schemas.microsoft.com/office/drawing/2014/main" id="{59FEC3B9-C082-624B-9AA1-D5CD05CE264E}"/>
+              </a:ext>
+            </a:extLst>
+          </p:cNvPr>
+          <p:cNvSpPr txBox="1"/>
+          <p:nvPr/>
+        </p:nvSpPr>
+        <p:spPr>
+          <a:xfrm>
+            <a:off x="1414237" y="5321545"/>
+            <a:ext cx="654353" cy="338554"/>
+          </a:xfrm>
+          <a:prstGeom prst="rect">
+            <a:avLst/>
+          </a:prstGeom>
+          <a:noFill/>
+        </p:spPr>
+        <p:txBody>
+          <a:bodyPr wrap="square" rtlCol="0">
+            <a:spAutoFit/>
+          </a:bodyPr>
+          <a:lstStyle/>
+          <a:p>
+            <a:r>
+              <a:rPr lang="en-US" sz="1600" b="1" dirty="0">
+                <a:latin typeface="Helvetica" pitchFamily="2" charset="0"/>
+              </a:rPr>
+              <a:t>E</a:t>
+            </a:r>
+            <a:r>
+              <a:rPr lang="en-US" sz="1600" b="1" dirty="0">
+                <a:latin typeface="Helvetica" pitchFamily="2" charset="0"/>
+                <a:sym typeface="Wingdings" pitchFamily="2" charset="2"/>
+              </a:rPr>
+              <a:t></a:t>
+            </a:r>
+            <a:r>
+              <a:rPr lang="en-US" sz="1600" b="1" dirty="0">
+                <a:latin typeface="Helvetica" pitchFamily="2" charset="0"/>
+              </a:rPr>
+              <a:t>I</a:t>
+            </a:r>
+          </a:p>
+        </p:txBody>
+      </p:sp>
+      <p:sp>
+        <p:nvSpPr>
+          <p:cNvPr id="47" name="TextBox 46">
+            <a:extLst>
+              <a:ext uri="{FF2B5EF4-FFF2-40B4-BE49-F238E27FC236}">
+                <a16:creationId xmlns:a16="http://schemas.microsoft.com/office/drawing/2014/main" id="{BBBBB346-2FCD-6F48-95A1-936F110D4C7F}"/>
+              </a:ext>
+            </a:extLst>
+          </p:cNvPr>
+          <p:cNvSpPr txBox="1"/>
+          <p:nvPr/>
+        </p:nvSpPr>
+        <p:spPr>
+          <a:xfrm>
+            <a:off x="2768479" y="5343472"/>
+            <a:ext cx="652440" cy="338554"/>
+          </a:xfrm>
+          <a:prstGeom prst="rect">
+            <a:avLst/>
+          </a:prstGeom>
+          <a:noFill/>
+        </p:spPr>
+        <p:txBody>
+          <a:bodyPr wrap="square" rtlCol="0">
+            <a:spAutoFit/>
+          </a:bodyPr>
+          <a:lstStyle/>
+          <a:p>
+            <a:r>
+              <a:rPr lang="en-US" sz="1600" b="1" dirty="0">
+                <a:latin typeface="Helvetica" pitchFamily="2" charset="0"/>
+                <a:sym typeface="Wingdings" pitchFamily="2" charset="2"/>
+              </a:rPr>
+              <a:t>I</a:t>
+            </a:r>
+            <a:r>
+              <a:rPr lang="en-US" sz="1600" b="1" dirty="0">
+                <a:latin typeface="Helvetica" pitchFamily="2" charset="0"/>
+              </a:rPr>
+              <a:t>A</a:t>
+            </a:r>
+          </a:p>
+        </p:txBody>
+      </p:sp>
+      <p:sp>
+        <p:nvSpPr>
+          <p:cNvPr id="48" name="TextBox 47">
+            <a:extLst>
+              <a:ext uri="{FF2B5EF4-FFF2-40B4-BE49-F238E27FC236}">
+                <a16:creationId xmlns:a16="http://schemas.microsoft.com/office/drawing/2014/main" id="{9DFDDEEB-4EFE-BC44-82ED-F4FE1D59CC80}"/>
+              </a:ext>
+            </a:extLst>
+          </p:cNvPr>
+          <p:cNvSpPr txBox="1"/>
+          <p:nvPr/>
+        </p:nvSpPr>
+        <p:spPr>
+          <a:xfrm>
+            <a:off x="4032093" y="5352253"/>
+            <a:ext cx="736231" cy="338554"/>
+          </a:xfrm>
+          <a:prstGeom prst="rect">
+            <a:avLst/>
+          </a:prstGeom>
+          <a:noFill/>
+        </p:spPr>
+        <p:txBody>
+          <a:bodyPr wrap="square" rtlCol="0">
+            <a:spAutoFit/>
+          </a:bodyPr>
+          <a:lstStyle/>
+          <a:p>
+            <a:r>
+              <a:rPr lang="en-US" sz="1600" b="1" dirty="0">
+                <a:latin typeface="Helvetica" pitchFamily="2" charset="0"/>
+              </a:rPr>
+              <a:t>A</a:t>
+            </a:r>
+            <a:r>
+              <a:rPr lang="en-US" sz="1600" b="1" dirty="0">
+                <a:latin typeface="Helvetica" pitchFamily="2" charset="0"/>
+                <a:sym typeface="Wingdings" pitchFamily="2" charset="2"/>
+              </a:rPr>
+              <a:t></a:t>
+            </a:r>
+            <a:r>
+              <a:rPr lang="en-US" sz="1600" b="1" dirty="0">
+                <a:latin typeface="Helvetica" pitchFamily="2" charset="0"/>
+              </a:rPr>
+              <a:t>E</a:t>
+            </a:r>
+          </a:p>
+        </p:txBody>
+      </p:sp>
+      <p:sp>
+        <p:nvSpPr>
+          <p:cNvPr id="49" name="TextBox 48">
+            <a:extLst>
+              <a:ext uri="{FF2B5EF4-FFF2-40B4-BE49-F238E27FC236}">
+                <a16:creationId xmlns:a16="http://schemas.microsoft.com/office/drawing/2014/main" id="{6C526193-CB34-4E42-9EDA-3F451DE24906}"/>
+              </a:ext>
+            </a:extLst>
+          </p:cNvPr>
+          <p:cNvSpPr txBox="1"/>
+          <p:nvPr/>
+        </p:nvSpPr>
+        <p:spPr>
+          <a:xfrm>
+            <a:off x="2103967" y="5321545"/>
+            <a:ext cx="793195" cy="338554"/>
+          </a:xfrm>
+          <a:prstGeom prst="rect">
+            <a:avLst/>
+          </a:prstGeom>
+          <a:noFill/>
+        </p:spPr>
+        <p:txBody>
+          <a:bodyPr wrap="square" rtlCol="0">
+            <a:spAutoFit/>
+          </a:bodyPr>
+          <a:lstStyle/>
+          <a:p>
+            <a:r>
+              <a:rPr lang="en-US" sz="1600" b="1" dirty="0">
+                <a:latin typeface="Helvetica" pitchFamily="2" charset="0"/>
+              </a:rPr>
+              <a:t>A</a:t>
+            </a:r>
+            <a:r>
+              <a:rPr lang="en-US" sz="1600" b="1" dirty="0">
+                <a:latin typeface="Helvetica" pitchFamily="2" charset="0"/>
+                <a:sym typeface="Wingdings" pitchFamily="2" charset="2"/>
+              </a:rPr>
+              <a:t></a:t>
+            </a:r>
+            <a:r>
+              <a:rPr lang="en-US" sz="1600" b="1" dirty="0">
+                <a:latin typeface="Helvetica" pitchFamily="2" charset="0"/>
+              </a:rPr>
+              <a:t>I</a:t>
+            </a:r>
+          </a:p>
+        </p:txBody>
+      </p:sp>
+      <p:sp>
+        <p:nvSpPr>
+          <p:cNvPr id="50" name="TextBox 49">
+            <a:extLst>
+              <a:ext uri="{FF2B5EF4-FFF2-40B4-BE49-F238E27FC236}">
+                <a16:creationId xmlns:a16="http://schemas.microsoft.com/office/drawing/2014/main" id="{89FDB35D-940F-FC4D-89CB-03ACE952D7F1}"/>
+              </a:ext>
+            </a:extLst>
+          </p:cNvPr>
+          <p:cNvSpPr txBox="1"/>
+          <p:nvPr/>
+        </p:nvSpPr>
+        <p:spPr>
+          <a:xfrm>
+            <a:off x="3292546" y="5329227"/>
+            <a:ext cx="793195" cy="338554"/>
+          </a:xfrm>
+          <a:prstGeom prst="rect">
+            <a:avLst/>
+          </a:prstGeom>
+          <a:noFill/>
+        </p:spPr>
+        <p:txBody>
+          <a:bodyPr wrap="square" rtlCol="0">
+            <a:spAutoFit/>
+          </a:bodyPr>
+          <a:lstStyle/>
+          <a:p>
+            <a:r>
+              <a:rPr lang="en-US" sz="1600" b="1" dirty="0">
+                <a:latin typeface="Helvetica" pitchFamily="2" charset="0"/>
+              </a:rPr>
+              <a:t>E </a:t>
+            </a:r>
+            <a:r>
+              <a:rPr lang="en-US" sz="1600" b="1" dirty="0">
+                <a:latin typeface="Helvetica" pitchFamily="2" charset="0"/>
+                <a:sym typeface="Wingdings" pitchFamily="2" charset="2"/>
+              </a:rPr>
+              <a:t> </a:t>
+            </a:r>
+            <a:r>
+              <a:rPr lang="en-US" sz="1600" b="1" dirty="0">
+                <a:latin typeface="Helvetica" pitchFamily="2" charset="0"/>
+              </a:rPr>
+              <a:t>A</a:t>
+            </a:r>
+          </a:p>
+        </p:txBody>
+      </p:sp>
+      <p:sp>
+        <p:nvSpPr>
+          <p:cNvPr id="51" name="TextBox 50">
+            <a:extLst>
+              <a:ext uri="{FF2B5EF4-FFF2-40B4-BE49-F238E27FC236}">
+                <a16:creationId xmlns:a16="http://schemas.microsoft.com/office/drawing/2014/main" id="{52AFDDC9-0DAC-C043-9678-FF3F3A8E97D8}"/>
+              </a:ext>
+            </a:extLst>
+          </p:cNvPr>
+          <p:cNvSpPr txBox="1"/>
+          <p:nvPr/>
+        </p:nvSpPr>
+        <p:spPr>
+          <a:xfrm>
+            <a:off x="4736396" y="5366498"/>
+            <a:ext cx="679047" cy="338554"/>
+          </a:xfrm>
+          <a:prstGeom prst="rect">
+            <a:avLst/>
+          </a:prstGeom>
+          <a:noFill/>
+        </p:spPr>
+        <p:txBody>
+          <a:bodyPr wrap="square" rtlCol="0">
+            <a:spAutoFit/>
+          </a:bodyPr>
+          <a:lstStyle/>
+          <a:p>
+            <a:r>
+              <a:rPr lang="en-US" sz="1600" b="1" dirty="0">
+                <a:latin typeface="Helvetica" pitchFamily="2" charset="0"/>
+              </a:rPr>
+              <a:t>I </a:t>
+            </a:r>
+            <a:r>
+              <a:rPr lang="en-US" sz="1600" b="1" dirty="0">
+                <a:latin typeface="Helvetica" pitchFamily="2" charset="0"/>
+                <a:sym typeface="Wingdings" pitchFamily="2" charset="2"/>
+              </a:rPr>
+              <a:t></a:t>
+            </a:r>
+            <a:r>
+              <a:rPr lang="en-US" sz="1600" b="1" dirty="0">
+                <a:latin typeface="Helvetica" pitchFamily="2" charset="0"/>
+              </a:rPr>
+              <a:t>E </a:t>
+            </a:r>
+          </a:p>
+        </p:txBody>
+      </p:sp>
+      <p:sp>
+        <p:nvSpPr>
+          <p:cNvPr id="69" name="TextBox 68">
+            <a:extLst>
+              <a:ext uri="{FF2B5EF4-FFF2-40B4-BE49-F238E27FC236}">
+                <a16:creationId xmlns:a16="http://schemas.microsoft.com/office/drawing/2014/main" id="{BFC0C680-C39D-0746-9930-382A1D48DDDB}"/>
+              </a:ext>
+            </a:extLst>
+          </p:cNvPr>
+          <p:cNvSpPr txBox="1"/>
+          <p:nvPr/>
+        </p:nvSpPr>
+        <p:spPr>
+          <a:xfrm>
+            <a:off x="6939791" y="5811161"/>
+            <a:ext cx="3007555" cy="338554"/>
+          </a:xfrm>
+          <a:prstGeom prst="rect">
+            <a:avLst/>
+          </a:prstGeom>
+          <a:noFill/>
+        </p:spPr>
+        <p:txBody>
+          <a:bodyPr wrap="none" rtlCol="0">
+            <a:spAutoFit/>
+          </a:bodyPr>
+          <a:lstStyle/>
+          <a:p>
+            <a:pPr algn="ctr"/>
+            <a:r>
+              <a:rPr lang="en-US" sz="1600" dirty="0">
+                <a:latin typeface="Helvetica" pitchFamily="2" charset="0"/>
+              </a:rPr>
+              <a:t>Following EU accession (2004)</a:t>
+            </a:r>
+          </a:p>
+        </p:txBody>
+      </p:sp>
+      <p:sp>
+        <p:nvSpPr>
+          <p:cNvPr id="70" name="TextBox 69">
+            <a:extLst>
+              <a:ext uri="{FF2B5EF4-FFF2-40B4-BE49-F238E27FC236}">
+                <a16:creationId xmlns:a16="http://schemas.microsoft.com/office/drawing/2014/main" id="{60FB6DC4-4757-2744-93EC-2A31F0C08847}"/>
+              </a:ext>
+            </a:extLst>
+          </p:cNvPr>
+          <p:cNvSpPr txBox="1"/>
+          <p:nvPr/>
+        </p:nvSpPr>
+        <p:spPr>
+          <a:xfrm rot="16200000">
+            <a:off x="4835741" y="3630294"/>
+            <a:ext cx="2906565" cy="338554"/>
+          </a:xfrm>
+          <a:prstGeom prst="rect">
+            <a:avLst/>
+          </a:prstGeom>
+          <a:noFill/>
+        </p:spPr>
+        <p:txBody>
+          <a:bodyPr wrap="none" rtlCol="0">
+            <a:spAutoFit/>
+          </a:bodyPr>
+          <a:lstStyle/>
+          <a:p>
+            <a:r>
+              <a:rPr lang="en-US" sz="1600" dirty="0">
+                <a:latin typeface="Helvetica" pitchFamily="2" charset="0"/>
+              </a:rPr>
+              <a:t>Pixels changing land-use type</a:t>
+            </a:r>
+          </a:p>
+        </p:txBody>
+      </p:sp>
+      <p:grpSp>
+        <p:nvGrpSpPr>
+          <p:cNvPr id="71" name="Group 70">
+            <a:extLst>
+              <a:ext uri="{FF2B5EF4-FFF2-40B4-BE49-F238E27FC236}">
+                <a16:creationId xmlns:a16="http://schemas.microsoft.com/office/drawing/2014/main" id="{10B0AB38-5A18-2344-9886-7309593A807C}"/>
+              </a:ext>
+            </a:extLst>
+          </p:cNvPr>
+          <p:cNvGrpSpPr/>
+          <p:nvPr/>
+        </p:nvGrpSpPr>
+        <p:grpSpPr>
+          <a:xfrm>
+            <a:off x="6458791" y="1875064"/>
+            <a:ext cx="4138897" cy="3785035"/>
+            <a:chOff x="1363851" y="2433234"/>
+            <a:chExt cx="3813472" cy="3118600"/>
+          </a:xfrm>
+        </p:grpSpPr>
+        <p:cxnSp>
+          <p:nvCxnSpPr>
+            <p:cNvPr id="72" name="Straight Connector 71">
+              <a:extLst>
+                <a:ext uri="{FF2B5EF4-FFF2-40B4-BE49-F238E27FC236}">
+                  <a16:creationId xmlns:a16="http://schemas.microsoft.com/office/drawing/2014/main" id="{3471BB42-ACFF-5741-8C5E-259AA41C079F}"/>
+                </a:ext>
+              </a:extLst>
+            </p:cNvPr>
+            <p:cNvCxnSpPr>
+              <a:cxnSpLocks/>
+            </p:cNvCxnSpPr>
+            <p:nvPr/>
+          </p:nvCxnSpPr>
+          <p:spPr>
+            <a:xfrm>
+              <a:off x="1363851" y="2433234"/>
+              <a:ext cx="0" cy="3112801"/>
+            </a:xfrm>
+            <a:prstGeom prst="line">
+              <a:avLst/>
+            </a:prstGeom>
+            <a:ln>
+              <a:solidFill>
+                <a:schemeClr val="tx1"/>
+              </a:solidFill>
+            </a:ln>
+          </p:spPr>
+          <p:style>
+            <a:lnRef idx="1">
+              <a:schemeClr val="accent1"/>
+            </a:lnRef>
+            <a:fillRef idx="0">
+              <a:schemeClr val="accent1"/>
+            </a:fillRef>
+            <a:effectRef idx="0">
+              <a:schemeClr val="accent1"/>
+            </a:effectRef>
+            <a:fontRef idx="minor">
+              <a:schemeClr val="tx1"/>
+            </a:fontRef>
+          </p:style>
+        </p:cxnSp>
+        <p:cxnSp>
+          <p:nvCxnSpPr>
+            <p:cNvPr id="73" name="Straight Connector 72">
+              <a:extLst>
+                <a:ext uri="{FF2B5EF4-FFF2-40B4-BE49-F238E27FC236}">
+                  <a16:creationId xmlns:a16="http://schemas.microsoft.com/office/drawing/2014/main" id="{3386855A-8146-3C4E-8E0B-8C39DC2FB91C}"/>
+                </a:ext>
+              </a:extLst>
+            </p:cNvPr>
+            <p:cNvCxnSpPr>
+              <a:cxnSpLocks/>
+            </p:cNvCxnSpPr>
+            <p:nvPr/>
+          </p:nvCxnSpPr>
+          <p:spPr>
+            <a:xfrm flipH="1" flipV="1">
+              <a:off x="1363852" y="5546035"/>
+              <a:ext cx="3813471" cy="5799"/>
+            </a:xfrm>
+            <a:prstGeom prst="line">
+              <a:avLst/>
+            </a:prstGeom>
+            <a:ln>
+              <a:solidFill>
+                <a:schemeClr val="tx1"/>
+              </a:solidFill>
+            </a:ln>
+          </p:spPr>
+          <p:style>
+            <a:lnRef idx="1">
+              <a:schemeClr val="accent1"/>
+            </a:lnRef>
+            <a:fillRef idx="0">
+              <a:schemeClr val="accent1"/>
+            </a:fillRef>
+            <a:effectRef idx="0">
+              <a:schemeClr val="accent1"/>
+            </a:effectRef>
+            <a:fontRef idx="minor">
+              <a:schemeClr val="tx1"/>
+            </a:fontRef>
+          </p:style>
+        </p:cxnSp>
+      </p:grpSp>
+      <p:sp>
+        <p:nvSpPr>
+          <p:cNvPr id="74" name="Rectangle 73">
+            <a:extLst>
+              <a:ext uri="{FF2B5EF4-FFF2-40B4-BE49-F238E27FC236}">
+                <a16:creationId xmlns:a16="http://schemas.microsoft.com/office/drawing/2014/main" id="{116FF775-8FB8-A64D-AD90-2104A407FB37}"/>
+              </a:ext>
+            </a:extLst>
+          </p:cNvPr>
+          <p:cNvSpPr/>
+          <p:nvPr/>
+        </p:nvSpPr>
+        <p:spPr>
+          <a:xfrm>
+            <a:off x="6458295" y="3834357"/>
+            <a:ext cx="602002" cy="1818704"/>
+          </a:xfrm>
+          <a:prstGeom prst="rect">
+            <a:avLst/>
+          </a:prstGeom>
+          <a:solidFill>
+            <a:srgbClr val="7030A0"/>
+          </a:solidFill>
+        </p:spPr>
+        <p:style>
+          <a:lnRef idx="2">
+            <a:schemeClr val="accent1">
+              <a:shade val="50000"/>
+            </a:schemeClr>
+          </a:lnRef>
+          <a:fillRef idx="1">
+            <a:schemeClr val="accent1"/>
+          </a:fillRef>
+          <a:effectRef idx="0">
+            <a:schemeClr val="accent1"/>
+          </a:effectRef>
+          <a:fontRef idx="minor">
+            <a:schemeClr val="lt1"/>
+          </a:fontRef>
+        </p:style>
+        <p:txBody>
+          <a:bodyPr rtlCol="0" anchor="ctr"/>
+          <a:lstStyle/>
+          <a:p>
+            <a:pPr algn="ctr"/>
+            <a:endParaRPr lang="en-US" dirty="0">
+              <a:solidFill>
+                <a:srgbClr val="7030A0"/>
+              </a:solidFill>
+            </a:endParaRPr>
+          </a:p>
+        </p:txBody>
+      </p:sp>
+      <p:sp>
+        <p:nvSpPr>
+          <p:cNvPr id="75" name="Rectangle 74">
+            <a:extLst>
+              <a:ext uri="{FF2B5EF4-FFF2-40B4-BE49-F238E27FC236}">
+                <a16:creationId xmlns:a16="http://schemas.microsoft.com/office/drawing/2014/main" id="{0197C841-2029-E441-B401-054F5E7033CA}"/>
+              </a:ext>
+            </a:extLst>
+          </p:cNvPr>
+          <p:cNvSpPr/>
+          <p:nvPr/>
+        </p:nvSpPr>
+        <p:spPr>
+          <a:xfrm>
+            <a:off x="7132216" y="4048366"/>
+            <a:ext cx="602001" cy="1603083"/>
+          </a:xfrm>
+          <a:prstGeom prst="rect">
+            <a:avLst/>
+          </a:prstGeom>
+          <a:solidFill>
+            <a:srgbClr val="7030A0"/>
+          </a:solidFill>
+        </p:spPr>
+        <p:style>
+          <a:lnRef idx="2">
+            <a:schemeClr val="accent1">
+              <a:shade val="50000"/>
+            </a:schemeClr>
+          </a:lnRef>
+          <a:fillRef idx="1">
+            <a:schemeClr val="accent1"/>
+          </a:fillRef>
+          <a:effectRef idx="0">
+            <a:schemeClr val="accent1"/>
+          </a:effectRef>
+          <a:fontRef idx="minor">
+            <a:schemeClr val="lt1"/>
+          </a:fontRef>
+        </p:style>
+        <p:txBody>
+          <a:bodyPr rtlCol="0" anchor="ctr"/>
+          <a:lstStyle/>
+          <a:p>
+            <a:pPr algn="ctr"/>
+            <a:endParaRPr lang="en-US" dirty="0">
+              <a:solidFill>
+                <a:srgbClr val="7030A0"/>
+              </a:solidFill>
+            </a:endParaRPr>
+          </a:p>
+        </p:txBody>
+      </p:sp>
+      <p:sp>
+        <p:nvSpPr>
+          <p:cNvPr id="76" name="Rectangle 75">
+            <a:extLst>
+              <a:ext uri="{FF2B5EF4-FFF2-40B4-BE49-F238E27FC236}">
+                <a16:creationId xmlns:a16="http://schemas.microsoft.com/office/drawing/2014/main" id="{AE6EEAD1-47BD-8D49-9903-56FF6C35C6E8}"/>
+              </a:ext>
+            </a:extLst>
+          </p:cNvPr>
+          <p:cNvSpPr/>
+          <p:nvPr/>
+        </p:nvSpPr>
+        <p:spPr>
+          <a:xfrm>
+            <a:off x="7788831" y="5402881"/>
+            <a:ext cx="602002" cy="257218"/>
+          </a:xfrm>
+          <a:prstGeom prst="rect">
+            <a:avLst/>
+          </a:prstGeom>
+          <a:solidFill>
+            <a:schemeClr val="accent2">
+              <a:lumMod val="50000"/>
+            </a:schemeClr>
+          </a:solidFill>
+        </p:spPr>
+        <p:style>
+          <a:lnRef idx="2">
+            <a:schemeClr val="accent1">
+              <a:shade val="50000"/>
+            </a:schemeClr>
+          </a:lnRef>
+          <a:fillRef idx="1">
+            <a:schemeClr val="accent1"/>
+          </a:fillRef>
+          <a:effectRef idx="0">
+            <a:schemeClr val="accent1"/>
+          </a:effectRef>
+          <a:fontRef idx="minor">
+            <a:schemeClr val="lt1"/>
+          </a:fontRef>
+        </p:style>
+        <p:txBody>
+          <a:bodyPr rtlCol="0" anchor="ctr"/>
+          <a:lstStyle/>
+          <a:p>
+            <a:pPr algn="ctr"/>
+            <a:endParaRPr lang="en-US" dirty="0">
+              <a:solidFill>
+                <a:srgbClr val="7030A0"/>
+              </a:solidFill>
+            </a:endParaRPr>
+          </a:p>
+        </p:txBody>
+      </p:sp>
+      <p:sp>
+        <p:nvSpPr>
+          <p:cNvPr id="77" name="Rectangle 76">
+            <a:extLst>
+              <a:ext uri="{FF2B5EF4-FFF2-40B4-BE49-F238E27FC236}">
+                <a16:creationId xmlns:a16="http://schemas.microsoft.com/office/drawing/2014/main" id="{92A81EE7-996A-A64F-B0B8-E5CC2B7D2B14}"/>
+              </a:ext>
+            </a:extLst>
+          </p:cNvPr>
+          <p:cNvSpPr/>
+          <p:nvPr/>
+        </p:nvSpPr>
+        <p:spPr>
+          <a:xfrm>
+            <a:off x="8433331" y="4328809"/>
+            <a:ext cx="602002" cy="1311287"/>
+          </a:xfrm>
+          <a:prstGeom prst="rect">
+            <a:avLst/>
+          </a:prstGeom>
+          <a:solidFill>
+            <a:schemeClr val="accent2">
+              <a:lumMod val="50000"/>
+            </a:schemeClr>
+          </a:solidFill>
+        </p:spPr>
+        <p:style>
+          <a:lnRef idx="2">
+            <a:schemeClr val="accent1">
+              <a:shade val="50000"/>
+            </a:schemeClr>
+          </a:lnRef>
+          <a:fillRef idx="1">
+            <a:schemeClr val="accent1"/>
+          </a:fillRef>
+          <a:effectRef idx="0">
+            <a:schemeClr val="accent1"/>
+          </a:effectRef>
+          <a:fontRef idx="minor">
+            <a:schemeClr val="lt1"/>
+          </a:fontRef>
+        </p:style>
+        <p:txBody>
+          <a:bodyPr rtlCol="0" anchor="ctr"/>
+          <a:lstStyle/>
+          <a:p>
+            <a:pPr algn="ctr"/>
+            <a:endParaRPr lang="en-US" dirty="0">
+              <a:solidFill>
+                <a:srgbClr val="7030A0"/>
+              </a:solidFill>
+            </a:endParaRPr>
+          </a:p>
+        </p:txBody>
+      </p:sp>
+      <p:sp>
+        <p:nvSpPr>
+          <p:cNvPr id="78" name="Rectangle 77">
+            <a:extLst>
+              <a:ext uri="{FF2B5EF4-FFF2-40B4-BE49-F238E27FC236}">
+                <a16:creationId xmlns:a16="http://schemas.microsoft.com/office/drawing/2014/main" id="{D0382DD6-960A-0F4A-846A-F8D32D05E3E3}"/>
+              </a:ext>
+            </a:extLst>
+          </p:cNvPr>
+          <p:cNvSpPr/>
+          <p:nvPr/>
+        </p:nvSpPr>
+        <p:spPr>
+          <a:xfrm>
+            <a:off x="9795338" y="5438240"/>
+            <a:ext cx="602001" cy="219787"/>
+          </a:xfrm>
+          <a:prstGeom prst="rect">
+            <a:avLst/>
+          </a:prstGeom>
+          <a:solidFill>
+            <a:schemeClr val="accent6">
+              <a:lumMod val="50000"/>
+            </a:schemeClr>
+          </a:solidFill>
+        </p:spPr>
+        <p:style>
+          <a:lnRef idx="2">
+            <a:schemeClr val="accent1">
+              <a:shade val="50000"/>
+            </a:schemeClr>
+          </a:lnRef>
+          <a:fillRef idx="1">
+            <a:schemeClr val="accent1"/>
+          </a:fillRef>
+          <a:effectRef idx="0">
+            <a:schemeClr val="accent1"/>
+          </a:effectRef>
+          <a:fontRef idx="minor">
+            <a:schemeClr val="lt1"/>
+          </a:fontRef>
+        </p:style>
+        <p:txBody>
+          <a:bodyPr rtlCol="0" anchor="ctr"/>
+          <a:lstStyle/>
+          <a:p>
+            <a:pPr algn="ctr"/>
+            <a:endParaRPr lang="en-US" dirty="0">
+              <a:solidFill>
+                <a:srgbClr val="7030A0"/>
+              </a:solidFill>
+            </a:endParaRPr>
+          </a:p>
+        </p:txBody>
+      </p:sp>
+      <p:sp>
+        <p:nvSpPr>
+          <p:cNvPr id="79" name="Rectangle 78">
+            <a:extLst>
+              <a:ext uri="{FF2B5EF4-FFF2-40B4-BE49-F238E27FC236}">
+                <a16:creationId xmlns:a16="http://schemas.microsoft.com/office/drawing/2014/main" id="{31E8DA57-DC9C-4A4C-8A3F-3C18FFA429B6}"/>
+              </a:ext>
+            </a:extLst>
+          </p:cNvPr>
+          <p:cNvSpPr/>
+          <p:nvPr/>
+        </p:nvSpPr>
+        <p:spPr>
+          <a:xfrm>
+            <a:off x="9112478" y="5202226"/>
+            <a:ext cx="602001" cy="449223"/>
+          </a:xfrm>
+          <a:prstGeom prst="rect">
+            <a:avLst/>
+          </a:prstGeom>
+          <a:solidFill>
+            <a:schemeClr val="accent6">
+              <a:lumMod val="50000"/>
+            </a:schemeClr>
+          </a:solidFill>
+        </p:spPr>
+        <p:style>
+          <a:lnRef idx="2">
+            <a:schemeClr val="accent1">
+              <a:shade val="50000"/>
+            </a:schemeClr>
+          </a:lnRef>
+          <a:fillRef idx="1">
+            <a:schemeClr val="accent1"/>
+          </a:fillRef>
+          <a:effectRef idx="0">
+            <a:schemeClr val="accent1"/>
+          </a:effectRef>
+          <a:fontRef idx="minor">
+            <a:schemeClr val="lt1"/>
+          </a:fontRef>
+        </p:style>
+        <p:txBody>
+          <a:bodyPr rtlCol="0" anchor="ctr"/>
+          <a:lstStyle/>
+          <a:p>
+            <a:pPr algn="ctr"/>
+            <a:endParaRPr lang="en-US" dirty="0">
+              <a:solidFill>
+                <a:srgbClr val="7030A0"/>
+              </a:solidFill>
+            </a:endParaRPr>
+          </a:p>
+        </p:txBody>
+      </p:sp>
+      <p:sp>
+        <p:nvSpPr>
+          <p:cNvPr id="80" name="TextBox 79">
+            <a:extLst>
+              <a:ext uri="{FF2B5EF4-FFF2-40B4-BE49-F238E27FC236}">
+                <a16:creationId xmlns:a16="http://schemas.microsoft.com/office/drawing/2014/main" id="{D9E92EA8-31B6-574A-9827-2948BB185218}"/>
+              </a:ext>
+            </a:extLst>
+          </p:cNvPr>
+          <p:cNvSpPr txBox="1"/>
+          <p:nvPr/>
+        </p:nvSpPr>
+        <p:spPr>
+          <a:xfrm>
+            <a:off x="6482451" y="5400324"/>
+            <a:ext cx="654353" cy="338554"/>
+          </a:xfrm>
+          <a:prstGeom prst="rect">
+            <a:avLst/>
+          </a:prstGeom>
+          <a:noFill/>
+        </p:spPr>
+        <p:txBody>
+          <a:bodyPr wrap="square" rtlCol="0">
+            <a:spAutoFit/>
+          </a:bodyPr>
+          <a:lstStyle/>
+          <a:p>
+            <a:r>
+              <a:rPr lang="en-US" sz="1600" b="1" dirty="0">
+                <a:latin typeface="Helvetica" pitchFamily="2" charset="0"/>
+              </a:rPr>
+              <a:t>E</a:t>
+            </a:r>
+            <a:r>
+              <a:rPr lang="en-US" sz="1600" b="1" dirty="0">
+                <a:latin typeface="Helvetica" pitchFamily="2" charset="0"/>
+                <a:sym typeface="Wingdings" pitchFamily="2" charset="2"/>
+              </a:rPr>
+              <a:t></a:t>
+            </a:r>
+            <a:r>
+              <a:rPr lang="en-US" sz="1600" b="1" dirty="0">
+                <a:latin typeface="Helvetica" pitchFamily="2" charset="0"/>
+              </a:rPr>
+              <a:t>I</a:t>
+            </a:r>
+          </a:p>
+        </p:txBody>
+      </p:sp>
+      <p:sp>
+        <p:nvSpPr>
+          <p:cNvPr id="81" name="TextBox 80">
+            <a:extLst>
+              <a:ext uri="{FF2B5EF4-FFF2-40B4-BE49-F238E27FC236}">
+                <a16:creationId xmlns:a16="http://schemas.microsoft.com/office/drawing/2014/main" id="{710FCFF7-518B-FB4C-9AB5-8DC1E977EAC1}"/>
+              </a:ext>
+            </a:extLst>
+          </p:cNvPr>
+          <p:cNvSpPr txBox="1"/>
+          <p:nvPr/>
+        </p:nvSpPr>
+        <p:spPr>
+          <a:xfrm>
+            <a:off x="7822565" y="5394100"/>
+            <a:ext cx="652440" cy="338554"/>
+          </a:xfrm>
+          <a:prstGeom prst="rect">
+            <a:avLst/>
+          </a:prstGeom>
+          <a:noFill/>
+        </p:spPr>
+        <p:txBody>
+          <a:bodyPr wrap="square" rtlCol="0">
+            <a:spAutoFit/>
+          </a:bodyPr>
+          <a:lstStyle/>
+          <a:p>
+            <a:r>
+              <a:rPr lang="en-US" sz="1600" b="1" dirty="0">
+                <a:latin typeface="Helvetica" pitchFamily="2" charset="0"/>
+                <a:sym typeface="Wingdings" pitchFamily="2" charset="2"/>
+              </a:rPr>
+              <a:t>I</a:t>
+            </a:r>
+            <a:r>
+              <a:rPr lang="en-US" sz="1600" b="1" dirty="0">
+                <a:latin typeface="Helvetica" pitchFamily="2" charset="0"/>
+              </a:rPr>
+              <a:t>A</a:t>
+            </a:r>
+          </a:p>
+        </p:txBody>
+      </p:sp>
+      <p:sp>
+        <p:nvSpPr>
+          <p:cNvPr id="82" name="TextBox 81">
+            <a:extLst>
+              <a:ext uri="{FF2B5EF4-FFF2-40B4-BE49-F238E27FC236}">
+                <a16:creationId xmlns:a16="http://schemas.microsoft.com/office/drawing/2014/main" id="{59CC9773-6FB3-5947-A046-D249650CA121}"/>
+              </a:ext>
+            </a:extLst>
+          </p:cNvPr>
+          <p:cNvSpPr txBox="1"/>
+          <p:nvPr/>
+        </p:nvSpPr>
+        <p:spPr>
+          <a:xfrm>
+            <a:off x="9094679" y="5402881"/>
+            <a:ext cx="736231" cy="338554"/>
+          </a:xfrm>
+          <a:prstGeom prst="rect">
+            <a:avLst/>
+          </a:prstGeom>
+          <a:noFill/>
+        </p:spPr>
+        <p:txBody>
+          <a:bodyPr wrap="square" rtlCol="0">
+            <a:spAutoFit/>
+          </a:bodyPr>
+          <a:lstStyle/>
+          <a:p>
+            <a:r>
+              <a:rPr lang="en-US" sz="1600" b="1" dirty="0">
+                <a:latin typeface="Helvetica" pitchFamily="2" charset="0"/>
+              </a:rPr>
+              <a:t>A</a:t>
+            </a:r>
+            <a:r>
+              <a:rPr lang="en-US" sz="1600" b="1" dirty="0">
+                <a:latin typeface="Helvetica" pitchFamily="2" charset="0"/>
+                <a:sym typeface="Wingdings" pitchFamily="2" charset="2"/>
+              </a:rPr>
+              <a:t></a:t>
+            </a:r>
+            <a:r>
+              <a:rPr lang="en-US" sz="1600" b="1" dirty="0">
+                <a:latin typeface="Helvetica" pitchFamily="2" charset="0"/>
+              </a:rPr>
+              <a:t>E</a:t>
+            </a:r>
+          </a:p>
+        </p:txBody>
+      </p:sp>
+      <p:sp>
+        <p:nvSpPr>
+          <p:cNvPr id="83" name="TextBox 82">
+            <a:extLst>
+              <a:ext uri="{FF2B5EF4-FFF2-40B4-BE49-F238E27FC236}">
+                <a16:creationId xmlns:a16="http://schemas.microsoft.com/office/drawing/2014/main" id="{C9A2EF27-75A2-AD4F-AB00-CFF8EFF7BCEE}"/>
+              </a:ext>
+            </a:extLst>
+          </p:cNvPr>
+          <p:cNvSpPr txBox="1"/>
+          <p:nvPr/>
+        </p:nvSpPr>
+        <p:spPr>
+          <a:xfrm>
+            <a:off x="7160463" y="5377814"/>
+            <a:ext cx="793195" cy="338554"/>
+          </a:xfrm>
+          <a:prstGeom prst="rect">
+            <a:avLst/>
+          </a:prstGeom>
+          <a:noFill/>
+        </p:spPr>
+        <p:txBody>
+          <a:bodyPr wrap="square" rtlCol="0">
+            <a:spAutoFit/>
+          </a:bodyPr>
+          <a:lstStyle/>
+          <a:p>
+            <a:r>
+              <a:rPr lang="en-US" sz="1600" b="1" dirty="0">
+                <a:latin typeface="Helvetica" pitchFamily="2" charset="0"/>
+              </a:rPr>
+              <a:t>A</a:t>
+            </a:r>
+            <a:r>
+              <a:rPr lang="en-US" sz="1600" b="1" dirty="0">
+                <a:latin typeface="Helvetica" pitchFamily="2" charset="0"/>
+                <a:sym typeface="Wingdings" pitchFamily="2" charset="2"/>
+              </a:rPr>
+              <a:t></a:t>
+            </a:r>
+            <a:r>
+              <a:rPr lang="en-US" sz="1600" b="1" dirty="0">
+                <a:latin typeface="Helvetica" pitchFamily="2" charset="0"/>
+              </a:rPr>
+              <a:t>I</a:t>
+            </a:r>
+          </a:p>
+        </p:txBody>
+      </p:sp>
+      <p:sp>
+        <p:nvSpPr>
+          <p:cNvPr id="84" name="TextBox 83">
+            <a:extLst>
+              <a:ext uri="{FF2B5EF4-FFF2-40B4-BE49-F238E27FC236}">
+                <a16:creationId xmlns:a16="http://schemas.microsoft.com/office/drawing/2014/main" id="{B47A2D0F-829B-0D4D-BCC4-1AAB054BEDDC}"/>
+              </a:ext>
+            </a:extLst>
+          </p:cNvPr>
+          <p:cNvSpPr txBox="1"/>
+          <p:nvPr/>
+        </p:nvSpPr>
+        <p:spPr>
+          <a:xfrm>
+            <a:off x="8369390" y="5377814"/>
+            <a:ext cx="793195" cy="338554"/>
+          </a:xfrm>
+          <a:prstGeom prst="rect">
+            <a:avLst/>
+          </a:prstGeom>
+          <a:noFill/>
+        </p:spPr>
+        <p:txBody>
+          <a:bodyPr wrap="square" rtlCol="0">
+            <a:spAutoFit/>
+          </a:bodyPr>
+          <a:lstStyle/>
+          <a:p>
+            <a:r>
+              <a:rPr lang="en-US" sz="1600" b="1" dirty="0">
+                <a:latin typeface="Helvetica" pitchFamily="2" charset="0"/>
+              </a:rPr>
+              <a:t>E </a:t>
+            </a:r>
+            <a:r>
+              <a:rPr lang="en-US" sz="1600" b="1" dirty="0">
+                <a:latin typeface="Helvetica" pitchFamily="2" charset="0"/>
+                <a:sym typeface="Wingdings" pitchFamily="2" charset="2"/>
+              </a:rPr>
+              <a:t> </a:t>
+            </a:r>
+            <a:r>
+              <a:rPr lang="en-US" sz="1600" b="1" dirty="0">
+                <a:latin typeface="Helvetica" pitchFamily="2" charset="0"/>
+              </a:rPr>
+              <a:t>A</a:t>
+            </a:r>
+          </a:p>
+        </p:txBody>
+      </p:sp>
+      <p:sp>
+        <p:nvSpPr>
+          <p:cNvPr id="85" name="TextBox 84">
+            <a:extLst>
+              <a:ext uri="{FF2B5EF4-FFF2-40B4-BE49-F238E27FC236}">
+                <a16:creationId xmlns:a16="http://schemas.microsoft.com/office/drawing/2014/main" id="{48A8DF45-837F-474F-B2DC-3382BD53F8C4}"/>
+              </a:ext>
+            </a:extLst>
+          </p:cNvPr>
+          <p:cNvSpPr txBox="1"/>
+          <p:nvPr/>
+        </p:nvSpPr>
+        <p:spPr>
+          <a:xfrm>
+            <a:off x="9790482" y="5417126"/>
+            <a:ext cx="679047" cy="338554"/>
+          </a:xfrm>
+          <a:prstGeom prst="rect">
+            <a:avLst/>
+          </a:prstGeom>
+          <a:noFill/>
+        </p:spPr>
+        <p:txBody>
+          <a:bodyPr wrap="square" rtlCol="0">
+            <a:spAutoFit/>
+          </a:bodyPr>
+          <a:lstStyle/>
+          <a:p>
+            <a:r>
+              <a:rPr lang="en-US" sz="1600" b="1" dirty="0">
+                <a:latin typeface="Helvetica" pitchFamily="2" charset="0"/>
+              </a:rPr>
+              <a:t>I </a:t>
+            </a:r>
+            <a:r>
+              <a:rPr lang="en-US" sz="1600" b="1" dirty="0">
+                <a:latin typeface="Helvetica" pitchFamily="2" charset="0"/>
+                <a:sym typeface="Wingdings" pitchFamily="2" charset="2"/>
+              </a:rPr>
+              <a:t></a:t>
+            </a:r>
+            <a:r>
+              <a:rPr lang="en-US" sz="1600" b="1" dirty="0">
+                <a:latin typeface="Helvetica" pitchFamily="2" charset="0"/>
+              </a:rPr>
+              <a:t>E </a:t>
+            </a:r>
+          </a:p>
+        </p:txBody>
+      </p:sp>
+      <p:sp>
+        <p:nvSpPr>
+          <p:cNvPr id="86" name="TextBox 85">
+            <a:extLst>
+              <a:ext uri="{FF2B5EF4-FFF2-40B4-BE49-F238E27FC236}">
+                <a16:creationId xmlns:a16="http://schemas.microsoft.com/office/drawing/2014/main" id="{9189DB4D-D05F-5345-8F17-B2B510161A30}"/>
+              </a:ext>
+            </a:extLst>
+          </p:cNvPr>
+          <p:cNvSpPr txBox="1"/>
+          <p:nvPr/>
+        </p:nvSpPr>
+        <p:spPr>
+          <a:xfrm>
+            <a:off x="1833320" y="1145959"/>
+            <a:ext cx="3281668" cy="1200329"/>
+          </a:xfrm>
+          <a:prstGeom prst="rect">
+            <a:avLst/>
+          </a:prstGeom>
+          <a:noFill/>
+        </p:spPr>
+        <p:txBody>
+          <a:bodyPr wrap="none" rtlCol="0">
+            <a:spAutoFit/>
+          </a:bodyPr>
+          <a:lstStyle/>
+          <a:p>
+            <a:r>
+              <a:rPr lang="en-US" sz="1200" dirty="0">
+                <a:latin typeface="Arial" panose="020B0604020202020204" pitchFamily="34" charset="0"/>
+                <a:cs typeface="Arial" panose="020B0604020202020204" pitchFamily="34" charset="0"/>
+              </a:rPr>
+              <a:t>Strongest move from intensive to abandoned </a:t>
+            </a:r>
+          </a:p>
+          <a:p>
+            <a:r>
+              <a:rPr lang="en-US" sz="1200" dirty="0">
+                <a:latin typeface="Arial" panose="020B0604020202020204" pitchFamily="34" charset="0"/>
+                <a:cs typeface="Arial" panose="020B0604020202020204" pitchFamily="34" charset="0"/>
+              </a:rPr>
+              <a:t>And intensive to extensive </a:t>
+            </a:r>
+          </a:p>
+          <a:p>
+            <a:endParaRPr lang="en-US" sz="1200" dirty="0">
+              <a:latin typeface="Arial" panose="020B0604020202020204" pitchFamily="34" charset="0"/>
+              <a:cs typeface="Arial" panose="020B0604020202020204" pitchFamily="34" charset="0"/>
+            </a:endParaRPr>
+          </a:p>
+          <a:p>
+            <a:r>
+              <a:rPr lang="en-US" sz="1200" dirty="0">
+                <a:latin typeface="Arial" panose="020B0604020202020204" pitchFamily="34" charset="0"/>
+                <a:cs typeface="Arial" panose="020B0604020202020204" pitchFamily="34" charset="0"/>
+              </a:rPr>
+              <a:t>Could be seen as a more uniform shift? </a:t>
+            </a:r>
+          </a:p>
+          <a:p>
+            <a:endParaRPr lang="en-US" sz="1200" dirty="0">
+              <a:latin typeface="Arial" panose="020B0604020202020204" pitchFamily="34" charset="0"/>
+              <a:cs typeface="Arial" panose="020B0604020202020204" pitchFamily="34" charset="0"/>
+            </a:endParaRPr>
+          </a:p>
+          <a:p>
+            <a:endParaRPr lang="en-US" sz="1200" dirty="0">
+              <a:latin typeface="Arial" panose="020B0604020202020204" pitchFamily="34" charset="0"/>
+              <a:cs typeface="Arial" panose="020B0604020202020204" pitchFamily="34" charset="0"/>
+            </a:endParaRPr>
+          </a:p>
+        </p:txBody>
+      </p:sp>
+      <p:sp>
+        <p:nvSpPr>
+          <p:cNvPr id="87" name="TextBox 86">
+            <a:extLst>
+              <a:ext uri="{FF2B5EF4-FFF2-40B4-BE49-F238E27FC236}">
+                <a16:creationId xmlns:a16="http://schemas.microsoft.com/office/drawing/2014/main" id="{B649DC73-264B-4C43-9FBB-DA1C9B8257CA}"/>
+              </a:ext>
+            </a:extLst>
+          </p:cNvPr>
+          <p:cNvSpPr txBox="1"/>
+          <p:nvPr/>
+        </p:nvSpPr>
+        <p:spPr>
+          <a:xfrm>
+            <a:off x="6814670" y="1644231"/>
+            <a:ext cx="4876656" cy="1200329"/>
+          </a:xfrm>
+          <a:prstGeom prst="rect">
+            <a:avLst/>
+          </a:prstGeom>
+          <a:noFill/>
+        </p:spPr>
+        <p:txBody>
+          <a:bodyPr wrap="none" rtlCol="0">
+            <a:spAutoFit/>
+          </a:bodyPr>
+          <a:lstStyle/>
+          <a:p>
+            <a:r>
+              <a:rPr lang="en-US" sz="1200" dirty="0">
+                <a:latin typeface="Arial" panose="020B0604020202020204" pitchFamily="34" charset="0"/>
+                <a:cs typeface="Arial" panose="020B0604020202020204" pitchFamily="34" charset="0"/>
+              </a:rPr>
+              <a:t>Strongest move from extensive to intensive </a:t>
+            </a:r>
+          </a:p>
+          <a:p>
+            <a:r>
+              <a:rPr lang="en-US" sz="1200" dirty="0">
+                <a:latin typeface="Arial" panose="020B0604020202020204" pitchFamily="34" charset="0"/>
+                <a:cs typeface="Arial" panose="020B0604020202020204" pitchFamily="34" charset="0"/>
+              </a:rPr>
+              <a:t>And abandoned to intensive</a:t>
+            </a:r>
+          </a:p>
+          <a:p>
+            <a:r>
+              <a:rPr lang="en-US" sz="1200" dirty="0">
+                <a:latin typeface="Arial" panose="020B0604020202020204" pitchFamily="34" charset="0"/>
+                <a:cs typeface="Arial" panose="020B0604020202020204" pitchFamily="34" charset="0"/>
+              </a:rPr>
+              <a:t>Slight move from extensive to abandoned (going to work on big farm)</a:t>
+            </a:r>
+          </a:p>
+          <a:p>
+            <a:r>
+              <a:rPr lang="en-US" sz="1200" dirty="0">
+                <a:latin typeface="Arial" panose="020B0604020202020204" pitchFamily="34" charset="0"/>
+                <a:cs typeface="Arial" panose="020B0604020202020204" pitchFamily="34" charset="0"/>
+              </a:rPr>
+              <a:t>And abandoned to extensive as people continue to return to old land </a:t>
+            </a:r>
+          </a:p>
+          <a:p>
+            <a:endParaRPr lang="en-US" sz="1200" dirty="0">
+              <a:latin typeface="Arial" panose="020B0604020202020204" pitchFamily="34" charset="0"/>
+              <a:cs typeface="Arial" panose="020B0604020202020204" pitchFamily="34" charset="0"/>
+            </a:endParaRPr>
+          </a:p>
+          <a:p>
+            <a:r>
+              <a:rPr lang="en-US" sz="1200" dirty="0">
+                <a:latin typeface="Arial" panose="020B0604020202020204" pitchFamily="34" charset="0"/>
+                <a:cs typeface="Arial" panose="020B0604020202020204" pitchFamily="34" charset="0"/>
+              </a:rPr>
+              <a:t>More shifting going on – more complex </a:t>
+            </a:r>
+          </a:p>
+        </p:txBody>
+      </p:sp>
+      <p:sp>
+        <p:nvSpPr>
+          <p:cNvPr id="88" name="TextBox 87">
+            <a:extLst>
+              <a:ext uri="{FF2B5EF4-FFF2-40B4-BE49-F238E27FC236}">
+                <a16:creationId xmlns:a16="http://schemas.microsoft.com/office/drawing/2014/main" id="{CE3D05E0-7BB5-9F45-B8E6-9D1CB209CDCA}"/>
+              </a:ext>
+            </a:extLst>
+          </p:cNvPr>
+          <p:cNvSpPr txBox="1"/>
+          <p:nvPr/>
+        </p:nvSpPr>
+        <p:spPr>
+          <a:xfrm>
+            <a:off x="8011886" y="65314"/>
+            <a:ext cx="3449086" cy="369332"/>
+          </a:xfrm>
+          <a:prstGeom prst="rect">
+            <a:avLst/>
+          </a:prstGeom>
+          <a:noFill/>
+        </p:spPr>
+        <p:txBody>
+          <a:bodyPr wrap="none" rtlCol="0">
+            <a:spAutoFit/>
+          </a:bodyPr>
+          <a:lstStyle/>
+          <a:p>
+            <a:r>
+              <a:rPr lang="en-US" dirty="0"/>
+              <a:t>** could do this as a line graph too</a:t>
+            </a:r>
+          </a:p>
+        </p:txBody>
+      </p:sp>
+    </p:spTree>
+    <p:extLst>
+      <p:ext uri="{BB962C8B-B14F-4D97-AF65-F5344CB8AC3E}">
+        <p14:creationId xmlns:p14="http://schemas.microsoft.com/office/powerpoint/2010/main" val="477376759"/>
+      </p:ext>
+    </p:extLst>
+  </p:cSld>
+  <p:clrMapOvr>
+    <a:masterClrMapping/>
+  </p:clrMapOvr>
+</p:sld>
+</file>
+
+<file path=ppt/slides/slide5.xml><?xml version="1.0" encoding="utf-8"?>
 <p:sld xmlns:a="http://schemas.openxmlformats.org/drawingml/2006/main" xmlns:r="http://schemas.openxmlformats.org/officeDocument/2006/relationships" xmlns:p="http://schemas.openxmlformats.org/presentationml/2006/main">
   <p:cSld>
     <p:spTree>
@@ -6928,50 +11010,6 @@
       </p:sp>
       <p:cxnSp>
         <p:nvCxnSpPr>
-          <p:cNvPr id="34" name="Straight Connector 33">
-            <a:extLst>
-              <a:ext uri="{FF2B5EF4-FFF2-40B4-BE49-F238E27FC236}">
-                <a16:creationId xmlns:a16="http://schemas.microsoft.com/office/drawing/2014/main" id="{BC084CB1-DE31-2646-8F88-5CEAAE373E89}"/>
-              </a:ext>
-            </a:extLst>
-          </p:cNvPr>
-          <p:cNvCxnSpPr>
-            <a:cxnSpLocks/>
-          </p:cNvCxnSpPr>
-          <p:nvPr/>
-        </p:nvCxnSpPr>
-        <p:spPr>
-          <a:xfrm flipV="1">
-            <a:off x="1466493" y="3875606"/>
-            <a:ext cx="4118052" cy="2"/>
-          </a:xfrm>
-          <a:prstGeom prst="line">
-            <a:avLst/>
-          </a:prstGeom>
-          <a:ln w="19050">
-            <a:solidFill>
-              <a:schemeClr val="tx1"/>
-            </a:solidFill>
-            <a:prstDash val="dash"/>
-          </a:ln>
-        </p:spPr>
-        <p:style>
-          <a:lnRef idx="1">
-            <a:schemeClr val="accent1"/>
-          </a:lnRef>
-          <a:fillRef idx="0">
-            <a:schemeClr val="accent1"/>
-          </a:fillRef>
-          <a:effectRef idx="0">
-            <a:schemeClr val="accent1"/>
-          </a:effectRef>
-          <a:fontRef idx="minor">
-            <a:schemeClr val="tx1"/>
-          </a:fontRef>
-        </p:style>
-      </p:cxnSp>
-      <p:cxnSp>
-        <p:nvCxnSpPr>
           <p:cNvPr id="43" name="Straight Connector 42">
             <a:extLst>
               <a:ext uri="{FF2B5EF4-FFF2-40B4-BE49-F238E27FC236}">
@@ -7029,8 +11067,8 @@
         </p:nvCxnSpPr>
         <p:spPr>
           <a:xfrm flipV="1">
-            <a:off x="1445149" y="3875606"/>
-            <a:ext cx="1842055" cy="3520"/>
+            <a:off x="1445150" y="5048655"/>
+            <a:ext cx="1882141" cy="418291"/>
           </a:xfrm>
           <a:prstGeom prst="line">
             <a:avLst/>
@@ -7204,10 +11242,10 @@
       </p:grpSp>
       <p:cxnSp>
         <p:nvCxnSpPr>
-          <p:cNvPr id="26" name="Straight Connector 25">
-            <a:extLst>
-              <a:ext uri="{FF2B5EF4-FFF2-40B4-BE49-F238E27FC236}">
-                <a16:creationId xmlns:a16="http://schemas.microsoft.com/office/drawing/2014/main" id="{7FE0B7EA-9C05-FC4D-96E6-F6AA450588DC}"/>
+          <p:cNvPr id="37" name="Straight Connector 36">
+            <a:extLst>
+              <a:ext uri="{FF2B5EF4-FFF2-40B4-BE49-F238E27FC236}">
+                <a16:creationId xmlns:a16="http://schemas.microsoft.com/office/drawing/2014/main" id="{0295E786-9DF4-6648-8BA3-8662292B1CE2}"/>
               </a:ext>
             </a:extLst>
           </p:cNvPr>
@@ -7218,52 +11256,8 @@
         </p:nvCxnSpPr>
         <p:spPr>
           <a:xfrm>
-            <a:off x="7091364" y="3875610"/>
-            <a:ext cx="4138896" cy="0"/>
-          </a:xfrm>
-          <a:prstGeom prst="line">
-            <a:avLst/>
-          </a:prstGeom>
-          <a:ln w="19050">
-            <a:solidFill>
-              <a:schemeClr val="tx1"/>
-            </a:solidFill>
-            <a:prstDash val="dash"/>
-          </a:ln>
-        </p:spPr>
-        <p:style>
-          <a:lnRef idx="1">
-            <a:schemeClr val="accent1"/>
-          </a:lnRef>
-          <a:fillRef idx="0">
-            <a:schemeClr val="accent1"/>
-          </a:fillRef>
-          <a:effectRef idx="0">
-            <a:schemeClr val="accent1"/>
-          </a:effectRef>
-          <a:fontRef idx="minor">
-            <a:schemeClr val="tx1"/>
-          </a:fontRef>
-        </p:style>
-      </p:cxnSp>
-      <p:cxnSp>
-        <p:nvCxnSpPr>
-          <p:cNvPr id="37" name="Straight Connector 36">
-            <a:extLst>
-              <a:ext uri="{FF2B5EF4-FFF2-40B4-BE49-F238E27FC236}">
-                <a16:creationId xmlns:a16="http://schemas.microsoft.com/office/drawing/2014/main" id="{0295E786-9DF4-6648-8BA3-8662292B1CE2}"/>
-              </a:ext>
-            </a:extLst>
-          </p:cNvPr>
-          <p:cNvCxnSpPr>
-            <a:cxnSpLocks/>
-          </p:cNvCxnSpPr>
-          <p:nvPr/>
-        </p:nvCxnSpPr>
-        <p:spPr>
-          <a:xfrm>
             <a:off x="3312300" y="2684491"/>
-            <a:ext cx="2164000" cy="395305"/>
+            <a:ext cx="2015219" cy="886023"/>
           </a:xfrm>
           <a:prstGeom prst="line">
             <a:avLst/>
@@ -7391,8 +11385,8 @@
         </p:nvCxnSpPr>
         <p:spPr>
           <a:xfrm flipV="1">
-            <a:off x="3283730" y="2292298"/>
-            <a:ext cx="2215174" cy="1586828"/>
+            <a:off x="3312300" y="2292298"/>
+            <a:ext cx="2186604" cy="2756357"/>
           </a:xfrm>
           <a:prstGeom prst="line">
             <a:avLst/>
@@ -7844,8 +11838,8 @@
         </p:nvSpPr>
         <p:spPr>
           <a:xfrm>
-            <a:off x="1459910" y="4444162"/>
-            <a:ext cx="3867609" cy="1569660"/>
+            <a:off x="1459910" y="4358777"/>
+            <a:ext cx="3867609" cy="1754326"/>
           </a:xfrm>
           <a:prstGeom prst="rect">
             <a:avLst/>
@@ -7872,7 +11866,7 @@
               <a:rPr lang="en-US" sz="1200" dirty="0">
                 <a:latin typeface="Helvetica" pitchFamily="2" charset="0"/>
               </a:rPr>
-              <a:t>Lag in extensive land-use change (as people returned to old practices)</a:t>
+              <a:t>Lag in extensive land-use change (as people returned to old practices) – Intensive to extensive</a:t>
             </a:r>
           </a:p>
           <a:p>
@@ -7888,7 +11882,7 @@
               <a:rPr lang="en-US" sz="1200" dirty="0">
                 <a:latin typeface="Helvetica" pitchFamily="2" charset="0"/>
               </a:rPr>
-              <a:t>intensive land-use change (not dramatic change and loss of tools from government)</a:t>
+              <a:t>intensive land-use change (loss of support and tools from government)</a:t>
             </a:r>
             <a:r>
               <a:rPr lang="en-US" sz="1200" dirty="0">
@@ -7897,6 +11891,16 @@
               </a:rPr>
               <a:t> </a:t>
             </a:r>
+            <a:r>
+              <a:rPr lang="en-US" sz="1200" dirty="0">
+                <a:latin typeface="Helvetica" pitchFamily="2" charset="0"/>
+              </a:rPr>
+              <a:t>– intensive to abandoned and extensive</a:t>
+            </a:r>
+            <a:endParaRPr lang="en-US" sz="1200" dirty="0">
+              <a:effectLst/>
+              <a:latin typeface="Helvetica" pitchFamily="2" charset="0"/>
+            </a:endParaRPr>
           </a:p>
           <a:p>
             <a:pPr algn="ctr"/>
@@ -7927,8 +11931,8 @@
         </p:nvSpPr>
         <p:spPr>
           <a:xfrm>
-            <a:off x="7098160" y="4538126"/>
-            <a:ext cx="4303591" cy="1384995"/>
+            <a:off x="7091363" y="4137906"/>
+            <a:ext cx="4303591" cy="1754326"/>
           </a:xfrm>
           <a:prstGeom prst="rect">
             <a:avLst/>
@@ -7961,7 +11965,7 @@
               <a:rPr lang="en-US" sz="1200" dirty="0">
                 <a:latin typeface="Helvetica" pitchFamily="2" charset="0"/>
               </a:rPr>
-              <a:t>No lag for extensive land-use change (people shift to larger farms supported by EU)</a:t>
+              <a:t>No lag for extensive land-use change (people shift to larger farms supported by EU) – Extensive to intensive and abandoned</a:t>
             </a:r>
           </a:p>
           <a:p>
@@ -7970,7 +11974,7 @@
               <a:rPr lang="en-US" sz="1200" dirty="0">
                 <a:latin typeface="Helvetica" pitchFamily="2" charset="0"/>
               </a:rPr>
-              <a:t>No lag for intensive land-use change (larger, more intensive farms better supported by EU)</a:t>
+              <a:t>No lag for intensive land-use change (larger, more intensive farms better supported by EU) – No transition really from intensive to other land-use types//dominant land-use</a:t>
             </a:r>
           </a:p>
           <a:p>
@@ -8161,86 +12165,6 @@
     <p:extLst>
       <p:ext uri="{BB962C8B-B14F-4D97-AF65-F5344CB8AC3E}">
         <p14:creationId xmlns:p14="http://schemas.microsoft.com/office/powerpoint/2010/main" val="2873355140"/>
-      </p:ext>
-    </p:extLst>
-  </p:cSld>
-  <p:clrMapOvr>
-    <a:masterClrMapping/>
-  </p:clrMapOvr>
-</p:sld>
-</file>
-
-<file path=ppt/slides/slide4.xml><?xml version="1.0" encoding="utf-8"?>
-<p:sld xmlns:a="http://schemas.openxmlformats.org/drawingml/2006/main" xmlns:r="http://schemas.openxmlformats.org/officeDocument/2006/relationships" xmlns:p="http://schemas.openxmlformats.org/presentationml/2006/main">
-  <p:cSld>
-    <p:spTree>
-      <p:nvGrpSpPr>
-        <p:cNvPr id="1" name=""/>
-        <p:cNvGrpSpPr/>
-        <p:nvPr/>
-      </p:nvGrpSpPr>
-      <p:grpSpPr>
-        <a:xfrm>
-          <a:off x="0" y="0"/>
-          <a:ext cx="0" cy="0"/>
-          <a:chOff x="0" y="0"/>
-          <a:chExt cx="0" cy="0"/>
-        </a:xfrm>
-      </p:grpSpPr>
-      <p:sp>
-        <p:nvSpPr>
-          <p:cNvPr id="3" name="Content Placeholder 2">
-            <a:extLst>
-              <a:ext uri="{FF2B5EF4-FFF2-40B4-BE49-F238E27FC236}">
-                <a16:creationId xmlns:a16="http://schemas.microsoft.com/office/drawing/2014/main" id="{38C21521-7A55-D74C-AF9C-38ECE194FECF}"/>
-              </a:ext>
-            </a:extLst>
-          </p:cNvPr>
-          <p:cNvSpPr>
-            <a:spLocks noGrp="1"/>
-          </p:cNvSpPr>
-          <p:nvPr>
-            <p:ph idx="1"/>
-          </p:nvPr>
-        </p:nvSpPr>
-        <p:spPr>
-          <a:xfrm>
-            <a:off x="902825" y="1562581"/>
-            <a:ext cx="10590835" cy="4614381"/>
-          </a:xfrm>
-        </p:spPr>
-        <p:txBody>
-          <a:bodyPr/>
-          <a:lstStyle/>
-          <a:p>
-            <a:r>
-              <a:rPr lang="en-US" dirty="0"/>
-              <a:t>Add null hypotheses, alternate hypotheses </a:t>
-            </a:r>
-            <a:r>
-              <a:rPr lang="en-US" dirty="0" err="1"/>
-              <a:t>etc</a:t>
-            </a:r>
-            <a:r>
-              <a:rPr lang="en-US" dirty="0"/>
-              <a:t> </a:t>
-            </a:r>
-          </a:p>
-          <a:p>
-            <a:r>
-              <a:rPr lang="en-US" dirty="0"/>
-              <a:t>For each question and sub question </a:t>
-            </a:r>
-          </a:p>
-          <a:p>
-            <a:endParaRPr lang="en-US" dirty="0"/>
-          </a:p>
-        </p:txBody>
-      </p:sp>
-    </p:spTree>
-    <p:extLst>
-      <p:ext uri="{BB962C8B-B14F-4D97-AF65-F5344CB8AC3E}">
-        <p14:creationId xmlns:p14="http://schemas.microsoft.com/office/powerpoint/2010/main" val="2766066670"/>
       </p:ext>
     </p:extLst>
   </p:cSld>

</xml_diff>

<commit_message>
Izzy is finishing her dissertation
</commit_message>
<xml_diff>
--- a/images/prediction_graphs.pptx
+++ b/images/prediction_graphs.pptx
@@ -213,7 +213,7 @@
           <a:p>
             <a:fld id="{B3983048-CB06-4E44-9303-08BA1CBDE2ED}" type="datetimeFigureOut">
               <a:rPr lang="en-US" smtClean="0"/>
-              <a:t>3/22/19</a:t>
+              <a:t>4/22/19</a:t>
             </a:fld>
             <a:endParaRPr lang="en-US"/>
           </a:p>
@@ -1135,7 +1135,7 @@
           <a:p>
             <a:fld id="{CF1B88E2-74B9-C74C-93C7-A1E2B177FB07}" type="datetimeFigureOut">
               <a:rPr lang="en-US" smtClean="0"/>
-              <a:t>3/22/19</a:t>
+              <a:t>4/22/19</a:t>
             </a:fld>
             <a:endParaRPr lang="en-US"/>
           </a:p>
@@ -1333,7 +1333,7 @@
           <a:p>
             <a:fld id="{CF1B88E2-74B9-C74C-93C7-A1E2B177FB07}" type="datetimeFigureOut">
               <a:rPr lang="en-US" smtClean="0"/>
-              <a:t>3/22/19</a:t>
+              <a:t>4/22/19</a:t>
             </a:fld>
             <a:endParaRPr lang="en-US"/>
           </a:p>
@@ -1541,7 +1541,7 @@
           <a:p>
             <a:fld id="{CF1B88E2-74B9-C74C-93C7-A1E2B177FB07}" type="datetimeFigureOut">
               <a:rPr lang="en-US" smtClean="0"/>
-              <a:t>3/22/19</a:t>
+              <a:t>4/22/19</a:t>
             </a:fld>
             <a:endParaRPr lang="en-US"/>
           </a:p>
@@ -1739,7 +1739,7 @@
           <a:p>
             <a:fld id="{CF1B88E2-74B9-C74C-93C7-A1E2B177FB07}" type="datetimeFigureOut">
               <a:rPr lang="en-US" smtClean="0"/>
-              <a:t>3/22/19</a:t>
+              <a:t>4/22/19</a:t>
             </a:fld>
             <a:endParaRPr lang="en-US"/>
           </a:p>
@@ -2014,7 +2014,7 @@
           <a:p>
             <a:fld id="{CF1B88E2-74B9-C74C-93C7-A1E2B177FB07}" type="datetimeFigureOut">
               <a:rPr lang="en-US" smtClean="0"/>
-              <a:t>3/22/19</a:t>
+              <a:t>4/22/19</a:t>
             </a:fld>
             <a:endParaRPr lang="en-US"/>
           </a:p>
@@ -2279,7 +2279,7 @@
           <a:p>
             <a:fld id="{CF1B88E2-74B9-C74C-93C7-A1E2B177FB07}" type="datetimeFigureOut">
               <a:rPr lang="en-US" smtClean="0"/>
-              <a:t>3/22/19</a:t>
+              <a:t>4/22/19</a:t>
             </a:fld>
             <a:endParaRPr lang="en-US"/>
           </a:p>
@@ -2691,7 +2691,7 @@
           <a:p>
             <a:fld id="{CF1B88E2-74B9-C74C-93C7-A1E2B177FB07}" type="datetimeFigureOut">
               <a:rPr lang="en-US" smtClean="0"/>
-              <a:t>3/22/19</a:t>
+              <a:t>4/22/19</a:t>
             </a:fld>
             <a:endParaRPr lang="en-US"/>
           </a:p>
@@ -2832,7 +2832,7 @@
           <a:p>
             <a:fld id="{CF1B88E2-74B9-C74C-93C7-A1E2B177FB07}" type="datetimeFigureOut">
               <a:rPr lang="en-US" smtClean="0"/>
-              <a:t>3/22/19</a:t>
+              <a:t>4/22/19</a:t>
             </a:fld>
             <a:endParaRPr lang="en-US"/>
           </a:p>
@@ -2945,7 +2945,7 @@
           <a:p>
             <a:fld id="{CF1B88E2-74B9-C74C-93C7-A1E2B177FB07}" type="datetimeFigureOut">
               <a:rPr lang="en-US" smtClean="0"/>
-              <a:t>3/22/19</a:t>
+              <a:t>4/22/19</a:t>
             </a:fld>
             <a:endParaRPr lang="en-US"/>
           </a:p>
@@ -3256,7 +3256,7 @@
           <a:p>
             <a:fld id="{CF1B88E2-74B9-C74C-93C7-A1E2B177FB07}" type="datetimeFigureOut">
               <a:rPr lang="en-US" smtClean="0"/>
-              <a:t>3/22/19</a:t>
+              <a:t>4/22/19</a:t>
             </a:fld>
             <a:endParaRPr lang="en-US"/>
           </a:p>
@@ -3544,7 +3544,7 @@
           <a:p>
             <a:fld id="{CF1B88E2-74B9-C74C-93C7-A1E2B177FB07}" type="datetimeFigureOut">
               <a:rPr lang="en-US" smtClean="0"/>
-              <a:t>3/22/19</a:t>
+              <a:t>4/22/19</a:t>
             </a:fld>
             <a:endParaRPr lang="en-US"/>
           </a:p>
@@ -3785,7 +3785,7 @@
           <a:p>
             <a:fld id="{CF1B88E2-74B9-C74C-93C7-A1E2B177FB07}" type="datetimeFigureOut">
               <a:rPr lang="en-US" smtClean="0"/>
-              <a:t>3/22/19</a:t>
+              <a:t>4/22/19</a:t>
             </a:fld>
             <a:endParaRPr lang="en-US"/>
           </a:p>
@@ -5664,8 +5664,8 @@
         </p:nvSpPr>
         <p:spPr>
           <a:xfrm rot="16200000">
-            <a:off x="167173" y="3579666"/>
-            <a:ext cx="2135521" cy="338554"/>
+            <a:off x="-105337" y="3579666"/>
+            <a:ext cx="2680542" cy="338554"/>
           </a:xfrm>
           <a:prstGeom prst="rect">
             <a:avLst/>
@@ -5682,7 +5682,19 @@
               <a:rPr lang="en-US" sz="1600" dirty="0">
                 <a:latin typeface="Helvetica" pitchFamily="2" charset="0"/>
               </a:rPr>
-              <a:t>Area of land-use type</a:t>
+              <a:t>Area of land-use type (km</a:t>
+            </a:r>
+            <a:r>
+              <a:rPr lang="en-US" sz="1600" baseline="30000" dirty="0">
+                <a:latin typeface="Helvetica" pitchFamily="2" charset="0"/>
+              </a:rPr>
+              <a:t>2</a:t>
+            </a:r>
+            <a:r>
+              <a:rPr lang="en-US" sz="1600" dirty="0">
+                <a:latin typeface="Helvetica" pitchFamily="2" charset="0"/>
+              </a:rPr>
+              <a:t>)</a:t>
             </a:r>
           </a:p>
         </p:txBody>
@@ -6889,8 +6901,8 @@
         </p:nvSpPr>
         <p:spPr>
           <a:xfrm rot="16200000">
-            <a:off x="5798559" y="3585583"/>
-            <a:ext cx="2135521" cy="338554"/>
+            <a:off x="5526049" y="3585583"/>
+            <a:ext cx="2680542" cy="338554"/>
           </a:xfrm>
           <a:prstGeom prst="rect">
             <a:avLst/>
@@ -6907,7 +6919,19 @@
               <a:rPr lang="en-US" sz="1600" dirty="0">
                 <a:latin typeface="Helvetica" pitchFamily="2" charset="0"/>
               </a:rPr>
-              <a:t>Area of land-use type</a:t>
+              <a:t>Area of land-use type (km</a:t>
+            </a:r>
+            <a:r>
+              <a:rPr lang="en-US" sz="1600" baseline="30000" dirty="0">
+                <a:latin typeface="Helvetica" pitchFamily="2" charset="0"/>
+              </a:rPr>
+              <a:t>2</a:t>
+            </a:r>
+            <a:r>
+              <a:rPr lang="en-US" sz="1600" dirty="0">
+                <a:latin typeface="Helvetica" pitchFamily="2" charset="0"/>
+              </a:rPr>
+              <a:t>)</a:t>
             </a:r>
           </a:p>
         </p:txBody>
@@ -10827,7 +10851,7 @@
         </p:nvCxnSpPr>
         <p:spPr>
           <a:xfrm>
-            <a:off x="3312300" y="5665673"/>
+            <a:off x="3327291" y="5665673"/>
             <a:ext cx="0" cy="281899"/>
           </a:xfrm>
           <a:prstGeom prst="line">
@@ -10899,43 +10923,6 @@
       </p:cxnSp>
       <p:sp>
         <p:nvSpPr>
-          <p:cNvPr id="28" name="TextBox 27">
-            <a:extLst>
-              <a:ext uri="{FF2B5EF4-FFF2-40B4-BE49-F238E27FC236}">
-                <a16:creationId xmlns:a16="http://schemas.microsoft.com/office/drawing/2014/main" id="{968DD3D5-A621-EF4B-8DA0-91B3F7195E41}"/>
-              </a:ext>
-            </a:extLst>
-          </p:cNvPr>
-          <p:cNvSpPr txBox="1"/>
-          <p:nvPr/>
-        </p:nvSpPr>
-        <p:spPr>
-          <a:xfrm rot="16200000">
-            <a:off x="213723" y="3634257"/>
-            <a:ext cx="2124299" cy="338554"/>
-          </a:xfrm>
-          <a:prstGeom prst="rect">
-            <a:avLst/>
-          </a:prstGeom>
-          <a:noFill/>
-        </p:spPr>
-        <p:txBody>
-          <a:bodyPr wrap="none" rtlCol="0">
-            <a:spAutoFit/>
-          </a:bodyPr>
-          <a:lstStyle/>
-          <a:p>
-            <a:r>
-              <a:rPr lang="en-US" sz="1600" dirty="0">
-                <a:latin typeface="Helvetica" pitchFamily="2" charset="0"/>
-              </a:rPr>
-              <a:t>Area of land use type</a:t>
-            </a:r>
-          </a:p>
-        </p:txBody>
-      </p:sp>
-      <p:sp>
-        <p:nvSpPr>
           <p:cNvPr id="31" name="TextBox 30">
             <a:extLst>
               <a:ext uri="{FF2B5EF4-FFF2-40B4-BE49-F238E27FC236}">
@@ -11109,7 +11096,7 @@
           <p:nvPr/>
         </p:nvSpPr>
         <p:spPr>
-          <a:xfrm rot="19442147">
+          <a:xfrm rot="18647953">
             <a:off x="4380404" y="2426922"/>
             <a:ext cx="1120954" cy="307777"/>
           </a:xfrm>
@@ -11838,7 +11825,7 @@
         </p:nvSpPr>
         <p:spPr>
           <a:xfrm>
-            <a:off x="1459910" y="4358777"/>
+            <a:off x="8812546" y="4211195"/>
             <a:ext cx="3867609" cy="1754326"/>
           </a:xfrm>
           <a:prstGeom prst="rect">

</xml_diff>